<commit_message>
Completed Paper Presentation Powerpoint
</commit_message>
<xml_diff>
--- a/paper/848_Paper_Presentation_Fasburg_Thomas.pptx
+++ b/paper/848_Paper_Presentation_Fasburg_Thomas.pptx
@@ -5,11 +5,26 @@
     <p:sldMasterId id="2147483761" r:id="rId1"/>
   </p:sldMasterIdLst>
   <p:notesMasterIdLst>
-    <p:notesMasterId r:id="rId4"/>
+    <p:notesMasterId r:id="rId19"/>
   </p:notesMasterIdLst>
   <p:sldIdLst>
     <p:sldId id="256" r:id="rId2"/>
-    <p:sldId id="274" r:id="rId3"/>
+    <p:sldId id="275" r:id="rId3"/>
+    <p:sldId id="282" r:id="rId4"/>
+    <p:sldId id="276" r:id="rId5"/>
+    <p:sldId id="277" r:id="rId6"/>
+    <p:sldId id="278" r:id="rId7"/>
+    <p:sldId id="283" r:id="rId8"/>
+    <p:sldId id="279" r:id="rId9"/>
+    <p:sldId id="284" r:id="rId10"/>
+    <p:sldId id="280" r:id="rId11"/>
+    <p:sldId id="287" r:id="rId12"/>
+    <p:sldId id="285" r:id="rId13"/>
+    <p:sldId id="288" r:id="rId14"/>
+    <p:sldId id="289" r:id="rId15"/>
+    <p:sldId id="286" r:id="rId16"/>
+    <p:sldId id="281" r:id="rId17"/>
+    <p:sldId id="274" r:id="rId18"/>
   </p:sldIdLst>
   <p:sldSz cx="9144000" cy="6858000" type="screen4x3"/>
   <p:notesSz cx="6858000" cy="9144000"/>
@@ -110,7 +125,7 @@
   </p:defaultTextStyle>
   <p:extLst>
     <p:ext uri="{EFAFB233-063F-42B5-8137-9DF3F51BA10A}">
-      <p15:sldGuideLst xmlns:p15="http://schemas.microsoft.com/office/powerpoint/2012/main" xmlns="">
+      <p15:sldGuideLst xmlns="" xmlns:p15="http://schemas.microsoft.com/office/powerpoint/2012/main">
         <p15:guide id="1" orient="horz" pos="2160">
           <p15:clr>
             <a:srgbClr val="A4A3A4"/>
@@ -209,7 +224,7 @@
           <a:p>
             <a:fld id="{A63B8CFC-D614-4432-A7DB-A65856E85B43}" type="datetimeFigureOut">
               <a:rPr lang="en-US" smtClean="0"/>
-              <a:t>10/16/2015</a:t>
+              <a:t>10/25/2015</a:t>
             </a:fld>
             <a:endParaRPr lang="en-US" dirty="0"/>
           </a:p>
@@ -552,6 +567,470 @@
     <p:extLst>
       <p:ext uri="{BB962C8B-B14F-4D97-AF65-F5344CB8AC3E}">
         <p14:creationId xmlns:p14="http://schemas.microsoft.com/office/powerpoint/2010/main" val="240085532"/>
+      </p:ext>
+    </p:extLst>
+  </p:cSld>
+  <p:clrMapOvr>
+    <a:masterClrMapping/>
+  </p:clrMapOvr>
+</p:notes>
+</file>
+
+<file path=ppt/notesSlides/notesSlide2.xml><?xml version="1.0" encoding="utf-8"?>
+<p:notes xmlns:a="http://schemas.openxmlformats.org/drawingml/2006/main" xmlns:r="http://schemas.openxmlformats.org/officeDocument/2006/relationships" xmlns:p="http://schemas.openxmlformats.org/presentationml/2006/main">
+  <p:cSld>
+    <p:spTree>
+      <p:nvGrpSpPr>
+        <p:cNvPr id="1" name=""/>
+        <p:cNvGrpSpPr/>
+        <p:nvPr/>
+      </p:nvGrpSpPr>
+      <p:grpSpPr>
+        <a:xfrm>
+          <a:off x="0" y="0"/>
+          <a:ext cx="0" cy="0"/>
+          <a:chOff x="0" y="0"/>
+          <a:chExt cx="0" cy="0"/>
+        </a:xfrm>
+      </p:grpSpPr>
+      <p:sp>
+        <p:nvSpPr>
+          <p:cNvPr id="2" name="Slide Image Placeholder 1"/>
+          <p:cNvSpPr>
+            <a:spLocks noGrp="1" noRot="1" noChangeAspect="1"/>
+          </p:cNvSpPr>
+          <p:nvPr>
+            <p:ph type="sldImg"/>
+          </p:nvPr>
+        </p:nvSpPr>
+        <p:spPr/>
+      </p:sp>
+      <p:sp>
+        <p:nvSpPr>
+          <p:cNvPr id="3" name="Notes Placeholder 2"/>
+          <p:cNvSpPr>
+            <a:spLocks noGrp="1"/>
+          </p:cNvSpPr>
+          <p:nvPr>
+            <p:ph type="body" idx="1"/>
+          </p:nvPr>
+        </p:nvSpPr>
+        <p:spPr/>
+        <p:txBody>
+          <a:bodyPr/>
+          <a:lstStyle/>
+          <a:p>
+            <a:r>
+              <a:rPr lang="en-US" dirty="0" smtClean="0"/>
+              <a:t>Some</a:t>
+            </a:r>
+            <a:r>
+              <a:rPr lang="en-US" baseline="0" dirty="0" smtClean="0"/>
+              <a:t> are “flexible” meaning there is a 1% chance that after any given app is released, it will change it’s style. Later we will see what happens if everyone is flexible.</a:t>
+            </a:r>
+            <a:endParaRPr lang="en-US" dirty="0"/>
+          </a:p>
+        </p:txBody>
+      </p:sp>
+      <p:sp>
+        <p:nvSpPr>
+          <p:cNvPr id="4" name="Slide Number Placeholder 3"/>
+          <p:cNvSpPr>
+            <a:spLocks noGrp="1"/>
+          </p:cNvSpPr>
+          <p:nvPr>
+            <p:ph type="sldNum" sz="quarter" idx="10"/>
+          </p:nvPr>
+        </p:nvSpPr>
+        <p:spPr/>
+        <p:txBody>
+          <a:bodyPr/>
+          <a:lstStyle/>
+          <a:p>
+            <a:fld id="{B8B3BC3C-0900-4ACD-9030-5BE6C2442A68}" type="slidenum">
+              <a:rPr lang="en-US" smtClean="0"/>
+              <a:t>4</a:t>
+            </a:fld>
+            <a:endParaRPr lang="en-US" dirty="0"/>
+          </a:p>
+        </p:txBody>
+      </p:sp>
+    </p:spTree>
+    <p:extLst>
+      <p:ext uri="{BB962C8B-B14F-4D97-AF65-F5344CB8AC3E}">
+        <p14:creationId xmlns:p14="http://schemas.microsoft.com/office/powerpoint/2010/main" val="704678554"/>
+      </p:ext>
+    </p:extLst>
+  </p:cSld>
+  <p:clrMapOvr>
+    <a:masterClrMapping/>
+  </p:clrMapOvr>
+</p:notes>
+</file>
+
+<file path=ppt/notesSlides/notesSlide3.xml><?xml version="1.0" encoding="utf-8"?>
+<p:notes xmlns:a="http://schemas.openxmlformats.org/drawingml/2006/main" xmlns:r="http://schemas.openxmlformats.org/officeDocument/2006/relationships" xmlns:p="http://schemas.openxmlformats.org/presentationml/2006/main">
+  <p:cSld>
+    <p:spTree>
+      <p:nvGrpSpPr>
+        <p:cNvPr id="1" name=""/>
+        <p:cNvGrpSpPr/>
+        <p:nvPr/>
+      </p:nvGrpSpPr>
+      <p:grpSpPr>
+        <a:xfrm>
+          <a:off x="0" y="0"/>
+          <a:ext cx="0" cy="0"/>
+          <a:chOff x="0" y="0"/>
+          <a:chExt cx="0" cy="0"/>
+        </a:xfrm>
+      </p:grpSpPr>
+      <p:sp>
+        <p:nvSpPr>
+          <p:cNvPr id="2" name="Slide Image Placeholder 1"/>
+          <p:cNvSpPr>
+            <a:spLocks noGrp="1" noRot="1" noChangeAspect="1"/>
+          </p:cNvSpPr>
+          <p:nvPr>
+            <p:ph type="sldImg"/>
+          </p:nvPr>
+        </p:nvSpPr>
+        <p:spPr/>
+      </p:sp>
+      <p:sp>
+        <p:nvSpPr>
+          <p:cNvPr id="3" name="Notes Placeholder 2"/>
+          <p:cNvSpPr>
+            <a:spLocks noGrp="1"/>
+          </p:cNvSpPr>
+          <p:nvPr>
+            <p:ph type="body" idx="1"/>
+          </p:nvPr>
+        </p:nvSpPr>
+        <p:spPr/>
+        <p:txBody>
+          <a:bodyPr/>
+          <a:lstStyle/>
+          <a:p>
+            <a:r>
+              <a:rPr lang="en-US" dirty="0" smtClean="0"/>
+              <a:t>Diversity measured</a:t>
+            </a:r>
+            <a:r>
+              <a:rPr lang="en-US" baseline="0" dirty="0" smtClean="0"/>
+              <a:t> by a coefficient of feature variation, based on the mean and standard deviation of values from the feature grid.</a:t>
+            </a:r>
+            <a:endParaRPr lang="en-US" dirty="0"/>
+          </a:p>
+        </p:txBody>
+      </p:sp>
+      <p:sp>
+        <p:nvSpPr>
+          <p:cNvPr id="4" name="Slide Number Placeholder 3"/>
+          <p:cNvSpPr>
+            <a:spLocks noGrp="1"/>
+          </p:cNvSpPr>
+          <p:nvPr>
+            <p:ph type="sldNum" sz="quarter" idx="10"/>
+          </p:nvPr>
+        </p:nvSpPr>
+        <p:spPr/>
+        <p:txBody>
+          <a:bodyPr/>
+          <a:lstStyle/>
+          <a:p>
+            <a:fld id="{B8B3BC3C-0900-4ACD-9030-5BE6C2442A68}" type="slidenum">
+              <a:rPr lang="en-US" smtClean="0"/>
+              <a:t>10</a:t>
+            </a:fld>
+            <a:endParaRPr lang="en-US" dirty="0"/>
+          </a:p>
+        </p:txBody>
+      </p:sp>
+    </p:spTree>
+    <p:extLst>
+      <p:ext uri="{BB962C8B-B14F-4D97-AF65-F5344CB8AC3E}">
+        <p14:creationId xmlns:p14="http://schemas.microsoft.com/office/powerpoint/2010/main" val="1971904817"/>
+      </p:ext>
+    </p:extLst>
+  </p:cSld>
+  <p:clrMapOvr>
+    <a:masterClrMapping/>
+  </p:clrMapOvr>
+</p:notes>
+</file>
+
+<file path=ppt/notesSlides/notesSlide4.xml><?xml version="1.0" encoding="utf-8"?>
+<p:notes xmlns:a="http://schemas.openxmlformats.org/drawingml/2006/main" xmlns:r="http://schemas.openxmlformats.org/officeDocument/2006/relationships" xmlns:p="http://schemas.openxmlformats.org/presentationml/2006/main">
+  <p:cSld>
+    <p:spTree>
+      <p:nvGrpSpPr>
+        <p:cNvPr id="1" name=""/>
+        <p:cNvGrpSpPr/>
+        <p:nvPr/>
+      </p:nvGrpSpPr>
+      <p:grpSpPr>
+        <a:xfrm>
+          <a:off x="0" y="0"/>
+          <a:ext cx="0" cy="0"/>
+          <a:chOff x="0" y="0"/>
+          <a:chExt cx="0" cy="0"/>
+        </a:xfrm>
+      </p:grpSpPr>
+      <p:sp>
+        <p:nvSpPr>
+          <p:cNvPr id="2" name="Slide Image Placeholder 1"/>
+          <p:cNvSpPr>
+            <a:spLocks noGrp="1" noRot="1" noChangeAspect="1"/>
+          </p:cNvSpPr>
+          <p:nvPr>
+            <p:ph type="sldImg"/>
+          </p:nvPr>
+        </p:nvSpPr>
+        <p:spPr/>
+      </p:sp>
+      <p:sp>
+        <p:nvSpPr>
+          <p:cNvPr id="3" name="Notes Placeholder 2"/>
+          <p:cNvSpPr>
+            <a:spLocks noGrp="1"/>
+          </p:cNvSpPr>
+          <p:nvPr>
+            <p:ph type="body" idx="1"/>
+          </p:nvPr>
+        </p:nvSpPr>
+        <p:spPr/>
+        <p:txBody>
+          <a:bodyPr/>
+          <a:lstStyle/>
+          <a:p>
+            <a:endParaRPr lang="en-US" dirty="0"/>
+          </a:p>
+        </p:txBody>
+      </p:sp>
+      <p:sp>
+        <p:nvSpPr>
+          <p:cNvPr id="4" name="Slide Number Placeholder 3"/>
+          <p:cNvSpPr>
+            <a:spLocks noGrp="1"/>
+          </p:cNvSpPr>
+          <p:nvPr>
+            <p:ph type="sldNum" sz="quarter" idx="10"/>
+          </p:nvPr>
+        </p:nvSpPr>
+        <p:spPr/>
+        <p:txBody>
+          <a:bodyPr/>
+          <a:lstStyle/>
+          <a:p>
+            <a:fld id="{B8B3BC3C-0900-4ACD-9030-5BE6C2442A68}" type="slidenum">
+              <a:rPr lang="en-US" smtClean="0"/>
+              <a:t>13</a:t>
+            </a:fld>
+            <a:endParaRPr lang="en-US" dirty="0"/>
+          </a:p>
+        </p:txBody>
+      </p:sp>
+    </p:spTree>
+    <p:extLst>
+      <p:ext uri="{BB962C8B-B14F-4D97-AF65-F5344CB8AC3E}">
+        <p14:creationId xmlns:p14="http://schemas.microsoft.com/office/powerpoint/2010/main" val="336890695"/>
+      </p:ext>
+    </p:extLst>
+  </p:cSld>
+  <p:clrMapOvr>
+    <a:masterClrMapping/>
+  </p:clrMapOvr>
+</p:notes>
+</file>
+
+<file path=ppt/notesSlides/notesSlide5.xml><?xml version="1.0" encoding="utf-8"?>
+<p:notes xmlns:a="http://schemas.openxmlformats.org/drawingml/2006/main" xmlns:r="http://schemas.openxmlformats.org/officeDocument/2006/relationships" xmlns:p="http://schemas.openxmlformats.org/presentationml/2006/main">
+  <p:cSld>
+    <p:spTree>
+      <p:nvGrpSpPr>
+        <p:cNvPr id="1" name=""/>
+        <p:cNvGrpSpPr/>
+        <p:nvPr/>
+      </p:nvGrpSpPr>
+      <p:grpSpPr>
+        <a:xfrm>
+          <a:off x="0" y="0"/>
+          <a:ext cx="0" cy="0"/>
+          <a:chOff x="0" y="0"/>
+          <a:chExt cx="0" cy="0"/>
+        </a:xfrm>
+      </p:grpSpPr>
+      <p:sp>
+        <p:nvSpPr>
+          <p:cNvPr id="2" name="Slide Image Placeholder 1"/>
+          <p:cNvSpPr>
+            <a:spLocks noGrp="1" noRot="1" noChangeAspect="1"/>
+          </p:cNvSpPr>
+          <p:nvPr>
+            <p:ph type="sldImg"/>
+          </p:nvPr>
+        </p:nvSpPr>
+        <p:spPr/>
+      </p:sp>
+      <p:sp>
+        <p:nvSpPr>
+          <p:cNvPr id="3" name="Notes Placeholder 2"/>
+          <p:cNvSpPr>
+            <a:spLocks noGrp="1"/>
+          </p:cNvSpPr>
+          <p:nvPr>
+            <p:ph type="body" idx="1"/>
+          </p:nvPr>
+        </p:nvSpPr>
+        <p:spPr/>
+        <p:txBody>
+          <a:bodyPr/>
+          <a:lstStyle/>
+          <a:p>
+            <a:r>
+              <a:rPr lang="en-US" dirty="0" smtClean="0"/>
+              <a:t>Some user preferences were not met</a:t>
+            </a:r>
+            <a:r>
+              <a:rPr lang="en-US" baseline="0" dirty="0" smtClean="0"/>
+              <a:t> by a single app when the whole developer </a:t>
+            </a:r>
+            <a:r>
+              <a:rPr lang="en-US" baseline="0" dirty="0" err="1" smtClean="0"/>
+              <a:t>poulation</a:t>
+            </a:r>
+            <a:r>
+              <a:rPr lang="en-US" baseline="0" dirty="0" smtClean="0"/>
+              <a:t> was </a:t>
+            </a:r>
+            <a:r>
+              <a:rPr lang="en-US" baseline="0" smtClean="0"/>
+              <a:t>not flexible</a:t>
+            </a:r>
+            <a:endParaRPr lang="en-US"/>
+          </a:p>
+        </p:txBody>
+      </p:sp>
+      <p:sp>
+        <p:nvSpPr>
+          <p:cNvPr id="4" name="Slide Number Placeholder 3"/>
+          <p:cNvSpPr>
+            <a:spLocks noGrp="1"/>
+          </p:cNvSpPr>
+          <p:nvPr>
+            <p:ph type="sldNum" sz="quarter" idx="10"/>
+          </p:nvPr>
+        </p:nvSpPr>
+        <p:spPr/>
+        <p:txBody>
+          <a:bodyPr/>
+          <a:lstStyle/>
+          <a:p>
+            <a:fld id="{B8B3BC3C-0900-4ACD-9030-5BE6C2442A68}" type="slidenum">
+              <a:rPr lang="en-US" smtClean="0"/>
+              <a:t>14</a:t>
+            </a:fld>
+            <a:endParaRPr lang="en-US" dirty="0"/>
+          </a:p>
+        </p:txBody>
+      </p:sp>
+    </p:spTree>
+    <p:extLst>
+      <p:ext uri="{BB962C8B-B14F-4D97-AF65-F5344CB8AC3E}">
+        <p14:creationId xmlns:p14="http://schemas.microsoft.com/office/powerpoint/2010/main" val="336890695"/>
+      </p:ext>
+    </p:extLst>
+  </p:cSld>
+  <p:clrMapOvr>
+    <a:masterClrMapping/>
+  </p:clrMapOvr>
+</p:notes>
+</file>
+
+<file path=ppt/notesSlides/notesSlide6.xml><?xml version="1.0" encoding="utf-8"?>
+<p:notes xmlns:a="http://schemas.openxmlformats.org/drawingml/2006/main" xmlns:r="http://schemas.openxmlformats.org/officeDocument/2006/relationships" xmlns:p="http://schemas.openxmlformats.org/presentationml/2006/main">
+  <p:cSld>
+    <p:spTree>
+      <p:nvGrpSpPr>
+        <p:cNvPr id="1" name=""/>
+        <p:cNvGrpSpPr/>
+        <p:nvPr/>
+      </p:nvGrpSpPr>
+      <p:grpSpPr>
+        <a:xfrm>
+          <a:off x="0" y="0"/>
+          <a:ext cx="0" cy="0"/>
+          <a:chOff x="0" y="0"/>
+          <a:chExt cx="0" cy="0"/>
+        </a:xfrm>
+      </p:grpSpPr>
+      <p:sp>
+        <p:nvSpPr>
+          <p:cNvPr id="2" name="Slide Image Placeholder 1"/>
+          <p:cNvSpPr>
+            <a:spLocks noGrp="1" noRot="1" noChangeAspect="1"/>
+          </p:cNvSpPr>
+          <p:nvPr>
+            <p:ph type="sldImg"/>
+          </p:nvPr>
+        </p:nvSpPr>
+        <p:spPr/>
+      </p:sp>
+      <p:sp>
+        <p:nvSpPr>
+          <p:cNvPr id="3" name="Notes Placeholder 2"/>
+          <p:cNvSpPr>
+            <a:spLocks noGrp="1"/>
+          </p:cNvSpPr>
+          <p:nvPr>
+            <p:ph type="body" idx="1"/>
+          </p:nvPr>
+        </p:nvSpPr>
+        <p:spPr/>
+        <p:txBody>
+          <a:bodyPr/>
+          <a:lstStyle/>
+          <a:p>
+            <a:r>
+              <a:rPr lang="en-US" dirty="0" smtClean="0"/>
+              <a:t>Including some</a:t>
+            </a:r>
+            <a:r>
+              <a:rPr lang="en-US" baseline="0" dirty="0" smtClean="0"/>
+              <a:t> random elements in user and developer behaviors would be interesting. Should have tried to assess validity of results based on empirical data.</a:t>
+            </a:r>
+            <a:endParaRPr lang="en-US" dirty="0"/>
+          </a:p>
+        </p:txBody>
+      </p:sp>
+      <p:sp>
+        <p:nvSpPr>
+          <p:cNvPr id="4" name="Slide Number Placeholder 3"/>
+          <p:cNvSpPr>
+            <a:spLocks noGrp="1"/>
+          </p:cNvSpPr>
+          <p:nvPr>
+            <p:ph type="sldNum" sz="quarter" idx="10"/>
+          </p:nvPr>
+        </p:nvSpPr>
+        <p:spPr/>
+        <p:txBody>
+          <a:bodyPr/>
+          <a:lstStyle/>
+          <a:p>
+            <a:fld id="{B8B3BC3C-0900-4ACD-9030-5BE6C2442A68}" type="slidenum">
+              <a:rPr lang="en-US" smtClean="0"/>
+              <a:t>15</a:t>
+            </a:fld>
+            <a:endParaRPr lang="en-US" dirty="0"/>
+          </a:p>
+        </p:txBody>
+      </p:sp>
+    </p:spTree>
+    <p:extLst>
+      <p:ext uri="{BB962C8B-B14F-4D97-AF65-F5344CB8AC3E}">
+        <p14:creationId xmlns:p14="http://schemas.microsoft.com/office/powerpoint/2010/main" val="1865372894"/>
       </p:ext>
     </p:extLst>
   </p:cSld>
@@ -1186,7 +1665,7 @@
           <a:p>
             <a:fld id="{ADE5661A-BDAA-4579-B2F5-AA9011776D83}" type="datetimeFigureOut">
               <a:rPr lang="en-US" smtClean="0"/>
-              <a:t>10/16/2015</a:t>
+              <a:t>10/25/2015</a:t>
             </a:fld>
             <a:endParaRPr lang="en-US" dirty="0"/>
           </a:p>
@@ -1384,7 +1863,7 @@
             <a:fld id="{1D8BD707-D9CF-40AE-B4C6-C98DA3205C09}" type="datetimeFigureOut">
               <a:rPr lang="en-US" smtClean="0"/>
               <a:pPr/>
-              <a:t>10/16/2015</a:t>
+              <a:t>10/25/2015</a:t>
             </a:fld>
             <a:endParaRPr lang="en-US" dirty="0"/>
           </a:p>
@@ -1571,7 +2050,7 @@
             <a:fld id="{1D8BD707-D9CF-40AE-B4C6-C98DA3205C09}" type="datetimeFigureOut">
               <a:rPr lang="en-US" smtClean="0"/>
               <a:pPr/>
-              <a:t>10/16/2015</a:t>
+              <a:t>10/25/2015</a:t>
             </a:fld>
             <a:endParaRPr lang="en-US" dirty="0"/>
           </a:p>
@@ -1723,7 +2202,7 @@
             <a:fld id="{1D8BD707-D9CF-40AE-B4C6-C98DA3205C09}" type="datetimeFigureOut">
               <a:rPr lang="en-US" smtClean="0"/>
               <a:pPr/>
-              <a:t>10/16/2015</a:t>
+              <a:t>10/25/2015</a:t>
             </a:fld>
             <a:endParaRPr lang="en-US" dirty="0"/>
           </a:p>
@@ -1979,7 +2458,7 @@
           <a:p>
             <a:fld id="{7D698992-9F5B-4E9D-871D-4517B2EC8643}" type="datetimeFigureOut">
               <a:rPr lang="en-US" smtClean="0"/>
-              <a:t>10/16/2015</a:t>
+              <a:t>10/25/2015</a:t>
             </a:fld>
             <a:endParaRPr lang="en-US" dirty="0"/>
           </a:p>
@@ -2389,7 +2868,7 @@
             <a:fld id="{1D8BD707-D9CF-40AE-B4C6-C98DA3205C09}" type="datetimeFigureOut">
               <a:rPr lang="en-US" smtClean="0"/>
               <a:pPr/>
-              <a:t>10/16/2015</a:t>
+              <a:t>10/25/2015</a:t>
             </a:fld>
             <a:endParaRPr lang="en-US" dirty="0"/>
           </a:p>
@@ -2837,7 +3316,7 @@
             <a:fld id="{1D8BD707-D9CF-40AE-B4C6-C98DA3205C09}" type="datetimeFigureOut">
               <a:rPr lang="en-US" smtClean="0"/>
               <a:pPr/>
-              <a:t>10/16/2015</a:t>
+              <a:t>10/25/2015</a:t>
             </a:fld>
             <a:endParaRPr lang="en-US" dirty="0"/>
           </a:p>
@@ -2940,7 +3419,7 @@
             <a:fld id="{1D8BD707-D9CF-40AE-B4C6-C98DA3205C09}" type="datetimeFigureOut">
               <a:rPr lang="en-US" smtClean="0"/>
               <a:pPr/>
-              <a:t>10/16/2015</a:t>
+              <a:t>10/25/2015</a:t>
             </a:fld>
             <a:endParaRPr lang="en-US" dirty="0"/>
           </a:p>
@@ -3063,7 +3542,7 @@
             <a:fld id="{1D8BD707-D9CF-40AE-B4C6-C98DA3205C09}" type="datetimeFigureOut">
               <a:rPr lang="en-US" smtClean="0"/>
               <a:pPr/>
-              <a:t>10/16/2015</a:t>
+              <a:t>10/25/2015</a:t>
             </a:fld>
             <a:endParaRPr lang="en-US" dirty="0"/>
           </a:p>
@@ -3339,7 +3818,7 @@
             <a:fld id="{1D8BD707-D9CF-40AE-B4C6-C98DA3205C09}" type="datetimeFigureOut">
               <a:rPr lang="en-US" smtClean="0"/>
               <a:pPr/>
-              <a:t>10/16/2015</a:t>
+              <a:t>10/25/2015</a:t>
             </a:fld>
             <a:endParaRPr lang="en-US" dirty="0"/>
           </a:p>
@@ -3546,7 +4025,7 @@
             <a:fld id="{1D8BD707-D9CF-40AE-B4C6-C98DA3205C09}" type="datetimeFigureOut">
               <a:rPr lang="en-US" smtClean="0"/>
               <a:pPr/>
-              <a:t>10/16/2015</a:t>
+              <a:t>10/25/2015</a:t>
             </a:fld>
             <a:endParaRPr lang="en-US" dirty="0"/>
           </a:p>
@@ -4657,7 +5136,7 @@
             <a:fld id="{1D8BD707-D9CF-40AE-B4C6-C98DA3205C09}" type="datetimeFigureOut">
               <a:rPr lang="en-US" smtClean="0"/>
               <a:pPr/>
-              <a:t>10/16/2015</a:t>
+              <a:t>10/25/2015</a:t>
             </a:fld>
             <a:endParaRPr lang="en-US" dirty="0"/>
           </a:p>
@@ -5089,18 +5568,16 @@
           <a:p>
             <a:pPr algn="ctr"/>
             <a:r>
-              <a:rPr lang="en-US" sz="2800" dirty="0" smtClean="0"/>
-              <a:t>Improving Evolutionary Solutions to the Game of </a:t>
-            </a:r>
-            <a:r>
-              <a:rPr lang="en-US" sz="2800" dirty="0" err="1" smtClean="0"/>
-              <a:t>MasterMind</a:t>
-            </a:r>
-            <a:r>
-              <a:rPr lang="en-US" sz="2800" dirty="0" smtClean="0"/>
-              <a:t> Using an Entropy-Based Scoring Method</a:t>
-            </a:r>
-            <a:endParaRPr lang="en-US" sz="2800" dirty="0"/>
+              <a:rPr lang="en-US" sz="2800" dirty="0"/>
+              <a:t>How to be a Successful App Developer:</a:t>
+            </a:r>
+            <a:br>
+              <a:rPr lang="en-US" sz="2800" dirty="0"/>
+            </a:br>
+            <a:r>
+              <a:rPr lang="en-US" sz="2800" dirty="0"/>
+              <a:t>Lessons from the Simulation of an App Ecosystem</a:t>
+            </a:r>
           </a:p>
         </p:txBody>
       </p:sp>
@@ -5128,36 +5605,24 @@
           <a:p>
             <a:pPr algn="l"/>
             <a:r>
+              <a:rPr lang="en-US" sz="2000" dirty="0" smtClean="0"/>
+              <a:t>Paper by</a:t>
+            </a:r>
+            <a:r>
+              <a:rPr lang="en-US" sz="2000" dirty="0" smtClean="0"/>
+              <a:t>: </a:t>
+            </a:r>
+            <a:r>
+              <a:rPr lang="en-US" sz="2000" dirty="0" err="1"/>
+              <a:t>Soo</a:t>
+            </a:r>
+            <a:r>
               <a:rPr lang="en-US" sz="2000" dirty="0"/>
-              <a:t>Paper by: </a:t>
-            </a:r>
-            <a:r>
-              <a:rPr lang="en-US" sz="2000" dirty="0"/>
-              <a:t>J.J. </a:t>
-            </a:r>
-            <a:r>
-              <a:rPr lang="en-US" sz="2000" dirty="0" err="1"/>
-              <a:t>Merelo</a:t>
-            </a:r>
-            <a:r>
-              <a:rPr lang="en-US" sz="2000" dirty="0"/>
-              <a:t>, Pedro Castillo, Antonio </a:t>
-            </a:r>
-            <a:r>
-              <a:rPr lang="en-US" sz="2000" dirty="0" err="1"/>
-              <a:t>Mora</a:t>
-            </a:r>
-            <a:r>
-              <a:rPr lang="en-US" sz="2000" dirty="0"/>
-              <a:t>, and Anna </a:t>
-            </a:r>
-            <a:r>
-              <a:rPr lang="en-US" sz="2000" dirty="0" err="1" smtClean="0"/>
-              <a:t>Esparcia</a:t>
+              <a:t> Ling Lim, Peter J. </a:t>
             </a:r>
             <a:r>
               <a:rPr lang="en-US" sz="2000" dirty="0" smtClean="0"/>
-              <a:t>-Alcazar</a:t>
+              <a:t>Bentley</a:t>
             </a:r>
           </a:p>
           <a:p>
@@ -5168,15 +5633,7 @@
             <a:pPr algn="l"/>
             <a:r>
               <a:rPr lang="en-US" sz="2000" dirty="0" smtClean="0"/>
-              <a:t>Presentation by: Vince </a:t>
-            </a:r>
-            <a:r>
-              <a:rPr lang="en-US" sz="2000" dirty="0" smtClean="0"/>
-              <a:t>Fasburg and Josh </a:t>
-            </a:r>
-            <a:r>
-              <a:rPr lang="en-US" sz="2000" dirty="0" smtClean="0"/>
-              <a:t>Thomas</a:t>
+              <a:t>Presentation by: Vince Fasburg and Josh Thomas</a:t>
             </a:r>
             <a:endParaRPr lang="en-US" sz="2000" dirty="0"/>
           </a:p>
@@ -5202,6 +5659,1259 @@
 </p:sld>
 </file>
 
+<file path=ppt/slides/slide10.xml><?xml version="1.0" encoding="utf-8"?>
+<p:sld xmlns:a="http://schemas.openxmlformats.org/drawingml/2006/main" xmlns:r="http://schemas.openxmlformats.org/officeDocument/2006/relationships" xmlns:p="http://schemas.openxmlformats.org/presentationml/2006/main">
+  <p:cSld>
+    <p:spTree>
+      <p:nvGrpSpPr>
+        <p:cNvPr id="1" name=""/>
+        <p:cNvGrpSpPr/>
+        <p:nvPr/>
+      </p:nvGrpSpPr>
+      <p:grpSpPr>
+        <a:xfrm>
+          <a:off x="0" y="0"/>
+          <a:ext cx="0" cy="0"/>
+          <a:chOff x="0" y="0"/>
+          <a:chExt cx="0" cy="0"/>
+        </a:xfrm>
+      </p:grpSpPr>
+      <p:sp>
+        <p:nvSpPr>
+          <p:cNvPr id="2" name="Content Placeholder 1"/>
+          <p:cNvSpPr>
+            <a:spLocks noGrp="1"/>
+          </p:cNvSpPr>
+          <p:nvPr>
+            <p:ph idx="1"/>
+          </p:nvPr>
+        </p:nvSpPr>
+        <p:spPr>
+          <a:xfrm>
+            <a:off x="457200" y="1481328"/>
+            <a:ext cx="8229600" cy="4843272"/>
+          </a:xfrm>
+        </p:spPr>
+        <p:txBody>
+          <a:bodyPr>
+            <a:normAutofit lnSpcReduction="10000"/>
+          </a:bodyPr>
+          <a:lstStyle/>
+          <a:p>
+            <a:r>
+              <a:rPr lang="en-US" i="1" dirty="0"/>
+              <a:t>Which developer strategy enables individual developers </a:t>
+            </a:r>
+            <a:r>
+              <a:rPr lang="en-US" i="1" dirty="0" smtClean="0"/>
+              <a:t>to be </a:t>
+            </a:r>
+            <a:r>
+              <a:rPr lang="en-US" i="1" dirty="0"/>
+              <a:t>most successful</a:t>
+            </a:r>
+            <a:r>
+              <a:rPr lang="en-US" i="1" dirty="0" smtClean="0"/>
+              <a:t>?</a:t>
+            </a:r>
+          </a:p>
+          <a:p>
+            <a:endParaRPr lang="en-US" i="1" dirty="0" smtClean="0"/>
+          </a:p>
+          <a:p>
+            <a:endParaRPr lang="en-US" i="1" dirty="0"/>
+          </a:p>
+          <a:p>
+            <a:endParaRPr lang="en-US" i="1" dirty="0" smtClean="0"/>
+          </a:p>
+          <a:p>
+            <a:endParaRPr lang="en-US" i="1" dirty="0"/>
+          </a:p>
+          <a:p>
+            <a:endParaRPr lang="en-US" i="1" dirty="0" smtClean="0"/>
+          </a:p>
+          <a:p>
+            <a:endParaRPr lang="en-US" i="1" dirty="0"/>
+          </a:p>
+          <a:p>
+            <a:endParaRPr lang="en-US" i="1" dirty="0" smtClean="0"/>
+          </a:p>
+          <a:p>
+            <a:r>
+              <a:rPr lang="en-US" i="1" dirty="0"/>
+              <a:t>What is the diversity of apps produced by each strategy?</a:t>
+            </a:r>
+          </a:p>
+          <a:p>
+            <a:endParaRPr lang="en-US" i="1" dirty="0" smtClean="0"/>
+          </a:p>
+          <a:p>
+            <a:pPr marL="393192" lvl="1" indent="0">
+              <a:buNone/>
+            </a:pPr>
+            <a:endParaRPr lang="en-US" i="1" dirty="0"/>
+          </a:p>
+          <a:p>
+            <a:pPr marL="393192" lvl="1" indent="0">
+              <a:buNone/>
+            </a:pPr>
+            <a:endParaRPr lang="en-US" i="1" dirty="0" smtClean="0"/>
+          </a:p>
+        </p:txBody>
+      </p:sp>
+      <p:sp>
+        <p:nvSpPr>
+          <p:cNvPr id="3" name="Title 2"/>
+          <p:cNvSpPr>
+            <a:spLocks noGrp="1"/>
+          </p:cNvSpPr>
+          <p:nvPr>
+            <p:ph type="title"/>
+          </p:nvPr>
+        </p:nvSpPr>
+        <p:spPr/>
+        <p:txBody>
+          <a:bodyPr/>
+          <a:lstStyle/>
+          <a:p>
+            <a:r>
+              <a:rPr lang="en-US" dirty="0" smtClean="0"/>
+              <a:t>Results</a:t>
+            </a:r>
+            <a:endParaRPr lang="en-US" dirty="0"/>
+          </a:p>
+        </p:txBody>
+      </p:sp>
+      <p:pic>
+        <p:nvPicPr>
+          <p:cNvPr id="4098" name="Picture 2"/>
+          <p:cNvPicPr>
+            <a:picLocks noChangeAspect="1" noChangeArrowheads="1"/>
+          </p:cNvPicPr>
+          <p:nvPr/>
+        </p:nvPicPr>
+        <p:blipFill>
+          <a:blip r:embed="rId3">
+            <a:extLst>
+              <a:ext uri="{28A0092B-C50C-407E-A947-70E740481C1C}">
+                <a14:useLocalDpi xmlns:a14="http://schemas.microsoft.com/office/drawing/2010/main" val="0"/>
+              </a:ext>
+            </a:extLst>
+          </a:blip>
+          <a:srcRect/>
+          <a:stretch>
+            <a:fillRect/>
+          </a:stretch>
+        </p:blipFill>
+        <p:spPr bwMode="auto">
+          <a:xfrm>
+            <a:off x="1381125" y="2514600"/>
+            <a:ext cx="6381750" cy="2295525"/>
+          </a:xfrm>
+          <a:prstGeom prst="rect">
+            <a:avLst/>
+          </a:prstGeom>
+          <a:noFill/>
+          <a:ln>
+            <a:noFill/>
+          </a:ln>
+          <a:effectLst/>
+          <a:extLst>
+            <a:ext uri="{909E8E84-426E-40DD-AFC4-6F175D3DCCD1}">
+              <a14:hiddenFill xmlns:a14="http://schemas.microsoft.com/office/drawing/2010/main">
+                <a:solidFill>
+                  <a:schemeClr val="accent1"/>
+                </a:solidFill>
+              </a14:hiddenFill>
+            </a:ext>
+            <a:ext uri="{91240B29-F687-4F45-9708-019B960494DF}">
+              <a14:hiddenLine xmlns:a14="http://schemas.microsoft.com/office/drawing/2010/main" w="9525">
+                <a:solidFill>
+                  <a:schemeClr val="tx1"/>
+                </a:solidFill>
+                <a:miter lim="800000"/>
+                <a:headEnd/>
+                <a:tailEnd/>
+              </a14:hiddenLine>
+            </a:ext>
+            <a:ext uri="{AF507438-7753-43E0-B8FC-AC1667EBCBE1}">
+              <a14:hiddenEffects xmlns:a14="http://schemas.microsoft.com/office/drawing/2010/main">
+                <a:effectLst>
+                  <a:outerShdw dist="35921" dir="2700000" algn="ctr" rotWithShape="0">
+                    <a:schemeClr val="bg2"/>
+                  </a:outerShdw>
+                </a:effectLst>
+              </a14:hiddenEffects>
+            </a:ext>
+          </a:extLst>
+        </p:spPr>
+      </p:pic>
+      <p:sp>
+        <p:nvSpPr>
+          <p:cNvPr id="4" name="Line Callout 2 3"/>
+          <p:cNvSpPr/>
+          <p:nvPr/>
+        </p:nvSpPr>
+        <p:spPr>
+          <a:xfrm rot="16200000">
+            <a:off x="6096367" y="3209924"/>
+            <a:ext cx="2514600" cy="904875"/>
+          </a:xfrm>
+          <a:prstGeom prst="borderCallout2">
+            <a:avLst>
+              <a:gd name="adj1" fmla="val 44380"/>
+              <a:gd name="adj2" fmla="val -213"/>
+              <a:gd name="adj3" fmla="val 47899"/>
+              <a:gd name="adj4" fmla="val -34849"/>
+              <a:gd name="adj5" fmla="val -397443"/>
+              <a:gd name="adj6" fmla="val -35478"/>
+            </a:avLst>
+          </a:prstGeom>
+          <a:noFill/>
+        </p:spPr>
+        <p:style>
+          <a:lnRef idx="2">
+            <a:schemeClr val="accent1">
+              <a:shade val="50000"/>
+            </a:schemeClr>
+          </a:lnRef>
+          <a:fillRef idx="1">
+            <a:schemeClr val="accent1"/>
+          </a:fillRef>
+          <a:effectRef idx="0">
+            <a:schemeClr val="accent1"/>
+          </a:effectRef>
+          <a:fontRef idx="minor">
+            <a:schemeClr val="lt1"/>
+          </a:fontRef>
+        </p:style>
+        <p:txBody>
+          <a:bodyPr rtlCol="0" anchor="ctr"/>
+          <a:lstStyle/>
+          <a:p>
+            <a:pPr algn="ctr"/>
+            <a:endParaRPr lang="en-US"/>
+          </a:p>
+        </p:txBody>
+      </p:sp>
+      <p:sp>
+        <p:nvSpPr>
+          <p:cNvPr id="6" name="Line Callout 2 5"/>
+          <p:cNvSpPr/>
+          <p:nvPr/>
+        </p:nvSpPr>
+        <p:spPr>
+          <a:xfrm rot="5400000">
+            <a:off x="2933699" y="962026"/>
+            <a:ext cx="2295526" cy="5400675"/>
+          </a:xfrm>
+          <a:prstGeom prst="borderCallout2">
+            <a:avLst>
+              <a:gd name="adj1" fmla="val 49897"/>
+              <a:gd name="adj2" fmla="val 496"/>
+              <a:gd name="adj3" fmla="val -19322"/>
+              <a:gd name="adj4" fmla="val -20828"/>
+              <a:gd name="adj5" fmla="val 987"/>
+              <a:gd name="adj6" fmla="val -21475"/>
+            </a:avLst>
+          </a:prstGeom>
+          <a:noFill/>
+          <a:ln>
+            <a:solidFill>
+              <a:schemeClr val="accent2"/>
+            </a:solidFill>
+          </a:ln>
+        </p:spPr>
+        <p:style>
+          <a:lnRef idx="2">
+            <a:schemeClr val="accent1">
+              <a:shade val="50000"/>
+            </a:schemeClr>
+          </a:lnRef>
+          <a:fillRef idx="1">
+            <a:schemeClr val="accent1"/>
+          </a:fillRef>
+          <a:effectRef idx="0">
+            <a:schemeClr val="accent1"/>
+          </a:effectRef>
+          <a:fontRef idx="minor">
+            <a:schemeClr val="lt1"/>
+          </a:fontRef>
+        </p:style>
+        <p:txBody>
+          <a:bodyPr rtlCol="0" anchor="ctr"/>
+          <a:lstStyle/>
+          <a:p>
+            <a:pPr algn="ctr"/>
+            <a:endParaRPr lang="en-US">
+              <a:solidFill>
+                <a:schemeClr val="accent3"/>
+              </a:solidFill>
+            </a:endParaRPr>
+          </a:p>
+        </p:txBody>
+      </p:sp>
+    </p:spTree>
+    <p:extLst>
+      <p:ext uri="{BB962C8B-B14F-4D97-AF65-F5344CB8AC3E}">
+        <p14:creationId xmlns:p14="http://schemas.microsoft.com/office/powerpoint/2010/main" val="2077121703"/>
+      </p:ext>
+    </p:extLst>
+  </p:cSld>
+  <p:clrMapOvr>
+    <a:masterClrMapping/>
+  </p:clrMapOvr>
+</p:sld>
+</file>
+
+<file path=ppt/slides/slide11.xml><?xml version="1.0" encoding="utf-8"?>
+<p:sld xmlns:a="http://schemas.openxmlformats.org/drawingml/2006/main" xmlns:r="http://schemas.openxmlformats.org/officeDocument/2006/relationships" xmlns:p="http://schemas.openxmlformats.org/presentationml/2006/main">
+  <p:cSld>
+    <p:spTree>
+      <p:nvGrpSpPr>
+        <p:cNvPr id="1" name=""/>
+        <p:cNvGrpSpPr/>
+        <p:nvPr/>
+      </p:nvGrpSpPr>
+      <p:grpSpPr>
+        <a:xfrm>
+          <a:off x="0" y="0"/>
+          <a:ext cx="0" cy="0"/>
+          <a:chOff x="0" y="0"/>
+          <a:chExt cx="0" cy="0"/>
+        </a:xfrm>
+      </p:grpSpPr>
+      <p:sp>
+        <p:nvSpPr>
+          <p:cNvPr id="2" name="Content Placeholder 1"/>
+          <p:cNvSpPr>
+            <a:spLocks noGrp="1"/>
+          </p:cNvSpPr>
+          <p:nvPr>
+            <p:ph idx="1"/>
+          </p:nvPr>
+        </p:nvSpPr>
+        <p:spPr/>
+        <p:txBody>
+          <a:bodyPr/>
+          <a:lstStyle/>
+          <a:p>
+            <a:r>
+              <a:rPr lang="en-US" i="1" dirty="0" smtClean="0"/>
+              <a:t>Which strategy </a:t>
+            </a:r>
+            <a:r>
+              <a:rPr lang="en-US" i="1" dirty="0"/>
+              <a:t>enables the developer to </a:t>
+            </a:r>
+            <a:r>
+              <a:rPr lang="en-US" i="1" dirty="0" smtClean="0"/>
+              <a:t>improve as </a:t>
+            </a:r>
+            <a:r>
+              <a:rPr lang="en-US" i="1" dirty="0"/>
+              <a:t>they develop more apps? </a:t>
+            </a:r>
+          </a:p>
+          <a:p>
+            <a:pPr lvl="1"/>
+            <a:r>
+              <a:rPr lang="en-US" dirty="0" smtClean="0"/>
+              <a:t>Optimizer – continuously improving upon itself</a:t>
+            </a:r>
+          </a:p>
+          <a:p>
+            <a:pPr lvl="1"/>
+            <a:r>
+              <a:rPr lang="en-US" dirty="0" smtClean="0"/>
+              <a:t>Similar to (1+</a:t>
+            </a:r>
+            <a:r>
+              <a:rPr lang="el-GR" dirty="0" smtClean="0"/>
+              <a:t>λ</a:t>
+            </a:r>
+            <a:r>
+              <a:rPr lang="en-US" dirty="0" smtClean="0"/>
+              <a:t>) Evolutionary Strategy</a:t>
+            </a:r>
+          </a:p>
+          <a:p>
+            <a:pPr lvl="1"/>
+            <a:endParaRPr lang="en-US" dirty="0"/>
+          </a:p>
+        </p:txBody>
+      </p:sp>
+      <p:sp>
+        <p:nvSpPr>
+          <p:cNvPr id="3" name="Title 2"/>
+          <p:cNvSpPr>
+            <a:spLocks noGrp="1"/>
+          </p:cNvSpPr>
+          <p:nvPr>
+            <p:ph type="title"/>
+          </p:nvPr>
+        </p:nvSpPr>
+        <p:spPr/>
+        <p:txBody>
+          <a:bodyPr/>
+          <a:lstStyle/>
+          <a:p>
+            <a:r>
+              <a:rPr lang="en-US" dirty="0" smtClean="0"/>
+              <a:t>Results</a:t>
+            </a:r>
+            <a:endParaRPr lang="en-US" dirty="0"/>
+          </a:p>
+        </p:txBody>
+      </p:sp>
+      <p:pic>
+        <p:nvPicPr>
+          <p:cNvPr id="5122" name="Picture 2"/>
+          <p:cNvPicPr>
+            <a:picLocks noChangeAspect="1" noChangeArrowheads="1"/>
+          </p:cNvPicPr>
+          <p:nvPr/>
+        </p:nvPicPr>
+        <p:blipFill>
+          <a:blip r:embed="rId2">
+            <a:extLst>
+              <a:ext uri="{28A0092B-C50C-407E-A947-70E740481C1C}">
+                <a14:useLocalDpi xmlns:a14="http://schemas.microsoft.com/office/drawing/2010/main" val="0"/>
+              </a:ext>
+            </a:extLst>
+          </a:blip>
+          <a:srcRect/>
+          <a:stretch>
+            <a:fillRect/>
+          </a:stretch>
+        </p:blipFill>
+        <p:spPr bwMode="auto">
+          <a:xfrm>
+            <a:off x="2824646" y="3276600"/>
+            <a:ext cx="5709754" cy="3196536"/>
+          </a:xfrm>
+          <a:prstGeom prst="rect">
+            <a:avLst/>
+          </a:prstGeom>
+          <a:noFill/>
+          <a:ln>
+            <a:noFill/>
+          </a:ln>
+          <a:effectLst/>
+          <a:extLst>
+            <a:ext uri="{909E8E84-426E-40DD-AFC4-6F175D3DCCD1}">
+              <a14:hiddenFill xmlns:a14="http://schemas.microsoft.com/office/drawing/2010/main">
+                <a:solidFill>
+                  <a:schemeClr val="accent1"/>
+                </a:solidFill>
+              </a14:hiddenFill>
+            </a:ext>
+            <a:ext uri="{91240B29-F687-4F45-9708-019B960494DF}">
+              <a14:hiddenLine xmlns:a14="http://schemas.microsoft.com/office/drawing/2010/main" w="9525">
+                <a:solidFill>
+                  <a:schemeClr val="tx1"/>
+                </a:solidFill>
+                <a:miter lim="800000"/>
+                <a:headEnd/>
+                <a:tailEnd/>
+              </a14:hiddenLine>
+            </a:ext>
+            <a:ext uri="{AF507438-7753-43E0-B8FC-AC1667EBCBE1}">
+              <a14:hiddenEffects xmlns:a14="http://schemas.microsoft.com/office/drawing/2010/main">
+                <a:effectLst>
+                  <a:outerShdw dist="35921" dir="2700000" algn="ctr" rotWithShape="0">
+                    <a:schemeClr val="bg2"/>
+                  </a:outerShdw>
+                </a:effectLst>
+              </a14:hiddenEffects>
+            </a:ext>
+          </a:extLst>
+        </p:spPr>
+      </p:pic>
+      <p:cxnSp>
+        <p:nvCxnSpPr>
+          <p:cNvPr id="5" name="Straight Arrow Connector 4"/>
+          <p:cNvCxnSpPr/>
+          <p:nvPr/>
+        </p:nvCxnSpPr>
+        <p:spPr>
+          <a:xfrm>
+            <a:off x="1828800" y="3733800"/>
+            <a:ext cx="2362200" cy="990600"/>
+          </a:xfrm>
+          <a:prstGeom prst="straightConnector1">
+            <a:avLst/>
+          </a:prstGeom>
+          <a:ln w="38100">
+            <a:tailEnd type="arrow"/>
+          </a:ln>
+        </p:spPr>
+        <p:style>
+          <a:lnRef idx="1">
+            <a:schemeClr val="accent1"/>
+          </a:lnRef>
+          <a:fillRef idx="0">
+            <a:schemeClr val="accent1"/>
+          </a:fillRef>
+          <a:effectRef idx="0">
+            <a:schemeClr val="accent1"/>
+          </a:effectRef>
+          <a:fontRef idx="minor">
+            <a:schemeClr val="tx1"/>
+          </a:fontRef>
+        </p:style>
+      </p:cxnSp>
+    </p:spTree>
+    <p:extLst>
+      <p:ext uri="{BB962C8B-B14F-4D97-AF65-F5344CB8AC3E}">
+        <p14:creationId xmlns:p14="http://schemas.microsoft.com/office/powerpoint/2010/main" val="2195938618"/>
+      </p:ext>
+    </p:extLst>
+  </p:cSld>
+  <p:clrMapOvr>
+    <a:masterClrMapping/>
+  </p:clrMapOvr>
+</p:sld>
+</file>
+
+<file path=ppt/slides/slide12.xml><?xml version="1.0" encoding="utf-8"?>
+<p:sld xmlns:a="http://schemas.openxmlformats.org/drawingml/2006/main" xmlns:r="http://schemas.openxmlformats.org/officeDocument/2006/relationships" xmlns:p="http://schemas.openxmlformats.org/presentationml/2006/main">
+  <p:cSld>
+    <p:spTree>
+      <p:nvGrpSpPr>
+        <p:cNvPr id="1" name=""/>
+        <p:cNvGrpSpPr/>
+        <p:nvPr/>
+      </p:nvGrpSpPr>
+      <p:grpSpPr>
+        <a:xfrm>
+          <a:off x="0" y="0"/>
+          <a:ext cx="0" cy="0"/>
+          <a:chOff x="0" y="0"/>
+          <a:chExt cx="0" cy="0"/>
+        </a:xfrm>
+      </p:grpSpPr>
+      <p:sp>
+        <p:nvSpPr>
+          <p:cNvPr id="2" name="Content Placeholder 1"/>
+          <p:cNvSpPr>
+            <a:spLocks noGrp="1"/>
+          </p:cNvSpPr>
+          <p:nvPr>
+            <p:ph idx="1"/>
+          </p:nvPr>
+        </p:nvSpPr>
+        <p:spPr/>
+        <p:txBody>
+          <a:bodyPr/>
+          <a:lstStyle/>
+          <a:p>
+            <a:r>
+              <a:rPr lang="en-US" i="1" dirty="0"/>
+              <a:t>When strategies compete, how often is each strategy </a:t>
+            </a:r>
+            <a:r>
+              <a:rPr lang="en-US" i="1" dirty="0" smtClean="0"/>
+              <a:t>chosen by </a:t>
+            </a:r>
+            <a:r>
+              <a:rPr lang="en-US" i="1" dirty="0"/>
+              <a:t>developers? </a:t>
+            </a:r>
+            <a:endParaRPr lang="en-US" i="1" dirty="0" smtClean="0"/>
+          </a:p>
+          <a:p>
+            <a:pPr lvl="1"/>
+            <a:r>
+              <a:rPr lang="en-US" i="1" dirty="0" smtClean="0"/>
+              <a:t>Copycat is least often chosen, others vary widely by individual run</a:t>
+            </a:r>
+          </a:p>
+          <a:p>
+            <a:pPr lvl="1"/>
+            <a:endParaRPr lang="en-US" i="1" dirty="0" smtClean="0"/>
+          </a:p>
+        </p:txBody>
+      </p:sp>
+      <p:sp>
+        <p:nvSpPr>
+          <p:cNvPr id="3" name="Title 2"/>
+          <p:cNvSpPr>
+            <a:spLocks noGrp="1"/>
+          </p:cNvSpPr>
+          <p:nvPr>
+            <p:ph type="title"/>
+          </p:nvPr>
+        </p:nvSpPr>
+        <p:spPr/>
+        <p:txBody>
+          <a:bodyPr/>
+          <a:lstStyle/>
+          <a:p>
+            <a:r>
+              <a:rPr lang="en-US" dirty="0" smtClean="0"/>
+              <a:t>Results</a:t>
+            </a:r>
+            <a:endParaRPr lang="en-US" dirty="0"/>
+          </a:p>
+        </p:txBody>
+      </p:sp>
+      <p:pic>
+        <p:nvPicPr>
+          <p:cNvPr id="6147" name="Picture 3"/>
+          <p:cNvPicPr>
+            <a:picLocks noChangeAspect="1" noChangeArrowheads="1"/>
+          </p:cNvPicPr>
+          <p:nvPr/>
+        </p:nvPicPr>
+        <p:blipFill>
+          <a:blip r:embed="rId2">
+            <a:extLst>
+              <a:ext uri="{28A0092B-C50C-407E-A947-70E740481C1C}">
+                <a14:useLocalDpi xmlns:a14="http://schemas.microsoft.com/office/drawing/2010/main" val="0"/>
+              </a:ext>
+            </a:extLst>
+          </a:blip>
+          <a:srcRect/>
+          <a:stretch>
+            <a:fillRect/>
+          </a:stretch>
+        </p:blipFill>
+        <p:spPr bwMode="auto">
+          <a:xfrm>
+            <a:off x="1219200" y="3276600"/>
+            <a:ext cx="6353175" cy="1295400"/>
+          </a:xfrm>
+          <a:prstGeom prst="rect">
+            <a:avLst/>
+          </a:prstGeom>
+          <a:noFill/>
+          <a:ln>
+            <a:noFill/>
+          </a:ln>
+          <a:effectLst/>
+          <a:extLst>
+            <a:ext uri="{909E8E84-426E-40DD-AFC4-6F175D3DCCD1}">
+              <a14:hiddenFill xmlns:a14="http://schemas.microsoft.com/office/drawing/2010/main">
+                <a:solidFill>
+                  <a:schemeClr val="accent1"/>
+                </a:solidFill>
+              </a14:hiddenFill>
+            </a:ext>
+            <a:ext uri="{91240B29-F687-4F45-9708-019B960494DF}">
+              <a14:hiddenLine xmlns:a14="http://schemas.microsoft.com/office/drawing/2010/main" w="9525">
+                <a:solidFill>
+                  <a:schemeClr val="tx1"/>
+                </a:solidFill>
+                <a:miter lim="800000"/>
+                <a:headEnd/>
+                <a:tailEnd/>
+              </a14:hiddenLine>
+            </a:ext>
+            <a:ext uri="{AF507438-7753-43E0-B8FC-AC1667EBCBE1}">
+              <a14:hiddenEffects xmlns:a14="http://schemas.microsoft.com/office/drawing/2010/main">
+                <a:effectLst>
+                  <a:outerShdw dist="35921" dir="2700000" algn="ctr" rotWithShape="0">
+                    <a:schemeClr val="bg2"/>
+                  </a:outerShdw>
+                </a:effectLst>
+              </a14:hiddenEffects>
+            </a:ext>
+          </a:extLst>
+        </p:spPr>
+      </p:pic>
+    </p:spTree>
+    <p:extLst>
+      <p:ext uri="{BB962C8B-B14F-4D97-AF65-F5344CB8AC3E}">
+        <p14:creationId xmlns:p14="http://schemas.microsoft.com/office/powerpoint/2010/main" val="835891475"/>
+      </p:ext>
+    </p:extLst>
+  </p:cSld>
+  <p:clrMapOvr>
+    <a:masterClrMapping/>
+  </p:clrMapOvr>
+</p:sld>
+</file>
+
+<file path=ppt/slides/slide13.xml><?xml version="1.0" encoding="utf-8"?>
+<p:sld xmlns:a="http://schemas.openxmlformats.org/drawingml/2006/main" xmlns:r="http://schemas.openxmlformats.org/officeDocument/2006/relationships" xmlns:p="http://schemas.openxmlformats.org/presentationml/2006/main">
+  <p:cSld>
+    <p:spTree>
+      <p:nvGrpSpPr>
+        <p:cNvPr id="1" name=""/>
+        <p:cNvGrpSpPr/>
+        <p:nvPr/>
+      </p:nvGrpSpPr>
+      <p:grpSpPr>
+        <a:xfrm>
+          <a:off x="0" y="0"/>
+          <a:ext cx="0" cy="0"/>
+          <a:chOff x="0" y="0"/>
+          <a:chExt cx="0" cy="0"/>
+        </a:xfrm>
+      </p:grpSpPr>
+      <p:sp>
+        <p:nvSpPr>
+          <p:cNvPr id="2" name="Content Placeholder 1"/>
+          <p:cNvSpPr>
+            <a:spLocks noGrp="1"/>
+          </p:cNvSpPr>
+          <p:nvPr>
+            <p:ph idx="1"/>
+          </p:nvPr>
+        </p:nvSpPr>
+        <p:spPr/>
+        <p:txBody>
+          <a:bodyPr/>
+          <a:lstStyle/>
+          <a:p>
+            <a:r>
+              <a:rPr lang="en-US" i="1" dirty="0" smtClean="0"/>
+              <a:t>What </a:t>
+            </a:r>
+            <a:r>
+              <a:rPr lang="en-US" i="1" dirty="0"/>
+              <a:t>is the diversity of apps produced</a:t>
+            </a:r>
+            <a:r>
+              <a:rPr lang="en-US" i="1" dirty="0" smtClean="0"/>
+              <a:t>?</a:t>
+            </a:r>
+          </a:p>
+          <a:p>
+            <a:pPr lvl="1"/>
+            <a:r>
+              <a:rPr lang="en-US" dirty="0" err="1" smtClean="0"/>
+              <a:t>FeatureCV</a:t>
+            </a:r>
+            <a:r>
+              <a:rPr lang="en-US" dirty="0" smtClean="0"/>
+              <a:t> much higher when developers can change strategies (6.28% </a:t>
+            </a:r>
+            <a:r>
+              <a:rPr lang="en-US" dirty="0" err="1" smtClean="0"/>
+              <a:t>vs</a:t>
+            </a:r>
+            <a:r>
+              <a:rPr lang="en-US" dirty="0" smtClean="0"/>
+              <a:t> 2.33%)</a:t>
+            </a:r>
+          </a:p>
+          <a:p>
+            <a:pPr lvl="1"/>
+            <a:r>
+              <a:rPr lang="en-US" dirty="0" smtClean="0"/>
+              <a:t>Apps evenly cover user preferences when developers are flexible</a:t>
+            </a:r>
+          </a:p>
+          <a:p>
+            <a:pPr lvl="1"/>
+            <a:r>
+              <a:rPr lang="en-US" dirty="0" smtClean="0"/>
+              <a:t>Without all flexible developers, there were some user preferences that were not met by a single app!</a:t>
+            </a:r>
+          </a:p>
+        </p:txBody>
+      </p:sp>
+      <p:sp>
+        <p:nvSpPr>
+          <p:cNvPr id="3" name="Title 2"/>
+          <p:cNvSpPr>
+            <a:spLocks noGrp="1"/>
+          </p:cNvSpPr>
+          <p:nvPr>
+            <p:ph type="title"/>
+          </p:nvPr>
+        </p:nvSpPr>
+        <p:spPr/>
+        <p:txBody>
+          <a:bodyPr/>
+          <a:lstStyle/>
+          <a:p>
+            <a:r>
+              <a:rPr lang="en-US" dirty="0" smtClean="0"/>
+              <a:t>Results</a:t>
+            </a:r>
+            <a:endParaRPr lang="en-US" dirty="0"/>
+          </a:p>
+        </p:txBody>
+      </p:sp>
+    </p:spTree>
+    <p:extLst>
+      <p:ext uri="{BB962C8B-B14F-4D97-AF65-F5344CB8AC3E}">
+        <p14:creationId xmlns:p14="http://schemas.microsoft.com/office/powerpoint/2010/main" val="4283748578"/>
+      </p:ext>
+    </p:extLst>
+  </p:cSld>
+  <p:clrMapOvr>
+    <a:masterClrMapping/>
+  </p:clrMapOvr>
+</p:sld>
+</file>
+
+<file path=ppt/slides/slide14.xml><?xml version="1.0" encoding="utf-8"?>
+<p:sld xmlns:a="http://schemas.openxmlformats.org/drawingml/2006/main" xmlns:r="http://schemas.openxmlformats.org/officeDocument/2006/relationships" xmlns:p="http://schemas.openxmlformats.org/presentationml/2006/main">
+  <p:cSld>
+    <p:spTree>
+      <p:nvGrpSpPr>
+        <p:cNvPr id="1" name=""/>
+        <p:cNvGrpSpPr/>
+        <p:nvPr/>
+      </p:nvGrpSpPr>
+      <p:grpSpPr>
+        <a:xfrm>
+          <a:off x="0" y="0"/>
+          <a:ext cx="0" cy="0"/>
+          <a:chOff x="0" y="0"/>
+          <a:chExt cx="0" cy="0"/>
+        </a:xfrm>
+      </p:grpSpPr>
+      <p:sp>
+        <p:nvSpPr>
+          <p:cNvPr id="2" name="Content Placeholder 1"/>
+          <p:cNvSpPr>
+            <a:spLocks noGrp="1"/>
+          </p:cNvSpPr>
+          <p:nvPr>
+            <p:ph idx="1"/>
+          </p:nvPr>
+        </p:nvSpPr>
+        <p:spPr/>
+        <p:txBody>
+          <a:bodyPr/>
+          <a:lstStyle/>
+          <a:p>
+            <a:r>
+              <a:rPr lang="en-US" i="1" dirty="0" smtClean="0"/>
+              <a:t>Is this ecosystem able to improve its performance in the long term?</a:t>
+            </a:r>
+          </a:p>
+          <a:p>
+            <a:endParaRPr lang="en-US" i="1" dirty="0" smtClean="0"/>
+          </a:p>
+        </p:txBody>
+      </p:sp>
+      <p:sp>
+        <p:nvSpPr>
+          <p:cNvPr id="3" name="Title 2"/>
+          <p:cNvSpPr>
+            <a:spLocks noGrp="1"/>
+          </p:cNvSpPr>
+          <p:nvPr>
+            <p:ph type="title"/>
+          </p:nvPr>
+        </p:nvSpPr>
+        <p:spPr/>
+        <p:txBody>
+          <a:bodyPr/>
+          <a:lstStyle/>
+          <a:p>
+            <a:r>
+              <a:rPr lang="en-US" dirty="0" smtClean="0"/>
+              <a:t>Results</a:t>
+            </a:r>
+            <a:endParaRPr lang="en-US" dirty="0"/>
+          </a:p>
+        </p:txBody>
+      </p:sp>
+      <p:pic>
+        <p:nvPicPr>
+          <p:cNvPr id="7170" name="Picture 2"/>
+          <p:cNvPicPr>
+            <a:picLocks noChangeAspect="1" noChangeArrowheads="1"/>
+          </p:cNvPicPr>
+          <p:nvPr/>
+        </p:nvPicPr>
+        <p:blipFill>
+          <a:blip r:embed="rId3">
+            <a:extLst>
+              <a:ext uri="{28A0092B-C50C-407E-A947-70E740481C1C}">
+                <a14:useLocalDpi xmlns:a14="http://schemas.microsoft.com/office/drawing/2010/main" val="0"/>
+              </a:ext>
+            </a:extLst>
+          </a:blip>
+          <a:srcRect/>
+          <a:stretch>
+            <a:fillRect/>
+          </a:stretch>
+        </p:blipFill>
+        <p:spPr bwMode="auto">
+          <a:xfrm>
+            <a:off x="1143000" y="2362200"/>
+            <a:ext cx="6515726" cy="3048000"/>
+          </a:xfrm>
+          <a:prstGeom prst="rect">
+            <a:avLst/>
+          </a:prstGeom>
+          <a:noFill/>
+          <a:ln>
+            <a:noFill/>
+          </a:ln>
+          <a:effectLst/>
+          <a:extLst>
+            <a:ext uri="{909E8E84-426E-40DD-AFC4-6F175D3DCCD1}">
+              <a14:hiddenFill xmlns:a14="http://schemas.microsoft.com/office/drawing/2010/main">
+                <a:solidFill>
+                  <a:schemeClr val="accent1"/>
+                </a:solidFill>
+              </a14:hiddenFill>
+            </a:ext>
+            <a:ext uri="{91240B29-F687-4F45-9708-019B960494DF}">
+              <a14:hiddenLine xmlns:a14="http://schemas.microsoft.com/office/drawing/2010/main" w="9525">
+                <a:solidFill>
+                  <a:schemeClr val="tx1"/>
+                </a:solidFill>
+                <a:miter lim="800000"/>
+                <a:headEnd/>
+                <a:tailEnd/>
+              </a14:hiddenLine>
+            </a:ext>
+            <a:ext uri="{AF507438-7753-43E0-B8FC-AC1667EBCBE1}">
+              <a14:hiddenEffects xmlns:a14="http://schemas.microsoft.com/office/drawing/2010/main">
+                <a:effectLst>
+                  <a:outerShdw dist="35921" dir="2700000" algn="ctr" rotWithShape="0">
+                    <a:schemeClr val="bg2"/>
+                  </a:outerShdw>
+                </a:effectLst>
+              </a14:hiddenEffects>
+            </a:ext>
+          </a:extLst>
+        </p:spPr>
+      </p:pic>
+      <p:sp>
+        <p:nvSpPr>
+          <p:cNvPr id="4" name="TextBox 3"/>
+          <p:cNvSpPr txBox="1"/>
+          <p:nvPr/>
+        </p:nvSpPr>
+        <p:spPr>
+          <a:xfrm>
+            <a:off x="1695763" y="5410200"/>
+            <a:ext cx="5410200" cy="369332"/>
+          </a:xfrm>
+          <a:prstGeom prst="rect">
+            <a:avLst/>
+          </a:prstGeom>
+          <a:noFill/>
+        </p:spPr>
+        <p:txBody>
+          <a:bodyPr wrap="square" rtlCol="0">
+            <a:spAutoFit/>
+          </a:bodyPr>
+          <a:lstStyle/>
+          <a:p>
+            <a:r>
+              <a:rPr lang="en-US" dirty="0" smtClean="0"/>
+              <a:t>E1 = Fixed Strategies  E2 = Flexible Strategies</a:t>
+            </a:r>
+            <a:endParaRPr lang="en-US" dirty="0"/>
+          </a:p>
+        </p:txBody>
+      </p:sp>
+    </p:spTree>
+    <p:extLst>
+      <p:ext uri="{BB962C8B-B14F-4D97-AF65-F5344CB8AC3E}">
+        <p14:creationId xmlns:p14="http://schemas.microsoft.com/office/powerpoint/2010/main" val="3775357573"/>
+      </p:ext>
+    </p:extLst>
+  </p:cSld>
+  <p:clrMapOvr>
+    <a:masterClrMapping/>
+  </p:clrMapOvr>
+</p:sld>
+</file>
+
+<file path=ppt/slides/slide15.xml><?xml version="1.0" encoding="utf-8"?>
+<p:sld xmlns:a="http://schemas.openxmlformats.org/drawingml/2006/main" xmlns:r="http://schemas.openxmlformats.org/officeDocument/2006/relationships" xmlns:p="http://schemas.openxmlformats.org/presentationml/2006/main">
+  <p:cSld>
+    <p:spTree>
+      <p:nvGrpSpPr>
+        <p:cNvPr id="1" name=""/>
+        <p:cNvGrpSpPr/>
+        <p:nvPr/>
+      </p:nvGrpSpPr>
+      <p:grpSpPr>
+        <a:xfrm>
+          <a:off x="0" y="0"/>
+          <a:ext cx="0" cy="0"/>
+          <a:chOff x="0" y="0"/>
+          <a:chExt cx="0" cy="0"/>
+        </a:xfrm>
+      </p:grpSpPr>
+      <p:sp>
+        <p:nvSpPr>
+          <p:cNvPr id="2" name="Content Placeholder 1"/>
+          <p:cNvSpPr>
+            <a:spLocks noGrp="1"/>
+          </p:cNvSpPr>
+          <p:nvPr>
+            <p:ph idx="1"/>
+          </p:nvPr>
+        </p:nvSpPr>
+        <p:spPr/>
+        <p:txBody>
+          <a:bodyPr/>
+          <a:lstStyle/>
+          <a:p>
+            <a:r>
+              <a:rPr lang="en-US" dirty="0" smtClean="0"/>
+              <a:t>No reasons provided for choice of developer strategies</a:t>
+            </a:r>
+          </a:p>
+          <a:p>
+            <a:r>
+              <a:rPr lang="en-US" dirty="0" smtClean="0"/>
+              <a:t>Overly simplistic models for:</a:t>
+            </a:r>
+          </a:p>
+          <a:p>
+            <a:pPr lvl="1"/>
+            <a:r>
+              <a:rPr lang="en-US" dirty="0" smtClean="0"/>
+              <a:t>User preferences</a:t>
+            </a:r>
+          </a:p>
+          <a:p>
+            <a:pPr lvl="1"/>
+            <a:r>
+              <a:rPr lang="en-US" dirty="0" smtClean="0"/>
+              <a:t>User download patterns</a:t>
+            </a:r>
+          </a:p>
+          <a:p>
+            <a:pPr lvl="1"/>
+            <a:r>
+              <a:rPr lang="en-US" dirty="0" smtClean="0"/>
+              <a:t>Number of developers</a:t>
+            </a:r>
+          </a:p>
+          <a:p>
+            <a:pPr lvl="1"/>
+            <a:r>
+              <a:rPr lang="en-US" dirty="0" smtClean="0"/>
+              <a:t>Developer app creations times</a:t>
+            </a:r>
+          </a:p>
+          <a:p>
+            <a:r>
+              <a:rPr lang="en-US" dirty="0"/>
+              <a:t>Lack of evidence that results predict real world</a:t>
+            </a:r>
+          </a:p>
+          <a:p>
+            <a:pPr lvl="1"/>
+            <a:endParaRPr lang="en-US" dirty="0" smtClean="0"/>
+          </a:p>
+          <a:p>
+            <a:pPr lvl="1"/>
+            <a:endParaRPr lang="en-US" dirty="0"/>
+          </a:p>
+        </p:txBody>
+      </p:sp>
+      <p:sp>
+        <p:nvSpPr>
+          <p:cNvPr id="3" name="Title 2"/>
+          <p:cNvSpPr>
+            <a:spLocks noGrp="1"/>
+          </p:cNvSpPr>
+          <p:nvPr>
+            <p:ph type="title"/>
+          </p:nvPr>
+        </p:nvSpPr>
+        <p:spPr/>
+        <p:txBody>
+          <a:bodyPr/>
+          <a:lstStyle/>
+          <a:p>
+            <a:r>
+              <a:rPr lang="en-US" dirty="0" smtClean="0"/>
+              <a:t>Limitations</a:t>
+            </a:r>
+            <a:endParaRPr lang="en-US" dirty="0"/>
+          </a:p>
+        </p:txBody>
+      </p:sp>
+    </p:spTree>
+    <p:extLst>
+      <p:ext uri="{BB962C8B-B14F-4D97-AF65-F5344CB8AC3E}">
+        <p14:creationId xmlns:p14="http://schemas.microsoft.com/office/powerpoint/2010/main" val="1697217071"/>
+      </p:ext>
+    </p:extLst>
+  </p:cSld>
+  <p:clrMapOvr>
+    <a:masterClrMapping/>
+  </p:clrMapOvr>
+</p:sld>
+</file>
+
+<file path=ppt/slides/slide16.xml><?xml version="1.0" encoding="utf-8"?>
+<p:sld xmlns:a="http://schemas.openxmlformats.org/drawingml/2006/main" xmlns:r="http://schemas.openxmlformats.org/officeDocument/2006/relationships" xmlns:p="http://schemas.openxmlformats.org/presentationml/2006/main">
+  <p:cSld>
+    <p:spTree>
+      <p:nvGrpSpPr>
+        <p:cNvPr id="1" name=""/>
+        <p:cNvGrpSpPr/>
+        <p:nvPr/>
+      </p:nvGrpSpPr>
+      <p:grpSpPr>
+        <a:xfrm>
+          <a:off x="0" y="0"/>
+          <a:ext cx="0" cy="0"/>
+          <a:chOff x="0" y="0"/>
+          <a:chExt cx="0" cy="0"/>
+        </a:xfrm>
+      </p:grpSpPr>
+      <p:sp>
+        <p:nvSpPr>
+          <p:cNvPr id="2" name="Content Placeholder 1"/>
+          <p:cNvSpPr>
+            <a:spLocks noGrp="1"/>
+          </p:cNvSpPr>
+          <p:nvPr>
+            <p:ph idx="1"/>
+          </p:nvPr>
+        </p:nvSpPr>
+        <p:spPr/>
+        <p:txBody>
+          <a:bodyPr/>
+          <a:lstStyle/>
+          <a:p>
+            <a:r>
+              <a:rPr lang="en-US" dirty="0" smtClean="0"/>
+              <a:t>Copycat is most lucrative for developers</a:t>
+            </a:r>
+          </a:p>
+          <a:p>
+            <a:pPr lvl="1"/>
+            <a:r>
+              <a:rPr lang="en-US" dirty="0" smtClean="0"/>
+              <a:t>This only works when a minority of developers follow copycat strategy</a:t>
+            </a:r>
+          </a:p>
+          <a:p>
+            <a:pPr lvl="1"/>
+            <a:r>
+              <a:rPr lang="en-US" dirty="0" smtClean="0"/>
+              <a:t>Good apps needed from other developers to be copied</a:t>
+            </a:r>
+          </a:p>
+          <a:p>
+            <a:r>
+              <a:rPr lang="en-US" dirty="0" smtClean="0"/>
+              <a:t>App diversity and fitness over time is improved by making developer strategies flexible</a:t>
+            </a:r>
+          </a:p>
+          <a:p>
+            <a:r>
+              <a:rPr lang="en-US" dirty="0" smtClean="0"/>
+              <a:t>More work needed comparing results to real world and adjusting </a:t>
+            </a:r>
+            <a:r>
+              <a:rPr lang="en-US" smtClean="0"/>
+              <a:t>models accordingly</a:t>
+            </a:r>
+            <a:endParaRPr lang="en-US" dirty="0" smtClean="0"/>
+          </a:p>
+          <a:p>
+            <a:endParaRPr lang="en-US" dirty="0"/>
+          </a:p>
+        </p:txBody>
+      </p:sp>
+      <p:sp>
+        <p:nvSpPr>
+          <p:cNvPr id="3" name="Title 2"/>
+          <p:cNvSpPr>
+            <a:spLocks noGrp="1"/>
+          </p:cNvSpPr>
+          <p:nvPr>
+            <p:ph type="title"/>
+          </p:nvPr>
+        </p:nvSpPr>
+        <p:spPr/>
+        <p:txBody>
+          <a:bodyPr/>
+          <a:lstStyle/>
+          <a:p>
+            <a:r>
+              <a:rPr lang="en-US" dirty="0" smtClean="0"/>
+              <a:t>Conclusions</a:t>
+            </a:r>
+            <a:endParaRPr lang="en-US" dirty="0"/>
+          </a:p>
+        </p:txBody>
+      </p:sp>
+    </p:spTree>
+    <p:extLst>
+      <p:ext uri="{BB962C8B-B14F-4D97-AF65-F5344CB8AC3E}">
+        <p14:creationId xmlns:p14="http://schemas.microsoft.com/office/powerpoint/2010/main" val="3583244977"/>
+      </p:ext>
+    </p:extLst>
+  </p:cSld>
+  <p:clrMapOvr>
+    <a:masterClrMapping/>
+  </p:clrMapOvr>
+</p:sld>
+</file>
+
+<file path=ppt/slides/slide17.xml><?xml version="1.0" encoding="utf-8"?>
+<p:sld xmlns:a="http://schemas.openxmlformats.org/drawingml/2006/main" xmlns:r="http://schemas.openxmlformats.org/officeDocument/2006/relationships" xmlns:p="http://schemas.openxmlformats.org/presentationml/2006/main">
+  <p:cSld>
+    <p:spTree>
+      <p:nvGrpSpPr>
+        <p:cNvPr id="1" name=""/>
+        <p:cNvGrpSpPr/>
+        <p:nvPr/>
+      </p:nvGrpSpPr>
+      <p:grpSpPr>
+        <a:xfrm>
+          <a:off x="0" y="0"/>
+          <a:ext cx="0" cy="0"/>
+          <a:chOff x="0" y="0"/>
+          <a:chExt cx="0" cy="0"/>
+        </a:xfrm>
+      </p:grpSpPr>
+      <p:sp>
+        <p:nvSpPr>
+          <p:cNvPr id="4" name="Title 3"/>
+          <p:cNvSpPr>
+            <a:spLocks noGrp="1"/>
+          </p:cNvSpPr>
+          <p:nvPr>
+            <p:ph type="title"/>
+          </p:nvPr>
+        </p:nvSpPr>
+        <p:spPr>
+          <a:xfrm>
+            <a:off x="609600" y="2438400"/>
+            <a:ext cx="7772400" cy="1143000"/>
+          </a:xfrm>
+        </p:spPr>
+        <p:txBody>
+          <a:bodyPr/>
+          <a:lstStyle/>
+          <a:p>
+            <a:pPr algn="ctr"/>
+            <a:r>
+              <a:rPr lang="en-US" dirty="0" smtClean="0"/>
+              <a:t>Questions?</a:t>
+            </a:r>
+            <a:endParaRPr lang="en-US" dirty="0"/>
+          </a:p>
+        </p:txBody>
+      </p:sp>
+    </p:spTree>
+    <p:extLst>
+      <p:ext uri="{BB962C8B-B14F-4D97-AF65-F5344CB8AC3E}">
+        <p14:creationId xmlns:p14="http://schemas.microsoft.com/office/powerpoint/2010/main" val="4283767605"/>
+      </p:ext>
+    </p:extLst>
+  </p:cSld>
+  <p:clrMapOvr>
+    <a:masterClrMapping/>
+  </p:clrMapOvr>
+</p:sld>
+</file>
+
 <file path=ppt/slides/slide2.xml><?xml version="1.0" encoding="utf-8"?>
 <p:sld xmlns:a="http://schemas.openxmlformats.org/drawingml/2006/main" xmlns:r="http://schemas.openxmlformats.org/officeDocument/2006/relationships" xmlns:p="http://schemas.openxmlformats.org/presentationml/2006/main">
   <p:cSld>
@@ -5221,28 +6931,51 @@
       </p:grpSpPr>
       <p:sp>
         <p:nvSpPr>
-          <p:cNvPr id="4" name="Title 3"/>
-          <p:cNvSpPr>
-            <a:spLocks noGrp="1"/>
-          </p:cNvSpPr>
-          <p:nvPr>
-            <p:ph type="title"/>
-          </p:nvPr>
-        </p:nvSpPr>
-        <p:spPr>
-          <a:xfrm>
-            <a:off x="609600" y="2438400"/>
-            <a:ext cx="7772400" cy="1143000"/>
-          </a:xfrm>
-        </p:spPr>
+          <p:cNvPr id="2" name="Content Placeholder 1"/>
+          <p:cNvSpPr>
+            <a:spLocks noGrp="1"/>
+          </p:cNvSpPr>
+          <p:nvPr>
+            <p:ph idx="1"/>
+          </p:nvPr>
+        </p:nvSpPr>
+        <p:spPr/>
         <p:txBody>
           <a:bodyPr/>
           <a:lstStyle/>
           <a:p>
-            <a:pPr algn="ctr"/>
             <a:r>
               <a:rPr lang="en-US" dirty="0" smtClean="0"/>
-              <a:t>Questions?</a:t>
+              <a:t>Agent-Based Models model complex systems by the interaction of autonomous “agents”</a:t>
+            </a:r>
+          </a:p>
+          <a:p>
+            <a:r>
+              <a:rPr lang="en-US" dirty="0" smtClean="0"/>
+              <a:t>Models used to predict emergent behaviors</a:t>
+            </a:r>
+            <a:endParaRPr lang="en-US" dirty="0"/>
+          </a:p>
+        </p:txBody>
+      </p:sp>
+      <p:sp>
+        <p:nvSpPr>
+          <p:cNvPr id="3" name="Title 2"/>
+          <p:cNvSpPr>
+            <a:spLocks noGrp="1"/>
+          </p:cNvSpPr>
+          <p:nvPr>
+            <p:ph type="title"/>
+          </p:nvPr>
+        </p:nvSpPr>
+        <p:spPr/>
+        <p:txBody>
+          <a:bodyPr/>
+          <a:lstStyle/>
+          <a:p>
+            <a:r>
+              <a:rPr lang="en-US" dirty="0" smtClean="0"/>
+              <a:t>Background</a:t>
             </a:r>
             <a:endParaRPr lang="en-US" dirty="0"/>
           </a:p>
@@ -5251,7 +6984,1543 @@
     </p:spTree>
     <p:extLst>
       <p:ext uri="{BB962C8B-B14F-4D97-AF65-F5344CB8AC3E}">
-        <p14:creationId xmlns:p14="http://schemas.microsoft.com/office/powerpoint/2010/main" val="4283767605"/>
+        <p14:creationId xmlns:p14="http://schemas.microsoft.com/office/powerpoint/2010/main" val="878043551"/>
+      </p:ext>
+    </p:extLst>
+  </p:cSld>
+  <p:clrMapOvr>
+    <a:masterClrMapping/>
+  </p:clrMapOvr>
+</p:sld>
+</file>
+
+<file path=ppt/slides/slide3.xml><?xml version="1.0" encoding="utf-8"?>
+<p:sld xmlns:a="http://schemas.openxmlformats.org/drawingml/2006/main" xmlns:r="http://schemas.openxmlformats.org/officeDocument/2006/relationships" xmlns:p="http://schemas.openxmlformats.org/presentationml/2006/main">
+  <p:cSld>
+    <p:spTree>
+      <p:nvGrpSpPr>
+        <p:cNvPr id="1" name=""/>
+        <p:cNvGrpSpPr/>
+        <p:nvPr/>
+      </p:nvGrpSpPr>
+      <p:grpSpPr>
+        <a:xfrm>
+          <a:off x="0" y="0"/>
+          <a:ext cx="0" cy="0"/>
+          <a:chOff x="0" y="0"/>
+          <a:chExt cx="0" cy="0"/>
+        </a:xfrm>
+      </p:grpSpPr>
+      <p:sp>
+        <p:nvSpPr>
+          <p:cNvPr id="3" name="Title 2"/>
+          <p:cNvSpPr>
+            <a:spLocks noGrp="1"/>
+          </p:cNvSpPr>
+          <p:nvPr>
+            <p:ph type="title"/>
+          </p:nvPr>
+        </p:nvSpPr>
+        <p:spPr>
+          <a:xfrm>
+            <a:off x="454513" y="246185"/>
+            <a:ext cx="8229600" cy="1143000"/>
+          </a:xfrm>
+        </p:spPr>
+        <p:txBody>
+          <a:bodyPr/>
+          <a:lstStyle/>
+          <a:p>
+            <a:r>
+              <a:rPr lang="en-US" dirty="0" smtClean="0"/>
+              <a:t>The Model</a:t>
+            </a:r>
+            <a:endParaRPr lang="en-US" dirty="0"/>
+          </a:p>
+        </p:txBody>
+      </p:sp>
+      <p:sp>
+        <p:nvSpPr>
+          <p:cNvPr id="4" name="Cloud 3"/>
+          <p:cNvSpPr/>
+          <p:nvPr/>
+        </p:nvSpPr>
+        <p:spPr>
+          <a:xfrm>
+            <a:off x="926123" y="1460562"/>
+            <a:ext cx="6324600" cy="2514600"/>
+          </a:xfrm>
+          <a:prstGeom prst="cloud">
+            <a:avLst/>
+          </a:prstGeom>
+          <a:solidFill>
+            <a:schemeClr val="bg1"/>
+          </a:solidFill>
+        </p:spPr>
+        <p:style>
+          <a:lnRef idx="2">
+            <a:schemeClr val="accent1">
+              <a:shade val="50000"/>
+            </a:schemeClr>
+          </a:lnRef>
+          <a:fillRef idx="1">
+            <a:schemeClr val="accent1"/>
+          </a:fillRef>
+          <a:effectRef idx="0">
+            <a:schemeClr val="accent1"/>
+          </a:effectRef>
+          <a:fontRef idx="minor">
+            <a:schemeClr val="lt1"/>
+          </a:fontRef>
+        </p:style>
+        <p:txBody>
+          <a:bodyPr rtlCol="0" anchor="ctr"/>
+          <a:lstStyle/>
+          <a:p>
+            <a:pPr algn="ctr"/>
+            <a:endParaRPr lang="en-US"/>
+          </a:p>
+        </p:txBody>
+      </p:sp>
+      <p:sp>
+        <p:nvSpPr>
+          <p:cNvPr id="5" name="AutoShape 2" descr="Image result for facebook icon"/>
+          <p:cNvSpPr>
+            <a:spLocks noChangeAspect="1" noChangeArrowheads="1"/>
+          </p:cNvSpPr>
+          <p:nvPr/>
+        </p:nvSpPr>
+        <p:spPr bwMode="auto">
+          <a:xfrm>
+            <a:off x="155575" y="-144463"/>
+            <a:ext cx="304800" cy="304801"/>
+          </a:xfrm>
+          <a:prstGeom prst="rect">
+            <a:avLst/>
+          </a:prstGeom>
+          <a:noFill/>
+          <a:extLst>
+            <a:ext uri="{909E8E84-426E-40DD-AFC4-6F175D3DCCD1}">
+              <a14:hiddenFill xmlns:a14="http://schemas.microsoft.com/office/drawing/2010/main">
+                <a:solidFill>
+                  <a:srgbClr val="FFFFFF"/>
+                </a:solidFill>
+              </a14:hiddenFill>
+            </a:ext>
+          </a:extLst>
+        </p:spPr>
+        <p:txBody>
+          <a:bodyPr vert="horz" wrap="square" lIns="91440" tIns="45720" rIns="91440" bIns="45720" numCol="1" anchor="t" anchorCtr="0" compatLnSpc="1">
+            <a:prstTxWarp prst="textNoShape">
+              <a:avLst/>
+            </a:prstTxWarp>
+          </a:bodyPr>
+          <a:lstStyle/>
+          <a:p>
+            <a:endParaRPr lang="en-US"/>
+          </a:p>
+        </p:txBody>
+      </p:sp>
+      <p:sp>
+        <p:nvSpPr>
+          <p:cNvPr id="6" name="AutoShape 4" descr="Image result for facebook icon"/>
+          <p:cNvSpPr>
+            <a:spLocks noChangeAspect="1" noChangeArrowheads="1"/>
+          </p:cNvSpPr>
+          <p:nvPr/>
+        </p:nvSpPr>
+        <p:spPr bwMode="auto">
+          <a:xfrm>
+            <a:off x="307975" y="7937"/>
+            <a:ext cx="304800" cy="304801"/>
+          </a:xfrm>
+          <a:prstGeom prst="rect">
+            <a:avLst/>
+          </a:prstGeom>
+          <a:noFill/>
+          <a:extLst>
+            <a:ext uri="{909E8E84-426E-40DD-AFC4-6F175D3DCCD1}">
+              <a14:hiddenFill xmlns:a14="http://schemas.microsoft.com/office/drawing/2010/main">
+                <a:solidFill>
+                  <a:srgbClr val="FFFFFF"/>
+                </a:solidFill>
+              </a14:hiddenFill>
+            </a:ext>
+          </a:extLst>
+        </p:spPr>
+        <p:txBody>
+          <a:bodyPr vert="horz" wrap="square" lIns="91440" tIns="45720" rIns="91440" bIns="45720" numCol="1" anchor="t" anchorCtr="0" compatLnSpc="1">
+            <a:prstTxWarp prst="textNoShape">
+              <a:avLst/>
+            </a:prstTxWarp>
+          </a:bodyPr>
+          <a:lstStyle/>
+          <a:p>
+            <a:endParaRPr lang="en-US"/>
+          </a:p>
+        </p:txBody>
+      </p:sp>
+      <p:sp>
+        <p:nvSpPr>
+          <p:cNvPr id="7" name="AutoShape 7" descr="Image result for social media app icons"/>
+          <p:cNvSpPr>
+            <a:spLocks noChangeAspect="1" noChangeArrowheads="1"/>
+          </p:cNvSpPr>
+          <p:nvPr/>
+        </p:nvSpPr>
+        <p:spPr bwMode="auto">
+          <a:xfrm>
+            <a:off x="460375" y="160337"/>
+            <a:ext cx="304800" cy="304801"/>
+          </a:xfrm>
+          <a:prstGeom prst="rect">
+            <a:avLst/>
+          </a:prstGeom>
+          <a:noFill/>
+          <a:extLst>
+            <a:ext uri="{909E8E84-426E-40DD-AFC4-6F175D3DCCD1}">
+              <a14:hiddenFill xmlns:a14="http://schemas.microsoft.com/office/drawing/2010/main">
+                <a:solidFill>
+                  <a:srgbClr val="FFFFFF"/>
+                </a:solidFill>
+              </a14:hiddenFill>
+            </a:ext>
+          </a:extLst>
+        </p:spPr>
+        <p:txBody>
+          <a:bodyPr vert="horz" wrap="square" lIns="91440" tIns="45720" rIns="91440" bIns="45720" numCol="1" anchor="t" anchorCtr="0" compatLnSpc="1">
+            <a:prstTxWarp prst="textNoShape">
+              <a:avLst/>
+            </a:prstTxWarp>
+          </a:bodyPr>
+          <a:lstStyle/>
+          <a:p>
+            <a:endParaRPr lang="en-US"/>
+          </a:p>
+        </p:txBody>
+      </p:sp>
+      <p:pic>
+        <p:nvPicPr>
+          <p:cNvPr id="1033" name="Picture 9"/>
+          <p:cNvPicPr>
+            <a:picLocks noChangeAspect="1" noChangeArrowheads="1"/>
+          </p:cNvPicPr>
+          <p:nvPr/>
+        </p:nvPicPr>
+        <p:blipFill>
+          <a:blip r:embed="rId2">
+            <a:extLst>
+              <a:ext uri="{28A0092B-C50C-407E-A947-70E740481C1C}">
+                <a14:useLocalDpi xmlns:a14="http://schemas.microsoft.com/office/drawing/2010/main" val="0"/>
+              </a:ext>
+            </a:extLst>
+          </a:blip>
+          <a:srcRect/>
+          <a:stretch>
+            <a:fillRect/>
+          </a:stretch>
+        </p:blipFill>
+        <p:spPr bwMode="auto">
+          <a:xfrm>
+            <a:off x="2624137" y="1932049"/>
+            <a:ext cx="2905125" cy="1571625"/>
+          </a:xfrm>
+          <a:prstGeom prst="rect">
+            <a:avLst/>
+          </a:prstGeom>
+          <a:noFill/>
+          <a:ln>
+            <a:noFill/>
+          </a:ln>
+          <a:effectLst/>
+          <a:extLst>
+            <a:ext uri="{909E8E84-426E-40DD-AFC4-6F175D3DCCD1}">
+              <a14:hiddenFill xmlns:a14="http://schemas.microsoft.com/office/drawing/2010/main">
+                <a:solidFill>
+                  <a:schemeClr val="accent1"/>
+                </a:solidFill>
+              </a14:hiddenFill>
+            </a:ext>
+            <a:ext uri="{91240B29-F687-4F45-9708-019B960494DF}">
+              <a14:hiddenLine xmlns:a14="http://schemas.microsoft.com/office/drawing/2010/main" w="9525">
+                <a:solidFill>
+                  <a:schemeClr val="tx1"/>
+                </a:solidFill>
+                <a:miter lim="800000"/>
+                <a:headEnd/>
+                <a:tailEnd/>
+              </a14:hiddenLine>
+            </a:ext>
+            <a:ext uri="{AF507438-7753-43E0-B8FC-AC1667EBCBE1}">
+              <a14:hiddenEffects xmlns:a14="http://schemas.microsoft.com/office/drawing/2010/main">
+                <a:effectLst>
+                  <a:outerShdw dist="35921" dir="2700000" algn="ctr" rotWithShape="0">
+                    <a:schemeClr val="bg2"/>
+                  </a:outerShdw>
+                </a:effectLst>
+              </a14:hiddenEffects>
+            </a:ext>
+          </a:extLst>
+        </p:spPr>
+      </p:pic>
+      <p:sp>
+        <p:nvSpPr>
+          <p:cNvPr id="8" name="TextBox 7"/>
+          <p:cNvSpPr txBox="1"/>
+          <p:nvPr/>
+        </p:nvSpPr>
+        <p:spPr>
+          <a:xfrm>
+            <a:off x="3374423" y="1078037"/>
+            <a:ext cx="1404552" cy="400110"/>
+          </a:xfrm>
+          <a:prstGeom prst="rect">
+            <a:avLst/>
+          </a:prstGeom>
+          <a:noFill/>
+        </p:spPr>
+        <p:txBody>
+          <a:bodyPr wrap="none" rtlCol="0">
+            <a:spAutoFit/>
+          </a:bodyPr>
+          <a:lstStyle/>
+          <a:p>
+            <a:r>
+              <a:rPr lang="en-US" sz="2000" dirty="0" smtClean="0"/>
+              <a:t>App Store</a:t>
+            </a:r>
+            <a:endParaRPr lang="en-US" sz="2000" dirty="0"/>
+          </a:p>
+        </p:txBody>
+      </p:sp>
+      <p:pic>
+        <p:nvPicPr>
+          <p:cNvPr id="1034" name="Picture 10"/>
+          <p:cNvPicPr>
+            <a:picLocks noChangeAspect="1" noChangeArrowheads="1"/>
+          </p:cNvPicPr>
+          <p:nvPr/>
+        </p:nvPicPr>
+        <p:blipFill>
+          <a:blip r:embed="rId3">
+            <a:extLst>
+              <a:ext uri="{28A0092B-C50C-407E-A947-70E740481C1C}">
+                <a14:useLocalDpi xmlns:a14="http://schemas.microsoft.com/office/drawing/2010/main" val="0"/>
+              </a:ext>
+            </a:extLst>
+          </a:blip>
+          <a:srcRect/>
+          <a:stretch>
+            <a:fillRect/>
+          </a:stretch>
+        </p:blipFill>
+        <p:spPr bwMode="auto">
+          <a:xfrm>
+            <a:off x="817929" y="4357687"/>
+            <a:ext cx="1576387" cy="1576387"/>
+          </a:xfrm>
+          <a:prstGeom prst="rect">
+            <a:avLst/>
+          </a:prstGeom>
+          <a:noFill/>
+          <a:ln>
+            <a:noFill/>
+          </a:ln>
+          <a:effectLst/>
+          <a:extLst>
+            <a:ext uri="{909E8E84-426E-40DD-AFC4-6F175D3DCCD1}">
+              <a14:hiddenFill xmlns:a14="http://schemas.microsoft.com/office/drawing/2010/main">
+                <a:solidFill>
+                  <a:schemeClr val="accent1"/>
+                </a:solidFill>
+              </a14:hiddenFill>
+            </a:ext>
+            <a:ext uri="{91240B29-F687-4F45-9708-019B960494DF}">
+              <a14:hiddenLine xmlns:a14="http://schemas.microsoft.com/office/drawing/2010/main" w="9525">
+                <a:solidFill>
+                  <a:schemeClr val="tx1"/>
+                </a:solidFill>
+                <a:miter lim="800000"/>
+                <a:headEnd/>
+                <a:tailEnd/>
+              </a14:hiddenLine>
+            </a:ext>
+            <a:ext uri="{AF507438-7753-43E0-B8FC-AC1667EBCBE1}">
+              <a14:hiddenEffects xmlns:a14="http://schemas.microsoft.com/office/drawing/2010/main">
+                <a:effectLst>
+                  <a:outerShdw dist="35921" dir="2700000" algn="ctr" rotWithShape="0">
+                    <a:schemeClr val="bg2"/>
+                  </a:outerShdw>
+                </a:effectLst>
+              </a14:hiddenEffects>
+            </a:ext>
+          </a:extLst>
+        </p:spPr>
+      </p:pic>
+      <p:sp>
+        <p:nvSpPr>
+          <p:cNvPr id="13" name="TextBox 12"/>
+          <p:cNvSpPr txBox="1"/>
+          <p:nvPr/>
+        </p:nvSpPr>
+        <p:spPr>
+          <a:xfrm>
+            <a:off x="612775" y="5624451"/>
+            <a:ext cx="2148345" cy="400110"/>
+          </a:xfrm>
+          <a:prstGeom prst="rect">
+            <a:avLst/>
+          </a:prstGeom>
+          <a:noFill/>
+        </p:spPr>
+        <p:txBody>
+          <a:bodyPr wrap="none" rtlCol="0">
+            <a:spAutoFit/>
+          </a:bodyPr>
+          <a:lstStyle/>
+          <a:p>
+            <a:r>
+              <a:rPr lang="en-US" sz="2000" dirty="0" smtClean="0"/>
+              <a:t>App Developers</a:t>
+            </a:r>
+            <a:endParaRPr lang="en-US" sz="2000" dirty="0"/>
+          </a:p>
+        </p:txBody>
+      </p:sp>
+      <p:sp>
+        <p:nvSpPr>
+          <p:cNvPr id="9" name="AutoShape 12" descr="Image result for smartphone icon"/>
+          <p:cNvSpPr>
+            <a:spLocks noChangeAspect="1" noChangeArrowheads="1"/>
+          </p:cNvSpPr>
+          <p:nvPr/>
+        </p:nvSpPr>
+        <p:spPr bwMode="auto">
+          <a:xfrm>
+            <a:off x="612775" y="312737"/>
+            <a:ext cx="304800" cy="304801"/>
+          </a:xfrm>
+          <a:prstGeom prst="rect">
+            <a:avLst/>
+          </a:prstGeom>
+          <a:noFill/>
+          <a:extLst>
+            <a:ext uri="{909E8E84-426E-40DD-AFC4-6F175D3DCCD1}">
+              <a14:hiddenFill xmlns:a14="http://schemas.microsoft.com/office/drawing/2010/main">
+                <a:solidFill>
+                  <a:srgbClr val="FFFFFF"/>
+                </a:solidFill>
+              </a14:hiddenFill>
+            </a:ext>
+          </a:extLst>
+        </p:spPr>
+        <p:txBody>
+          <a:bodyPr vert="horz" wrap="square" lIns="91440" tIns="45720" rIns="91440" bIns="45720" numCol="1" anchor="t" anchorCtr="0" compatLnSpc="1">
+            <a:prstTxWarp prst="textNoShape">
+              <a:avLst/>
+            </a:prstTxWarp>
+          </a:bodyPr>
+          <a:lstStyle/>
+          <a:p>
+            <a:endParaRPr lang="en-US"/>
+          </a:p>
+        </p:txBody>
+      </p:sp>
+      <p:pic>
+        <p:nvPicPr>
+          <p:cNvPr id="1037" name="Picture 13"/>
+          <p:cNvPicPr>
+            <a:picLocks noChangeAspect="1" noChangeArrowheads="1"/>
+          </p:cNvPicPr>
+          <p:nvPr/>
+        </p:nvPicPr>
+        <p:blipFill>
+          <a:blip r:embed="rId4">
+            <a:extLst>
+              <a:ext uri="{28A0092B-C50C-407E-A947-70E740481C1C}">
+                <a14:useLocalDpi xmlns:a14="http://schemas.microsoft.com/office/drawing/2010/main" val="0"/>
+              </a:ext>
+            </a:extLst>
+          </a:blip>
+          <a:srcRect/>
+          <a:stretch>
+            <a:fillRect/>
+          </a:stretch>
+        </p:blipFill>
+        <p:spPr bwMode="auto">
+          <a:xfrm>
+            <a:off x="6550544" y="4624203"/>
+            <a:ext cx="1400358" cy="1400358"/>
+          </a:xfrm>
+          <a:prstGeom prst="rect">
+            <a:avLst/>
+          </a:prstGeom>
+          <a:noFill/>
+          <a:ln>
+            <a:noFill/>
+          </a:ln>
+          <a:effectLst/>
+          <a:extLst>
+            <a:ext uri="{909E8E84-426E-40DD-AFC4-6F175D3DCCD1}">
+              <a14:hiddenFill xmlns:a14="http://schemas.microsoft.com/office/drawing/2010/main">
+                <a:solidFill>
+                  <a:schemeClr val="accent1"/>
+                </a:solidFill>
+              </a14:hiddenFill>
+            </a:ext>
+            <a:ext uri="{91240B29-F687-4F45-9708-019B960494DF}">
+              <a14:hiddenLine xmlns:a14="http://schemas.microsoft.com/office/drawing/2010/main" w="9525">
+                <a:solidFill>
+                  <a:schemeClr val="tx1"/>
+                </a:solidFill>
+                <a:miter lim="800000"/>
+                <a:headEnd/>
+                <a:tailEnd/>
+              </a14:hiddenLine>
+            </a:ext>
+            <a:ext uri="{AF507438-7753-43E0-B8FC-AC1667EBCBE1}">
+              <a14:hiddenEffects xmlns:a14="http://schemas.microsoft.com/office/drawing/2010/main">
+                <a:effectLst>
+                  <a:outerShdw dist="35921" dir="2700000" algn="ctr" rotWithShape="0">
+                    <a:schemeClr val="bg2"/>
+                  </a:outerShdw>
+                </a:effectLst>
+              </a14:hiddenEffects>
+            </a:ext>
+          </a:extLst>
+        </p:spPr>
+      </p:pic>
+      <p:sp>
+        <p:nvSpPr>
+          <p:cNvPr id="16" name="TextBox 15"/>
+          <p:cNvSpPr txBox="1"/>
+          <p:nvPr/>
+        </p:nvSpPr>
+        <p:spPr>
+          <a:xfrm>
+            <a:off x="6523601" y="6086474"/>
+            <a:ext cx="1454244" cy="400110"/>
+          </a:xfrm>
+          <a:prstGeom prst="rect">
+            <a:avLst/>
+          </a:prstGeom>
+          <a:noFill/>
+        </p:spPr>
+        <p:txBody>
+          <a:bodyPr wrap="none" rtlCol="0">
+            <a:spAutoFit/>
+          </a:bodyPr>
+          <a:lstStyle/>
+          <a:p>
+            <a:r>
+              <a:rPr lang="en-US" sz="2000" dirty="0" smtClean="0"/>
+              <a:t>App Users</a:t>
+            </a:r>
+            <a:endParaRPr lang="en-US" sz="2000" dirty="0"/>
+          </a:p>
+        </p:txBody>
+      </p:sp>
+      <p:sp>
+        <p:nvSpPr>
+          <p:cNvPr id="10" name="Up Arrow 9"/>
+          <p:cNvSpPr/>
+          <p:nvPr/>
+        </p:nvSpPr>
+        <p:spPr>
+          <a:xfrm rot="1500000">
+            <a:off x="1931524" y="3872563"/>
+            <a:ext cx="308945" cy="796558"/>
+          </a:xfrm>
+          <a:prstGeom prst="upArrow">
+            <a:avLst/>
+          </a:prstGeom>
+        </p:spPr>
+        <p:style>
+          <a:lnRef idx="2">
+            <a:schemeClr val="accent1">
+              <a:shade val="50000"/>
+            </a:schemeClr>
+          </a:lnRef>
+          <a:fillRef idx="1">
+            <a:schemeClr val="accent1"/>
+          </a:fillRef>
+          <a:effectRef idx="0">
+            <a:schemeClr val="accent1"/>
+          </a:effectRef>
+          <a:fontRef idx="minor">
+            <a:schemeClr val="lt1"/>
+          </a:fontRef>
+        </p:style>
+        <p:txBody>
+          <a:bodyPr rtlCol="0" anchor="ctr"/>
+          <a:lstStyle/>
+          <a:p>
+            <a:pPr algn="ctr"/>
+            <a:endParaRPr lang="en-US"/>
+          </a:p>
+        </p:txBody>
+      </p:sp>
+      <p:sp>
+        <p:nvSpPr>
+          <p:cNvPr id="18" name="Up Arrow 17"/>
+          <p:cNvSpPr/>
+          <p:nvPr/>
+        </p:nvSpPr>
+        <p:spPr>
+          <a:xfrm rot="9120000">
+            <a:off x="6360044" y="3736618"/>
+            <a:ext cx="381000" cy="838200"/>
+          </a:xfrm>
+          <a:prstGeom prst="upArrow">
+            <a:avLst/>
+          </a:prstGeom>
+        </p:spPr>
+        <p:style>
+          <a:lnRef idx="2">
+            <a:schemeClr val="accent1">
+              <a:shade val="50000"/>
+            </a:schemeClr>
+          </a:lnRef>
+          <a:fillRef idx="1">
+            <a:schemeClr val="accent1"/>
+          </a:fillRef>
+          <a:effectRef idx="0">
+            <a:schemeClr val="accent1"/>
+          </a:effectRef>
+          <a:fontRef idx="minor">
+            <a:schemeClr val="lt1"/>
+          </a:fontRef>
+        </p:style>
+        <p:txBody>
+          <a:bodyPr rtlCol="0" anchor="ctr"/>
+          <a:lstStyle/>
+          <a:p>
+            <a:pPr algn="ctr"/>
+            <a:endParaRPr lang="en-US"/>
+          </a:p>
+        </p:txBody>
+      </p:sp>
+    </p:spTree>
+    <p:extLst>
+      <p:ext uri="{BB962C8B-B14F-4D97-AF65-F5344CB8AC3E}">
+        <p14:creationId xmlns:p14="http://schemas.microsoft.com/office/powerpoint/2010/main" val="2320841995"/>
+      </p:ext>
+    </p:extLst>
+  </p:cSld>
+  <p:clrMapOvr>
+    <a:masterClrMapping/>
+  </p:clrMapOvr>
+</p:sld>
+</file>
+
+<file path=ppt/slides/slide4.xml><?xml version="1.0" encoding="utf-8"?>
+<p:sld xmlns:a="http://schemas.openxmlformats.org/drawingml/2006/main" xmlns:r="http://schemas.openxmlformats.org/officeDocument/2006/relationships" xmlns:p="http://schemas.openxmlformats.org/presentationml/2006/main">
+  <p:cSld>
+    <p:spTree>
+      <p:nvGrpSpPr>
+        <p:cNvPr id="1" name=""/>
+        <p:cNvGrpSpPr/>
+        <p:nvPr/>
+      </p:nvGrpSpPr>
+      <p:grpSpPr>
+        <a:xfrm>
+          <a:off x="0" y="0"/>
+          <a:ext cx="0" cy="0"/>
+          <a:chOff x="0" y="0"/>
+          <a:chExt cx="0" cy="0"/>
+        </a:xfrm>
+      </p:grpSpPr>
+      <p:sp>
+        <p:nvSpPr>
+          <p:cNvPr id="2" name="Content Placeholder 1"/>
+          <p:cNvSpPr>
+            <a:spLocks noGrp="1"/>
+          </p:cNvSpPr>
+          <p:nvPr>
+            <p:ph idx="1"/>
+          </p:nvPr>
+        </p:nvSpPr>
+        <p:spPr/>
+        <p:txBody>
+          <a:bodyPr/>
+          <a:lstStyle/>
+          <a:p>
+            <a:r>
+              <a:rPr lang="en-US" dirty="0" smtClean="0"/>
+              <a:t>Developers develop apps at regular intervals, using one of four strategies. SOME can change strategies throughout simulation</a:t>
+            </a:r>
+          </a:p>
+          <a:p>
+            <a:pPr lvl="1"/>
+            <a:r>
+              <a:rPr lang="en-US" i="1" u="sng" dirty="0" smtClean="0"/>
+              <a:t>Innovator</a:t>
+            </a:r>
+            <a:r>
+              <a:rPr lang="en-US" u="sng" dirty="0" smtClean="0"/>
+              <a:t>: </a:t>
+            </a:r>
+            <a:r>
+              <a:rPr lang="en-US" dirty="0" smtClean="0"/>
+              <a:t>Creates new, totally different apps each time</a:t>
+            </a:r>
+          </a:p>
+          <a:p>
+            <a:pPr lvl="1"/>
+            <a:r>
+              <a:rPr lang="en-US" i="1" u="sng" dirty="0" err="1" smtClean="0"/>
+              <a:t>Milker</a:t>
+            </a:r>
+            <a:r>
+              <a:rPr lang="en-US" u="sng" dirty="0" smtClean="0"/>
+              <a:t>: </a:t>
+            </a:r>
+            <a:r>
+              <a:rPr lang="en-US" dirty="0" smtClean="0"/>
+              <a:t>Produces apps that are a variation of their most recent app</a:t>
+            </a:r>
+          </a:p>
+          <a:p>
+            <a:pPr lvl="1"/>
+            <a:r>
+              <a:rPr lang="en-US" i="1" u="sng" dirty="0" smtClean="0"/>
+              <a:t>Optimizer: </a:t>
+            </a:r>
+            <a:r>
+              <a:rPr lang="en-US" dirty="0" smtClean="0"/>
+              <a:t>Develops apps that are a variation of their best app to date</a:t>
+            </a:r>
+          </a:p>
+          <a:p>
+            <a:pPr lvl="1"/>
+            <a:r>
+              <a:rPr lang="en-US" i="1" u="sng" dirty="0" smtClean="0"/>
+              <a:t>Copycat: </a:t>
+            </a:r>
+            <a:r>
+              <a:rPr lang="en-US" dirty="0"/>
+              <a:t> </a:t>
+            </a:r>
+            <a:r>
+              <a:rPr lang="en-US" dirty="0" smtClean="0"/>
+              <a:t>Duplicates current best selling apps, with minor variations</a:t>
+            </a:r>
+            <a:endParaRPr lang="en-US" i="1" dirty="0"/>
+          </a:p>
+        </p:txBody>
+      </p:sp>
+      <p:sp>
+        <p:nvSpPr>
+          <p:cNvPr id="3" name="Title 2"/>
+          <p:cNvSpPr>
+            <a:spLocks noGrp="1"/>
+          </p:cNvSpPr>
+          <p:nvPr>
+            <p:ph type="title"/>
+          </p:nvPr>
+        </p:nvSpPr>
+        <p:spPr/>
+        <p:txBody>
+          <a:bodyPr/>
+          <a:lstStyle/>
+          <a:p>
+            <a:r>
+              <a:rPr lang="en-US" dirty="0" smtClean="0"/>
+              <a:t>The Model: Developers</a:t>
+            </a:r>
+            <a:endParaRPr lang="en-US" dirty="0"/>
+          </a:p>
+        </p:txBody>
+      </p:sp>
+    </p:spTree>
+    <p:extLst>
+      <p:ext uri="{BB962C8B-B14F-4D97-AF65-F5344CB8AC3E}">
+        <p14:creationId xmlns:p14="http://schemas.microsoft.com/office/powerpoint/2010/main" val="517154474"/>
+      </p:ext>
+    </p:extLst>
+  </p:cSld>
+  <p:clrMapOvr>
+    <a:masterClrMapping/>
+  </p:clrMapOvr>
+</p:sld>
+</file>
+
+<file path=ppt/slides/slide5.xml><?xml version="1.0" encoding="utf-8"?>
+<p:sld xmlns:a="http://schemas.openxmlformats.org/drawingml/2006/main" xmlns:r="http://schemas.openxmlformats.org/officeDocument/2006/relationships" xmlns:p="http://schemas.openxmlformats.org/presentationml/2006/main">
+  <p:cSld>
+    <p:spTree>
+      <p:nvGrpSpPr>
+        <p:cNvPr id="1" name=""/>
+        <p:cNvGrpSpPr/>
+        <p:nvPr/>
+      </p:nvGrpSpPr>
+      <p:grpSpPr>
+        <a:xfrm>
+          <a:off x="0" y="0"/>
+          <a:ext cx="0" cy="0"/>
+          <a:chOff x="0" y="0"/>
+          <a:chExt cx="0" cy="0"/>
+        </a:xfrm>
+      </p:grpSpPr>
+      <p:sp>
+        <p:nvSpPr>
+          <p:cNvPr id="2" name="Content Placeholder 1"/>
+          <p:cNvSpPr>
+            <a:spLocks noGrp="1"/>
+          </p:cNvSpPr>
+          <p:nvPr>
+            <p:ph idx="1"/>
+          </p:nvPr>
+        </p:nvSpPr>
+        <p:spPr/>
+        <p:txBody>
+          <a:bodyPr/>
+          <a:lstStyle/>
+          <a:p>
+            <a:r>
+              <a:rPr lang="en-US" dirty="0" smtClean="0"/>
+              <a:t>Represented by 10x10 binary grid of “features”</a:t>
+            </a:r>
+          </a:p>
+          <a:p>
+            <a:r>
+              <a:rPr lang="en-US" dirty="0" smtClean="0"/>
+              <a:t>Features occupying adjacent spaces on the grid represent similar features</a:t>
+            </a:r>
+          </a:p>
+          <a:p>
+            <a:endParaRPr lang="en-US" dirty="0"/>
+          </a:p>
+        </p:txBody>
+      </p:sp>
+      <p:sp>
+        <p:nvSpPr>
+          <p:cNvPr id="3" name="Title 2"/>
+          <p:cNvSpPr>
+            <a:spLocks noGrp="1"/>
+          </p:cNvSpPr>
+          <p:nvPr>
+            <p:ph type="title"/>
+          </p:nvPr>
+        </p:nvSpPr>
+        <p:spPr/>
+        <p:txBody>
+          <a:bodyPr/>
+          <a:lstStyle/>
+          <a:p>
+            <a:r>
+              <a:rPr lang="en-US" dirty="0" smtClean="0"/>
+              <a:t>The Model: Applications</a:t>
+            </a:r>
+            <a:endParaRPr lang="en-US" dirty="0"/>
+          </a:p>
+        </p:txBody>
+      </p:sp>
+    </p:spTree>
+    <p:extLst>
+      <p:ext uri="{BB962C8B-B14F-4D97-AF65-F5344CB8AC3E}">
+        <p14:creationId xmlns:p14="http://schemas.microsoft.com/office/powerpoint/2010/main" val="3479852073"/>
+      </p:ext>
+    </p:extLst>
+  </p:cSld>
+  <p:clrMapOvr>
+    <a:masterClrMapping/>
+  </p:clrMapOvr>
+</p:sld>
+</file>
+
+<file path=ppt/slides/slide6.xml><?xml version="1.0" encoding="utf-8"?>
+<p:sld xmlns:a="http://schemas.openxmlformats.org/drawingml/2006/main" xmlns:r="http://schemas.openxmlformats.org/officeDocument/2006/relationships" xmlns:p="http://schemas.openxmlformats.org/presentationml/2006/main">
+  <p:cSld>
+    <p:spTree>
+      <p:nvGrpSpPr>
+        <p:cNvPr id="1" name=""/>
+        <p:cNvGrpSpPr/>
+        <p:nvPr/>
+      </p:nvGrpSpPr>
+      <p:grpSpPr>
+        <a:xfrm>
+          <a:off x="0" y="0"/>
+          <a:ext cx="0" cy="0"/>
+          <a:chOff x="0" y="0"/>
+          <a:chExt cx="0" cy="0"/>
+        </a:xfrm>
+      </p:grpSpPr>
+      <p:sp>
+        <p:nvSpPr>
+          <p:cNvPr id="2" name="Content Placeholder 1"/>
+          <p:cNvSpPr>
+            <a:spLocks noGrp="1"/>
+          </p:cNvSpPr>
+          <p:nvPr>
+            <p:ph idx="1"/>
+          </p:nvPr>
+        </p:nvSpPr>
+        <p:spPr/>
+        <p:txBody>
+          <a:bodyPr/>
+          <a:lstStyle/>
+          <a:p>
+            <a:r>
+              <a:rPr lang="en-US" dirty="0" smtClean="0"/>
+              <a:t>10x10 grid representing desired features</a:t>
+            </a:r>
+          </a:p>
+          <a:p>
+            <a:r>
+              <a:rPr lang="en-US" dirty="0" smtClean="0"/>
+              <a:t>All users have same 5x5 block of unwanted features</a:t>
+            </a:r>
+          </a:p>
+          <a:p>
+            <a:r>
+              <a:rPr lang="en-US" dirty="0" smtClean="0"/>
+              <a:t>User downloads apps at regular intervals</a:t>
+            </a:r>
+          </a:p>
+          <a:p>
+            <a:r>
+              <a:rPr lang="en-US" dirty="0" smtClean="0"/>
+              <a:t>All apps that include only desired features are downloaded at each interval</a:t>
+            </a:r>
+          </a:p>
+          <a:p>
+            <a:r>
+              <a:rPr lang="en-US" dirty="0" smtClean="0"/>
+              <a:t>User population increases over time governed by sigmoid growth function</a:t>
+            </a:r>
+            <a:endParaRPr lang="en-US" dirty="0"/>
+          </a:p>
+        </p:txBody>
+      </p:sp>
+      <p:sp>
+        <p:nvSpPr>
+          <p:cNvPr id="3" name="Title 2"/>
+          <p:cNvSpPr>
+            <a:spLocks noGrp="1"/>
+          </p:cNvSpPr>
+          <p:nvPr>
+            <p:ph type="title"/>
+          </p:nvPr>
+        </p:nvSpPr>
+        <p:spPr/>
+        <p:txBody>
+          <a:bodyPr/>
+          <a:lstStyle/>
+          <a:p>
+            <a:r>
+              <a:rPr lang="en-US" dirty="0" smtClean="0"/>
+              <a:t>The Model: Users</a:t>
+            </a:r>
+            <a:endParaRPr lang="en-US" dirty="0"/>
+          </a:p>
+        </p:txBody>
+      </p:sp>
+    </p:spTree>
+    <p:extLst>
+      <p:ext uri="{BB962C8B-B14F-4D97-AF65-F5344CB8AC3E}">
+        <p14:creationId xmlns:p14="http://schemas.microsoft.com/office/powerpoint/2010/main" val="1518114891"/>
+      </p:ext>
+    </p:extLst>
+  </p:cSld>
+  <p:clrMapOvr>
+    <a:masterClrMapping/>
+  </p:clrMapOvr>
+</p:sld>
+</file>
+
+<file path=ppt/slides/slide7.xml><?xml version="1.0" encoding="utf-8"?>
+<p:sld xmlns:a="http://schemas.openxmlformats.org/drawingml/2006/main" xmlns:r="http://schemas.openxmlformats.org/officeDocument/2006/relationships" xmlns:p="http://schemas.openxmlformats.org/presentationml/2006/main">
+  <p:cSld>
+    <p:spTree>
+      <p:nvGrpSpPr>
+        <p:cNvPr id="1" name=""/>
+        <p:cNvGrpSpPr/>
+        <p:nvPr/>
+      </p:nvGrpSpPr>
+      <p:grpSpPr>
+        <a:xfrm>
+          <a:off x="0" y="0"/>
+          <a:ext cx="0" cy="0"/>
+          <a:chOff x="0" y="0"/>
+          <a:chExt cx="0" cy="0"/>
+        </a:xfrm>
+      </p:grpSpPr>
+      <p:sp>
+        <p:nvSpPr>
+          <p:cNvPr id="3" name="Title 2"/>
+          <p:cNvSpPr>
+            <a:spLocks noGrp="1"/>
+          </p:cNvSpPr>
+          <p:nvPr>
+            <p:ph type="title"/>
+          </p:nvPr>
+        </p:nvSpPr>
+        <p:spPr/>
+        <p:txBody>
+          <a:bodyPr/>
+          <a:lstStyle/>
+          <a:p>
+            <a:r>
+              <a:rPr lang="en-US" dirty="0" smtClean="0"/>
+              <a:t>The Model: Users</a:t>
+            </a:r>
+            <a:endParaRPr lang="en-US" dirty="0"/>
+          </a:p>
+        </p:txBody>
+      </p:sp>
+      <p:pic>
+        <p:nvPicPr>
+          <p:cNvPr id="3074" name="Picture 2"/>
+          <p:cNvPicPr>
+            <a:picLocks noGrp="1" noChangeAspect="1" noChangeArrowheads="1"/>
+          </p:cNvPicPr>
+          <p:nvPr>
+            <p:ph idx="1"/>
+          </p:nvPr>
+        </p:nvPicPr>
+        <p:blipFill>
+          <a:blip r:embed="rId2">
+            <a:extLst>
+              <a:ext uri="{28A0092B-C50C-407E-A947-70E740481C1C}">
+                <a14:useLocalDpi xmlns:a14="http://schemas.microsoft.com/office/drawing/2010/main" val="0"/>
+              </a:ext>
+            </a:extLst>
+          </a:blip>
+          <a:srcRect/>
+          <a:stretch>
+            <a:fillRect/>
+          </a:stretch>
+        </p:blipFill>
+        <p:spPr bwMode="auto">
+          <a:xfrm>
+            <a:off x="1600200" y="1737122"/>
+            <a:ext cx="5715000" cy="3859609"/>
+          </a:xfrm>
+          <a:prstGeom prst="rect">
+            <a:avLst/>
+          </a:prstGeom>
+          <a:noFill/>
+          <a:ln>
+            <a:noFill/>
+          </a:ln>
+          <a:effectLst/>
+          <a:extLst>
+            <a:ext uri="{909E8E84-426E-40DD-AFC4-6F175D3DCCD1}">
+              <a14:hiddenFill xmlns:a14="http://schemas.microsoft.com/office/drawing/2010/main">
+                <a:solidFill>
+                  <a:schemeClr val="accent1"/>
+                </a:solidFill>
+              </a14:hiddenFill>
+            </a:ext>
+            <a:ext uri="{91240B29-F687-4F45-9708-019B960494DF}">
+              <a14:hiddenLine xmlns:a14="http://schemas.microsoft.com/office/drawing/2010/main" w="9525">
+                <a:solidFill>
+                  <a:schemeClr val="tx1"/>
+                </a:solidFill>
+                <a:miter lim="800000"/>
+                <a:headEnd/>
+                <a:tailEnd/>
+              </a14:hiddenLine>
+            </a:ext>
+            <a:ext uri="{AF507438-7753-43E0-B8FC-AC1667EBCBE1}">
+              <a14:hiddenEffects xmlns:a14="http://schemas.microsoft.com/office/drawing/2010/main">
+                <a:effectLst>
+                  <a:outerShdw dist="35921" dir="2700000" algn="ctr" rotWithShape="0">
+                    <a:schemeClr val="bg2"/>
+                  </a:outerShdw>
+                </a:effectLst>
+              </a14:hiddenEffects>
+            </a:ext>
+          </a:extLst>
+        </p:spPr>
+      </p:pic>
+      <p:pic>
+        <p:nvPicPr>
+          <p:cNvPr id="3075" name="Picture 3"/>
+          <p:cNvPicPr>
+            <a:picLocks noChangeAspect="1" noChangeArrowheads="1"/>
+          </p:cNvPicPr>
+          <p:nvPr/>
+        </p:nvPicPr>
+        <p:blipFill>
+          <a:blip r:embed="rId3">
+            <a:extLst>
+              <a:ext uri="{28A0092B-C50C-407E-A947-70E740481C1C}">
+                <a14:useLocalDpi xmlns:a14="http://schemas.microsoft.com/office/drawing/2010/main" val="0"/>
+              </a:ext>
+            </a:extLst>
+          </a:blip>
+          <a:srcRect/>
+          <a:stretch>
+            <a:fillRect/>
+          </a:stretch>
+        </p:blipFill>
+        <p:spPr bwMode="auto">
+          <a:xfrm>
+            <a:off x="1423987" y="1447800"/>
+            <a:ext cx="6296025" cy="4276725"/>
+          </a:xfrm>
+          <a:prstGeom prst="rect">
+            <a:avLst/>
+          </a:prstGeom>
+          <a:noFill/>
+          <a:ln>
+            <a:noFill/>
+          </a:ln>
+          <a:effectLst/>
+          <a:extLst>
+            <a:ext uri="{909E8E84-426E-40DD-AFC4-6F175D3DCCD1}">
+              <a14:hiddenFill xmlns:a14="http://schemas.microsoft.com/office/drawing/2010/main">
+                <a:solidFill>
+                  <a:schemeClr val="accent1"/>
+                </a:solidFill>
+              </a14:hiddenFill>
+            </a:ext>
+            <a:ext uri="{91240B29-F687-4F45-9708-019B960494DF}">
+              <a14:hiddenLine xmlns:a14="http://schemas.microsoft.com/office/drawing/2010/main" w="9525">
+                <a:solidFill>
+                  <a:schemeClr val="tx1"/>
+                </a:solidFill>
+                <a:miter lim="800000"/>
+                <a:headEnd/>
+                <a:tailEnd/>
+              </a14:hiddenLine>
+            </a:ext>
+            <a:ext uri="{AF507438-7753-43E0-B8FC-AC1667EBCBE1}">
+              <a14:hiddenEffects xmlns:a14="http://schemas.microsoft.com/office/drawing/2010/main">
+                <a:effectLst>
+                  <a:outerShdw dist="35921" dir="2700000" algn="ctr" rotWithShape="0">
+                    <a:schemeClr val="bg2"/>
+                  </a:outerShdw>
+                </a:effectLst>
+              </a14:hiddenEffects>
+            </a:ext>
+          </a:extLst>
+        </p:spPr>
+      </p:pic>
+      <p:pic>
+        <p:nvPicPr>
+          <p:cNvPr id="3077" name="Picture 5" descr="https://tse1.mm.bing.net/th?&amp;id=OIP.Mfef892ba552ef6770e1f21a88d8680b0H0&amp;w=300&amp;h=300&amp;c=0&amp;pid=1.9&amp;rs=0&amp;p=0"/>
+          <p:cNvPicPr>
+            <a:picLocks noChangeAspect="1" noChangeArrowheads="1"/>
+          </p:cNvPicPr>
+          <p:nvPr/>
+        </p:nvPicPr>
+        <p:blipFill>
+          <a:blip r:embed="rId4" cstate="print">
+            <a:extLst>
+              <a:ext uri="{28A0092B-C50C-407E-A947-70E740481C1C}">
+                <a14:useLocalDpi xmlns:a14="http://schemas.microsoft.com/office/drawing/2010/main" val="0"/>
+              </a:ext>
+            </a:extLst>
+          </a:blip>
+          <a:srcRect/>
+          <a:stretch>
+            <a:fillRect/>
+          </a:stretch>
+        </p:blipFill>
+        <p:spPr bwMode="auto">
+          <a:xfrm>
+            <a:off x="354995" y="1981200"/>
+            <a:ext cx="1068992" cy="990600"/>
+          </a:xfrm>
+          <a:prstGeom prst="rect">
+            <a:avLst/>
+          </a:prstGeom>
+          <a:noFill/>
+          <a:extLst>
+            <a:ext uri="{909E8E84-426E-40DD-AFC4-6F175D3DCCD1}">
+              <a14:hiddenFill xmlns:a14="http://schemas.microsoft.com/office/drawing/2010/main">
+                <a:solidFill>
+                  <a:srgbClr val="FFFFFF"/>
+                </a:solidFill>
+              </a14:hiddenFill>
+            </a:ext>
+          </a:extLst>
+        </p:spPr>
+      </p:pic>
+      <p:pic>
+        <p:nvPicPr>
+          <p:cNvPr id="3079" name="Picture 7" descr="https://tse1.mm.bing.net/th?&amp;id=OIP.Md3878cc478ed38d181e985bf3ea0ae02H0&amp;w=300&amp;h=300&amp;c=0&amp;pid=1.9&amp;rs=0&amp;p=0"/>
+          <p:cNvPicPr>
+            <a:picLocks noChangeAspect="1" noChangeArrowheads="1"/>
+          </p:cNvPicPr>
+          <p:nvPr/>
+        </p:nvPicPr>
+        <p:blipFill>
+          <a:blip r:embed="rId5">
+            <a:extLst>
+              <a:ext uri="{28A0092B-C50C-407E-A947-70E740481C1C}">
+                <a14:useLocalDpi xmlns:a14="http://schemas.microsoft.com/office/drawing/2010/main" val="0"/>
+              </a:ext>
+            </a:extLst>
+          </a:blip>
+          <a:srcRect/>
+          <a:stretch>
+            <a:fillRect/>
+          </a:stretch>
+        </p:blipFill>
+        <p:spPr bwMode="auto">
+          <a:xfrm>
+            <a:off x="331533" y="4038600"/>
+            <a:ext cx="1092454" cy="1295400"/>
+          </a:xfrm>
+          <a:prstGeom prst="rect">
+            <a:avLst/>
+          </a:prstGeom>
+          <a:noFill/>
+          <a:extLst>
+            <a:ext uri="{909E8E84-426E-40DD-AFC4-6F175D3DCCD1}">
+              <a14:hiddenFill xmlns:a14="http://schemas.microsoft.com/office/drawing/2010/main">
+                <a:solidFill>
+                  <a:srgbClr val="FFFFFF"/>
+                </a:solidFill>
+              </a14:hiddenFill>
+            </a:ext>
+          </a:extLst>
+        </p:spPr>
+      </p:pic>
+    </p:spTree>
+    <p:extLst>
+      <p:ext uri="{BB962C8B-B14F-4D97-AF65-F5344CB8AC3E}">
+        <p14:creationId xmlns:p14="http://schemas.microsoft.com/office/powerpoint/2010/main" val="1183134247"/>
+      </p:ext>
+    </p:extLst>
+  </p:cSld>
+  <p:clrMapOvr>
+    <a:masterClrMapping/>
+  </p:clrMapOvr>
+</p:sld>
+</file>
+
+<file path=ppt/slides/slide8.xml><?xml version="1.0" encoding="utf-8"?>
+<p:sld xmlns:a="http://schemas.openxmlformats.org/drawingml/2006/main" xmlns:r="http://schemas.openxmlformats.org/officeDocument/2006/relationships" xmlns:p="http://schemas.openxmlformats.org/presentationml/2006/main">
+  <p:cSld>
+    <p:spTree>
+      <p:nvGrpSpPr>
+        <p:cNvPr id="1" name=""/>
+        <p:cNvGrpSpPr/>
+        <p:nvPr/>
+      </p:nvGrpSpPr>
+      <p:grpSpPr>
+        <a:xfrm>
+          <a:off x="0" y="0"/>
+          <a:ext cx="0" cy="0"/>
+          <a:chOff x="0" y="0"/>
+          <a:chExt cx="0" cy="0"/>
+        </a:xfrm>
+      </p:grpSpPr>
+      <p:sp>
+        <p:nvSpPr>
+          <p:cNvPr id="3" name="Title 2"/>
+          <p:cNvSpPr>
+            <a:spLocks noGrp="1"/>
+          </p:cNvSpPr>
+          <p:nvPr>
+            <p:ph type="title"/>
+          </p:nvPr>
+        </p:nvSpPr>
+        <p:spPr/>
+        <p:txBody>
+          <a:bodyPr/>
+          <a:lstStyle/>
+          <a:p>
+            <a:r>
+              <a:rPr lang="en-US" dirty="0" smtClean="0"/>
+              <a:t>Algorithm</a:t>
+            </a:r>
+            <a:endParaRPr lang="en-US" dirty="0"/>
+          </a:p>
+        </p:txBody>
+      </p:sp>
+      <p:sp>
+        <p:nvSpPr>
+          <p:cNvPr id="4" name="Content Placeholder 3"/>
+          <p:cNvSpPr>
+            <a:spLocks noGrp="1"/>
+          </p:cNvSpPr>
+          <p:nvPr>
+            <p:ph idx="1"/>
+          </p:nvPr>
+        </p:nvSpPr>
+        <p:spPr/>
+        <p:txBody>
+          <a:bodyPr/>
+          <a:lstStyle/>
+          <a:p>
+            <a:r>
+              <a:rPr lang="en-US" dirty="0" smtClean="0"/>
+              <a:t>Initial parameters set up to mimic </a:t>
+            </a:r>
+            <a:r>
+              <a:rPr lang="en-US" dirty="0" err="1" smtClean="0"/>
+              <a:t>iOS</a:t>
+            </a:r>
+            <a:r>
+              <a:rPr lang="en-US" dirty="0" smtClean="0"/>
+              <a:t> app store in July 2008, simulated to June 2011</a:t>
+            </a:r>
+          </a:p>
+          <a:p>
+            <a:pPr marL="109728" indent="0">
+              <a:buNone/>
+            </a:pPr>
+            <a:endParaRPr lang="en-US" dirty="0"/>
+          </a:p>
+        </p:txBody>
+      </p:sp>
+      <p:pic>
+        <p:nvPicPr>
+          <p:cNvPr id="2052" name="Picture 4"/>
+          <p:cNvPicPr>
+            <a:picLocks noChangeAspect="1" noChangeArrowheads="1"/>
+          </p:cNvPicPr>
+          <p:nvPr/>
+        </p:nvPicPr>
+        <p:blipFill>
+          <a:blip r:embed="rId2">
+            <a:extLst>
+              <a:ext uri="{28A0092B-C50C-407E-A947-70E740481C1C}">
+                <a14:useLocalDpi xmlns:a14="http://schemas.microsoft.com/office/drawing/2010/main" val="0"/>
+              </a:ext>
+            </a:extLst>
+          </a:blip>
+          <a:srcRect/>
+          <a:stretch>
+            <a:fillRect/>
+          </a:stretch>
+        </p:blipFill>
+        <p:spPr bwMode="auto">
+          <a:xfrm>
+            <a:off x="1348154" y="2500313"/>
+            <a:ext cx="6388587" cy="2147887"/>
+          </a:xfrm>
+          <a:prstGeom prst="rect">
+            <a:avLst/>
+          </a:prstGeom>
+          <a:noFill/>
+          <a:ln>
+            <a:noFill/>
+          </a:ln>
+          <a:effectLst/>
+          <a:extLst>
+            <a:ext uri="{909E8E84-426E-40DD-AFC4-6F175D3DCCD1}">
+              <a14:hiddenFill xmlns:a14="http://schemas.microsoft.com/office/drawing/2010/main">
+                <a:solidFill>
+                  <a:schemeClr val="accent1"/>
+                </a:solidFill>
+              </a14:hiddenFill>
+            </a:ext>
+            <a:ext uri="{91240B29-F687-4F45-9708-019B960494DF}">
+              <a14:hiddenLine xmlns:a14="http://schemas.microsoft.com/office/drawing/2010/main" w="9525">
+                <a:solidFill>
+                  <a:schemeClr val="tx1"/>
+                </a:solidFill>
+                <a:miter lim="800000"/>
+                <a:headEnd/>
+                <a:tailEnd/>
+              </a14:hiddenLine>
+            </a:ext>
+            <a:ext uri="{AF507438-7753-43E0-B8FC-AC1667EBCBE1}">
+              <a14:hiddenEffects xmlns:a14="http://schemas.microsoft.com/office/drawing/2010/main">
+                <a:effectLst>
+                  <a:outerShdw dist="35921" dir="2700000" algn="ctr" rotWithShape="0">
+                    <a:schemeClr val="bg2"/>
+                  </a:outerShdw>
+                </a:effectLst>
+              </a14:hiddenEffects>
+            </a:ext>
+          </a:extLst>
+        </p:spPr>
+      </p:pic>
+    </p:spTree>
+    <p:extLst>
+      <p:ext uri="{BB962C8B-B14F-4D97-AF65-F5344CB8AC3E}">
+        <p14:creationId xmlns:p14="http://schemas.microsoft.com/office/powerpoint/2010/main" val="1154494063"/>
+      </p:ext>
+    </p:extLst>
+  </p:cSld>
+  <p:clrMapOvr>
+    <a:masterClrMapping/>
+  </p:clrMapOvr>
+</p:sld>
+</file>
+
+<file path=ppt/slides/slide9.xml><?xml version="1.0" encoding="utf-8"?>
+<p:sld xmlns:a="http://schemas.openxmlformats.org/drawingml/2006/main" xmlns:r="http://schemas.openxmlformats.org/officeDocument/2006/relationships" xmlns:p="http://schemas.openxmlformats.org/presentationml/2006/main">
+  <p:cSld>
+    <p:spTree>
+      <p:nvGrpSpPr>
+        <p:cNvPr id="1" name=""/>
+        <p:cNvGrpSpPr/>
+        <p:nvPr/>
+      </p:nvGrpSpPr>
+      <p:grpSpPr>
+        <a:xfrm>
+          <a:off x="0" y="0"/>
+          <a:ext cx="0" cy="0"/>
+          <a:chOff x="0" y="0"/>
+          <a:chExt cx="0" cy="0"/>
+        </a:xfrm>
+      </p:grpSpPr>
+      <p:sp>
+        <p:nvSpPr>
+          <p:cNvPr id="3" name="Title 2"/>
+          <p:cNvSpPr>
+            <a:spLocks noGrp="1"/>
+          </p:cNvSpPr>
+          <p:nvPr>
+            <p:ph type="title"/>
+          </p:nvPr>
+        </p:nvSpPr>
+        <p:spPr/>
+        <p:txBody>
+          <a:bodyPr/>
+          <a:lstStyle/>
+          <a:p>
+            <a:r>
+              <a:rPr lang="en-US" dirty="0" smtClean="0"/>
+              <a:t>Algorithm</a:t>
+            </a:r>
+            <a:endParaRPr lang="en-US" dirty="0"/>
+          </a:p>
+        </p:txBody>
+      </p:sp>
+      <p:pic>
+        <p:nvPicPr>
+          <p:cNvPr id="2050" name="Picture 2"/>
+          <p:cNvPicPr>
+            <a:picLocks noGrp="1" noChangeAspect="1" noChangeArrowheads="1"/>
+          </p:cNvPicPr>
+          <p:nvPr>
+            <p:ph idx="1"/>
+          </p:nvPr>
+        </p:nvPicPr>
+        <p:blipFill>
+          <a:blip r:embed="rId2">
+            <a:extLst>
+              <a:ext uri="{28A0092B-C50C-407E-A947-70E740481C1C}">
+                <a14:useLocalDpi xmlns:a14="http://schemas.microsoft.com/office/drawing/2010/main" val="0"/>
+              </a:ext>
+            </a:extLst>
+          </a:blip>
+          <a:srcRect/>
+          <a:stretch>
+            <a:fillRect/>
+          </a:stretch>
+        </p:blipFill>
+        <p:spPr bwMode="auto">
+          <a:xfrm>
+            <a:off x="749086" y="1828800"/>
+            <a:ext cx="6180352" cy="3096419"/>
+          </a:xfrm>
+          <a:prstGeom prst="rect">
+            <a:avLst/>
+          </a:prstGeom>
+          <a:noFill/>
+          <a:ln>
+            <a:noFill/>
+          </a:ln>
+          <a:effectLst/>
+          <a:extLst>
+            <a:ext uri="{909E8E84-426E-40DD-AFC4-6F175D3DCCD1}">
+              <a14:hiddenFill xmlns:a14="http://schemas.microsoft.com/office/drawing/2010/main">
+                <a:solidFill>
+                  <a:schemeClr val="accent1"/>
+                </a:solidFill>
+              </a14:hiddenFill>
+            </a:ext>
+            <a:ext uri="{91240B29-F687-4F45-9708-019B960494DF}">
+              <a14:hiddenLine xmlns:a14="http://schemas.microsoft.com/office/drawing/2010/main" w="9525">
+                <a:solidFill>
+                  <a:schemeClr val="tx1"/>
+                </a:solidFill>
+                <a:miter lim="800000"/>
+                <a:headEnd/>
+                <a:tailEnd/>
+              </a14:hiddenLine>
+            </a:ext>
+            <a:ext uri="{AF507438-7753-43E0-B8FC-AC1667EBCBE1}">
+              <a14:hiddenEffects xmlns:a14="http://schemas.microsoft.com/office/drawing/2010/main">
+                <a:effectLst>
+                  <a:outerShdw dist="35921" dir="2700000" algn="ctr" rotWithShape="0">
+                    <a:schemeClr val="bg2"/>
+                  </a:outerShdw>
+                </a:effectLst>
+              </a14:hiddenEffects>
+            </a:ext>
+          </a:extLst>
+        </p:spPr>
+      </p:pic>
+      <p:pic>
+        <p:nvPicPr>
+          <p:cNvPr id="2051" name="Picture 3"/>
+          <p:cNvPicPr>
+            <a:picLocks noChangeAspect="1" noChangeArrowheads="1"/>
+          </p:cNvPicPr>
+          <p:nvPr/>
+        </p:nvPicPr>
+        <p:blipFill>
+          <a:blip r:embed="rId3">
+            <a:extLst>
+              <a:ext uri="{28A0092B-C50C-407E-A947-70E740481C1C}">
+                <a14:useLocalDpi xmlns:a14="http://schemas.microsoft.com/office/drawing/2010/main" val="0"/>
+              </a:ext>
+            </a:extLst>
+          </a:blip>
+          <a:srcRect/>
+          <a:stretch>
+            <a:fillRect/>
+          </a:stretch>
+        </p:blipFill>
+        <p:spPr bwMode="auto">
+          <a:xfrm>
+            <a:off x="590550" y="1462088"/>
+            <a:ext cx="7962900" cy="3933825"/>
+          </a:xfrm>
+          <a:prstGeom prst="rect">
+            <a:avLst/>
+          </a:prstGeom>
+          <a:noFill/>
+          <a:ln>
+            <a:noFill/>
+          </a:ln>
+          <a:effectLst/>
+          <a:extLst>
+            <a:ext uri="{909E8E84-426E-40DD-AFC4-6F175D3DCCD1}">
+              <a14:hiddenFill xmlns:a14="http://schemas.microsoft.com/office/drawing/2010/main">
+                <a:solidFill>
+                  <a:schemeClr val="accent1"/>
+                </a:solidFill>
+              </a14:hiddenFill>
+            </a:ext>
+            <a:ext uri="{91240B29-F687-4F45-9708-019B960494DF}">
+              <a14:hiddenLine xmlns:a14="http://schemas.microsoft.com/office/drawing/2010/main" w="9525">
+                <a:solidFill>
+                  <a:schemeClr val="tx1"/>
+                </a:solidFill>
+                <a:miter lim="800000"/>
+                <a:headEnd/>
+                <a:tailEnd/>
+              </a14:hiddenLine>
+            </a:ext>
+            <a:ext uri="{AF507438-7753-43E0-B8FC-AC1667EBCBE1}">
+              <a14:hiddenEffects xmlns:a14="http://schemas.microsoft.com/office/drawing/2010/main">
+                <a:effectLst>
+                  <a:outerShdw dist="35921" dir="2700000" algn="ctr" rotWithShape="0">
+                    <a:schemeClr val="bg2"/>
+                  </a:outerShdw>
+                </a:effectLst>
+              </a14:hiddenEffects>
+            </a:ext>
+          </a:extLst>
+        </p:spPr>
+      </p:pic>
+    </p:spTree>
+    <p:extLst>
+      <p:ext uri="{BB962C8B-B14F-4D97-AF65-F5344CB8AC3E}">
+        <p14:creationId xmlns:p14="http://schemas.microsoft.com/office/powerpoint/2010/main" val="2986724388"/>
       </p:ext>
     </p:extLst>
   </p:cSld>

</xml_diff>

<commit_message>
made updates to paper PP and summary
</commit_message>
<xml_diff>
--- a/paper/848_Paper_Presentation_Fasburg_Thomas.pptx
+++ b/paper/848_Paper_Presentation_Fasburg_Thomas.pptx
@@ -5,26 +5,27 @@
     <p:sldMasterId id="2147483761" r:id="rId1"/>
   </p:sldMasterIdLst>
   <p:notesMasterIdLst>
-    <p:notesMasterId r:id="rId19"/>
+    <p:notesMasterId r:id="rId20"/>
   </p:notesMasterIdLst>
   <p:sldIdLst>
     <p:sldId id="256" r:id="rId2"/>
-    <p:sldId id="275" r:id="rId3"/>
-    <p:sldId id="282" r:id="rId4"/>
-    <p:sldId id="276" r:id="rId5"/>
-    <p:sldId id="277" r:id="rId6"/>
-    <p:sldId id="278" r:id="rId7"/>
-    <p:sldId id="283" r:id="rId8"/>
-    <p:sldId id="279" r:id="rId9"/>
-    <p:sldId id="284" r:id="rId10"/>
-    <p:sldId id="280" r:id="rId11"/>
-    <p:sldId id="287" r:id="rId12"/>
-    <p:sldId id="285" r:id="rId13"/>
-    <p:sldId id="288" r:id="rId14"/>
-    <p:sldId id="289" r:id="rId15"/>
-    <p:sldId id="286" r:id="rId16"/>
-    <p:sldId id="281" r:id="rId17"/>
-    <p:sldId id="274" r:id="rId18"/>
+    <p:sldId id="290" r:id="rId3"/>
+    <p:sldId id="275" r:id="rId4"/>
+    <p:sldId id="282" r:id="rId5"/>
+    <p:sldId id="276" r:id="rId6"/>
+    <p:sldId id="277" r:id="rId7"/>
+    <p:sldId id="278" r:id="rId8"/>
+    <p:sldId id="283" r:id="rId9"/>
+    <p:sldId id="279" r:id="rId10"/>
+    <p:sldId id="284" r:id="rId11"/>
+    <p:sldId id="280" r:id="rId12"/>
+    <p:sldId id="287" r:id="rId13"/>
+    <p:sldId id="285" r:id="rId14"/>
+    <p:sldId id="288" r:id="rId15"/>
+    <p:sldId id="289" r:id="rId16"/>
+    <p:sldId id="286" r:id="rId17"/>
+    <p:sldId id="281" r:id="rId18"/>
+    <p:sldId id="274" r:id="rId19"/>
   </p:sldIdLst>
   <p:sldSz cx="9144000" cy="6858000" type="screen4x3"/>
   <p:notesSz cx="6858000" cy="9144000"/>
@@ -125,7 +126,7 @@
   </p:defaultTextStyle>
   <p:extLst>
     <p:ext uri="{EFAFB233-063F-42B5-8137-9DF3F51BA10A}">
-      <p15:sldGuideLst xmlns="" xmlns:p15="http://schemas.microsoft.com/office/powerpoint/2012/main">
+      <p15:sldGuideLst xmlns:p15="http://schemas.microsoft.com/office/powerpoint/2012/main" xmlns="">
         <p15:guide id="1" orient="horz" pos="2160">
           <p15:clr>
             <a:srgbClr val="A4A3A4"/>
@@ -224,7 +225,7 @@
           <a:p>
             <a:fld id="{A63B8CFC-D614-4432-A7DB-A65856E85B43}" type="datetimeFigureOut">
               <a:rPr lang="en-US" smtClean="0"/>
-              <a:t>10/25/2015</a:t>
+              <a:t>10/29/2015</a:t>
             </a:fld>
             <a:endParaRPr lang="en-US" dirty="0"/>
           </a:p>
@@ -576,6 +577,282 @@
 </p:notes>
 </file>
 
+<file path=ppt/notesSlides/notesSlide10.xml><?xml version="1.0" encoding="utf-8"?>
+<p:notes xmlns:a="http://schemas.openxmlformats.org/drawingml/2006/main" xmlns:r="http://schemas.openxmlformats.org/officeDocument/2006/relationships" xmlns:p="http://schemas.openxmlformats.org/presentationml/2006/main">
+  <p:cSld>
+    <p:spTree>
+      <p:nvGrpSpPr>
+        <p:cNvPr id="1" name=""/>
+        <p:cNvGrpSpPr/>
+        <p:nvPr/>
+      </p:nvGrpSpPr>
+      <p:grpSpPr>
+        <a:xfrm>
+          <a:off x="0" y="0"/>
+          <a:ext cx="0" cy="0"/>
+          <a:chOff x="0" y="0"/>
+          <a:chExt cx="0" cy="0"/>
+        </a:xfrm>
+      </p:grpSpPr>
+      <p:sp>
+        <p:nvSpPr>
+          <p:cNvPr id="2" name="Slide Image Placeholder 1"/>
+          <p:cNvSpPr>
+            <a:spLocks noGrp="1" noRot="1" noChangeAspect="1"/>
+          </p:cNvSpPr>
+          <p:nvPr>
+            <p:ph type="sldImg"/>
+          </p:nvPr>
+        </p:nvSpPr>
+        <p:spPr/>
+      </p:sp>
+      <p:sp>
+        <p:nvSpPr>
+          <p:cNvPr id="3" name="Notes Placeholder 2"/>
+          <p:cNvSpPr>
+            <a:spLocks noGrp="1"/>
+          </p:cNvSpPr>
+          <p:nvPr>
+            <p:ph type="body" idx="1"/>
+          </p:nvPr>
+        </p:nvSpPr>
+        <p:spPr/>
+        <p:txBody>
+          <a:bodyPr/>
+          <a:lstStyle/>
+          <a:p>
+            <a:endParaRPr lang="en-US" dirty="0"/>
+          </a:p>
+        </p:txBody>
+      </p:sp>
+      <p:sp>
+        <p:nvSpPr>
+          <p:cNvPr id="4" name="Slide Number Placeholder 3"/>
+          <p:cNvSpPr>
+            <a:spLocks noGrp="1"/>
+          </p:cNvSpPr>
+          <p:nvPr>
+            <p:ph type="sldNum" sz="quarter" idx="10"/>
+          </p:nvPr>
+        </p:nvSpPr>
+        <p:spPr/>
+        <p:txBody>
+          <a:bodyPr/>
+          <a:lstStyle/>
+          <a:p>
+            <a:fld id="{B8B3BC3C-0900-4ACD-9030-5BE6C2442A68}" type="slidenum">
+              <a:rPr lang="en-US" smtClean="0"/>
+              <a:t>14</a:t>
+            </a:fld>
+            <a:endParaRPr lang="en-US" dirty="0"/>
+          </a:p>
+        </p:txBody>
+      </p:sp>
+    </p:spTree>
+    <p:extLst>
+      <p:ext uri="{BB962C8B-B14F-4D97-AF65-F5344CB8AC3E}">
+        <p14:creationId xmlns:p14="http://schemas.microsoft.com/office/powerpoint/2010/main" val="336890695"/>
+      </p:ext>
+    </p:extLst>
+  </p:cSld>
+  <p:clrMapOvr>
+    <a:masterClrMapping/>
+  </p:clrMapOvr>
+</p:notes>
+</file>
+
+<file path=ppt/notesSlides/notesSlide11.xml><?xml version="1.0" encoding="utf-8"?>
+<p:notes xmlns:a="http://schemas.openxmlformats.org/drawingml/2006/main" xmlns:r="http://schemas.openxmlformats.org/officeDocument/2006/relationships" xmlns:p="http://schemas.openxmlformats.org/presentationml/2006/main">
+  <p:cSld>
+    <p:spTree>
+      <p:nvGrpSpPr>
+        <p:cNvPr id="1" name=""/>
+        <p:cNvGrpSpPr/>
+        <p:nvPr/>
+      </p:nvGrpSpPr>
+      <p:grpSpPr>
+        <a:xfrm>
+          <a:off x="0" y="0"/>
+          <a:ext cx="0" cy="0"/>
+          <a:chOff x="0" y="0"/>
+          <a:chExt cx="0" cy="0"/>
+        </a:xfrm>
+      </p:grpSpPr>
+      <p:sp>
+        <p:nvSpPr>
+          <p:cNvPr id="2" name="Slide Image Placeholder 1"/>
+          <p:cNvSpPr>
+            <a:spLocks noGrp="1" noRot="1" noChangeAspect="1"/>
+          </p:cNvSpPr>
+          <p:nvPr>
+            <p:ph type="sldImg"/>
+          </p:nvPr>
+        </p:nvSpPr>
+        <p:spPr/>
+      </p:sp>
+      <p:sp>
+        <p:nvSpPr>
+          <p:cNvPr id="3" name="Notes Placeholder 2"/>
+          <p:cNvSpPr>
+            <a:spLocks noGrp="1"/>
+          </p:cNvSpPr>
+          <p:nvPr>
+            <p:ph type="body" idx="1"/>
+          </p:nvPr>
+        </p:nvSpPr>
+        <p:spPr/>
+        <p:txBody>
+          <a:bodyPr/>
+          <a:lstStyle/>
+          <a:p>
+            <a:r>
+              <a:rPr lang="en-US" dirty="0" smtClean="0"/>
+              <a:t>Some user preferences were not met</a:t>
+            </a:r>
+            <a:r>
+              <a:rPr lang="en-US" baseline="0" dirty="0" smtClean="0"/>
+              <a:t> by a single app when the whole developer </a:t>
+            </a:r>
+            <a:r>
+              <a:rPr lang="en-US" baseline="0" dirty="0" smtClean="0"/>
+              <a:t>population </a:t>
+            </a:r>
+            <a:r>
+              <a:rPr lang="en-US" baseline="0" dirty="0" smtClean="0"/>
+              <a:t>was not flexible</a:t>
+            </a:r>
+            <a:endParaRPr lang="en-US" dirty="0"/>
+          </a:p>
+        </p:txBody>
+      </p:sp>
+      <p:sp>
+        <p:nvSpPr>
+          <p:cNvPr id="4" name="Slide Number Placeholder 3"/>
+          <p:cNvSpPr>
+            <a:spLocks noGrp="1"/>
+          </p:cNvSpPr>
+          <p:nvPr>
+            <p:ph type="sldNum" sz="quarter" idx="10"/>
+          </p:nvPr>
+        </p:nvSpPr>
+        <p:spPr/>
+        <p:txBody>
+          <a:bodyPr/>
+          <a:lstStyle/>
+          <a:p>
+            <a:fld id="{B8B3BC3C-0900-4ACD-9030-5BE6C2442A68}" type="slidenum">
+              <a:rPr lang="en-US" smtClean="0"/>
+              <a:t>15</a:t>
+            </a:fld>
+            <a:endParaRPr lang="en-US" dirty="0"/>
+          </a:p>
+        </p:txBody>
+      </p:sp>
+    </p:spTree>
+    <p:extLst>
+      <p:ext uri="{BB962C8B-B14F-4D97-AF65-F5344CB8AC3E}">
+        <p14:creationId xmlns:p14="http://schemas.microsoft.com/office/powerpoint/2010/main" val="336890695"/>
+      </p:ext>
+    </p:extLst>
+  </p:cSld>
+  <p:clrMapOvr>
+    <a:masterClrMapping/>
+  </p:clrMapOvr>
+</p:notes>
+</file>
+
+<file path=ppt/notesSlides/notesSlide12.xml><?xml version="1.0" encoding="utf-8"?>
+<p:notes xmlns:a="http://schemas.openxmlformats.org/drawingml/2006/main" xmlns:r="http://schemas.openxmlformats.org/officeDocument/2006/relationships" xmlns:p="http://schemas.openxmlformats.org/presentationml/2006/main">
+  <p:cSld>
+    <p:spTree>
+      <p:nvGrpSpPr>
+        <p:cNvPr id="1" name=""/>
+        <p:cNvGrpSpPr/>
+        <p:nvPr/>
+      </p:nvGrpSpPr>
+      <p:grpSpPr>
+        <a:xfrm>
+          <a:off x="0" y="0"/>
+          <a:ext cx="0" cy="0"/>
+          <a:chOff x="0" y="0"/>
+          <a:chExt cx="0" cy="0"/>
+        </a:xfrm>
+      </p:grpSpPr>
+      <p:sp>
+        <p:nvSpPr>
+          <p:cNvPr id="2" name="Slide Image Placeholder 1"/>
+          <p:cNvSpPr>
+            <a:spLocks noGrp="1" noRot="1" noChangeAspect="1"/>
+          </p:cNvSpPr>
+          <p:nvPr>
+            <p:ph type="sldImg"/>
+          </p:nvPr>
+        </p:nvSpPr>
+        <p:spPr/>
+      </p:sp>
+      <p:sp>
+        <p:nvSpPr>
+          <p:cNvPr id="3" name="Notes Placeholder 2"/>
+          <p:cNvSpPr>
+            <a:spLocks noGrp="1"/>
+          </p:cNvSpPr>
+          <p:nvPr>
+            <p:ph type="body" idx="1"/>
+          </p:nvPr>
+        </p:nvSpPr>
+        <p:spPr/>
+        <p:txBody>
+          <a:bodyPr/>
+          <a:lstStyle/>
+          <a:p>
+            <a:r>
+              <a:rPr lang="en-US" dirty="0" smtClean="0"/>
+              <a:t>Including some</a:t>
+            </a:r>
+            <a:r>
+              <a:rPr lang="en-US" baseline="0" dirty="0" smtClean="0"/>
+              <a:t> random elements in user and developer behaviors would be interesting. Should have tried to assess validity of results based on empirical data.</a:t>
+            </a:r>
+            <a:endParaRPr lang="en-US" dirty="0"/>
+          </a:p>
+        </p:txBody>
+      </p:sp>
+      <p:sp>
+        <p:nvSpPr>
+          <p:cNvPr id="4" name="Slide Number Placeholder 3"/>
+          <p:cNvSpPr>
+            <a:spLocks noGrp="1"/>
+          </p:cNvSpPr>
+          <p:nvPr>
+            <p:ph type="sldNum" sz="quarter" idx="10"/>
+          </p:nvPr>
+        </p:nvSpPr>
+        <p:spPr/>
+        <p:txBody>
+          <a:bodyPr/>
+          <a:lstStyle/>
+          <a:p>
+            <a:fld id="{B8B3BC3C-0900-4ACD-9030-5BE6C2442A68}" type="slidenum">
+              <a:rPr lang="en-US" smtClean="0"/>
+              <a:t>16</a:t>
+            </a:fld>
+            <a:endParaRPr lang="en-US" dirty="0"/>
+          </a:p>
+        </p:txBody>
+      </p:sp>
+    </p:spTree>
+    <p:extLst>
+      <p:ext uri="{BB962C8B-B14F-4D97-AF65-F5344CB8AC3E}">
+        <p14:creationId xmlns:p14="http://schemas.microsoft.com/office/powerpoint/2010/main" val="1865372894"/>
+      </p:ext>
+    </p:extLst>
+  </p:cSld>
+  <p:clrMapOvr>
+    <a:masterClrMapping/>
+  </p:clrMapOvr>
+</p:notes>
+</file>
+
 <file path=ppt/notesSlides/notesSlide2.xml><?xml version="1.0" encoding="utf-8"?>
 <p:notes xmlns:a="http://schemas.openxmlformats.org/drawingml/2006/main" xmlns:r="http://schemas.openxmlformats.org/officeDocument/2006/relationships" xmlns:p="http://schemas.openxmlformats.org/presentationml/2006/main">
   <p:cSld>
@@ -622,11 +899,20 @@
           <a:p>
             <a:r>
               <a:rPr lang="en-US" dirty="0" smtClean="0"/>
-              <a:t>Some</a:t>
+              <a:t>A mobile app ecosystem was</a:t>
             </a:r>
             <a:r>
               <a:rPr lang="en-US" baseline="0" dirty="0" smtClean="0"/>
-              <a:t> are “flexible” meaning there is a 1% chance that after any given app is released, it will change it’s style. Later we will see what happens if everyone is flexible.</a:t>
+              <a:t> developed to model the creation and downloading of mobile apps simulate Apple’s iOS and investigate common developer strategies.</a:t>
+            </a:r>
+          </a:p>
+          <a:p>
+            <a:endParaRPr lang="en-US" baseline="0" dirty="0" smtClean="0"/>
+          </a:p>
+          <a:p>
+            <a:r>
+              <a:rPr lang="en-US" baseline="0" dirty="0" smtClean="0"/>
+              <a:t>Evaluate in terms of downloads received, app diversity, and adoption rate.</a:t>
             </a:r>
             <a:endParaRPr lang="en-US" dirty="0"/>
           </a:p>
@@ -649,7 +935,7 @@
           <a:p>
             <a:fld id="{B8B3BC3C-0900-4ACD-9030-5BE6C2442A68}" type="slidenum">
               <a:rPr lang="en-US" smtClean="0"/>
-              <a:t>4</a:t>
+              <a:t>2</a:t>
             </a:fld>
             <a:endParaRPr lang="en-US" dirty="0"/>
           </a:p>
@@ -658,7 +944,7 @@
     </p:spTree>
     <p:extLst>
       <p:ext uri="{BB962C8B-B14F-4D97-AF65-F5344CB8AC3E}">
-        <p14:creationId xmlns:p14="http://schemas.microsoft.com/office/powerpoint/2010/main" val="704678554"/>
+        <p14:creationId xmlns:p14="http://schemas.microsoft.com/office/powerpoint/2010/main" val="3762026629"/>
       </p:ext>
     </p:extLst>
   </p:cSld>
@@ -714,11 +1000,71 @@
           <a:p>
             <a:r>
               <a:rPr lang="en-US" dirty="0" smtClean="0"/>
-              <a:t>Diversity measured</a:t>
+              <a:t>Garg and </a:t>
+            </a:r>
+            <a:r>
+              <a:rPr lang="en-US" dirty="0" err="1" smtClean="0"/>
+              <a:t>Telang</a:t>
             </a:r>
             <a:r>
               <a:rPr lang="en-US" baseline="0" dirty="0" smtClean="0"/>
-              <a:t> by a coefficient of feature variation, based on the mean and standard deviation of values from the feature grid.</a:t>
+              <a:t> – developed strategies to infer the current sales of an app based on it ranking in the app store.</a:t>
+            </a:r>
+          </a:p>
+          <a:p>
+            <a:r>
+              <a:rPr lang="en-US" baseline="0" dirty="0" smtClean="0"/>
+              <a:t>	- Allows investors to predict profits, there is no certainty a new app will appear ranked though</a:t>
+            </a:r>
+          </a:p>
+          <a:p>
+            <a:endParaRPr lang="en-US" baseline="0" dirty="0" smtClean="0"/>
+          </a:p>
+          <a:p>
+            <a:r>
+              <a:rPr lang="en-US" baseline="0" dirty="0" err="1" smtClean="0"/>
+              <a:t>Bohmer</a:t>
+            </a:r>
+            <a:r>
+              <a:rPr lang="en-US" baseline="0" dirty="0" smtClean="0"/>
+              <a:t> – developed app to collect app usage information.</a:t>
+            </a:r>
+          </a:p>
+          <a:p>
+            <a:r>
+              <a:rPr lang="en-US" baseline="0" dirty="0" smtClean="0"/>
+              <a:t>	- Average app session time is less than a minute</a:t>
+            </a:r>
+          </a:p>
+          <a:p>
+            <a:r>
+              <a:rPr lang="en-US" baseline="0" dirty="0" smtClean="0"/>
+              <a:t>	- People use news apps in the morning, games at night, and communication apps during the day</a:t>
+            </a:r>
+          </a:p>
+          <a:p>
+            <a:r>
+              <a:rPr lang="en-US" baseline="0" dirty="0" smtClean="0"/>
+              <a:t>	- Informative, but only studies what is already out there</a:t>
+            </a:r>
+          </a:p>
+          <a:p>
+            <a:endParaRPr lang="en-US" baseline="0" dirty="0" smtClean="0"/>
+          </a:p>
+          <a:p>
+            <a:r>
+              <a:rPr lang="en-US" baseline="0" dirty="0" smtClean="0"/>
+              <a:t>Holland – Echo: ecosystem model where evolving agents are placed in a resource limited environment</a:t>
+            </a:r>
+          </a:p>
+          <a:p>
+            <a:r>
+              <a:rPr lang="en-US" baseline="0" dirty="0" smtClean="0"/>
+              <a:t>	Study the interaction between </a:t>
+            </a:r>
+            <a:r>
+              <a:rPr lang="en-US" baseline="0" dirty="0" err="1" smtClean="0"/>
+              <a:t>organisims</a:t>
             </a:r>
             <a:endParaRPr lang="en-US" dirty="0"/>
           </a:p>
@@ -741,7 +1087,7 @@
           <a:p>
             <a:fld id="{B8B3BC3C-0900-4ACD-9030-5BE6C2442A68}" type="slidenum">
               <a:rPr lang="en-US" smtClean="0"/>
-              <a:t>10</a:t>
+              <a:t>3</a:t>
             </a:fld>
             <a:endParaRPr lang="en-US" dirty="0"/>
           </a:p>
@@ -750,7 +1096,7 @@
     </p:spTree>
     <p:extLst>
       <p:ext uri="{BB962C8B-B14F-4D97-AF65-F5344CB8AC3E}">
-        <p14:creationId xmlns:p14="http://schemas.microsoft.com/office/powerpoint/2010/main" val="1971904817"/>
+        <p14:creationId xmlns:p14="http://schemas.microsoft.com/office/powerpoint/2010/main" val="2616936225"/>
       </p:ext>
     </p:extLst>
   </p:cSld>
@@ -804,6 +1150,39 @@
           <a:bodyPr/>
           <a:lstStyle/>
           <a:p>
+            <a:r>
+              <a:rPr lang="en-US" dirty="0" smtClean="0"/>
+              <a:t>Coevolving systems</a:t>
+            </a:r>
+            <a:r>
+              <a:rPr lang="en-US" baseline="0" dirty="0" smtClean="0"/>
+              <a:t> of apps, developers, and users</a:t>
+            </a:r>
+          </a:p>
+          <a:p>
+            <a:endParaRPr lang="en-US" baseline="0" dirty="0" smtClean="0"/>
+          </a:p>
+          <a:p>
+            <a:pPr marL="0" indent="0">
+              <a:buFontTx/>
+              <a:buNone/>
+            </a:pPr>
+            <a:r>
+              <a:rPr lang="en-US" baseline="0" dirty="0" smtClean="0"/>
+              <a:t>Developer agents build and upload apps to the app store</a:t>
+            </a:r>
+          </a:p>
+          <a:p>
+            <a:pPr marL="0" indent="0">
+              <a:buFontTx/>
+              <a:buNone/>
+            </a:pPr>
+            <a:r>
+              <a:rPr lang="en-US" baseline="0" dirty="0" smtClean="0"/>
+              <a:t>User agents browse the store and download the apps</a:t>
+            </a:r>
+          </a:p>
+          <a:p>
             <a:endParaRPr lang="en-US" dirty="0"/>
           </a:p>
         </p:txBody>
@@ -825,7 +1204,7 @@
           <a:p>
             <a:fld id="{B8B3BC3C-0900-4ACD-9030-5BE6C2442A68}" type="slidenum">
               <a:rPr lang="en-US" smtClean="0"/>
-              <a:t>13</a:t>
+              <a:t>4</a:t>
             </a:fld>
             <a:endParaRPr lang="en-US" dirty="0"/>
           </a:p>
@@ -834,7 +1213,7 @@
     </p:spTree>
     <p:extLst>
       <p:ext uri="{BB962C8B-B14F-4D97-AF65-F5344CB8AC3E}">
-        <p14:creationId xmlns:p14="http://schemas.microsoft.com/office/powerpoint/2010/main" val="336890695"/>
+        <p14:creationId xmlns:p14="http://schemas.microsoft.com/office/powerpoint/2010/main" val="2157627345"/>
       </p:ext>
     </p:extLst>
   </p:cSld>
@@ -889,26 +1268,94 @@
           <a:lstStyle/>
           <a:p>
             <a:r>
+              <a:rPr lang="en-US" baseline="0" dirty="0" smtClean="0"/>
+              <a:t>Variables: </a:t>
+            </a:r>
+          </a:p>
+          <a:p>
+            <a:r>
+              <a:rPr lang="en-US" baseline="0" dirty="0" smtClean="0"/>
+              <a:t>Development duration – random value for days to build an app</a:t>
+            </a:r>
+          </a:p>
+          <a:p>
+            <a:r>
+              <a:rPr lang="en-US" baseline="0" dirty="0" smtClean="0"/>
+              <a:t>Probability to become inactive – to model hobbyists and tendency to stop building apps</a:t>
+            </a:r>
+          </a:p>
+          <a:p>
+            <a:endParaRPr lang="en-US" baseline="0" dirty="0" smtClean="0"/>
+          </a:p>
+          <a:p>
+            <a:r>
+              <a:rPr lang="en-US" baseline="0" dirty="0" smtClean="0"/>
+              <a:t>Innovator: Innovative </a:t>
+            </a:r>
+            <a:r>
+              <a:rPr lang="en-US" baseline="0" dirty="0" err="1" smtClean="0"/>
+              <a:t>Devloper</a:t>
+            </a:r>
+            <a:r>
+              <a:rPr lang="en-US" baseline="0" dirty="0" smtClean="0"/>
+              <a:t> to create random features each time</a:t>
+            </a:r>
+          </a:p>
+          <a:p>
+            <a:r>
+              <a:rPr lang="en-US" baseline="0" dirty="0" err="1" smtClean="0"/>
+              <a:t>Milker</a:t>
+            </a:r>
+            <a:r>
+              <a:rPr lang="en-US" baseline="0" dirty="0" smtClean="0"/>
+              <a:t>: “milk” a single app idea repeatedly</a:t>
+            </a:r>
+          </a:p>
+          <a:p>
+            <a:r>
+              <a:rPr lang="en-US" baseline="0" dirty="0" smtClean="0"/>
+              <a:t>Optimizer: improve on the best app</a:t>
+            </a:r>
+          </a:p>
+          <a:p>
+            <a:r>
+              <a:rPr lang="en-US" baseline="0" dirty="0" smtClean="0"/>
+              <a:t>Copycat: Less creative</a:t>
+            </a:r>
+          </a:p>
+          <a:p>
+            <a:pPr marL="0" marR="0" indent="0" algn="l" defTabSz="914400" rtl="0" eaLnBrk="1" fontAlgn="auto" latinLnBrk="0" hangingPunct="1">
+              <a:lnSpc>
+                <a:spcPct val="100000"/>
+              </a:lnSpc>
+              <a:spcBef>
+                <a:spcPts val="0"/>
+              </a:spcBef>
+              <a:spcAft>
+                <a:spcPts val="0"/>
+              </a:spcAft>
+              <a:buClrTx/>
+              <a:buSzTx/>
+              <a:buFontTx/>
+              <a:buNone/>
+              <a:tabLst/>
+              <a:defRPr/>
+            </a:pPr>
+            <a:r>
+              <a:rPr lang="en-US" baseline="0" dirty="0" smtClean="0"/>
+              <a:t>Flexible: </a:t>
+            </a:r>
+            <a:r>
               <a:rPr lang="en-US" dirty="0" smtClean="0"/>
-              <a:t>Some user preferences were not met</a:t>
+              <a:t>Some</a:t>
             </a:r>
             <a:r>
               <a:rPr lang="en-US" baseline="0" dirty="0" smtClean="0"/>
-              <a:t> by a single app when the whole developer </a:t>
-            </a:r>
-            <a:r>
-              <a:rPr lang="en-US" baseline="0" dirty="0" err="1" smtClean="0"/>
-              <a:t>poulation</a:t>
-            </a:r>
-            <a:r>
-              <a:rPr lang="en-US" baseline="0" dirty="0" smtClean="0"/>
-              <a:t> was </a:t>
-            </a:r>
-            <a:r>
-              <a:rPr lang="en-US" baseline="0" smtClean="0"/>
-              <a:t>not flexible</a:t>
-            </a:r>
-            <a:endParaRPr lang="en-US"/>
+              <a:t> are “flexible” meaning there is a 1% chance that after any given app is released, it will change it’s style. Later we will see what happens if everyone is flexible.</a:t>
+            </a:r>
+          </a:p>
+          <a:p>
+            <a:endParaRPr lang="en-US" dirty="0"/>
           </a:p>
         </p:txBody>
       </p:sp>
@@ -929,7 +1376,7 @@
           <a:p>
             <a:fld id="{B8B3BC3C-0900-4ACD-9030-5BE6C2442A68}" type="slidenum">
               <a:rPr lang="en-US" smtClean="0"/>
-              <a:t>14</a:t>
+              <a:t>5</a:t>
             </a:fld>
             <a:endParaRPr lang="en-US" dirty="0"/>
           </a:p>
@@ -938,7 +1385,7 @@
     </p:spTree>
     <p:extLst>
       <p:ext uri="{BB962C8B-B14F-4D97-AF65-F5344CB8AC3E}">
-        <p14:creationId xmlns:p14="http://schemas.microsoft.com/office/powerpoint/2010/main" val="336890695"/>
+        <p14:creationId xmlns:p14="http://schemas.microsoft.com/office/powerpoint/2010/main" val="704678554"/>
       </p:ext>
     </p:extLst>
   </p:cSld>
@@ -994,11 +1441,37 @@
           <a:p>
             <a:r>
               <a:rPr lang="en-US" dirty="0" smtClean="0"/>
-              <a:t>Including some</a:t>
+              <a:t>Innovator: All cells filled based</a:t>
             </a:r>
             <a:r>
               <a:rPr lang="en-US" baseline="0" dirty="0" smtClean="0"/>
-              <a:t> random elements in user and developer behaviors would be interesting. Should have tried to assess validity of results based on empirical data.</a:t>
+              <a:t> on random probability of being filled</a:t>
+            </a:r>
+          </a:p>
+          <a:p>
+            <a:r>
+              <a:rPr lang="en-US" baseline="0" dirty="0" err="1" smtClean="0"/>
+              <a:t>Milker</a:t>
+            </a:r>
+            <a:r>
+              <a:rPr lang="en-US" baseline="0" dirty="0" smtClean="0"/>
+              <a:t>: Copies features from previous app with random mutation</a:t>
+            </a:r>
+          </a:p>
+          <a:p>
+            <a:r>
+              <a:rPr lang="en-US" baseline="0" dirty="0" smtClean="0"/>
+              <a:t>Optimizer: Copies features from own best app with random mutation</a:t>
+            </a:r>
+          </a:p>
+          <a:p>
+            <a:r>
+              <a:rPr lang="en-US" baseline="0" dirty="0" err="1" smtClean="0"/>
+              <a:t>CopyCat</a:t>
+            </a:r>
+            <a:r>
+              <a:rPr lang="en-US" baseline="0" dirty="0" smtClean="0"/>
+              <a:t>: App randomly selected from top charts and copied with random mutation</a:t>
             </a:r>
             <a:endParaRPr lang="en-US" dirty="0"/>
           </a:p>
@@ -1021,7 +1494,7 @@
           <a:p>
             <a:fld id="{B8B3BC3C-0900-4ACD-9030-5BE6C2442A68}" type="slidenum">
               <a:rPr lang="en-US" smtClean="0"/>
-              <a:t>15</a:t>
+              <a:t>6</a:t>
             </a:fld>
             <a:endParaRPr lang="en-US" dirty="0"/>
           </a:p>
@@ -1030,7 +1503,516 @@
     </p:spTree>
     <p:extLst>
       <p:ext uri="{BB962C8B-B14F-4D97-AF65-F5344CB8AC3E}">
-        <p14:creationId xmlns:p14="http://schemas.microsoft.com/office/powerpoint/2010/main" val="1865372894"/>
+        <p14:creationId xmlns:p14="http://schemas.microsoft.com/office/powerpoint/2010/main" val="2848245607"/>
+      </p:ext>
+    </p:extLst>
+  </p:cSld>
+  <p:clrMapOvr>
+    <a:masterClrMapping/>
+  </p:clrMapOvr>
+</p:notes>
+</file>
+
+<file path=ppt/notesSlides/notesSlide7.xml><?xml version="1.0" encoding="utf-8"?>
+<p:notes xmlns:a="http://schemas.openxmlformats.org/drawingml/2006/main" xmlns:r="http://schemas.openxmlformats.org/officeDocument/2006/relationships" xmlns:p="http://schemas.openxmlformats.org/presentationml/2006/main">
+  <p:cSld>
+    <p:spTree>
+      <p:nvGrpSpPr>
+        <p:cNvPr id="1" name=""/>
+        <p:cNvGrpSpPr/>
+        <p:nvPr/>
+      </p:nvGrpSpPr>
+      <p:grpSpPr>
+        <a:xfrm>
+          <a:off x="0" y="0"/>
+          <a:ext cx="0" cy="0"/>
+          <a:chOff x="0" y="0"/>
+          <a:chExt cx="0" cy="0"/>
+        </a:xfrm>
+      </p:grpSpPr>
+      <p:sp>
+        <p:nvSpPr>
+          <p:cNvPr id="2" name="Slide Image Placeholder 1"/>
+          <p:cNvSpPr>
+            <a:spLocks noGrp="1" noRot="1" noChangeAspect="1"/>
+          </p:cNvSpPr>
+          <p:nvPr>
+            <p:ph type="sldImg"/>
+          </p:nvPr>
+        </p:nvSpPr>
+        <p:spPr/>
+      </p:sp>
+      <p:sp>
+        <p:nvSpPr>
+          <p:cNvPr id="3" name="Notes Placeholder 2"/>
+          <p:cNvSpPr>
+            <a:spLocks noGrp="1"/>
+          </p:cNvSpPr>
+          <p:nvPr>
+            <p:ph type="body" idx="1"/>
+          </p:nvPr>
+        </p:nvSpPr>
+        <p:spPr/>
+        <p:txBody>
+          <a:bodyPr/>
+          <a:lstStyle/>
+          <a:p>
+            <a:r>
+              <a:rPr lang="en-US" dirty="0" smtClean="0"/>
+              <a:t>Initialize:</a:t>
+            </a:r>
+            <a:r>
+              <a:rPr lang="en-US" baseline="0" dirty="0" smtClean="0"/>
+              <a:t> Creates initial number of apps from random developers</a:t>
+            </a:r>
+          </a:p>
+          <a:p>
+            <a:r>
+              <a:rPr lang="en-US" baseline="0" dirty="0" smtClean="0"/>
+              <a:t>Dev Build Apps: For each active </a:t>
+            </a:r>
+            <a:r>
+              <a:rPr lang="en-US" baseline="0" dirty="0" err="1" smtClean="0"/>
+              <a:t>dev</a:t>
+            </a:r>
+            <a:r>
+              <a:rPr lang="en-US" baseline="0" dirty="0" smtClean="0"/>
+              <a:t>, </a:t>
+            </a:r>
+            <a:r>
+              <a:rPr lang="en-US" baseline="0" dirty="0" err="1" smtClean="0"/>
+              <a:t>daysTaken</a:t>
+            </a:r>
+            <a:r>
+              <a:rPr lang="en-US" baseline="0" dirty="0" smtClean="0"/>
+              <a:t>++ if </a:t>
+            </a:r>
+            <a:r>
+              <a:rPr lang="en-US" baseline="0" dirty="0" err="1" smtClean="0"/>
+              <a:t>daysTaken</a:t>
+            </a:r>
+            <a:r>
+              <a:rPr lang="en-US" baseline="0" dirty="0" smtClean="0"/>
+              <a:t> &gt; </a:t>
+            </a:r>
+            <a:r>
+              <a:rPr lang="en-US" baseline="0" dirty="0" err="1" smtClean="0"/>
+              <a:t>devDuration</a:t>
+            </a:r>
+            <a:r>
+              <a:rPr lang="en-US" baseline="0" dirty="0" smtClean="0"/>
+              <a:t> app is uploaded to Store</a:t>
+            </a:r>
+          </a:p>
+          <a:p>
+            <a:r>
+              <a:rPr lang="en-US" baseline="0" dirty="0" smtClean="0"/>
+              <a:t>App Store: New Apps Chart and Top Apps Chart is updated</a:t>
+            </a:r>
+          </a:p>
+          <a:p>
+            <a:r>
+              <a:rPr lang="en-US" baseline="0" dirty="0" smtClean="0"/>
+              <a:t>User Agents: For each user, </a:t>
+            </a:r>
+            <a:r>
+              <a:rPr lang="en-US" baseline="0" dirty="0" err="1" smtClean="0"/>
+              <a:t>daysElapsed</a:t>
+            </a:r>
+            <a:r>
+              <a:rPr lang="en-US" baseline="0" dirty="0" smtClean="0"/>
+              <a:t>++ if </a:t>
+            </a:r>
+            <a:r>
+              <a:rPr lang="en-US" baseline="0" dirty="0" err="1" smtClean="0"/>
+              <a:t>daysElapsed</a:t>
+            </a:r>
+            <a:r>
+              <a:rPr lang="en-US" baseline="0" dirty="0" smtClean="0"/>
+              <a:t> &gt; </a:t>
+            </a:r>
+            <a:r>
+              <a:rPr lang="en-US" baseline="0" dirty="0" err="1" smtClean="0"/>
+              <a:t>daysBtwBrowse</a:t>
+            </a:r>
+            <a:r>
+              <a:rPr lang="en-US" baseline="0" dirty="0" smtClean="0"/>
+              <a:t> user looks at store</a:t>
+            </a:r>
+          </a:p>
+          <a:p>
+            <a:r>
+              <a:rPr lang="en-US" baseline="0" dirty="0" smtClean="0"/>
+              <a:t>Increase Population: Increases </a:t>
+            </a:r>
+            <a:r>
+              <a:rPr lang="en-US" baseline="0" dirty="0" err="1" smtClean="0"/>
+              <a:t>devs</a:t>
+            </a:r>
+            <a:r>
+              <a:rPr lang="en-US" baseline="0" dirty="0" smtClean="0"/>
+              <a:t> and users</a:t>
+            </a:r>
+          </a:p>
+        </p:txBody>
+      </p:sp>
+      <p:sp>
+        <p:nvSpPr>
+          <p:cNvPr id="4" name="Slide Number Placeholder 3"/>
+          <p:cNvSpPr>
+            <a:spLocks noGrp="1"/>
+          </p:cNvSpPr>
+          <p:nvPr>
+            <p:ph type="sldNum" sz="quarter" idx="10"/>
+          </p:nvPr>
+        </p:nvSpPr>
+        <p:spPr/>
+        <p:txBody>
+          <a:bodyPr/>
+          <a:lstStyle/>
+          <a:p>
+            <a:fld id="{B8B3BC3C-0900-4ACD-9030-5BE6C2442A68}" type="slidenum">
+              <a:rPr lang="en-US" smtClean="0"/>
+              <a:t>10</a:t>
+            </a:fld>
+            <a:endParaRPr lang="en-US" dirty="0"/>
+          </a:p>
+        </p:txBody>
+      </p:sp>
+    </p:spTree>
+    <p:extLst>
+      <p:ext uri="{BB962C8B-B14F-4D97-AF65-F5344CB8AC3E}">
+        <p14:creationId xmlns:p14="http://schemas.microsoft.com/office/powerpoint/2010/main" val="2614985751"/>
+      </p:ext>
+    </p:extLst>
+  </p:cSld>
+  <p:clrMapOvr>
+    <a:masterClrMapping/>
+  </p:clrMapOvr>
+</p:notes>
+</file>
+
+<file path=ppt/notesSlides/notesSlide8.xml><?xml version="1.0" encoding="utf-8"?>
+<p:notes xmlns:a="http://schemas.openxmlformats.org/drawingml/2006/main" xmlns:r="http://schemas.openxmlformats.org/officeDocument/2006/relationships" xmlns:p="http://schemas.openxmlformats.org/presentationml/2006/main">
+  <p:cSld>
+    <p:spTree>
+      <p:nvGrpSpPr>
+        <p:cNvPr id="1" name=""/>
+        <p:cNvGrpSpPr/>
+        <p:nvPr/>
+      </p:nvGrpSpPr>
+      <p:grpSpPr>
+        <a:xfrm>
+          <a:off x="0" y="0"/>
+          <a:ext cx="0" cy="0"/>
+          <a:chOff x="0" y="0"/>
+          <a:chExt cx="0" cy="0"/>
+        </a:xfrm>
+      </p:grpSpPr>
+      <p:sp>
+        <p:nvSpPr>
+          <p:cNvPr id="2" name="Slide Image Placeholder 1"/>
+          <p:cNvSpPr>
+            <a:spLocks noGrp="1" noRot="1" noChangeAspect="1"/>
+          </p:cNvSpPr>
+          <p:nvPr>
+            <p:ph type="sldImg"/>
+          </p:nvPr>
+        </p:nvSpPr>
+        <p:spPr/>
+      </p:sp>
+      <p:sp>
+        <p:nvSpPr>
+          <p:cNvPr id="3" name="Notes Placeholder 2"/>
+          <p:cNvSpPr>
+            <a:spLocks noGrp="1"/>
+          </p:cNvSpPr>
+          <p:nvPr>
+            <p:ph type="body" idx="1"/>
+          </p:nvPr>
+        </p:nvSpPr>
+        <p:spPr/>
+        <p:txBody>
+          <a:bodyPr/>
+          <a:lstStyle/>
+          <a:p>
+            <a:r>
+              <a:rPr lang="en-US" dirty="0" smtClean="0"/>
+              <a:t>Diversity measured</a:t>
+            </a:r>
+            <a:r>
+              <a:rPr lang="en-US" baseline="0" dirty="0" smtClean="0"/>
+              <a:t> by a coefficient of feature variation, based on the mean and standard deviation of values from the feature grid</a:t>
+            </a:r>
+            <a:r>
+              <a:rPr lang="en-US" baseline="0" dirty="0" smtClean="0"/>
+              <a:t>.</a:t>
+            </a:r>
+          </a:p>
+          <a:p>
+            <a:endParaRPr lang="en-US" baseline="0" dirty="0" smtClean="0"/>
+          </a:p>
+          <a:p>
+            <a:r>
+              <a:rPr lang="en-US" baseline="0" dirty="0" err="1" smtClean="0"/>
+              <a:t>AvgDl</a:t>
+            </a:r>
+            <a:r>
+              <a:rPr lang="en-US" baseline="0" dirty="0" smtClean="0"/>
+              <a:t>: total number of downloads / total number of apps</a:t>
+            </a:r>
+          </a:p>
+          <a:p>
+            <a:r>
+              <a:rPr lang="en-US" baseline="0" dirty="0" smtClean="0"/>
+              <a:t>Top20TotDl: Rank top 20 based on total number of downloads, % proportion belonging to each strategy</a:t>
+            </a:r>
+          </a:p>
+          <a:p>
+            <a:r>
+              <a:rPr lang="en-US" baseline="0" dirty="0" smtClean="0"/>
+              <a:t>Top20AvgDl: Rank top 20 based on average number of downloads, % proportion belonging to each strategy</a:t>
+            </a:r>
+          </a:p>
+          <a:p>
+            <a:r>
+              <a:rPr lang="en-US" baseline="0" dirty="0" err="1" smtClean="0"/>
+              <a:t>ZeroDl</a:t>
+            </a:r>
+            <a:r>
+              <a:rPr lang="en-US" baseline="0" dirty="0" smtClean="0"/>
+              <a:t>: Proportion of </a:t>
+            </a:r>
+            <a:r>
+              <a:rPr lang="en-US" baseline="0" dirty="0" err="1" smtClean="0"/>
+              <a:t>devs</a:t>
+            </a:r>
+            <a:r>
+              <a:rPr lang="en-US" baseline="0" dirty="0" smtClean="0"/>
+              <a:t> who received no downloads for any apps so far.</a:t>
+            </a:r>
+          </a:p>
+          <a:p>
+            <a:endParaRPr lang="en-US" baseline="0" dirty="0" smtClean="0"/>
+          </a:p>
+          <a:p>
+            <a:r>
+              <a:rPr lang="en-US" baseline="0" dirty="0" err="1" smtClean="0"/>
+              <a:t>FeatCV</a:t>
+            </a:r>
+            <a:r>
+              <a:rPr lang="en-US" baseline="0" dirty="0" smtClean="0"/>
+              <a:t>: Measure app coverage of features that are desired by users</a:t>
+            </a:r>
+          </a:p>
+          <a:p>
+            <a:r>
+              <a:rPr lang="en-US" baseline="0" dirty="0" smtClean="0"/>
+              <a:t>	Good strategy has low </a:t>
+            </a:r>
+            <a:r>
+              <a:rPr lang="en-US" baseline="0" dirty="0" err="1" smtClean="0"/>
+              <a:t>FeatCV</a:t>
+            </a:r>
+            <a:endParaRPr lang="en-US" baseline="0" dirty="0" smtClean="0"/>
+          </a:p>
+          <a:p>
+            <a:r>
+              <a:rPr lang="en-US" baseline="0" dirty="0" smtClean="0"/>
+              <a:t>	Mean preference for user population is evenly distributed</a:t>
+            </a:r>
+          </a:p>
+          <a:p>
+            <a:r>
+              <a:rPr lang="en-US" baseline="0" dirty="0" smtClean="0"/>
+              <a:t>	Indicates all the apps have features that cover the desired region in feature matrix</a:t>
+            </a:r>
+          </a:p>
+          <a:p>
+            <a:endParaRPr lang="en-US" dirty="0"/>
+          </a:p>
+        </p:txBody>
+      </p:sp>
+      <p:sp>
+        <p:nvSpPr>
+          <p:cNvPr id="4" name="Slide Number Placeholder 3"/>
+          <p:cNvSpPr>
+            <a:spLocks noGrp="1"/>
+          </p:cNvSpPr>
+          <p:nvPr>
+            <p:ph type="sldNum" sz="quarter" idx="10"/>
+          </p:nvPr>
+        </p:nvSpPr>
+        <p:spPr/>
+        <p:txBody>
+          <a:bodyPr/>
+          <a:lstStyle/>
+          <a:p>
+            <a:fld id="{B8B3BC3C-0900-4ACD-9030-5BE6C2442A68}" type="slidenum">
+              <a:rPr lang="en-US" smtClean="0"/>
+              <a:t>11</a:t>
+            </a:fld>
+            <a:endParaRPr lang="en-US" dirty="0"/>
+          </a:p>
+        </p:txBody>
+      </p:sp>
+    </p:spTree>
+    <p:extLst>
+      <p:ext uri="{BB962C8B-B14F-4D97-AF65-F5344CB8AC3E}">
+        <p14:creationId xmlns:p14="http://schemas.microsoft.com/office/powerpoint/2010/main" val="1971904817"/>
+      </p:ext>
+    </p:extLst>
+  </p:cSld>
+  <p:clrMapOvr>
+    <a:masterClrMapping/>
+  </p:clrMapOvr>
+</p:notes>
+</file>
+
+<file path=ppt/notesSlides/notesSlide9.xml><?xml version="1.0" encoding="utf-8"?>
+<p:notes xmlns:a="http://schemas.openxmlformats.org/drawingml/2006/main" xmlns:r="http://schemas.openxmlformats.org/officeDocument/2006/relationships" xmlns:p="http://schemas.openxmlformats.org/presentationml/2006/main">
+  <p:cSld>
+    <p:spTree>
+      <p:nvGrpSpPr>
+        <p:cNvPr id="1" name=""/>
+        <p:cNvGrpSpPr/>
+        <p:nvPr/>
+      </p:nvGrpSpPr>
+      <p:grpSpPr>
+        <a:xfrm>
+          <a:off x="0" y="0"/>
+          <a:ext cx="0" cy="0"/>
+          <a:chOff x="0" y="0"/>
+          <a:chExt cx="0" cy="0"/>
+        </a:xfrm>
+      </p:grpSpPr>
+      <p:sp>
+        <p:nvSpPr>
+          <p:cNvPr id="2" name="Slide Image Placeholder 1"/>
+          <p:cNvSpPr>
+            <a:spLocks noGrp="1" noRot="1" noChangeAspect="1"/>
+          </p:cNvSpPr>
+          <p:nvPr>
+            <p:ph type="sldImg"/>
+          </p:nvPr>
+        </p:nvSpPr>
+        <p:spPr/>
+      </p:sp>
+      <p:sp>
+        <p:nvSpPr>
+          <p:cNvPr id="3" name="Notes Placeholder 2"/>
+          <p:cNvSpPr>
+            <a:spLocks noGrp="1"/>
+          </p:cNvSpPr>
+          <p:nvPr>
+            <p:ph type="body" idx="1"/>
+          </p:nvPr>
+        </p:nvSpPr>
+        <p:spPr/>
+        <p:txBody>
+          <a:bodyPr/>
+          <a:lstStyle/>
+          <a:p>
+            <a:r>
+              <a:rPr lang="en-US" dirty="0" smtClean="0"/>
+              <a:t>Measure fitness of each strategy as developers</a:t>
+            </a:r>
+            <a:r>
+              <a:rPr lang="en-US" baseline="0" dirty="0" smtClean="0"/>
+              <a:t> gain more experience in app development</a:t>
+            </a:r>
+          </a:p>
+          <a:p>
+            <a:r>
+              <a:rPr lang="en-US" baseline="0" dirty="0" smtClean="0"/>
+              <a:t>Survey users if they would download the app</a:t>
+            </a:r>
+          </a:p>
+          <a:p>
+            <a:r>
+              <a:rPr lang="en-US" baseline="0" dirty="0" smtClean="0"/>
+              <a:t>	Fitness = </a:t>
+            </a:r>
+            <a:r>
+              <a:rPr lang="en-US" baseline="0" dirty="0" err="1" smtClean="0"/>
+              <a:t>avg</a:t>
+            </a:r>
+            <a:r>
+              <a:rPr lang="en-US" baseline="0" dirty="0" smtClean="0"/>
+              <a:t> download / </a:t>
+            </a:r>
+            <a:r>
+              <a:rPr lang="en-US" baseline="0" dirty="0" err="1" smtClean="0"/>
+              <a:t>NumUsers</a:t>
+            </a:r>
+            <a:endParaRPr lang="en-US" baseline="0" dirty="0" smtClean="0"/>
+          </a:p>
+          <a:p>
+            <a:endParaRPr lang="en-US" baseline="0" dirty="0" smtClean="0"/>
+          </a:p>
+          <a:p>
+            <a:r>
+              <a:rPr lang="en-US" baseline="0" dirty="0" smtClean="0"/>
+              <a:t>S0: Innovator</a:t>
+            </a:r>
+          </a:p>
+          <a:p>
+            <a:r>
+              <a:rPr lang="en-US" baseline="0" dirty="0" smtClean="0"/>
+              <a:t>S1: </a:t>
+            </a:r>
+            <a:r>
+              <a:rPr lang="en-US" baseline="0" dirty="0" err="1" smtClean="0"/>
+              <a:t>Milker</a:t>
+            </a:r>
+            <a:endParaRPr lang="en-US" baseline="0" dirty="0" smtClean="0"/>
+          </a:p>
+          <a:p>
+            <a:r>
+              <a:rPr lang="en-US" baseline="0" dirty="0" smtClean="0"/>
+              <a:t>S2: Optimizer</a:t>
+            </a:r>
+          </a:p>
+          <a:p>
+            <a:r>
+              <a:rPr lang="en-US" baseline="0" dirty="0" smtClean="0"/>
+              <a:t>S3: </a:t>
+            </a:r>
+            <a:r>
+              <a:rPr lang="en-US" baseline="0" dirty="0" err="1" smtClean="0"/>
+              <a:t>CopyCat</a:t>
+            </a:r>
+            <a:endParaRPr lang="en-US" dirty="0"/>
+          </a:p>
+        </p:txBody>
+      </p:sp>
+      <p:sp>
+        <p:nvSpPr>
+          <p:cNvPr id="4" name="Slide Number Placeholder 3"/>
+          <p:cNvSpPr>
+            <a:spLocks noGrp="1"/>
+          </p:cNvSpPr>
+          <p:nvPr>
+            <p:ph type="sldNum" sz="quarter" idx="10"/>
+          </p:nvPr>
+        </p:nvSpPr>
+        <p:spPr/>
+        <p:txBody>
+          <a:bodyPr/>
+          <a:lstStyle/>
+          <a:p>
+            <a:fld id="{B8B3BC3C-0900-4ACD-9030-5BE6C2442A68}" type="slidenum">
+              <a:rPr lang="en-US" smtClean="0"/>
+              <a:t>12</a:t>
+            </a:fld>
+            <a:endParaRPr lang="en-US" dirty="0"/>
+          </a:p>
+        </p:txBody>
+      </p:sp>
+    </p:spTree>
+    <p:extLst>
+      <p:ext uri="{BB962C8B-B14F-4D97-AF65-F5344CB8AC3E}">
+        <p14:creationId xmlns:p14="http://schemas.microsoft.com/office/powerpoint/2010/main" val="4109889531"/>
       </p:ext>
     </p:extLst>
   </p:cSld>
@@ -1665,7 +2647,7 @@
           <a:p>
             <a:fld id="{ADE5661A-BDAA-4579-B2F5-AA9011776D83}" type="datetimeFigureOut">
               <a:rPr lang="en-US" smtClean="0"/>
-              <a:t>10/25/2015</a:t>
+              <a:t>10/29/2015</a:t>
             </a:fld>
             <a:endParaRPr lang="en-US" dirty="0"/>
           </a:p>
@@ -1863,7 +2845,7 @@
             <a:fld id="{1D8BD707-D9CF-40AE-B4C6-C98DA3205C09}" type="datetimeFigureOut">
               <a:rPr lang="en-US" smtClean="0"/>
               <a:pPr/>
-              <a:t>10/25/2015</a:t>
+              <a:t>10/29/2015</a:t>
             </a:fld>
             <a:endParaRPr lang="en-US" dirty="0"/>
           </a:p>
@@ -2050,7 +3032,7 @@
             <a:fld id="{1D8BD707-D9CF-40AE-B4C6-C98DA3205C09}" type="datetimeFigureOut">
               <a:rPr lang="en-US" smtClean="0"/>
               <a:pPr/>
-              <a:t>10/25/2015</a:t>
+              <a:t>10/29/2015</a:t>
             </a:fld>
             <a:endParaRPr lang="en-US" dirty="0"/>
           </a:p>
@@ -2202,7 +3184,7 @@
             <a:fld id="{1D8BD707-D9CF-40AE-B4C6-C98DA3205C09}" type="datetimeFigureOut">
               <a:rPr lang="en-US" smtClean="0"/>
               <a:pPr/>
-              <a:t>10/25/2015</a:t>
+              <a:t>10/29/2015</a:t>
             </a:fld>
             <a:endParaRPr lang="en-US" dirty="0"/>
           </a:p>
@@ -2458,7 +3440,7 @@
           <a:p>
             <a:fld id="{7D698992-9F5B-4E9D-871D-4517B2EC8643}" type="datetimeFigureOut">
               <a:rPr lang="en-US" smtClean="0"/>
-              <a:t>10/25/2015</a:t>
+              <a:t>10/29/2015</a:t>
             </a:fld>
             <a:endParaRPr lang="en-US" dirty="0"/>
           </a:p>
@@ -2868,7 +3850,7 @@
             <a:fld id="{1D8BD707-D9CF-40AE-B4C6-C98DA3205C09}" type="datetimeFigureOut">
               <a:rPr lang="en-US" smtClean="0"/>
               <a:pPr/>
-              <a:t>10/25/2015</a:t>
+              <a:t>10/29/2015</a:t>
             </a:fld>
             <a:endParaRPr lang="en-US" dirty="0"/>
           </a:p>
@@ -3316,7 +4298,7 @@
             <a:fld id="{1D8BD707-D9CF-40AE-B4C6-C98DA3205C09}" type="datetimeFigureOut">
               <a:rPr lang="en-US" smtClean="0"/>
               <a:pPr/>
-              <a:t>10/25/2015</a:t>
+              <a:t>10/29/2015</a:t>
             </a:fld>
             <a:endParaRPr lang="en-US" dirty="0"/>
           </a:p>
@@ -3419,7 +4401,7 @@
             <a:fld id="{1D8BD707-D9CF-40AE-B4C6-C98DA3205C09}" type="datetimeFigureOut">
               <a:rPr lang="en-US" smtClean="0"/>
               <a:pPr/>
-              <a:t>10/25/2015</a:t>
+              <a:t>10/29/2015</a:t>
             </a:fld>
             <a:endParaRPr lang="en-US" dirty="0"/>
           </a:p>
@@ -3542,7 +4524,7 @@
             <a:fld id="{1D8BD707-D9CF-40AE-B4C6-C98DA3205C09}" type="datetimeFigureOut">
               <a:rPr lang="en-US" smtClean="0"/>
               <a:pPr/>
-              <a:t>10/25/2015</a:t>
+              <a:t>10/29/2015</a:t>
             </a:fld>
             <a:endParaRPr lang="en-US" dirty="0"/>
           </a:p>
@@ -3818,7 +4800,7 @@
             <a:fld id="{1D8BD707-D9CF-40AE-B4C6-C98DA3205C09}" type="datetimeFigureOut">
               <a:rPr lang="en-US" smtClean="0"/>
               <a:pPr/>
-              <a:t>10/25/2015</a:t>
+              <a:t>10/29/2015</a:t>
             </a:fld>
             <a:endParaRPr lang="en-US" dirty="0"/>
           </a:p>
@@ -4025,7 +5007,7 @@
             <a:fld id="{1D8BD707-D9CF-40AE-B4C6-C98DA3205C09}" type="datetimeFigureOut">
               <a:rPr lang="en-US" smtClean="0"/>
               <a:pPr/>
-              <a:t>10/25/2015</a:t>
+              <a:t>10/29/2015</a:t>
             </a:fld>
             <a:endParaRPr lang="en-US" dirty="0"/>
           </a:p>
@@ -5136,7 +6118,7 @@
             <a:fld id="{1D8BD707-D9CF-40AE-B4C6-C98DA3205C09}" type="datetimeFigureOut">
               <a:rPr lang="en-US" smtClean="0"/>
               <a:pPr/>
-              <a:t>10/25/2015</a:t>
+              <a:t>10/29/2015</a:t>
             </a:fld>
             <a:endParaRPr lang="en-US" dirty="0"/>
           </a:p>
@@ -5606,11 +6588,7 @@
             <a:pPr algn="l"/>
             <a:r>
               <a:rPr lang="en-US" sz="2000" dirty="0" smtClean="0"/>
-              <a:t>Paper by</a:t>
-            </a:r>
-            <a:r>
-              <a:rPr lang="en-US" sz="2000" dirty="0" smtClean="0"/>
-              <a:t>: </a:t>
+              <a:t>Paper by: </a:t>
             </a:r>
             <a:r>
               <a:rPr lang="en-US" sz="2000" dirty="0" err="1"/>
@@ -5639,6 +6617,127 @@
           </a:p>
         </p:txBody>
       </p:sp>
+      <p:pic>
+        <p:nvPicPr>
+          <p:cNvPr id="1026" name="Picture 2" descr="http://dc942d419843af05523b-ff74ae13537a01be6cfec5927837dcfe.r14.cf1.rackcdn.com/wp-content/uploads/Android-logo.png"/>
+          <p:cNvPicPr>
+            <a:picLocks noChangeAspect="1" noChangeArrowheads="1"/>
+          </p:cNvPicPr>
+          <p:nvPr/>
+        </p:nvPicPr>
+        <p:blipFill>
+          <a:blip r:embed="rId3" cstate="print">
+            <a:extLst>
+              <a:ext uri="{28A0092B-C50C-407E-A947-70E740481C1C}">
+                <a14:useLocalDpi xmlns:a14="http://schemas.microsoft.com/office/drawing/2010/main" val="0"/>
+              </a:ext>
+            </a:extLst>
+          </a:blip>
+          <a:srcRect/>
+          <a:stretch>
+            <a:fillRect/>
+          </a:stretch>
+        </p:blipFill>
+        <p:spPr bwMode="auto">
+          <a:xfrm>
+            <a:off x="6019800" y="2155618"/>
+            <a:ext cx="1425782" cy="1425782"/>
+          </a:xfrm>
+          <a:prstGeom prst="rect">
+            <a:avLst/>
+          </a:prstGeom>
+          <a:noFill/>
+          <a:extLst>
+            <a:ext uri="{909E8E84-426E-40DD-AFC4-6F175D3DCCD1}">
+              <a14:hiddenFill xmlns:a14="http://schemas.microsoft.com/office/drawing/2010/main">
+                <a:solidFill>
+                  <a:srgbClr val="FFFFFF"/>
+                </a:solidFill>
+              </a14:hiddenFill>
+            </a:ext>
+          </a:extLst>
+        </p:spPr>
+      </p:pic>
+      <p:pic>
+        <p:nvPicPr>
+          <p:cNvPr id="1028" name="Picture 4" descr="http://www.pcgames.de/screenshots/1280x1024/2012/02/Logo-des-App-Store-von-Apple-400x300-4337d3888429118c.jpg"/>
+          <p:cNvPicPr>
+            <a:picLocks noChangeAspect="1" noChangeArrowheads="1"/>
+          </p:cNvPicPr>
+          <p:nvPr/>
+        </p:nvPicPr>
+        <p:blipFill rotWithShape="1">
+          <a:blip r:embed="rId4" cstate="print">
+            <a:extLst>
+              <a:ext uri="{28A0092B-C50C-407E-A947-70E740481C1C}">
+                <a14:useLocalDpi xmlns:a14="http://schemas.microsoft.com/office/drawing/2010/main" val="0"/>
+              </a:ext>
+            </a:extLst>
+          </a:blip>
+          <a:srcRect l="11706" r="12657"/>
+          <a:stretch/>
+        </p:blipFill>
+        <p:spPr bwMode="auto">
+          <a:xfrm>
+            <a:off x="7617093" y="2209800"/>
+            <a:ext cx="993507" cy="985153"/>
+          </a:xfrm>
+          <a:prstGeom prst="rect">
+            <a:avLst/>
+          </a:prstGeom>
+          <a:noFill/>
+          <a:extLst>
+            <a:ext uri="{909E8E84-426E-40DD-AFC4-6F175D3DCCD1}">
+              <a14:hiddenFill xmlns:a14="http://schemas.microsoft.com/office/drawing/2010/main">
+                <a:solidFill>
+                  <a:srgbClr val="FFFFFF"/>
+                </a:solidFill>
+              </a14:hiddenFill>
+            </a:ext>
+          </a:extLst>
+        </p:spPr>
+      </p:pic>
+      <p:pic>
+        <p:nvPicPr>
+          <p:cNvPr id="1030" name="Picture 6" descr="http://cdn.geekwire.com/wp-content/uploads/2014/01/windows-store-logo.png"/>
+          <p:cNvPicPr>
+            <a:picLocks noChangeAspect="1" noChangeArrowheads="1"/>
+          </p:cNvPicPr>
+          <p:nvPr/>
+        </p:nvPicPr>
+        <p:blipFill>
+          <a:blip r:embed="rId5" cstate="print">
+            <a:extLst>
+              <a:ext uri="{28A0092B-C50C-407E-A947-70E740481C1C}">
+                <a14:useLocalDpi xmlns:a14="http://schemas.microsoft.com/office/drawing/2010/main" val="0"/>
+              </a:ext>
+            </a:extLst>
+          </a:blip>
+          <a:srcRect/>
+          <a:stretch>
+            <a:fillRect/>
+          </a:stretch>
+        </p:blipFill>
+        <p:spPr bwMode="auto">
+          <a:xfrm>
+            <a:off x="7440139" y="3493533"/>
+            <a:ext cx="1070404" cy="1066800"/>
+          </a:xfrm>
+          <a:prstGeom prst="rect">
+            <a:avLst/>
+          </a:prstGeom>
+          <a:noFill/>
+          <a:extLst>
+            <a:ext uri="{909E8E84-426E-40DD-AFC4-6F175D3DCCD1}">
+              <a14:hiddenFill xmlns:a14="http://schemas.microsoft.com/office/drawing/2010/main">
+                <a:solidFill>
+                  <a:srgbClr val="FFFFFF"/>
+                </a:solidFill>
+              </a14:hiddenFill>
+            </a:ext>
+          </a:extLst>
+        </p:spPr>
+      </p:pic>
     </p:spTree>
     <p:extLst>
       <p:ext uri="{BB962C8B-B14F-4D97-AF65-F5344CB8AC3E}">
@@ -5660,6 +6759,189 @@
 </file>
 
 <file path=ppt/slides/slide10.xml><?xml version="1.0" encoding="utf-8"?>
+<p:sld xmlns:a="http://schemas.openxmlformats.org/drawingml/2006/main" xmlns:r="http://schemas.openxmlformats.org/officeDocument/2006/relationships" xmlns:p="http://schemas.openxmlformats.org/presentationml/2006/main">
+  <p:cSld>
+    <p:spTree>
+      <p:nvGrpSpPr>
+        <p:cNvPr id="1" name=""/>
+        <p:cNvGrpSpPr/>
+        <p:nvPr/>
+      </p:nvGrpSpPr>
+      <p:grpSpPr>
+        <a:xfrm>
+          <a:off x="0" y="0"/>
+          <a:ext cx="0" cy="0"/>
+          <a:chOff x="0" y="0"/>
+          <a:chExt cx="0" cy="0"/>
+        </a:xfrm>
+      </p:grpSpPr>
+      <p:sp>
+        <p:nvSpPr>
+          <p:cNvPr id="3" name="Title 2"/>
+          <p:cNvSpPr>
+            <a:spLocks noGrp="1"/>
+          </p:cNvSpPr>
+          <p:nvPr>
+            <p:ph type="title"/>
+          </p:nvPr>
+        </p:nvSpPr>
+        <p:spPr/>
+        <p:txBody>
+          <a:bodyPr/>
+          <a:lstStyle/>
+          <a:p>
+            <a:r>
+              <a:rPr lang="en-US" dirty="0" smtClean="0"/>
+              <a:t>Algorithm</a:t>
+            </a:r>
+            <a:endParaRPr lang="en-US" dirty="0"/>
+          </a:p>
+        </p:txBody>
+      </p:sp>
+      <p:pic>
+        <p:nvPicPr>
+          <p:cNvPr id="2050" name="Picture 2"/>
+          <p:cNvPicPr>
+            <a:picLocks noGrp="1" noChangeAspect="1" noChangeArrowheads="1"/>
+          </p:cNvPicPr>
+          <p:nvPr>
+            <p:ph idx="1"/>
+          </p:nvPr>
+        </p:nvPicPr>
+        <p:blipFill>
+          <a:blip r:embed="rId3">
+            <a:extLst>
+              <a:ext uri="{28A0092B-C50C-407E-A947-70E740481C1C}">
+                <a14:useLocalDpi xmlns:a14="http://schemas.microsoft.com/office/drawing/2010/main" val="0"/>
+              </a:ext>
+            </a:extLst>
+          </a:blip>
+          <a:srcRect/>
+          <a:stretch>
+            <a:fillRect/>
+          </a:stretch>
+        </p:blipFill>
+        <p:spPr bwMode="auto">
+          <a:xfrm>
+            <a:off x="749086" y="1828800"/>
+            <a:ext cx="6180352" cy="3096419"/>
+          </a:xfrm>
+          <a:prstGeom prst="rect">
+            <a:avLst/>
+          </a:prstGeom>
+          <a:noFill/>
+          <a:ln>
+            <a:noFill/>
+          </a:ln>
+          <a:effectLst/>
+          <a:extLst>
+            <a:ext uri="{909E8E84-426E-40DD-AFC4-6F175D3DCCD1}">
+              <a14:hiddenFill xmlns:a14="http://schemas.microsoft.com/office/drawing/2010/main">
+                <a:solidFill>
+                  <a:schemeClr val="accent1"/>
+                </a:solidFill>
+              </a14:hiddenFill>
+            </a:ext>
+            <a:ext uri="{91240B29-F687-4F45-9708-019B960494DF}">
+              <a14:hiddenLine xmlns:a14="http://schemas.microsoft.com/office/drawing/2010/main" w="9525">
+                <a:solidFill>
+                  <a:schemeClr val="tx1"/>
+                </a:solidFill>
+                <a:miter lim="800000"/>
+                <a:headEnd/>
+                <a:tailEnd/>
+              </a14:hiddenLine>
+            </a:ext>
+            <a:ext uri="{AF507438-7753-43E0-B8FC-AC1667EBCBE1}">
+              <a14:hiddenEffects xmlns:a14="http://schemas.microsoft.com/office/drawing/2010/main">
+                <a:effectLst>
+                  <a:outerShdw dist="35921" dir="2700000" algn="ctr" rotWithShape="0">
+                    <a:schemeClr val="bg2"/>
+                  </a:outerShdw>
+                </a:effectLst>
+              </a14:hiddenEffects>
+            </a:ext>
+          </a:extLst>
+        </p:spPr>
+      </p:pic>
+      <p:pic>
+        <p:nvPicPr>
+          <p:cNvPr id="2051" name="Picture 3"/>
+          <p:cNvPicPr>
+            <a:picLocks noChangeAspect="1" noChangeArrowheads="1"/>
+          </p:cNvPicPr>
+          <p:nvPr/>
+        </p:nvPicPr>
+        <p:blipFill>
+          <a:blip r:embed="rId4">
+            <a:extLst>
+              <a:ext uri="{28A0092B-C50C-407E-A947-70E740481C1C}">
+                <a14:useLocalDpi xmlns:a14="http://schemas.microsoft.com/office/drawing/2010/main" val="0"/>
+              </a:ext>
+            </a:extLst>
+          </a:blip>
+          <a:srcRect/>
+          <a:stretch>
+            <a:fillRect/>
+          </a:stretch>
+        </p:blipFill>
+        <p:spPr bwMode="auto">
+          <a:xfrm>
+            <a:off x="590550" y="1462088"/>
+            <a:ext cx="7962900" cy="3933825"/>
+          </a:xfrm>
+          <a:prstGeom prst="rect">
+            <a:avLst/>
+          </a:prstGeom>
+          <a:noFill/>
+          <a:ln>
+            <a:noFill/>
+          </a:ln>
+          <a:effectLst/>
+          <a:extLst>
+            <a:ext uri="{909E8E84-426E-40DD-AFC4-6F175D3DCCD1}">
+              <a14:hiddenFill xmlns:a14="http://schemas.microsoft.com/office/drawing/2010/main">
+                <a:solidFill>
+                  <a:schemeClr val="accent1"/>
+                </a:solidFill>
+              </a14:hiddenFill>
+            </a:ext>
+            <a:ext uri="{91240B29-F687-4F45-9708-019B960494DF}">
+              <a14:hiddenLine xmlns:a14="http://schemas.microsoft.com/office/drawing/2010/main" w="9525">
+                <a:solidFill>
+                  <a:schemeClr val="tx1"/>
+                </a:solidFill>
+                <a:miter lim="800000"/>
+                <a:headEnd/>
+                <a:tailEnd/>
+              </a14:hiddenLine>
+            </a:ext>
+            <a:ext uri="{AF507438-7753-43E0-B8FC-AC1667EBCBE1}">
+              <a14:hiddenEffects xmlns:a14="http://schemas.microsoft.com/office/drawing/2010/main">
+                <a:effectLst>
+                  <a:outerShdw dist="35921" dir="2700000" algn="ctr" rotWithShape="0">
+                    <a:schemeClr val="bg2"/>
+                  </a:outerShdw>
+                </a:effectLst>
+              </a14:hiddenEffects>
+            </a:ext>
+          </a:extLst>
+        </p:spPr>
+      </p:pic>
+    </p:spTree>
+    <p:extLst>
+      <p:ext uri="{BB962C8B-B14F-4D97-AF65-F5344CB8AC3E}">
+        <p14:creationId xmlns:p14="http://schemas.microsoft.com/office/powerpoint/2010/main" val="2986724388"/>
+      </p:ext>
+    </p:extLst>
+  </p:cSld>
+  <p:clrMapOvr>
+    <a:masterClrMapping/>
+  </p:clrMapOvr>
+</p:sld>
+</file>
+
+<file path=ppt/slides/slide11.xml><?xml version="1.0" encoding="utf-8"?>
 <p:sld xmlns:a="http://schemas.openxmlformats.org/drawingml/2006/main" xmlns:r="http://schemas.openxmlformats.org/officeDocument/2006/relationships" xmlns:p="http://schemas.openxmlformats.org/presentationml/2006/main">
   <p:cSld>
     <p:spTree>
@@ -5859,10 +7141,10 @@
           </a:xfrm>
           <a:prstGeom prst="borderCallout2">
             <a:avLst>
-              <a:gd name="adj1" fmla="val 44380"/>
+              <a:gd name="adj1" fmla="val 57983"/>
               <a:gd name="adj2" fmla="val -213"/>
-              <a:gd name="adj3" fmla="val 47899"/>
-              <a:gd name="adj4" fmla="val -34849"/>
+              <a:gd name="adj3" fmla="val 57616"/>
+              <a:gd name="adj4" fmla="val -33450"/>
               <a:gd name="adj5" fmla="val -397443"/>
               <a:gd name="adj6" fmla="val -35478"/>
             </a:avLst>
@@ -5964,7 +7246,7 @@
 </p:sld>
 </file>
 
-<file path=ppt/slides/slide11.xml><?xml version="1.0" encoding="utf-8"?>
+<file path=ppt/slides/slide12.xml><?xml version="1.0" encoding="utf-8"?>
 <p:sld xmlns:a="http://schemas.openxmlformats.org/drawingml/2006/main" xmlns:r="http://schemas.openxmlformats.org/officeDocument/2006/relationships" xmlns:p="http://schemas.openxmlformats.org/presentationml/2006/main">
   <p:cSld>
     <p:spTree>
@@ -6073,7 +7355,7 @@
           <p:nvPr/>
         </p:nvPicPr>
         <p:blipFill>
-          <a:blip r:embed="rId2">
+          <a:blip r:embed="rId3">
             <a:extLst>
               <a:ext uri="{28A0092B-C50C-407E-A947-70E740481C1C}">
                 <a14:useLocalDpi xmlns:a14="http://schemas.microsoft.com/office/drawing/2010/main" val="0"/>
@@ -6087,8 +7369,8 @@
         </p:blipFill>
         <p:spPr bwMode="auto">
           <a:xfrm>
-            <a:off x="2824646" y="3276600"/>
-            <a:ext cx="5709754" cy="3196536"/>
+            <a:off x="2514600" y="3305907"/>
+            <a:ext cx="6019800" cy="3370111"/>
           </a:xfrm>
           <a:prstGeom prst="rect">
             <a:avLst/>
@@ -6136,7 +7418,7 @@
         </p:nvCxnSpPr>
         <p:spPr>
           <a:xfrm>
-            <a:off x="1828800" y="3733800"/>
+            <a:off x="1524000" y="3962400"/>
             <a:ext cx="2362200" cy="990600"/>
           </a:xfrm>
           <a:prstGeom prst="straightConnector1">
@@ -6174,7 +7456,7 @@
 </p:sld>
 </file>
 
-<file path=ppt/slides/slide12.xml><?xml version="1.0" encoding="utf-8"?>
+<file path=ppt/slides/slide13.xml><?xml version="1.0" encoding="utf-8"?>
 <p:sld xmlns:a="http://schemas.openxmlformats.org/drawingml/2006/main" xmlns:r="http://schemas.openxmlformats.org/officeDocument/2006/relationships" xmlns:p="http://schemas.openxmlformats.org/presentationml/2006/main">
   <p:cSld>
     <p:spTree>
@@ -6279,8 +7561,8 @@
         </p:blipFill>
         <p:spPr bwMode="auto">
           <a:xfrm>
-            <a:off x="1219200" y="3276600"/>
-            <a:ext cx="6353175" cy="1295400"/>
+            <a:off x="1205193" y="3429000"/>
+            <a:ext cx="7100607" cy="1447800"/>
           </a:xfrm>
           <a:prstGeom prst="rect">
             <a:avLst/>
@@ -6333,7 +7615,7 @@
 </p:sld>
 </file>
 
-<file path=ppt/slides/slide13.xml><?xml version="1.0" encoding="utf-8"?>
+<file path=ppt/slides/slide14.xml><?xml version="1.0" encoding="utf-8"?>
 <p:sld xmlns:a="http://schemas.openxmlformats.org/drawingml/2006/main" xmlns:r="http://schemas.openxmlformats.org/officeDocument/2006/relationships" xmlns:p="http://schemas.openxmlformats.org/presentationml/2006/main">
   <p:cSld>
     <p:spTree>
@@ -6449,7 +7731,7 @@
 </p:sld>
 </file>
 
-<file path=ppt/slides/slide14.xml><?xml version="1.0" encoding="utf-8"?>
+<file path=ppt/slides/slide15.xml><?xml version="1.0" encoding="utf-8"?>
 <p:sld xmlns:a="http://schemas.openxmlformats.org/drawingml/2006/main" xmlns:r="http://schemas.openxmlformats.org/officeDocument/2006/relationships" xmlns:p="http://schemas.openxmlformats.org/presentationml/2006/main">
   <p:cSld>
     <p:spTree>
@@ -6621,129 +7903,6 @@
 </p:sld>
 </file>
 
-<file path=ppt/slides/slide15.xml><?xml version="1.0" encoding="utf-8"?>
-<p:sld xmlns:a="http://schemas.openxmlformats.org/drawingml/2006/main" xmlns:r="http://schemas.openxmlformats.org/officeDocument/2006/relationships" xmlns:p="http://schemas.openxmlformats.org/presentationml/2006/main">
-  <p:cSld>
-    <p:spTree>
-      <p:nvGrpSpPr>
-        <p:cNvPr id="1" name=""/>
-        <p:cNvGrpSpPr/>
-        <p:nvPr/>
-      </p:nvGrpSpPr>
-      <p:grpSpPr>
-        <a:xfrm>
-          <a:off x="0" y="0"/>
-          <a:ext cx="0" cy="0"/>
-          <a:chOff x="0" y="0"/>
-          <a:chExt cx="0" cy="0"/>
-        </a:xfrm>
-      </p:grpSpPr>
-      <p:sp>
-        <p:nvSpPr>
-          <p:cNvPr id="2" name="Content Placeholder 1"/>
-          <p:cNvSpPr>
-            <a:spLocks noGrp="1"/>
-          </p:cNvSpPr>
-          <p:nvPr>
-            <p:ph idx="1"/>
-          </p:nvPr>
-        </p:nvSpPr>
-        <p:spPr/>
-        <p:txBody>
-          <a:bodyPr/>
-          <a:lstStyle/>
-          <a:p>
-            <a:r>
-              <a:rPr lang="en-US" dirty="0" smtClean="0"/>
-              <a:t>No reasons provided for choice of developer strategies</a:t>
-            </a:r>
-          </a:p>
-          <a:p>
-            <a:r>
-              <a:rPr lang="en-US" dirty="0" smtClean="0"/>
-              <a:t>Overly simplistic models for:</a:t>
-            </a:r>
-          </a:p>
-          <a:p>
-            <a:pPr lvl="1"/>
-            <a:r>
-              <a:rPr lang="en-US" dirty="0" smtClean="0"/>
-              <a:t>User preferences</a:t>
-            </a:r>
-          </a:p>
-          <a:p>
-            <a:pPr lvl="1"/>
-            <a:r>
-              <a:rPr lang="en-US" dirty="0" smtClean="0"/>
-              <a:t>User download patterns</a:t>
-            </a:r>
-          </a:p>
-          <a:p>
-            <a:pPr lvl="1"/>
-            <a:r>
-              <a:rPr lang="en-US" dirty="0" smtClean="0"/>
-              <a:t>Number of developers</a:t>
-            </a:r>
-          </a:p>
-          <a:p>
-            <a:pPr lvl="1"/>
-            <a:r>
-              <a:rPr lang="en-US" dirty="0" smtClean="0"/>
-              <a:t>Developer app creations times</a:t>
-            </a:r>
-          </a:p>
-          <a:p>
-            <a:r>
-              <a:rPr lang="en-US" dirty="0"/>
-              <a:t>Lack of evidence that results predict real world</a:t>
-            </a:r>
-          </a:p>
-          <a:p>
-            <a:pPr lvl="1"/>
-            <a:endParaRPr lang="en-US" dirty="0" smtClean="0"/>
-          </a:p>
-          <a:p>
-            <a:pPr lvl="1"/>
-            <a:endParaRPr lang="en-US" dirty="0"/>
-          </a:p>
-        </p:txBody>
-      </p:sp>
-      <p:sp>
-        <p:nvSpPr>
-          <p:cNvPr id="3" name="Title 2"/>
-          <p:cNvSpPr>
-            <a:spLocks noGrp="1"/>
-          </p:cNvSpPr>
-          <p:nvPr>
-            <p:ph type="title"/>
-          </p:nvPr>
-        </p:nvSpPr>
-        <p:spPr/>
-        <p:txBody>
-          <a:bodyPr/>
-          <a:lstStyle/>
-          <a:p>
-            <a:r>
-              <a:rPr lang="en-US" dirty="0" smtClean="0"/>
-              <a:t>Limitations</a:t>
-            </a:r>
-            <a:endParaRPr lang="en-US" dirty="0"/>
-          </a:p>
-        </p:txBody>
-      </p:sp>
-    </p:spTree>
-    <p:extLst>
-      <p:ext uri="{BB962C8B-B14F-4D97-AF65-F5344CB8AC3E}">
-        <p14:creationId xmlns:p14="http://schemas.microsoft.com/office/powerpoint/2010/main" val="1697217071"/>
-      </p:ext>
-    </p:extLst>
-  </p:cSld>
-  <p:clrMapOvr>
-    <a:masterClrMapping/>
-  </p:clrMapOvr>
-</p:sld>
-</file>
-
 <file path=ppt/slides/slide16.xml><?xml version="1.0" encoding="utf-8"?>
 <p:sld xmlns:a="http://schemas.openxmlformats.org/drawingml/2006/main" xmlns:r="http://schemas.openxmlformats.org/officeDocument/2006/relationships" xmlns:p="http://schemas.openxmlformats.org/presentationml/2006/main">
   <p:cSld>
@@ -6778,6 +7937,129 @@
           <a:p>
             <a:r>
               <a:rPr lang="en-US" dirty="0" smtClean="0"/>
+              <a:t>No reasons provided for choice of developer strategies</a:t>
+            </a:r>
+          </a:p>
+          <a:p>
+            <a:r>
+              <a:rPr lang="en-US" dirty="0" smtClean="0"/>
+              <a:t>Overly simplistic models for:</a:t>
+            </a:r>
+          </a:p>
+          <a:p>
+            <a:pPr lvl="1"/>
+            <a:r>
+              <a:rPr lang="en-US" dirty="0" smtClean="0"/>
+              <a:t>User preferences</a:t>
+            </a:r>
+          </a:p>
+          <a:p>
+            <a:pPr lvl="1"/>
+            <a:r>
+              <a:rPr lang="en-US" dirty="0" smtClean="0"/>
+              <a:t>User download patterns</a:t>
+            </a:r>
+          </a:p>
+          <a:p>
+            <a:pPr lvl="1"/>
+            <a:r>
+              <a:rPr lang="en-US" dirty="0" smtClean="0"/>
+              <a:t>Number of developers</a:t>
+            </a:r>
+          </a:p>
+          <a:p>
+            <a:pPr lvl="1"/>
+            <a:r>
+              <a:rPr lang="en-US" dirty="0" smtClean="0"/>
+              <a:t>Developer app creations times</a:t>
+            </a:r>
+          </a:p>
+          <a:p>
+            <a:r>
+              <a:rPr lang="en-US" dirty="0"/>
+              <a:t>Lack of evidence that results predict real world</a:t>
+            </a:r>
+          </a:p>
+          <a:p>
+            <a:pPr lvl="1"/>
+            <a:endParaRPr lang="en-US" dirty="0" smtClean="0"/>
+          </a:p>
+          <a:p>
+            <a:pPr lvl="1"/>
+            <a:endParaRPr lang="en-US" dirty="0"/>
+          </a:p>
+        </p:txBody>
+      </p:sp>
+      <p:sp>
+        <p:nvSpPr>
+          <p:cNvPr id="3" name="Title 2"/>
+          <p:cNvSpPr>
+            <a:spLocks noGrp="1"/>
+          </p:cNvSpPr>
+          <p:nvPr>
+            <p:ph type="title"/>
+          </p:nvPr>
+        </p:nvSpPr>
+        <p:spPr/>
+        <p:txBody>
+          <a:bodyPr/>
+          <a:lstStyle/>
+          <a:p>
+            <a:r>
+              <a:rPr lang="en-US" dirty="0" smtClean="0"/>
+              <a:t>Limitations</a:t>
+            </a:r>
+            <a:endParaRPr lang="en-US" dirty="0"/>
+          </a:p>
+        </p:txBody>
+      </p:sp>
+    </p:spTree>
+    <p:extLst>
+      <p:ext uri="{BB962C8B-B14F-4D97-AF65-F5344CB8AC3E}">
+        <p14:creationId xmlns:p14="http://schemas.microsoft.com/office/powerpoint/2010/main" val="1697217071"/>
+      </p:ext>
+    </p:extLst>
+  </p:cSld>
+  <p:clrMapOvr>
+    <a:masterClrMapping/>
+  </p:clrMapOvr>
+</p:sld>
+</file>
+
+<file path=ppt/slides/slide17.xml><?xml version="1.0" encoding="utf-8"?>
+<p:sld xmlns:a="http://schemas.openxmlformats.org/drawingml/2006/main" xmlns:r="http://schemas.openxmlformats.org/officeDocument/2006/relationships" xmlns:p="http://schemas.openxmlformats.org/presentationml/2006/main">
+  <p:cSld>
+    <p:spTree>
+      <p:nvGrpSpPr>
+        <p:cNvPr id="1" name=""/>
+        <p:cNvGrpSpPr/>
+        <p:nvPr/>
+      </p:nvGrpSpPr>
+      <p:grpSpPr>
+        <a:xfrm>
+          <a:off x="0" y="0"/>
+          <a:ext cx="0" cy="0"/>
+          <a:chOff x="0" y="0"/>
+          <a:chExt cx="0" cy="0"/>
+        </a:xfrm>
+      </p:grpSpPr>
+      <p:sp>
+        <p:nvSpPr>
+          <p:cNvPr id="2" name="Content Placeholder 1"/>
+          <p:cNvSpPr>
+            <a:spLocks noGrp="1"/>
+          </p:cNvSpPr>
+          <p:nvPr>
+            <p:ph idx="1"/>
+          </p:nvPr>
+        </p:nvSpPr>
+        <p:spPr/>
+        <p:txBody>
+          <a:bodyPr/>
+          <a:lstStyle/>
+          <a:p>
+            <a:r>
+              <a:rPr lang="en-US" dirty="0" smtClean="0"/>
               <a:t>Copycat is most lucrative for developers</a:t>
             </a:r>
           </a:p>
@@ -6804,13 +8086,16 @@
           <a:p>
             <a:r>
               <a:rPr lang="en-US" dirty="0" smtClean="0"/>
-              <a:t>More work needed comparing results to real world and adjusting </a:t>
-            </a:r>
-            <a:r>
-              <a:rPr lang="en-US" smtClean="0"/>
-              <a:t>models accordingly</a:t>
-            </a:r>
-            <a:endParaRPr lang="en-US" dirty="0" smtClean="0"/>
+              <a:t>More work needed </a:t>
+            </a:r>
+            <a:r>
+              <a:rPr lang="en-US" dirty="0" smtClean="0"/>
+              <a:t>in comparing </a:t>
+            </a:r>
+            <a:r>
+              <a:rPr lang="en-US" dirty="0" smtClean="0"/>
+              <a:t>results to real world and adjusting models accordingly</a:t>
+            </a:r>
           </a:p>
           <a:p>
             <a:endParaRPr lang="en-US" dirty="0"/>
@@ -6853,7 +8138,7 @@
 </p:sld>
 </file>
 
-<file path=ppt/slides/slide17.xml><?xml version="1.0" encoding="utf-8"?>
+<file path=ppt/slides/slide18.xml><?xml version="1.0" encoding="utf-8"?>
 <p:sld xmlns:a="http://schemas.openxmlformats.org/drawingml/2006/main" xmlns:r="http://schemas.openxmlformats.org/officeDocument/2006/relationships" xmlns:p="http://schemas.openxmlformats.org/presentationml/2006/main">
   <p:cSld>
     <p:spTree>
@@ -6944,16 +8229,163 @@
           <a:bodyPr/>
           <a:lstStyle/>
           <a:p>
+            <a:pPr marL="109728" indent="0" algn="ctr">
+              <a:buNone/>
+            </a:pPr>
+            <a:r>
+              <a:rPr lang="en-US" b="1" dirty="0" smtClean="0"/>
+              <a:t>Problem</a:t>
+            </a:r>
+          </a:p>
+          <a:p>
+            <a:pPr marL="109728" indent="0" algn="ctr">
+              <a:buNone/>
+            </a:pPr>
             <a:r>
               <a:rPr lang="en-US" dirty="0" smtClean="0"/>
-              <a:t>Agent-Based Models model complex systems by the interaction of autonomous “agents”</a:t>
-            </a:r>
-          </a:p>
-          <a:p>
+              <a:t>App developers are always competing with each other to get more downloads of their apps.</a:t>
+            </a:r>
+          </a:p>
+          <a:p>
+            <a:pPr marL="109728" indent="0" algn="ctr">
+              <a:buNone/>
+            </a:pPr>
+            <a:endParaRPr lang="en-US" dirty="0" smtClean="0"/>
+          </a:p>
+          <a:p>
+            <a:pPr marL="109728" indent="0" algn="ctr">
+              <a:buNone/>
+            </a:pPr>
             <a:r>
               <a:rPr lang="en-US" dirty="0" smtClean="0"/>
-              <a:t>Models used to predict emergent behaviors</a:t>
-            </a:r>
+              <a:t>What strategy should app developers use to be successful?</a:t>
+            </a:r>
+            <a:endParaRPr lang="en-US" dirty="0"/>
+          </a:p>
+        </p:txBody>
+      </p:sp>
+      <p:sp>
+        <p:nvSpPr>
+          <p:cNvPr id="3" name="Title 2"/>
+          <p:cNvSpPr>
+            <a:spLocks noGrp="1"/>
+          </p:cNvSpPr>
+          <p:nvPr>
+            <p:ph type="title"/>
+          </p:nvPr>
+        </p:nvSpPr>
+        <p:spPr/>
+        <p:txBody>
+          <a:bodyPr/>
+          <a:lstStyle/>
+          <a:p>
+            <a:r>
+              <a:rPr lang="en-US" dirty="0" smtClean="0"/>
+              <a:t>Introduction</a:t>
+            </a:r>
+            <a:endParaRPr lang="en-US" dirty="0"/>
+          </a:p>
+        </p:txBody>
+      </p:sp>
+    </p:spTree>
+    <p:extLst>
+      <p:ext uri="{BB962C8B-B14F-4D97-AF65-F5344CB8AC3E}">
+        <p14:creationId xmlns:p14="http://schemas.microsoft.com/office/powerpoint/2010/main" val="4035027493"/>
+      </p:ext>
+    </p:extLst>
+  </p:cSld>
+  <p:clrMapOvr>
+    <a:masterClrMapping/>
+  </p:clrMapOvr>
+</p:sld>
+</file>
+
+<file path=ppt/slides/slide3.xml><?xml version="1.0" encoding="utf-8"?>
+<p:sld xmlns:a="http://schemas.openxmlformats.org/drawingml/2006/main" xmlns:r="http://schemas.openxmlformats.org/officeDocument/2006/relationships" xmlns:p="http://schemas.openxmlformats.org/presentationml/2006/main">
+  <p:cSld>
+    <p:spTree>
+      <p:nvGrpSpPr>
+        <p:cNvPr id="1" name=""/>
+        <p:cNvGrpSpPr/>
+        <p:nvPr/>
+      </p:nvGrpSpPr>
+      <p:grpSpPr>
+        <a:xfrm>
+          <a:off x="0" y="0"/>
+          <a:ext cx="0" cy="0"/>
+          <a:chOff x="0" y="0"/>
+          <a:chExt cx="0" cy="0"/>
+        </a:xfrm>
+      </p:grpSpPr>
+      <p:sp>
+        <p:nvSpPr>
+          <p:cNvPr id="2" name="Content Placeholder 1"/>
+          <p:cNvSpPr>
+            <a:spLocks noGrp="1"/>
+          </p:cNvSpPr>
+          <p:nvPr>
+            <p:ph idx="1"/>
+          </p:nvPr>
+        </p:nvSpPr>
+        <p:spPr/>
+        <p:txBody>
+          <a:bodyPr>
+            <a:normAutofit/>
+          </a:bodyPr>
+          <a:lstStyle/>
+          <a:p>
+            <a:r>
+              <a:rPr lang="en-US" dirty="0" smtClean="0"/>
+              <a:t>There has been little work in mobile app ecosystem modeling, but a lot of related work in ecosystem modeling.</a:t>
+            </a:r>
+          </a:p>
+          <a:p>
+            <a:r>
+              <a:rPr lang="en-US" dirty="0" smtClean="0"/>
+              <a:t>Garg and </a:t>
+            </a:r>
+            <a:r>
+              <a:rPr lang="en-US" dirty="0" err="1" smtClean="0"/>
+              <a:t>Telang</a:t>
+            </a:r>
+            <a:r>
+              <a:rPr lang="en-US" dirty="0"/>
+              <a:t> </a:t>
+            </a:r>
+            <a:r>
+              <a:rPr lang="en-US" dirty="0" smtClean="0"/>
+              <a:t>– strategy to infer the sales based on ranking</a:t>
+            </a:r>
+          </a:p>
+          <a:p>
+            <a:r>
+              <a:rPr lang="en-US" dirty="0" err="1" smtClean="0"/>
+              <a:t>Bohmer</a:t>
+            </a:r>
+            <a:r>
+              <a:rPr lang="en-US" dirty="0" smtClean="0"/>
+              <a:t> – developed app to collect mobile app usage info</a:t>
+            </a:r>
+          </a:p>
+          <a:p>
+            <a:r>
+              <a:rPr lang="en-US" dirty="0" smtClean="0"/>
+              <a:t>Holland – agent based </a:t>
+            </a:r>
+            <a:r>
+              <a:rPr lang="en-US" dirty="0" smtClean="0"/>
+              <a:t>m</a:t>
+            </a:r>
+            <a:r>
+              <a:rPr lang="en-US" dirty="0" smtClean="0"/>
+              <a:t>odels to model </a:t>
+            </a:r>
+            <a:r>
+              <a:rPr lang="en-US" dirty="0" smtClean="0"/>
+              <a:t>complex systems by the interaction of autonomous “agents”</a:t>
+            </a:r>
+          </a:p>
+          <a:p>
             <a:endParaRPr lang="en-US" dirty="0"/>
           </a:p>
         </p:txBody>
@@ -6994,7 +8426,7 @@
 </p:sld>
 </file>
 
-<file path=ppt/slides/slide3.xml><?xml version="1.0" encoding="utf-8"?>
+<file path=ppt/slides/slide4.xml><?xml version="1.0" encoding="utf-8"?>
 <p:sld xmlns:a="http://schemas.openxmlformats.org/drawingml/2006/main" xmlns:r="http://schemas.openxmlformats.org/officeDocument/2006/relationships" xmlns:p="http://schemas.openxmlformats.org/presentationml/2006/main">
   <p:cSld>
     <p:spTree>
@@ -7208,7 +8640,7 @@
           <p:nvPr/>
         </p:nvPicPr>
         <p:blipFill>
-          <a:blip r:embed="rId2">
+          <a:blip r:embed="rId3">
             <a:extLst>
               <a:ext uri="{28A0092B-C50C-407E-A947-70E740481C1C}">
                 <a14:useLocalDpi xmlns:a14="http://schemas.microsoft.com/office/drawing/2010/main" val="0"/>
@@ -7302,7 +8734,7 @@
           <p:nvPr/>
         </p:nvPicPr>
         <p:blipFill>
-          <a:blip r:embed="rId3">
+          <a:blip r:embed="rId4">
             <a:extLst>
               <a:ext uri="{28A0092B-C50C-407E-A947-70E740481C1C}">
                 <a14:useLocalDpi xmlns:a14="http://schemas.microsoft.com/office/drawing/2010/main" val="0"/>
@@ -7316,7 +8748,7 @@
         </p:blipFill>
         <p:spPr bwMode="auto">
           <a:xfrm>
-            <a:off x="817929" y="4357687"/>
+            <a:off x="1333409" y="4419600"/>
             <a:ext cx="1576387" cy="1576387"/>
           </a:xfrm>
           <a:prstGeom prst="rect">
@@ -7365,7 +8797,7 @@
         </p:nvSpPr>
         <p:spPr>
           <a:xfrm>
-            <a:off x="612775" y="5624451"/>
+            <a:off x="1128255" y="5686364"/>
             <a:ext cx="2148345" cy="400110"/>
           </a:xfrm>
           <a:prstGeom prst="rect">
@@ -7435,7 +8867,7 @@
           <p:nvPr/>
         </p:nvPicPr>
         <p:blipFill>
-          <a:blip r:embed="rId4">
+          <a:blip r:embed="rId5">
             <a:extLst>
               <a:ext uri="{28A0092B-C50C-407E-A947-70E740481C1C}">
                 <a14:useLocalDpi xmlns:a14="http://schemas.microsoft.com/office/drawing/2010/main" val="0"/>
@@ -7449,7 +8881,7 @@
         </p:blipFill>
         <p:spPr bwMode="auto">
           <a:xfrm>
-            <a:off x="6550544" y="4624203"/>
+            <a:off x="6199143" y="4624203"/>
             <a:ext cx="1400358" cy="1400358"/>
           </a:xfrm>
           <a:prstGeom prst="rect">
@@ -7498,7 +8930,7 @@
         </p:nvSpPr>
         <p:spPr>
           <a:xfrm>
-            <a:off x="6523601" y="6086474"/>
+            <a:off x="6172200" y="6086474"/>
             <a:ext cx="1454244" cy="400110"/>
           </a:xfrm>
           <a:prstGeom prst="rect">
@@ -7604,138 +9036,6 @@
     <p:extLst>
       <p:ext uri="{BB962C8B-B14F-4D97-AF65-F5344CB8AC3E}">
         <p14:creationId xmlns:p14="http://schemas.microsoft.com/office/powerpoint/2010/main" val="2320841995"/>
-      </p:ext>
-    </p:extLst>
-  </p:cSld>
-  <p:clrMapOvr>
-    <a:masterClrMapping/>
-  </p:clrMapOvr>
-</p:sld>
-</file>
-
-<file path=ppt/slides/slide4.xml><?xml version="1.0" encoding="utf-8"?>
-<p:sld xmlns:a="http://schemas.openxmlformats.org/drawingml/2006/main" xmlns:r="http://schemas.openxmlformats.org/officeDocument/2006/relationships" xmlns:p="http://schemas.openxmlformats.org/presentationml/2006/main">
-  <p:cSld>
-    <p:spTree>
-      <p:nvGrpSpPr>
-        <p:cNvPr id="1" name=""/>
-        <p:cNvGrpSpPr/>
-        <p:nvPr/>
-      </p:nvGrpSpPr>
-      <p:grpSpPr>
-        <a:xfrm>
-          <a:off x="0" y="0"/>
-          <a:ext cx="0" cy="0"/>
-          <a:chOff x="0" y="0"/>
-          <a:chExt cx="0" cy="0"/>
-        </a:xfrm>
-      </p:grpSpPr>
-      <p:sp>
-        <p:nvSpPr>
-          <p:cNvPr id="2" name="Content Placeholder 1"/>
-          <p:cNvSpPr>
-            <a:spLocks noGrp="1"/>
-          </p:cNvSpPr>
-          <p:nvPr>
-            <p:ph idx="1"/>
-          </p:nvPr>
-        </p:nvSpPr>
-        <p:spPr/>
-        <p:txBody>
-          <a:bodyPr/>
-          <a:lstStyle/>
-          <a:p>
-            <a:r>
-              <a:rPr lang="en-US" dirty="0" smtClean="0"/>
-              <a:t>Developers develop apps at regular intervals, using one of four strategies. SOME can change strategies throughout simulation</a:t>
-            </a:r>
-          </a:p>
-          <a:p>
-            <a:pPr lvl="1"/>
-            <a:r>
-              <a:rPr lang="en-US" i="1" u="sng" dirty="0" smtClean="0"/>
-              <a:t>Innovator</a:t>
-            </a:r>
-            <a:r>
-              <a:rPr lang="en-US" u="sng" dirty="0" smtClean="0"/>
-              <a:t>: </a:t>
-            </a:r>
-            <a:r>
-              <a:rPr lang="en-US" dirty="0" smtClean="0"/>
-              <a:t>Creates new, totally different apps each time</a:t>
-            </a:r>
-          </a:p>
-          <a:p>
-            <a:pPr lvl="1"/>
-            <a:r>
-              <a:rPr lang="en-US" i="1" u="sng" dirty="0" err="1" smtClean="0"/>
-              <a:t>Milker</a:t>
-            </a:r>
-            <a:r>
-              <a:rPr lang="en-US" u="sng" dirty="0" smtClean="0"/>
-              <a:t>: </a:t>
-            </a:r>
-            <a:r>
-              <a:rPr lang="en-US" dirty="0" smtClean="0"/>
-              <a:t>Produces apps that are a variation of their most recent app</a:t>
-            </a:r>
-          </a:p>
-          <a:p>
-            <a:pPr lvl="1"/>
-            <a:r>
-              <a:rPr lang="en-US" i="1" u="sng" dirty="0" smtClean="0"/>
-              <a:t>Optimizer: </a:t>
-            </a:r>
-            <a:r>
-              <a:rPr lang="en-US" dirty="0" smtClean="0"/>
-              <a:t>Develops apps that are a variation of their best app to date</a:t>
-            </a:r>
-          </a:p>
-          <a:p>
-            <a:pPr lvl="1"/>
-            <a:r>
-              <a:rPr lang="en-US" i="1" u="sng" dirty="0" smtClean="0"/>
-              <a:t>Copycat: </a:t>
-            </a:r>
-            <a:r>
-              <a:rPr lang="en-US" dirty="0"/>
-              <a:t> </a:t>
-            </a:r>
-            <a:r>
-              <a:rPr lang="en-US" dirty="0" smtClean="0"/>
-              <a:t>Duplicates current best selling apps, with minor variations</a:t>
-            </a:r>
-            <a:endParaRPr lang="en-US" i="1" dirty="0"/>
-          </a:p>
-        </p:txBody>
-      </p:sp>
-      <p:sp>
-        <p:nvSpPr>
-          <p:cNvPr id="3" name="Title 2"/>
-          <p:cNvSpPr>
-            <a:spLocks noGrp="1"/>
-          </p:cNvSpPr>
-          <p:nvPr>
-            <p:ph type="title"/>
-          </p:nvPr>
-        </p:nvSpPr>
-        <p:spPr/>
-        <p:txBody>
-          <a:bodyPr/>
-          <a:lstStyle/>
-          <a:p>
-            <a:r>
-              <a:rPr lang="en-US" dirty="0" smtClean="0"/>
-              <a:t>The Model: Developers</a:t>
-            </a:r>
-            <a:endParaRPr lang="en-US" dirty="0"/>
-          </a:p>
-        </p:txBody>
-      </p:sp>
-    </p:spTree>
-    <p:extLst>
-      <p:ext uri="{BB962C8B-B14F-4D97-AF65-F5344CB8AC3E}">
-        <p14:creationId xmlns:p14="http://schemas.microsoft.com/office/powerpoint/2010/main" val="517154474"/>
       </p:ext>
     </p:extLst>
   </p:cSld>
@@ -7779,17 +9079,70 @@
           <a:p>
             <a:r>
               <a:rPr lang="en-US" dirty="0" smtClean="0"/>
-              <a:t>Represented by 10x10 binary grid of “features”</a:t>
-            </a:r>
-          </a:p>
-          <a:p>
+              <a:t>Developers develop apps at regular intervals, using one of four strategies. SOME can change strategies throughout simulation</a:t>
+            </a:r>
+          </a:p>
+          <a:p>
+            <a:pPr lvl="1"/>
+            <a:r>
+              <a:rPr lang="en-US" i="1" u="sng" dirty="0" smtClean="0"/>
+              <a:t>Innovator</a:t>
+            </a:r>
+            <a:r>
+              <a:rPr lang="en-US" u="sng" dirty="0" smtClean="0"/>
+              <a:t>: </a:t>
+            </a:r>
             <a:r>
               <a:rPr lang="en-US" dirty="0" smtClean="0"/>
-              <a:t>Features occupying adjacent spaces on the grid represent similar features</a:t>
-            </a:r>
-          </a:p>
-          <a:p>
-            <a:endParaRPr lang="en-US" dirty="0"/>
+              <a:t>Creates new, totally different apps each time</a:t>
+            </a:r>
+          </a:p>
+          <a:p>
+            <a:pPr lvl="1"/>
+            <a:r>
+              <a:rPr lang="en-US" i="1" u="sng" dirty="0" err="1" smtClean="0"/>
+              <a:t>Milker</a:t>
+            </a:r>
+            <a:r>
+              <a:rPr lang="en-US" u="sng" dirty="0" smtClean="0"/>
+              <a:t>: </a:t>
+            </a:r>
+            <a:r>
+              <a:rPr lang="en-US" dirty="0" smtClean="0"/>
+              <a:t>Produces apps that are a variation of their most recent app</a:t>
+            </a:r>
+          </a:p>
+          <a:p>
+            <a:pPr lvl="1"/>
+            <a:r>
+              <a:rPr lang="en-US" i="1" u="sng" dirty="0" smtClean="0"/>
+              <a:t>Optimizer: </a:t>
+            </a:r>
+            <a:r>
+              <a:rPr lang="en-US" dirty="0" smtClean="0"/>
+              <a:t>Develops apps that are a variation of their best app to </a:t>
+            </a:r>
+            <a:r>
+              <a:rPr lang="en-US" dirty="0" smtClean="0"/>
+              <a:t>date</a:t>
+            </a:r>
+            <a:endParaRPr lang="en-US" dirty="0" smtClean="0"/>
+          </a:p>
+          <a:p>
+            <a:pPr lvl="1"/>
+            <a:r>
+              <a:rPr lang="en-US" i="1" u="sng" dirty="0" smtClean="0"/>
+              <a:t>Copycat: </a:t>
+            </a:r>
+            <a:r>
+              <a:rPr lang="en-US" dirty="0"/>
+              <a:t> </a:t>
+            </a:r>
+            <a:r>
+              <a:rPr lang="en-US" dirty="0" smtClean="0"/>
+              <a:t>Duplicates current best selling apps, with minor variations</a:t>
+            </a:r>
+            <a:endParaRPr lang="en-US" i="1" dirty="0"/>
           </a:p>
         </p:txBody>
       </p:sp>
@@ -7810,7 +9163,7 @@
           <a:p>
             <a:r>
               <a:rPr lang="en-US" dirty="0" smtClean="0"/>
-              <a:t>The Model: Applications</a:t>
+              <a:t>The Model: Developers</a:t>
             </a:r>
             <a:endParaRPr lang="en-US" dirty="0"/>
           </a:p>
@@ -7819,7 +9172,7 @@
     </p:spTree>
     <p:extLst>
       <p:ext uri="{BB962C8B-B14F-4D97-AF65-F5344CB8AC3E}">
-        <p14:creationId xmlns:p14="http://schemas.microsoft.com/office/powerpoint/2010/main" val="3479852073"/>
+        <p14:creationId xmlns:p14="http://schemas.microsoft.com/office/powerpoint/2010/main" val="517154474"/>
       </p:ext>
     </p:extLst>
   </p:cSld>
@@ -7863,32 +9216,43 @@
           <a:p>
             <a:r>
               <a:rPr lang="en-US" dirty="0" smtClean="0"/>
-              <a:t>10x10 grid representing desired features</a:t>
+              <a:t>Represented by 10x10 binary grid of “features”</a:t>
             </a:r>
           </a:p>
           <a:p>
             <a:r>
               <a:rPr lang="en-US" dirty="0" smtClean="0"/>
-              <a:t>All users have same 5x5 block of unwanted features</a:t>
-            </a:r>
-          </a:p>
-          <a:p>
+              <a:t>Features </a:t>
+            </a:r>
             <a:r>
               <a:rPr lang="en-US" dirty="0" smtClean="0"/>
-              <a:t>User downloads apps at regular intervals</a:t>
-            </a:r>
-          </a:p>
-          <a:p>
+              <a:t>occupying </a:t>
+            </a:r>
             <a:r>
               <a:rPr lang="en-US" dirty="0" smtClean="0"/>
-              <a:t>All apps that include only desired features are downloaded at each interval</a:t>
-            </a:r>
-          </a:p>
-          <a:p>
+              <a:t>spaces on the </a:t>
+            </a:r>
             <a:r>
               <a:rPr lang="en-US" dirty="0" smtClean="0"/>
-              <a:t>User population increases over time governed by sigmoid growth function</a:t>
-            </a:r>
+              <a:t>grid near each other </a:t>
+            </a:r>
+            <a:r>
+              <a:rPr lang="en-US" dirty="0" smtClean="0"/>
+              <a:t>represent similar </a:t>
+            </a:r>
+            <a:r>
+              <a:rPr lang="en-US" dirty="0" smtClean="0"/>
+              <a:t>features</a:t>
+            </a:r>
+          </a:p>
+          <a:p>
+            <a:r>
+              <a:rPr lang="en-US" dirty="0" smtClean="0"/>
+              <a:t>Feature grid is filled depending on the strategy used by the app developer</a:t>
+            </a:r>
+            <a:endParaRPr lang="en-US" dirty="0" smtClean="0"/>
+          </a:p>
+          <a:p>
             <a:endParaRPr lang="en-US" dirty="0"/>
           </a:p>
         </p:txBody>
@@ -7910,60 +9274,7 @@
           <a:p>
             <a:r>
               <a:rPr lang="en-US" dirty="0" smtClean="0"/>
-              <a:t>The Model: Users</a:t>
-            </a:r>
-            <a:endParaRPr lang="en-US" dirty="0"/>
-          </a:p>
-        </p:txBody>
-      </p:sp>
-    </p:spTree>
-    <p:extLst>
-      <p:ext uri="{BB962C8B-B14F-4D97-AF65-F5344CB8AC3E}">
-        <p14:creationId xmlns:p14="http://schemas.microsoft.com/office/powerpoint/2010/main" val="1518114891"/>
-      </p:ext>
-    </p:extLst>
-  </p:cSld>
-  <p:clrMapOvr>
-    <a:masterClrMapping/>
-  </p:clrMapOvr>
-</p:sld>
-</file>
-
-<file path=ppt/slides/slide7.xml><?xml version="1.0" encoding="utf-8"?>
-<p:sld xmlns:a="http://schemas.openxmlformats.org/drawingml/2006/main" xmlns:r="http://schemas.openxmlformats.org/officeDocument/2006/relationships" xmlns:p="http://schemas.openxmlformats.org/presentationml/2006/main">
-  <p:cSld>
-    <p:spTree>
-      <p:nvGrpSpPr>
-        <p:cNvPr id="1" name=""/>
-        <p:cNvGrpSpPr/>
-        <p:nvPr/>
-      </p:nvGrpSpPr>
-      <p:grpSpPr>
-        <a:xfrm>
-          <a:off x="0" y="0"/>
-          <a:ext cx="0" cy="0"/>
-          <a:chOff x="0" y="0"/>
-          <a:chExt cx="0" cy="0"/>
-        </a:xfrm>
-      </p:grpSpPr>
-      <p:sp>
-        <p:nvSpPr>
-          <p:cNvPr id="3" name="Title 2"/>
-          <p:cNvSpPr>
-            <a:spLocks noGrp="1"/>
-          </p:cNvSpPr>
-          <p:nvPr>
-            <p:ph type="title"/>
-          </p:nvPr>
-        </p:nvSpPr>
-        <p:spPr/>
-        <p:txBody>
-          <a:bodyPr/>
-          <a:lstStyle/>
-          <a:p>
-            <a:r>
-              <a:rPr lang="en-US" dirty="0" smtClean="0"/>
-              <a:t>The Model: Users</a:t>
+              <a:t>The Model: Applications</a:t>
             </a:r>
             <a:endParaRPr lang="en-US" dirty="0"/>
           </a:p>
@@ -7971,31 +9282,27 @@
       </p:sp>
       <p:pic>
         <p:nvPicPr>
-          <p:cNvPr id="3074" name="Picture 2"/>
+          <p:cNvPr id="4" name="Picture 3"/>
           <p:cNvPicPr>
-            <a:picLocks noGrp="1" noChangeAspect="1" noChangeArrowheads="1"/>
+            <a:picLocks noChangeAspect="1" noChangeArrowheads="1"/>
           </p:cNvPicPr>
-          <p:nvPr>
-            <p:ph idx="1"/>
-          </p:nvPr>
+          <p:nvPr/>
         </p:nvPicPr>
-        <p:blipFill>
-          <a:blip r:embed="rId2">
+        <p:blipFill rotWithShape="1">
+          <a:blip r:embed="rId3">
             <a:extLst>
               <a:ext uri="{28A0092B-C50C-407E-A947-70E740481C1C}">
                 <a14:useLocalDpi xmlns:a14="http://schemas.microsoft.com/office/drawing/2010/main" val="0"/>
               </a:ext>
             </a:extLst>
           </a:blip>
-          <a:srcRect/>
-          <a:stretch>
-            <a:fillRect/>
-          </a:stretch>
+          <a:srcRect t="50000" r="68433"/>
+          <a:stretch/>
         </p:blipFill>
         <p:spPr bwMode="auto">
           <a:xfrm>
-            <a:off x="1600200" y="1737122"/>
-            <a:ext cx="5715000" cy="3859609"/>
+            <a:off x="6013572" y="4191000"/>
+            <a:ext cx="1987428" cy="2138363"/>
           </a:xfrm>
           <a:prstGeom prst="rect">
             <a:avLst/>
@@ -8037,6 +9344,295 @@
       </p:pic>
       <p:pic>
         <p:nvPicPr>
+          <p:cNvPr id="5" name="Picture 3"/>
+          <p:cNvPicPr>
+            <a:picLocks noChangeAspect="1" noChangeArrowheads="1"/>
+          </p:cNvPicPr>
+          <p:nvPr/>
+        </p:nvPicPr>
+        <p:blipFill rotWithShape="1">
+          <a:blip r:embed="rId3">
+            <a:extLst>
+              <a:ext uri="{28A0092B-C50C-407E-A947-70E740481C1C}">
+                <a14:useLocalDpi xmlns:a14="http://schemas.microsoft.com/office/drawing/2010/main" val="0"/>
+              </a:ext>
+            </a:extLst>
+          </a:blip>
+          <a:srcRect r="68154" b="50000"/>
+          <a:stretch/>
+        </p:blipFill>
+        <p:spPr bwMode="auto">
+          <a:xfrm>
+            <a:off x="3493110" y="4191001"/>
+            <a:ext cx="2005013" cy="2138362"/>
+          </a:xfrm>
+          <a:prstGeom prst="rect">
+            <a:avLst/>
+          </a:prstGeom>
+          <a:noFill/>
+          <a:ln>
+            <a:noFill/>
+          </a:ln>
+          <a:effectLst/>
+          <a:extLst>
+            <a:ext uri="{909E8E84-426E-40DD-AFC4-6F175D3DCCD1}">
+              <a14:hiddenFill xmlns:a14="http://schemas.microsoft.com/office/drawing/2010/main">
+                <a:solidFill>
+                  <a:schemeClr val="accent1"/>
+                </a:solidFill>
+              </a14:hiddenFill>
+            </a:ext>
+            <a:ext uri="{91240B29-F687-4F45-9708-019B960494DF}">
+              <a14:hiddenLine xmlns:a14="http://schemas.microsoft.com/office/drawing/2010/main" w="9525">
+                <a:solidFill>
+                  <a:schemeClr val="tx1"/>
+                </a:solidFill>
+                <a:miter lim="800000"/>
+                <a:headEnd/>
+                <a:tailEnd/>
+              </a14:hiddenLine>
+            </a:ext>
+            <a:ext uri="{AF507438-7753-43E0-B8FC-AC1667EBCBE1}">
+              <a14:hiddenEffects xmlns:a14="http://schemas.microsoft.com/office/drawing/2010/main">
+                <a:effectLst>
+                  <a:outerShdw dist="35921" dir="2700000" algn="ctr" rotWithShape="0">
+                    <a:schemeClr val="bg2"/>
+                  </a:outerShdw>
+                </a:effectLst>
+              </a14:hiddenEffects>
+            </a:ext>
+          </a:extLst>
+        </p:spPr>
+      </p:pic>
+    </p:spTree>
+    <p:extLst>
+      <p:ext uri="{BB962C8B-B14F-4D97-AF65-F5344CB8AC3E}">
+        <p14:creationId xmlns:p14="http://schemas.microsoft.com/office/powerpoint/2010/main" val="3479852073"/>
+      </p:ext>
+    </p:extLst>
+  </p:cSld>
+  <p:clrMapOvr>
+    <a:masterClrMapping/>
+  </p:clrMapOvr>
+</p:sld>
+</file>
+
+<file path=ppt/slides/slide7.xml><?xml version="1.0" encoding="utf-8"?>
+<p:sld xmlns:a="http://schemas.openxmlformats.org/drawingml/2006/main" xmlns:r="http://schemas.openxmlformats.org/officeDocument/2006/relationships" xmlns:p="http://schemas.openxmlformats.org/presentationml/2006/main">
+  <p:cSld>
+    <p:spTree>
+      <p:nvGrpSpPr>
+        <p:cNvPr id="1" name=""/>
+        <p:cNvGrpSpPr/>
+        <p:nvPr/>
+      </p:nvGrpSpPr>
+      <p:grpSpPr>
+        <a:xfrm>
+          <a:off x="0" y="0"/>
+          <a:ext cx="0" cy="0"/>
+          <a:chOff x="0" y="0"/>
+          <a:chExt cx="0" cy="0"/>
+        </a:xfrm>
+      </p:grpSpPr>
+      <p:sp>
+        <p:nvSpPr>
+          <p:cNvPr id="2" name="Content Placeholder 1"/>
+          <p:cNvSpPr>
+            <a:spLocks noGrp="1"/>
+          </p:cNvSpPr>
+          <p:nvPr>
+            <p:ph idx="1"/>
+          </p:nvPr>
+        </p:nvSpPr>
+        <p:spPr/>
+        <p:txBody>
+          <a:bodyPr/>
+          <a:lstStyle/>
+          <a:p>
+            <a:r>
+              <a:rPr lang="en-US" dirty="0" smtClean="0"/>
+              <a:t>10x10 grid representing desired features</a:t>
+            </a:r>
+          </a:p>
+          <a:p>
+            <a:r>
+              <a:rPr lang="en-US" dirty="0" smtClean="0"/>
+              <a:t>All users have same </a:t>
+            </a:r>
+            <a:r>
+              <a:rPr lang="en-US" dirty="0" smtClean="0"/>
+              <a:t>blank 5x5 </a:t>
+            </a:r>
+            <a:r>
+              <a:rPr lang="en-US" dirty="0" smtClean="0"/>
+              <a:t>block of unwanted features</a:t>
+            </a:r>
+          </a:p>
+          <a:p>
+            <a:r>
+              <a:rPr lang="en-US" dirty="0" smtClean="0"/>
+              <a:t>User downloads apps at regular intervals</a:t>
+            </a:r>
+          </a:p>
+          <a:p>
+            <a:r>
+              <a:rPr lang="en-US" dirty="0" smtClean="0"/>
+              <a:t>All apps that include only desired features are downloaded at each interval</a:t>
+            </a:r>
+          </a:p>
+          <a:p>
+            <a:r>
+              <a:rPr lang="en-US" dirty="0" smtClean="0"/>
+              <a:t>User population increases over time governed by sigmoid growth </a:t>
+            </a:r>
+            <a:r>
+              <a:rPr lang="en-US" dirty="0" smtClean="0"/>
+              <a:t>function </a:t>
+            </a:r>
+            <a:endParaRPr lang="en-US" dirty="0"/>
+          </a:p>
+        </p:txBody>
+      </p:sp>
+      <p:sp>
+        <p:nvSpPr>
+          <p:cNvPr id="3" name="Title 2"/>
+          <p:cNvSpPr>
+            <a:spLocks noGrp="1"/>
+          </p:cNvSpPr>
+          <p:nvPr>
+            <p:ph type="title"/>
+          </p:nvPr>
+        </p:nvSpPr>
+        <p:spPr/>
+        <p:txBody>
+          <a:bodyPr/>
+          <a:lstStyle/>
+          <a:p>
+            <a:r>
+              <a:rPr lang="en-US" dirty="0" smtClean="0"/>
+              <a:t>The Model: Users</a:t>
+            </a:r>
+            <a:endParaRPr lang="en-US" dirty="0"/>
+          </a:p>
+        </p:txBody>
+      </p:sp>
+      <p:pic>
+        <p:nvPicPr>
+          <p:cNvPr id="4" name="Picture 3"/>
+          <p:cNvPicPr>
+            <a:picLocks noChangeAspect="1" noChangeArrowheads="1"/>
+          </p:cNvPicPr>
+          <p:nvPr/>
+        </p:nvPicPr>
+        <p:blipFill rotWithShape="1">
+          <a:blip r:embed="rId2">
+            <a:extLst>
+              <a:ext uri="{28A0092B-C50C-407E-A947-70E740481C1C}">
+                <a14:useLocalDpi xmlns:a14="http://schemas.microsoft.com/office/drawing/2010/main" val="0"/>
+              </a:ext>
+            </a:extLst>
+          </a:blip>
+          <a:srcRect l="62848" t="24122" b="24482"/>
+          <a:stretch/>
+        </p:blipFill>
+        <p:spPr bwMode="auto">
+          <a:xfrm>
+            <a:off x="6019800" y="4767661"/>
+            <a:ext cx="1981200" cy="1861739"/>
+          </a:xfrm>
+          <a:prstGeom prst="rect">
+            <a:avLst/>
+          </a:prstGeom>
+          <a:noFill/>
+          <a:ln>
+            <a:noFill/>
+          </a:ln>
+          <a:effectLst/>
+          <a:extLst>
+            <a:ext uri="{909E8E84-426E-40DD-AFC4-6F175D3DCCD1}">
+              <a14:hiddenFill xmlns:a14="http://schemas.microsoft.com/office/drawing/2010/main">
+                <a:solidFill>
+                  <a:schemeClr val="accent1"/>
+                </a:solidFill>
+              </a14:hiddenFill>
+            </a:ext>
+            <a:ext uri="{91240B29-F687-4F45-9708-019B960494DF}">
+              <a14:hiddenLine xmlns:a14="http://schemas.microsoft.com/office/drawing/2010/main" w="9525">
+                <a:solidFill>
+                  <a:schemeClr val="tx1"/>
+                </a:solidFill>
+                <a:miter lim="800000"/>
+                <a:headEnd/>
+                <a:tailEnd/>
+              </a14:hiddenLine>
+            </a:ext>
+            <a:ext uri="{AF507438-7753-43E0-B8FC-AC1667EBCBE1}">
+              <a14:hiddenEffects xmlns:a14="http://schemas.microsoft.com/office/drawing/2010/main">
+                <a:effectLst>
+                  <a:outerShdw dist="35921" dir="2700000" algn="ctr" rotWithShape="0">
+                    <a:schemeClr val="bg2"/>
+                  </a:outerShdw>
+                </a:effectLst>
+              </a14:hiddenEffects>
+            </a:ext>
+          </a:extLst>
+        </p:spPr>
+      </p:pic>
+    </p:spTree>
+    <p:extLst>
+      <p:ext uri="{BB962C8B-B14F-4D97-AF65-F5344CB8AC3E}">
+        <p14:creationId xmlns:p14="http://schemas.microsoft.com/office/powerpoint/2010/main" val="1518114891"/>
+      </p:ext>
+    </p:extLst>
+  </p:cSld>
+  <p:clrMapOvr>
+    <a:masterClrMapping/>
+  </p:clrMapOvr>
+</p:sld>
+</file>
+
+<file path=ppt/slides/slide8.xml><?xml version="1.0" encoding="utf-8"?>
+<p:sld xmlns:a="http://schemas.openxmlformats.org/drawingml/2006/main" xmlns:r="http://schemas.openxmlformats.org/officeDocument/2006/relationships" xmlns:p="http://schemas.openxmlformats.org/presentationml/2006/main">
+  <p:cSld>
+    <p:spTree>
+      <p:nvGrpSpPr>
+        <p:cNvPr id="1" name=""/>
+        <p:cNvGrpSpPr/>
+        <p:nvPr/>
+      </p:nvGrpSpPr>
+      <p:grpSpPr>
+        <a:xfrm>
+          <a:off x="0" y="0"/>
+          <a:ext cx="0" cy="0"/>
+          <a:chOff x="0" y="0"/>
+          <a:chExt cx="0" cy="0"/>
+        </a:xfrm>
+      </p:grpSpPr>
+      <p:sp>
+        <p:nvSpPr>
+          <p:cNvPr id="3" name="Title 2"/>
+          <p:cNvSpPr>
+            <a:spLocks noGrp="1"/>
+          </p:cNvSpPr>
+          <p:nvPr>
+            <p:ph type="title"/>
+          </p:nvPr>
+        </p:nvSpPr>
+        <p:spPr/>
+        <p:txBody>
+          <a:bodyPr/>
+          <a:lstStyle/>
+          <a:p>
+            <a:r>
+              <a:rPr lang="en-US" dirty="0" smtClean="0"/>
+              <a:t>The Model: Users</a:t>
+            </a:r>
+            <a:endParaRPr lang="en-US" dirty="0"/>
+          </a:p>
+        </p:txBody>
+      </p:sp>
+      <p:pic>
+        <p:nvPicPr>
           <p:cNvPr id="3075" name="Picture 3"/>
           <p:cNvPicPr>
             <a:picLocks noChangeAspect="1" noChangeArrowheads="1"/>
@@ -8044,7 +9640,7 @@
           <p:nvPr/>
         </p:nvPicPr>
         <p:blipFill>
-          <a:blip r:embed="rId3">
+          <a:blip r:embed="rId2">
             <a:extLst>
               <a:ext uri="{28A0092B-C50C-407E-A947-70E740481C1C}">
                 <a14:useLocalDpi xmlns:a14="http://schemas.microsoft.com/office/drawing/2010/main" val="0"/>
@@ -8058,7 +9654,7 @@
         </p:blipFill>
         <p:spPr bwMode="auto">
           <a:xfrm>
-            <a:off x="1423987" y="1447800"/>
+            <a:off x="2133600" y="1524000"/>
             <a:ext cx="6296025" cy="4276725"/>
           </a:xfrm>
           <a:prstGeom prst="rect">
@@ -8108,7 +9704,7 @@
           <p:nvPr/>
         </p:nvPicPr>
         <p:blipFill>
-          <a:blip r:embed="rId4" cstate="print">
+          <a:blip r:embed="rId3" cstate="print">
             <a:extLst>
               <a:ext uri="{28A0092B-C50C-407E-A947-70E740481C1C}">
                 <a14:useLocalDpi xmlns:a14="http://schemas.microsoft.com/office/drawing/2010/main" val="0"/>
@@ -8122,7 +9718,7 @@
         </p:blipFill>
         <p:spPr bwMode="auto">
           <a:xfrm>
-            <a:off x="354995" y="1981200"/>
+            <a:off x="1014062" y="1981200"/>
             <a:ext cx="1068992" cy="990600"/>
           </a:xfrm>
           <a:prstGeom prst="rect">
@@ -8149,7 +9745,7 @@
           <p:nvPr/>
         </p:nvPicPr>
         <p:blipFill>
-          <a:blip r:embed="rId5">
+          <a:blip r:embed="rId4">
             <a:extLst>
               <a:ext uri="{28A0092B-C50C-407E-A947-70E740481C1C}">
                 <a14:useLocalDpi xmlns:a14="http://schemas.microsoft.com/office/drawing/2010/main" val="0"/>
@@ -8163,7 +9759,7 @@
         </p:blipFill>
         <p:spPr bwMode="auto">
           <a:xfrm>
-            <a:off x="331533" y="4038600"/>
+            <a:off x="990600" y="4038600"/>
             <a:ext cx="1092454" cy="1295400"/>
           </a:xfrm>
           <a:prstGeom prst="rect">
@@ -8194,7 +9790,7 @@
 </p:sld>
 </file>
 
-<file path=ppt/slides/slide8.xml><?xml version="1.0" encoding="utf-8"?>
+<file path=ppt/slides/slide9.xml><?xml version="1.0" encoding="utf-8"?>
 <p:sld xmlns:a="http://schemas.openxmlformats.org/drawingml/2006/main" xmlns:r="http://schemas.openxmlformats.org/officeDocument/2006/relationships" xmlns:p="http://schemas.openxmlformats.org/presentationml/2006/main">
   <p:cSld>
     <p:spTree>
@@ -8338,189 +9934,6 @@
     <p:extLst>
       <p:ext uri="{BB962C8B-B14F-4D97-AF65-F5344CB8AC3E}">
         <p14:creationId xmlns:p14="http://schemas.microsoft.com/office/powerpoint/2010/main" val="1154494063"/>
-      </p:ext>
-    </p:extLst>
-  </p:cSld>
-  <p:clrMapOvr>
-    <a:masterClrMapping/>
-  </p:clrMapOvr>
-</p:sld>
-</file>
-
-<file path=ppt/slides/slide9.xml><?xml version="1.0" encoding="utf-8"?>
-<p:sld xmlns:a="http://schemas.openxmlformats.org/drawingml/2006/main" xmlns:r="http://schemas.openxmlformats.org/officeDocument/2006/relationships" xmlns:p="http://schemas.openxmlformats.org/presentationml/2006/main">
-  <p:cSld>
-    <p:spTree>
-      <p:nvGrpSpPr>
-        <p:cNvPr id="1" name=""/>
-        <p:cNvGrpSpPr/>
-        <p:nvPr/>
-      </p:nvGrpSpPr>
-      <p:grpSpPr>
-        <a:xfrm>
-          <a:off x="0" y="0"/>
-          <a:ext cx="0" cy="0"/>
-          <a:chOff x="0" y="0"/>
-          <a:chExt cx="0" cy="0"/>
-        </a:xfrm>
-      </p:grpSpPr>
-      <p:sp>
-        <p:nvSpPr>
-          <p:cNvPr id="3" name="Title 2"/>
-          <p:cNvSpPr>
-            <a:spLocks noGrp="1"/>
-          </p:cNvSpPr>
-          <p:nvPr>
-            <p:ph type="title"/>
-          </p:nvPr>
-        </p:nvSpPr>
-        <p:spPr/>
-        <p:txBody>
-          <a:bodyPr/>
-          <a:lstStyle/>
-          <a:p>
-            <a:r>
-              <a:rPr lang="en-US" dirty="0" smtClean="0"/>
-              <a:t>Algorithm</a:t>
-            </a:r>
-            <a:endParaRPr lang="en-US" dirty="0"/>
-          </a:p>
-        </p:txBody>
-      </p:sp>
-      <p:pic>
-        <p:nvPicPr>
-          <p:cNvPr id="2050" name="Picture 2"/>
-          <p:cNvPicPr>
-            <a:picLocks noGrp="1" noChangeAspect="1" noChangeArrowheads="1"/>
-          </p:cNvPicPr>
-          <p:nvPr>
-            <p:ph idx="1"/>
-          </p:nvPr>
-        </p:nvPicPr>
-        <p:blipFill>
-          <a:blip r:embed="rId2">
-            <a:extLst>
-              <a:ext uri="{28A0092B-C50C-407E-A947-70E740481C1C}">
-                <a14:useLocalDpi xmlns:a14="http://schemas.microsoft.com/office/drawing/2010/main" val="0"/>
-              </a:ext>
-            </a:extLst>
-          </a:blip>
-          <a:srcRect/>
-          <a:stretch>
-            <a:fillRect/>
-          </a:stretch>
-        </p:blipFill>
-        <p:spPr bwMode="auto">
-          <a:xfrm>
-            <a:off x="749086" y="1828800"/>
-            <a:ext cx="6180352" cy="3096419"/>
-          </a:xfrm>
-          <a:prstGeom prst="rect">
-            <a:avLst/>
-          </a:prstGeom>
-          <a:noFill/>
-          <a:ln>
-            <a:noFill/>
-          </a:ln>
-          <a:effectLst/>
-          <a:extLst>
-            <a:ext uri="{909E8E84-426E-40DD-AFC4-6F175D3DCCD1}">
-              <a14:hiddenFill xmlns:a14="http://schemas.microsoft.com/office/drawing/2010/main">
-                <a:solidFill>
-                  <a:schemeClr val="accent1"/>
-                </a:solidFill>
-              </a14:hiddenFill>
-            </a:ext>
-            <a:ext uri="{91240B29-F687-4F45-9708-019B960494DF}">
-              <a14:hiddenLine xmlns:a14="http://schemas.microsoft.com/office/drawing/2010/main" w="9525">
-                <a:solidFill>
-                  <a:schemeClr val="tx1"/>
-                </a:solidFill>
-                <a:miter lim="800000"/>
-                <a:headEnd/>
-                <a:tailEnd/>
-              </a14:hiddenLine>
-            </a:ext>
-            <a:ext uri="{AF507438-7753-43E0-B8FC-AC1667EBCBE1}">
-              <a14:hiddenEffects xmlns:a14="http://schemas.microsoft.com/office/drawing/2010/main">
-                <a:effectLst>
-                  <a:outerShdw dist="35921" dir="2700000" algn="ctr" rotWithShape="0">
-                    <a:schemeClr val="bg2"/>
-                  </a:outerShdw>
-                </a:effectLst>
-              </a14:hiddenEffects>
-            </a:ext>
-          </a:extLst>
-        </p:spPr>
-      </p:pic>
-      <p:pic>
-        <p:nvPicPr>
-          <p:cNvPr id="2051" name="Picture 3"/>
-          <p:cNvPicPr>
-            <a:picLocks noChangeAspect="1" noChangeArrowheads="1"/>
-          </p:cNvPicPr>
-          <p:nvPr/>
-        </p:nvPicPr>
-        <p:blipFill>
-          <a:blip r:embed="rId3">
-            <a:extLst>
-              <a:ext uri="{28A0092B-C50C-407E-A947-70E740481C1C}">
-                <a14:useLocalDpi xmlns:a14="http://schemas.microsoft.com/office/drawing/2010/main" val="0"/>
-              </a:ext>
-            </a:extLst>
-          </a:blip>
-          <a:srcRect/>
-          <a:stretch>
-            <a:fillRect/>
-          </a:stretch>
-        </p:blipFill>
-        <p:spPr bwMode="auto">
-          <a:xfrm>
-            <a:off x="590550" y="1462088"/>
-            <a:ext cx="7962900" cy="3933825"/>
-          </a:xfrm>
-          <a:prstGeom prst="rect">
-            <a:avLst/>
-          </a:prstGeom>
-          <a:noFill/>
-          <a:ln>
-            <a:noFill/>
-          </a:ln>
-          <a:effectLst/>
-          <a:extLst>
-            <a:ext uri="{909E8E84-426E-40DD-AFC4-6F175D3DCCD1}">
-              <a14:hiddenFill xmlns:a14="http://schemas.microsoft.com/office/drawing/2010/main">
-                <a:solidFill>
-                  <a:schemeClr val="accent1"/>
-                </a:solidFill>
-              </a14:hiddenFill>
-            </a:ext>
-            <a:ext uri="{91240B29-F687-4F45-9708-019B960494DF}">
-              <a14:hiddenLine xmlns:a14="http://schemas.microsoft.com/office/drawing/2010/main" w="9525">
-                <a:solidFill>
-                  <a:schemeClr val="tx1"/>
-                </a:solidFill>
-                <a:miter lim="800000"/>
-                <a:headEnd/>
-                <a:tailEnd/>
-              </a14:hiddenLine>
-            </a:ext>
-            <a:ext uri="{AF507438-7753-43E0-B8FC-AC1667EBCBE1}">
-              <a14:hiddenEffects xmlns:a14="http://schemas.microsoft.com/office/drawing/2010/main">
-                <a:effectLst>
-                  <a:outerShdw dist="35921" dir="2700000" algn="ctr" rotWithShape="0">
-                    <a:schemeClr val="bg2"/>
-                  </a:outerShdw>
-                </a:effectLst>
-              </a14:hiddenEffects>
-            </a:ext>
-          </a:extLst>
-        </p:spPr>
-      </p:pic>
-    </p:spTree>
-    <p:extLst>
-      <p:ext uri="{BB962C8B-B14F-4D97-AF65-F5344CB8AC3E}">
-        <p14:creationId xmlns:p14="http://schemas.microsoft.com/office/powerpoint/2010/main" val="2986724388"/>
       </p:ext>
     </p:extLst>
   </p:cSld>

</xml_diff>

<commit_message>
Added limitations to presentation
</commit_message>
<xml_diff>
--- a/paper/848_Paper_Presentation_Fasburg_Thomas.pptx
+++ b/paper/848_Paper_Presentation_Fasburg_Thomas.pptx
@@ -126,7 +126,7 @@
   </p:defaultTextStyle>
   <p:extLst>
     <p:ext uri="{EFAFB233-063F-42B5-8137-9DF3F51BA10A}">
-      <p15:sldGuideLst xmlns:p15="http://schemas.microsoft.com/office/powerpoint/2012/main" xmlns="">
+      <p15:sldGuideLst xmlns="" xmlns:p15="http://schemas.microsoft.com/office/powerpoint/2012/main">
         <p15:guide id="1" orient="horz" pos="2160">
           <p15:clr>
             <a:srgbClr val="A4A3A4"/>
@@ -225,7 +225,7 @@
           <a:p>
             <a:fld id="{A63B8CFC-D614-4432-A7DB-A65856E85B43}" type="datetimeFigureOut">
               <a:rPr lang="en-US" smtClean="0"/>
-              <a:t>10/29/2015</a:t>
+              <a:t>11/11/2015</a:t>
             </a:fld>
             <a:endParaRPr lang="en-US" dirty="0"/>
           </a:p>
@@ -711,15 +711,7 @@
             </a:r>
             <a:r>
               <a:rPr lang="en-US" baseline="0" dirty="0" smtClean="0"/>
-              <a:t> by a single app when the whole developer </a:t>
-            </a:r>
-            <a:r>
-              <a:rPr lang="en-US" baseline="0" dirty="0" smtClean="0"/>
-              <a:t>population </a:t>
-            </a:r>
-            <a:r>
-              <a:rPr lang="en-US" baseline="0" dirty="0" smtClean="0"/>
-              <a:t>was not flexible</a:t>
+              <a:t> by a single app when the whole developer population was not flexible</a:t>
             </a:r>
             <a:endParaRPr lang="en-US" dirty="0"/>
           </a:p>
@@ -811,7 +803,38 @@
             </a:r>
             <a:r>
               <a:rPr lang="en-US" baseline="0" dirty="0" smtClean="0"/>
-              <a:t> random elements in user and developer behaviors would be interesting. Should have tried to assess validity of results based on empirical data.</a:t>
+              <a:t> random elements in user and developer behaviors would be interesting. Should have tried to assess validity of results based on empirical data</a:t>
+            </a:r>
+            <a:r>
+              <a:rPr lang="en-US" baseline="0" dirty="0" smtClean="0"/>
+              <a:t>.  </a:t>
+            </a:r>
+          </a:p>
+          <a:p>
+            <a:endParaRPr lang="en-US" baseline="0" dirty="0" smtClean="0"/>
+          </a:p>
+          <a:p>
+            <a:r>
+              <a:rPr lang="en-US" baseline="0" dirty="0" smtClean="0"/>
+              <a:t>Flexible strategies have a 1% chance of changing strategy, but it is not mentioned how selection pressure was applied to make strategies appear in uneven proportions.</a:t>
+            </a:r>
+          </a:p>
+          <a:p>
+            <a:endParaRPr lang="en-US" baseline="0" dirty="0" smtClean="0"/>
+          </a:p>
+          <a:p>
+            <a:r>
+              <a:rPr lang="en-US" baseline="0" dirty="0" smtClean="0"/>
+              <a:t>Paper says that nearby cells are similar features, but it is not clear whether this is used when determining a user’s preference for an app. </a:t>
+            </a:r>
+          </a:p>
+          <a:p>
+            <a:endParaRPr lang="en-US" baseline="0" dirty="0" smtClean="0"/>
+          </a:p>
+          <a:p>
+            <a:r>
+              <a:rPr lang="en-US" baseline="0" dirty="0" smtClean="0"/>
+              <a:t>More realistic download model would consider apps a user already has, and number of features a user wants</a:t>
             </a:r>
             <a:endParaRPr lang="en-US" dirty="0"/>
           </a:p>
@@ -1742,11 +1765,7 @@
             </a:r>
             <a:r>
               <a:rPr lang="en-US" baseline="0" dirty="0" smtClean="0"/>
-              <a:t> by a coefficient of feature variation, based on the mean and standard deviation of values from the feature grid</a:t>
-            </a:r>
-            <a:r>
-              <a:rPr lang="en-US" baseline="0" dirty="0" smtClean="0"/>
-              <a:t>.</a:t>
+              <a:t> by a coefficient of feature variation, based on the mean and standard deviation of values from the feature grid.</a:t>
             </a:r>
           </a:p>
           <a:p>
@@ -2647,7 +2666,7 @@
           <a:p>
             <a:fld id="{ADE5661A-BDAA-4579-B2F5-AA9011776D83}" type="datetimeFigureOut">
               <a:rPr lang="en-US" smtClean="0"/>
-              <a:t>10/29/2015</a:t>
+              <a:t>11/11/2015</a:t>
             </a:fld>
             <a:endParaRPr lang="en-US" dirty="0"/>
           </a:p>
@@ -2845,7 +2864,7 @@
             <a:fld id="{1D8BD707-D9CF-40AE-B4C6-C98DA3205C09}" type="datetimeFigureOut">
               <a:rPr lang="en-US" smtClean="0"/>
               <a:pPr/>
-              <a:t>10/29/2015</a:t>
+              <a:t>11/11/2015</a:t>
             </a:fld>
             <a:endParaRPr lang="en-US" dirty="0"/>
           </a:p>
@@ -3032,7 +3051,7 @@
             <a:fld id="{1D8BD707-D9CF-40AE-B4C6-C98DA3205C09}" type="datetimeFigureOut">
               <a:rPr lang="en-US" smtClean="0"/>
               <a:pPr/>
-              <a:t>10/29/2015</a:t>
+              <a:t>11/11/2015</a:t>
             </a:fld>
             <a:endParaRPr lang="en-US" dirty="0"/>
           </a:p>
@@ -3184,7 +3203,7 @@
             <a:fld id="{1D8BD707-D9CF-40AE-B4C6-C98DA3205C09}" type="datetimeFigureOut">
               <a:rPr lang="en-US" smtClean="0"/>
               <a:pPr/>
-              <a:t>10/29/2015</a:t>
+              <a:t>11/11/2015</a:t>
             </a:fld>
             <a:endParaRPr lang="en-US" dirty="0"/>
           </a:p>
@@ -3440,7 +3459,7 @@
           <a:p>
             <a:fld id="{7D698992-9F5B-4E9D-871D-4517B2EC8643}" type="datetimeFigureOut">
               <a:rPr lang="en-US" smtClean="0"/>
-              <a:t>10/29/2015</a:t>
+              <a:t>11/11/2015</a:t>
             </a:fld>
             <a:endParaRPr lang="en-US" dirty="0"/>
           </a:p>
@@ -3850,7 +3869,7 @@
             <a:fld id="{1D8BD707-D9CF-40AE-B4C6-C98DA3205C09}" type="datetimeFigureOut">
               <a:rPr lang="en-US" smtClean="0"/>
               <a:pPr/>
-              <a:t>10/29/2015</a:t>
+              <a:t>11/11/2015</a:t>
             </a:fld>
             <a:endParaRPr lang="en-US" dirty="0"/>
           </a:p>
@@ -4298,7 +4317,7 @@
             <a:fld id="{1D8BD707-D9CF-40AE-B4C6-C98DA3205C09}" type="datetimeFigureOut">
               <a:rPr lang="en-US" smtClean="0"/>
               <a:pPr/>
-              <a:t>10/29/2015</a:t>
+              <a:t>11/11/2015</a:t>
             </a:fld>
             <a:endParaRPr lang="en-US" dirty="0"/>
           </a:p>
@@ -4401,7 +4420,7 @@
             <a:fld id="{1D8BD707-D9CF-40AE-B4C6-C98DA3205C09}" type="datetimeFigureOut">
               <a:rPr lang="en-US" smtClean="0"/>
               <a:pPr/>
-              <a:t>10/29/2015</a:t>
+              <a:t>11/11/2015</a:t>
             </a:fld>
             <a:endParaRPr lang="en-US" dirty="0"/>
           </a:p>
@@ -4524,7 +4543,7 @@
             <a:fld id="{1D8BD707-D9CF-40AE-B4C6-C98DA3205C09}" type="datetimeFigureOut">
               <a:rPr lang="en-US" smtClean="0"/>
               <a:pPr/>
-              <a:t>10/29/2015</a:t>
+              <a:t>11/11/2015</a:t>
             </a:fld>
             <a:endParaRPr lang="en-US" dirty="0"/>
           </a:p>
@@ -4800,7 +4819,7 @@
             <a:fld id="{1D8BD707-D9CF-40AE-B4C6-C98DA3205C09}" type="datetimeFigureOut">
               <a:rPr lang="en-US" smtClean="0"/>
               <a:pPr/>
-              <a:t>10/29/2015</a:t>
+              <a:t>11/11/2015</a:t>
             </a:fld>
             <a:endParaRPr lang="en-US" dirty="0"/>
           </a:p>
@@ -5007,7 +5026,7 @@
             <a:fld id="{1D8BD707-D9CF-40AE-B4C6-C98DA3205C09}" type="datetimeFigureOut">
               <a:rPr lang="en-US" smtClean="0"/>
               <a:pPr/>
-              <a:t>10/29/2015</a:t>
+              <a:t>11/11/2015</a:t>
             </a:fld>
             <a:endParaRPr lang="en-US" dirty="0"/>
           </a:p>
@@ -6118,7 +6137,7 @@
             <a:fld id="{1D8BD707-D9CF-40AE-B4C6-C98DA3205C09}" type="datetimeFigureOut">
               <a:rPr lang="en-US" smtClean="0"/>
               <a:pPr/>
-              <a:t>10/29/2015</a:t>
+              <a:t>11/11/2015</a:t>
             </a:fld>
             <a:endParaRPr lang="en-US" dirty="0"/>
           </a:p>
@@ -7932,61 +7951,91 @@
         </p:nvSpPr>
         <p:spPr/>
         <p:txBody>
-          <a:bodyPr/>
+          <a:bodyPr>
+            <a:normAutofit/>
+          </a:bodyPr>
           <a:lstStyle/>
           <a:p>
             <a:r>
               <a:rPr lang="en-US" dirty="0" smtClean="0"/>
-              <a:t>No reasons provided for choice of developer strategies</a:t>
-            </a:r>
-          </a:p>
-          <a:p>
+              <a:t>No reasons </a:t>
+            </a:r>
             <a:r>
               <a:rPr lang="en-US" dirty="0" smtClean="0"/>
-              <a:t>Overly simplistic models for:</a:t>
+              <a:t>for </a:t>
+            </a:r>
+            <a:r>
+              <a:rPr lang="en-US" dirty="0" smtClean="0"/>
+              <a:t>choice of developer strategies</a:t>
+            </a:r>
+          </a:p>
+          <a:p>
+            <a:r>
+              <a:rPr lang="en-US" dirty="0" smtClean="0"/>
+              <a:t>Overly simplistic models </a:t>
+            </a:r>
+            <a:r>
+              <a:rPr lang="en-US" dirty="0" smtClean="0"/>
+              <a:t>for user downloads</a:t>
             </a:r>
           </a:p>
           <a:p>
             <a:pPr lvl="1"/>
             <a:r>
               <a:rPr lang="en-US" dirty="0" smtClean="0"/>
-              <a:t>User preferences</a:t>
+              <a:t>Wanted </a:t>
+            </a:r>
+            <a:r>
+              <a:rPr lang="en-US" dirty="0" err="1" smtClean="0"/>
+              <a:t>vs</a:t>
+            </a:r>
+            <a:r>
+              <a:rPr lang="en-US" dirty="0" smtClean="0"/>
+              <a:t> unwanted features</a:t>
             </a:r>
           </a:p>
           <a:p>
             <a:pPr lvl="1"/>
             <a:r>
               <a:rPr lang="en-US" dirty="0" smtClean="0"/>
-              <a:t>User download patterns</a:t>
-            </a:r>
+              <a:t>Feature closeness to desired features</a:t>
+            </a:r>
+            <a:endParaRPr lang="en-US" dirty="0" smtClean="0"/>
           </a:p>
           <a:p>
             <a:pPr lvl="1"/>
             <a:r>
               <a:rPr lang="en-US" dirty="0" smtClean="0"/>
-              <a:t>Number of developers</a:t>
+              <a:t>App popularity</a:t>
             </a:r>
           </a:p>
           <a:p>
             <a:pPr lvl="1"/>
             <a:r>
               <a:rPr lang="en-US" dirty="0" smtClean="0"/>
-              <a:t>Developer app creations times</a:t>
-            </a:r>
-          </a:p>
-          <a:p>
+              <a:t>Currently owned apps</a:t>
+            </a:r>
+            <a:endParaRPr lang="en-US" dirty="0" smtClean="0"/>
+          </a:p>
+          <a:p>
+            <a:r>
+              <a:rPr lang="en-US" dirty="0" smtClean="0"/>
+              <a:t>Lack </a:t>
+            </a:r>
             <a:r>
               <a:rPr lang="en-US" dirty="0"/>
-              <a:t>Lack of evidence that results predict real world</a:t>
-            </a:r>
-          </a:p>
-          <a:p>
-            <a:pPr lvl="1"/>
-            <a:endParaRPr lang="en-US" dirty="0" smtClean="0"/>
-          </a:p>
-          <a:p>
-            <a:pPr lvl="1"/>
-            <a:endParaRPr lang="en-US" dirty="0"/>
+              <a:t>of evidence that results predict </a:t>
+            </a:r>
+            <a:r>
+              <a:rPr lang="en-US" dirty="0" smtClean="0"/>
+              <a:t>reality</a:t>
+            </a:r>
+          </a:p>
+          <a:p>
+            <a:r>
+              <a:rPr lang="en-US" dirty="0" smtClean="0"/>
+              <a:t>No mention of how strategies are selected</a:t>
+            </a:r>
           </a:p>
         </p:txBody>
       </p:sp>
@@ -8086,15 +8135,7 @@
           <a:p>
             <a:r>
               <a:rPr lang="en-US" dirty="0" smtClean="0"/>
-              <a:t>More work needed </a:t>
-            </a:r>
-            <a:r>
-              <a:rPr lang="en-US" dirty="0" smtClean="0"/>
-              <a:t>in comparing </a:t>
-            </a:r>
-            <a:r>
-              <a:rPr lang="en-US" dirty="0" smtClean="0"/>
-              <a:t>results to real world and adjusting models accordingly</a:t>
+              <a:t>More work needed in comparing results to real world and adjusting models accordingly</a:t>
             </a:r>
           </a:p>
           <a:p>
@@ -8370,19 +8411,7 @@
           <a:p>
             <a:r>
               <a:rPr lang="en-US" dirty="0" smtClean="0"/>
-              <a:t>Holland – agent based </a:t>
-            </a:r>
-            <a:r>
-              <a:rPr lang="en-US" dirty="0" smtClean="0"/>
-              <a:t>m</a:t>
-            </a:r>
-            <a:r>
-              <a:rPr lang="en-US" dirty="0" smtClean="0"/>
-              <a:t>odels to model </a:t>
-            </a:r>
-            <a:r>
-              <a:rPr lang="en-US" dirty="0" smtClean="0"/>
-              <a:t>complex systems by the interaction of autonomous “agents”</a:t>
+              <a:t>Holland – agent based models to model complex systems by the interaction of autonomous “agents”</a:t>
             </a:r>
           </a:p>
           <a:p>
@@ -9120,13 +9149,8 @@
             </a:r>
             <a:r>
               <a:rPr lang="en-US" dirty="0" smtClean="0"/>
-              <a:t>Develops apps that are a variation of their best app to </a:t>
-            </a:r>
-            <a:r>
-              <a:rPr lang="en-US" dirty="0" smtClean="0"/>
-              <a:t>date</a:t>
-            </a:r>
-            <a:endParaRPr lang="en-US" dirty="0" smtClean="0"/>
+              <a:t>Develops apps that are a variation of their best app to date</a:t>
+            </a:r>
           </a:p>
           <a:p>
             <a:pPr lvl="1"/>
@@ -9222,27 +9246,7 @@
           <a:p>
             <a:r>
               <a:rPr lang="en-US" dirty="0" smtClean="0"/>
-              <a:t>Features </a:t>
-            </a:r>
-            <a:r>
-              <a:rPr lang="en-US" dirty="0" smtClean="0"/>
-              <a:t>occupying </a:t>
-            </a:r>
-            <a:r>
-              <a:rPr lang="en-US" dirty="0" smtClean="0"/>
-              <a:t>spaces on the </a:t>
-            </a:r>
-            <a:r>
-              <a:rPr lang="en-US" dirty="0" smtClean="0"/>
-              <a:t>grid near each other </a:t>
-            </a:r>
-            <a:r>
-              <a:rPr lang="en-US" dirty="0" smtClean="0"/>
-              <a:t>represent similar </a:t>
-            </a:r>
-            <a:r>
-              <a:rPr lang="en-US" dirty="0" smtClean="0"/>
-              <a:t>features</a:t>
+              <a:t>Features occupying spaces on the grid near each other represent similar features</a:t>
             </a:r>
           </a:p>
           <a:p>
@@ -9250,7 +9254,6 @@
               <a:rPr lang="en-US" dirty="0" smtClean="0"/>
               <a:t>Feature grid is filled depending on the strategy used by the app developer</a:t>
             </a:r>
-            <a:endParaRPr lang="en-US" dirty="0" smtClean="0"/>
           </a:p>
           <a:p>
             <a:endParaRPr lang="en-US" dirty="0"/>
@@ -9457,15 +9460,7 @@
           <a:p>
             <a:r>
               <a:rPr lang="en-US" dirty="0" smtClean="0"/>
-              <a:t>All users have same </a:t>
-            </a:r>
-            <a:r>
-              <a:rPr lang="en-US" dirty="0" smtClean="0"/>
-              <a:t>blank 5x5 </a:t>
-            </a:r>
-            <a:r>
-              <a:rPr lang="en-US" dirty="0" smtClean="0"/>
-              <a:t>block of unwanted features</a:t>
+              <a:t>All users have same blank 5x5 block of unwanted features</a:t>
             </a:r>
           </a:p>
           <a:p>
@@ -9483,11 +9478,7 @@
           <a:p>
             <a:r>
               <a:rPr lang="en-US" dirty="0" smtClean="0"/>
-              <a:t>User population increases over time governed by sigmoid growth </a:t>
-            </a:r>
-            <a:r>
-              <a:rPr lang="en-US" dirty="0" smtClean="0"/>
-              <a:t>function </a:t>
+              <a:t>User population increases over time governed by sigmoid growth function </a:t>
             </a:r>
             <a:endParaRPr lang="en-US" dirty="0"/>
           </a:p>

</xml_diff>

<commit_message>
Added Some Project Presentation Slides
</commit_message>
<xml_diff>
--- a/paper/848_Paper_Presentation_Fasburg_Thomas.pptx
+++ b/paper/848_Paper_Presentation_Fasburg_Thomas.pptx
@@ -5,27 +5,28 @@
     <p:sldMasterId id="2147483761" r:id="rId1"/>
   </p:sldMasterIdLst>
   <p:notesMasterIdLst>
-    <p:notesMasterId r:id="rId20"/>
+    <p:notesMasterId r:id="rId21"/>
   </p:notesMasterIdLst>
   <p:sldIdLst>
     <p:sldId id="256" r:id="rId2"/>
-    <p:sldId id="290" r:id="rId3"/>
-    <p:sldId id="275" r:id="rId4"/>
-    <p:sldId id="282" r:id="rId5"/>
-    <p:sldId id="276" r:id="rId6"/>
-    <p:sldId id="277" r:id="rId7"/>
-    <p:sldId id="278" r:id="rId8"/>
-    <p:sldId id="283" r:id="rId9"/>
-    <p:sldId id="279" r:id="rId10"/>
-    <p:sldId id="284" r:id="rId11"/>
-    <p:sldId id="280" r:id="rId12"/>
-    <p:sldId id="287" r:id="rId13"/>
-    <p:sldId id="285" r:id="rId14"/>
-    <p:sldId id="288" r:id="rId15"/>
-    <p:sldId id="289" r:id="rId16"/>
-    <p:sldId id="286" r:id="rId17"/>
-    <p:sldId id="281" r:id="rId18"/>
-    <p:sldId id="274" r:id="rId19"/>
+    <p:sldId id="291" r:id="rId3"/>
+    <p:sldId id="290" r:id="rId4"/>
+    <p:sldId id="275" r:id="rId5"/>
+    <p:sldId id="282" r:id="rId6"/>
+    <p:sldId id="276" r:id="rId7"/>
+    <p:sldId id="277" r:id="rId8"/>
+    <p:sldId id="278" r:id="rId9"/>
+    <p:sldId id="283" r:id="rId10"/>
+    <p:sldId id="279" r:id="rId11"/>
+    <p:sldId id="284" r:id="rId12"/>
+    <p:sldId id="280" r:id="rId13"/>
+    <p:sldId id="287" r:id="rId14"/>
+    <p:sldId id="285" r:id="rId15"/>
+    <p:sldId id="288" r:id="rId16"/>
+    <p:sldId id="289" r:id="rId17"/>
+    <p:sldId id="286" r:id="rId18"/>
+    <p:sldId id="281" r:id="rId19"/>
+    <p:sldId id="274" r:id="rId20"/>
   </p:sldIdLst>
   <p:sldSz cx="9144000" cy="6858000" type="screen4x3"/>
   <p:notesSz cx="6858000" cy="9144000"/>
@@ -126,7 +127,7 @@
   </p:defaultTextStyle>
   <p:extLst>
     <p:ext uri="{EFAFB233-063F-42B5-8137-9DF3F51BA10A}">
-      <p15:sldGuideLst xmlns="" xmlns:p15="http://schemas.microsoft.com/office/powerpoint/2012/main">
+      <p15:sldGuideLst xmlns:p15="http://schemas.microsoft.com/office/powerpoint/2012/main" xmlns="">
         <p15:guide id="1" orient="horz" pos="2160">
           <p15:clr>
             <a:srgbClr val="A4A3A4"/>
@@ -225,7 +226,7 @@
           <a:p>
             <a:fld id="{A63B8CFC-D614-4432-A7DB-A65856E85B43}" type="datetimeFigureOut">
               <a:rPr lang="en-US" smtClean="0"/>
-              <a:t>11/11/2015</a:t>
+              <a:t>11/16/2015</a:t>
             </a:fld>
             <a:endParaRPr lang="en-US" dirty="0"/>
           </a:p>
@@ -621,6 +622,75 @@
           <a:bodyPr/>
           <a:lstStyle/>
           <a:p>
+            <a:r>
+              <a:rPr lang="en-US" dirty="0" smtClean="0"/>
+              <a:t>Measure fitness of each strategy as developers</a:t>
+            </a:r>
+            <a:r>
+              <a:rPr lang="en-US" baseline="0" dirty="0" smtClean="0"/>
+              <a:t> gain more experience in app development</a:t>
+            </a:r>
+          </a:p>
+          <a:p>
+            <a:r>
+              <a:rPr lang="en-US" baseline="0" dirty="0" smtClean="0"/>
+              <a:t>Survey users if they would download the app</a:t>
+            </a:r>
+          </a:p>
+          <a:p>
+            <a:r>
+              <a:rPr lang="en-US" baseline="0" dirty="0" smtClean="0"/>
+              <a:t>	Fitness = </a:t>
+            </a:r>
+            <a:r>
+              <a:rPr lang="en-US" baseline="0" dirty="0" err="1" smtClean="0"/>
+              <a:t>avg</a:t>
+            </a:r>
+            <a:r>
+              <a:rPr lang="en-US" baseline="0" dirty="0" smtClean="0"/>
+              <a:t> download / </a:t>
+            </a:r>
+            <a:r>
+              <a:rPr lang="en-US" baseline="0" dirty="0" err="1" smtClean="0"/>
+              <a:t>NumUsers</a:t>
+            </a:r>
+            <a:endParaRPr lang="en-US" baseline="0" dirty="0" smtClean="0"/>
+          </a:p>
+          <a:p>
+            <a:endParaRPr lang="en-US" baseline="0" dirty="0" smtClean="0"/>
+          </a:p>
+          <a:p>
+            <a:r>
+              <a:rPr lang="en-US" baseline="0" dirty="0" smtClean="0"/>
+              <a:t>S0: Innovator</a:t>
+            </a:r>
+          </a:p>
+          <a:p>
+            <a:r>
+              <a:rPr lang="en-US" baseline="0" dirty="0" smtClean="0"/>
+              <a:t>S1: </a:t>
+            </a:r>
+            <a:r>
+              <a:rPr lang="en-US" baseline="0" dirty="0" err="1" smtClean="0"/>
+              <a:t>Milker</a:t>
+            </a:r>
+            <a:endParaRPr lang="en-US" baseline="0" dirty="0" smtClean="0"/>
+          </a:p>
+          <a:p>
+            <a:r>
+              <a:rPr lang="en-US" baseline="0" dirty="0" smtClean="0"/>
+              <a:t>S2: Optimizer</a:t>
+            </a:r>
+          </a:p>
+          <a:p>
+            <a:r>
+              <a:rPr lang="en-US" baseline="0" dirty="0" smtClean="0"/>
+              <a:t>S3: </a:t>
+            </a:r>
+            <a:r>
+              <a:rPr lang="en-US" baseline="0" dirty="0" err="1" smtClean="0"/>
+              <a:t>CopyCat</a:t>
+            </a:r>
             <a:endParaRPr lang="en-US" dirty="0"/>
           </a:p>
         </p:txBody>
@@ -642,7 +712,7 @@
           <a:p>
             <a:fld id="{B8B3BC3C-0900-4ACD-9030-5BE6C2442A68}" type="slidenum">
               <a:rPr lang="en-US" smtClean="0"/>
-              <a:t>14</a:t>
+              <a:t>13</a:t>
             </a:fld>
             <a:endParaRPr lang="en-US" dirty="0"/>
           </a:p>
@@ -651,7 +721,7 @@
     </p:spTree>
     <p:extLst>
       <p:ext uri="{BB962C8B-B14F-4D97-AF65-F5344CB8AC3E}">
-        <p14:creationId xmlns:p14="http://schemas.microsoft.com/office/powerpoint/2010/main" val="336890695"/>
+        <p14:creationId xmlns:p14="http://schemas.microsoft.com/office/powerpoint/2010/main" val="4109889531"/>
       </p:ext>
     </p:extLst>
   </p:cSld>
@@ -705,14 +775,6 @@
           <a:bodyPr/>
           <a:lstStyle/>
           <a:p>
-            <a:r>
-              <a:rPr lang="en-US" dirty="0" smtClean="0"/>
-              <a:t>Some user preferences were not met</a:t>
-            </a:r>
-            <a:r>
-              <a:rPr lang="en-US" baseline="0" dirty="0" smtClean="0"/>
-              <a:t> by a single app when the whole developer population was not flexible</a:t>
-            </a:r>
             <a:endParaRPr lang="en-US" dirty="0"/>
           </a:p>
         </p:txBody>
@@ -799,42 +861,11 @@
           <a:p>
             <a:r>
               <a:rPr lang="en-US" dirty="0" smtClean="0"/>
-              <a:t>Including some</a:t>
+              <a:t>Some user preferences were not met</a:t>
             </a:r>
             <a:r>
               <a:rPr lang="en-US" baseline="0" dirty="0" smtClean="0"/>
-              <a:t> random elements in user and developer behaviors would be interesting. Should have tried to assess validity of results based on empirical data</a:t>
-            </a:r>
-            <a:r>
-              <a:rPr lang="en-US" baseline="0" dirty="0" smtClean="0"/>
-              <a:t>.  </a:t>
-            </a:r>
-          </a:p>
-          <a:p>
-            <a:endParaRPr lang="en-US" baseline="0" dirty="0" smtClean="0"/>
-          </a:p>
-          <a:p>
-            <a:r>
-              <a:rPr lang="en-US" baseline="0" dirty="0" smtClean="0"/>
-              <a:t>Flexible strategies have a 1% chance of changing strategy, but it is not mentioned how selection pressure was applied to make strategies appear in uneven proportions.</a:t>
-            </a:r>
-          </a:p>
-          <a:p>
-            <a:endParaRPr lang="en-US" baseline="0" dirty="0" smtClean="0"/>
-          </a:p>
-          <a:p>
-            <a:r>
-              <a:rPr lang="en-US" baseline="0" dirty="0" smtClean="0"/>
-              <a:t>Paper says that nearby cells are similar features, but it is not clear whether this is used when determining a user’s preference for an app. </a:t>
-            </a:r>
-          </a:p>
-          <a:p>
-            <a:endParaRPr lang="en-US" baseline="0" dirty="0" smtClean="0"/>
-          </a:p>
-          <a:p>
-            <a:r>
-              <a:rPr lang="en-US" baseline="0" dirty="0" smtClean="0"/>
-              <a:t>More realistic download model would consider apps a user already has, and number of features a user wants</a:t>
+              <a:t> by a single app when the whole developer population was not flexible</a:t>
             </a:r>
             <a:endParaRPr lang="en-US" dirty="0"/>
           </a:p>
@@ -858,6 +889,125 @@
             <a:fld id="{B8B3BC3C-0900-4ACD-9030-5BE6C2442A68}" type="slidenum">
               <a:rPr lang="en-US" smtClean="0"/>
               <a:t>16</a:t>
+            </a:fld>
+            <a:endParaRPr lang="en-US" dirty="0"/>
+          </a:p>
+        </p:txBody>
+      </p:sp>
+    </p:spTree>
+    <p:extLst>
+      <p:ext uri="{BB962C8B-B14F-4D97-AF65-F5344CB8AC3E}">
+        <p14:creationId xmlns:p14="http://schemas.microsoft.com/office/powerpoint/2010/main" val="336890695"/>
+      </p:ext>
+    </p:extLst>
+  </p:cSld>
+  <p:clrMapOvr>
+    <a:masterClrMapping/>
+  </p:clrMapOvr>
+</p:notes>
+</file>
+
+<file path=ppt/notesSlides/notesSlide13.xml><?xml version="1.0" encoding="utf-8"?>
+<p:notes xmlns:a="http://schemas.openxmlformats.org/drawingml/2006/main" xmlns:r="http://schemas.openxmlformats.org/officeDocument/2006/relationships" xmlns:p="http://schemas.openxmlformats.org/presentationml/2006/main">
+  <p:cSld>
+    <p:spTree>
+      <p:nvGrpSpPr>
+        <p:cNvPr id="1" name=""/>
+        <p:cNvGrpSpPr/>
+        <p:nvPr/>
+      </p:nvGrpSpPr>
+      <p:grpSpPr>
+        <a:xfrm>
+          <a:off x="0" y="0"/>
+          <a:ext cx="0" cy="0"/>
+          <a:chOff x="0" y="0"/>
+          <a:chExt cx="0" cy="0"/>
+        </a:xfrm>
+      </p:grpSpPr>
+      <p:sp>
+        <p:nvSpPr>
+          <p:cNvPr id="2" name="Slide Image Placeholder 1"/>
+          <p:cNvSpPr>
+            <a:spLocks noGrp="1" noRot="1" noChangeAspect="1"/>
+          </p:cNvSpPr>
+          <p:nvPr>
+            <p:ph type="sldImg"/>
+          </p:nvPr>
+        </p:nvSpPr>
+        <p:spPr/>
+      </p:sp>
+      <p:sp>
+        <p:nvSpPr>
+          <p:cNvPr id="3" name="Notes Placeholder 2"/>
+          <p:cNvSpPr>
+            <a:spLocks noGrp="1"/>
+          </p:cNvSpPr>
+          <p:nvPr>
+            <p:ph type="body" idx="1"/>
+          </p:nvPr>
+        </p:nvSpPr>
+        <p:spPr/>
+        <p:txBody>
+          <a:bodyPr/>
+          <a:lstStyle/>
+          <a:p>
+            <a:r>
+              <a:rPr lang="en-US" dirty="0" smtClean="0"/>
+              <a:t>Including some</a:t>
+            </a:r>
+            <a:r>
+              <a:rPr lang="en-US" baseline="0" dirty="0" smtClean="0"/>
+              <a:t> random elements in user and developer behaviors would be interesting. Should have tried to assess validity of results based on empirical data.  </a:t>
+            </a:r>
+          </a:p>
+          <a:p>
+            <a:endParaRPr lang="en-US" baseline="0" dirty="0" smtClean="0"/>
+          </a:p>
+          <a:p>
+            <a:r>
+              <a:rPr lang="en-US" baseline="0" dirty="0" smtClean="0"/>
+              <a:t>Flexible strategies have a 1% chance of changing strategy, but it is not mentioned how selection pressure was applied to make strategies appear in uneven proportions.</a:t>
+            </a:r>
+          </a:p>
+          <a:p>
+            <a:endParaRPr lang="en-US" baseline="0" dirty="0" smtClean="0"/>
+          </a:p>
+          <a:p>
+            <a:r>
+              <a:rPr lang="en-US" baseline="0" dirty="0" smtClean="0"/>
+              <a:t>Paper says that nearby cells are similar features, but it is not clear whether this is used when determining a user’s preference for an app. </a:t>
+            </a:r>
+          </a:p>
+          <a:p>
+            <a:endParaRPr lang="en-US" baseline="0" dirty="0" smtClean="0"/>
+          </a:p>
+          <a:p>
+            <a:r>
+              <a:rPr lang="en-US" baseline="0" dirty="0" smtClean="0"/>
+              <a:t>More realistic download model would consider apps a user already has, and number of features a user wants</a:t>
+            </a:r>
+            <a:endParaRPr lang="en-US" dirty="0"/>
+          </a:p>
+        </p:txBody>
+      </p:sp>
+      <p:sp>
+        <p:nvSpPr>
+          <p:cNvPr id="4" name="Slide Number Placeholder 3"/>
+          <p:cNvSpPr>
+            <a:spLocks noGrp="1"/>
+          </p:cNvSpPr>
+          <p:nvPr>
+            <p:ph type="sldNum" sz="quarter" idx="10"/>
+          </p:nvPr>
+        </p:nvSpPr>
+        <p:spPr/>
+        <p:txBody>
+          <a:bodyPr/>
+          <a:lstStyle/>
+          <a:p>
+            <a:fld id="{B8B3BC3C-0900-4ACD-9030-5BE6C2442A68}" type="slidenum">
+              <a:rPr lang="en-US" smtClean="0"/>
+              <a:t>17</a:t>
             </a:fld>
             <a:endParaRPr lang="en-US" dirty="0"/>
           </a:p>
@@ -920,23 +1070,6 @@
           <a:bodyPr/>
           <a:lstStyle/>
           <a:p>
-            <a:r>
-              <a:rPr lang="en-US" dirty="0" smtClean="0"/>
-              <a:t>A mobile app ecosystem was</a:t>
-            </a:r>
-            <a:r>
-              <a:rPr lang="en-US" baseline="0" dirty="0" smtClean="0"/>
-              <a:t> developed to model the creation and downloading of mobile apps simulate Apple’s iOS and investigate common developer strategies.</a:t>
-            </a:r>
-          </a:p>
-          <a:p>
-            <a:endParaRPr lang="en-US" baseline="0" dirty="0" smtClean="0"/>
-          </a:p>
-          <a:p>
-            <a:r>
-              <a:rPr lang="en-US" baseline="0" dirty="0" smtClean="0"/>
-              <a:t>Evaluate in terms of downloads received, app diversity, and adoption rate.</a:t>
-            </a:r>
             <a:endParaRPr lang="en-US" dirty="0"/>
           </a:p>
         </p:txBody>
@@ -967,7 +1100,7 @@
     </p:spTree>
     <p:extLst>
       <p:ext uri="{BB962C8B-B14F-4D97-AF65-F5344CB8AC3E}">
-        <p14:creationId xmlns:p14="http://schemas.microsoft.com/office/powerpoint/2010/main" val="3762026629"/>
+        <p14:creationId xmlns:p14="http://schemas.microsoft.com/office/powerpoint/2010/main" val="2616936225"/>
       </p:ext>
     </p:extLst>
   </p:cSld>
@@ -1023,71 +1156,20 @@
           <a:p>
             <a:r>
               <a:rPr lang="en-US" dirty="0" smtClean="0"/>
-              <a:t>Garg and </a:t>
-            </a:r>
-            <a:r>
-              <a:rPr lang="en-US" dirty="0" err="1" smtClean="0"/>
-              <a:t>Telang</a:t>
+              <a:t>A mobile app ecosystem was</a:t>
             </a:r>
             <a:r>
               <a:rPr lang="en-US" baseline="0" dirty="0" smtClean="0"/>
-              <a:t> – developed strategies to infer the current sales of an app based on it ranking in the app store.</a:t>
-            </a:r>
+              <a:t> developed to model the creation and downloading of mobile apps simulate Apple’s iOS and investigate common developer strategies.</a:t>
+            </a:r>
+          </a:p>
+          <a:p>
+            <a:endParaRPr lang="en-US" baseline="0" dirty="0" smtClean="0"/>
           </a:p>
           <a:p>
             <a:r>
               <a:rPr lang="en-US" baseline="0" dirty="0" smtClean="0"/>
-              <a:t>	- Allows investors to predict profits, there is no certainty a new app will appear ranked though</a:t>
-            </a:r>
-          </a:p>
-          <a:p>
-            <a:endParaRPr lang="en-US" baseline="0" dirty="0" smtClean="0"/>
-          </a:p>
-          <a:p>
-            <a:r>
-              <a:rPr lang="en-US" baseline="0" dirty="0" err="1" smtClean="0"/>
-              <a:t>Bohmer</a:t>
-            </a:r>
-            <a:r>
-              <a:rPr lang="en-US" baseline="0" dirty="0" smtClean="0"/>
-              <a:t> – developed app to collect app usage information.</a:t>
-            </a:r>
-          </a:p>
-          <a:p>
-            <a:r>
-              <a:rPr lang="en-US" baseline="0" dirty="0" smtClean="0"/>
-              <a:t>	- Average app session time is less than a minute</a:t>
-            </a:r>
-          </a:p>
-          <a:p>
-            <a:r>
-              <a:rPr lang="en-US" baseline="0" dirty="0" smtClean="0"/>
-              <a:t>	- People use news apps in the morning, games at night, and communication apps during the day</a:t>
-            </a:r>
-          </a:p>
-          <a:p>
-            <a:r>
-              <a:rPr lang="en-US" baseline="0" dirty="0" smtClean="0"/>
-              <a:t>	- Informative, but only studies what is already out there</a:t>
-            </a:r>
-          </a:p>
-          <a:p>
-            <a:endParaRPr lang="en-US" baseline="0" dirty="0" smtClean="0"/>
-          </a:p>
-          <a:p>
-            <a:r>
-              <a:rPr lang="en-US" baseline="0" dirty="0" smtClean="0"/>
-              <a:t>Holland – Echo: ecosystem model where evolving agents are placed in a resource limited environment</a:t>
-            </a:r>
-          </a:p>
-          <a:p>
-            <a:r>
-              <a:rPr lang="en-US" baseline="0" dirty="0" smtClean="0"/>
-              <a:t>	Study the interaction between </a:t>
-            </a:r>
-            <a:r>
-              <a:rPr lang="en-US" baseline="0" dirty="0" err="1" smtClean="0"/>
-              <a:t>organisims</a:t>
+              <a:t>Evaluate in terms of downloads received, app diversity, and adoption rate.</a:t>
             </a:r>
             <a:endParaRPr lang="en-US" dirty="0"/>
           </a:p>
@@ -1119,7 +1201,7 @@
     </p:spTree>
     <p:extLst>
       <p:ext uri="{BB962C8B-B14F-4D97-AF65-F5344CB8AC3E}">
-        <p14:creationId xmlns:p14="http://schemas.microsoft.com/office/powerpoint/2010/main" val="2616936225"/>
+        <p14:creationId xmlns:p14="http://schemas.microsoft.com/office/powerpoint/2010/main" val="3762026629"/>
       </p:ext>
     </p:extLst>
   </p:cSld>
@@ -1175,37 +1257,72 @@
           <a:p>
             <a:r>
               <a:rPr lang="en-US" dirty="0" smtClean="0"/>
-              <a:t>Coevolving systems</a:t>
+              <a:t>Garg and </a:t>
+            </a:r>
+            <a:r>
+              <a:rPr lang="en-US" dirty="0" err="1" smtClean="0"/>
+              <a:t>Telang</a:t>
             </a:r>
             <a:r>
               <a:rPr lang="en-US" baseline="0" dirty="0" smtClean="0"/>
-              <a:t> of apps, developers, and users</a:t>
+              <a:t> – developed strategies to infer the current sales of an app based on it ranking in the app store.</a:t>
+            </a:r>
+          </a:p>
+          <a:p>
+            <a:r>
+              <a:rPr lang="en-US" baseline="0" dirty="0" smtClean="0"/>
+              <a:t>	- Allows investors to predict profits, there is no certainty a new app will appear ranked though</a:t>
             </a:r>
           </a:p>
           <a:p>
             <a:endParaRPr lang="en-US" baseline="0" dirty="0" smtClean="0"/>
           </a:p>
           <a:p>
-            <a:pPr marL="0" indent="0">
-              <a:buFontTx/>
-              <a:buNone/>
-            </a:pPr>
+            <a:r>
+              <a:rPr lang="en-US" baseline="0" dirty="0" err="1" smtClean="0"/>
+              <a:t>Bohmer</a:t>
+            </a:r>
             <a:r>
               <a:rPr lang="en-US" baseline="0" dirty="0" smtClean="0"/>
-              <a:t>Developer agents build and upload apps to the app store</a:t>
-            </a:r>
-          </a:p>
-          <a:p>
-            <a:pPr marL="0" indent="0">
-              <a:buFontTx/>
-              <a:buNone/>
-            </a:pPr>
+              <a:t> – developed app to collect app usage information.</a:t>
+            </a:r>
+          </a:p>
+          <a:p>
             <a:r>
               <a:rPr lang="en-US" baseline="0" dirty="0" smtClean="0"/>
-              <a:t>User agents browse the store and download the apps</a:t>
-            </a:r>
-          </a:p>
-          <a:p>
+              <a:t>	- Average app session time is less than a minute</a:t>
+            </a:r>
+          </a:p>
+          <a:p>
+            <a:r>
+              <a:rPr lang="en-US" baseline="0" dirty="0" smtClean="0"/>
+              <a:t>	- People use news apps in the morning, games at night, and communication apps during the day</a:t>
+            </a:r>
+          </a:p>
+          <a:p>
+            <a:r>
+              <a:rPr lang="en-US" baseline="0" dirty="0" smtClean="0"/>
+              <a:t>	- Informative, but only studies what is already out there</a:t>
+            </a:r>
+          </a:p>
+          <a:p>
+            <a:endParaRPr lang="en-US" baseline="0" dirty="0" smtClean="0"/>
+          </a:p>
+          <a:p>
+            <a:r>
+              <a:rPr lang="en-US" baseline="0" dirty="0" smtClean="0"/>
+              <a:t>Holland – Echo: ecosystem model where evolving agents are placed in a resource limited environment</a:t>
+            </a:r>
+          </a:p>
+          <a:p>
+            <a:r>
+              <a:rPr lang="en-US" baseline="0" dirty="0" smtClean="0"/>
+              <a:t>	Study the interaction between </a:t>
+            </a:r>
+            <a:r>
+              <a:rPr lang="en-US" baseline="0" dirty="0" err="1" smtClean="0"/>
+              <a:t>organisims</a:t>
+            </a:r>
             <a:endParaRPr lang="en-US" dirty="0"/>
           </a:p>
         </p:txBody>
@@ -1236,7 +1353,7 @@
     </p:spTree>
     <p:extLst>
       <p:ext uri="{BB962C8B-B14F-4D97-AF65-F5344CB8AC3E}">
-        <p14:creationId xmlns:p14="http://schemas.microsoft.com/office/powerpoint/2010/main" val="2157627345"/>
+        <p14:creationId xmlns:p14="http://schemas.microsoft.com/office/powerpoint/2010/main" val="2616936225"/>
       </p:ext>
     </p:extLst>
   </p:cSld>
@@ -1291,90 +1408,35 @@
           <a:lstStyle/>
           <a:p>
             <a:r>
+              <a:rPr lang="en-US" dirty="0" smtClean="0"/>
+              <a:t>Coevolving systems</a:t>
+            </a:r>
+            <a:r>
               <a:rPr lang="en-US" baseline="0" dirty="0" smtClean="0"/>
-              <a:t>Variables: </a:t>
-            </a:r>
-          </a:p>
-          <a:p>
-            <a:r>
-              <a:rPr lang="en-US" baseline="0" dirty="0" smtClean="0"/>
-              <a:t>Development duration – random value for days to build an app</a:t>
-            </a:r>
-          </a:p>
-          <a:p>
-            <a:r>
-              <a:rPr lang="en-US" baseline="0" dirty="0" smtClean="0"/>
-              <a:t>Probability to become inactive – to model hobbyists and tendency to stop building apps</a:t>
+              <a:t> of apps, developers, and users</a:t>
             </a:r>
           </a:p>
           <a:p>
             <a:endParaRPr lang="en-US" baseline="0" dirty="0" smtClean="0"/>
           </a:p>
           <a:p>
-            <a:r>
-              <a:rPr lang="en-US" baseline="0" dirty="0" smtClean="0"/>
-              <a:t>Innovator: Innovative </a:t>
-            </a:r>
-            <a:r>
-              <a:rPr lang="en-US" baseline="0" dirty="0" err="1" smtClean="0"/>
-              <a:t>Devloper</a:t>
-            </a:r>
-            <a:r>
-              <a:rPr lang="en-US" baseline="0" dirty="0" smtClean="0"/>
-              <a:t> to create random features each time</a:t>
-            </a:r>
-          </a:p>
-          <a:p>
-            <a:r>
-              <a:rPr lang="en-US" baseline="0" dirty="0" err="1" smtClean="0"/>
-              <a:t>Milker</a:t>
-            </a:r>
-            <a:r>
-              <a:rPr lang="en-US" baseline="0" dirty="0" smtClean="0"/>
-              <a:t>: “milk” a single app idea repeatedly</a:t>
-            </a:r>
-          </a:p>
-          <a:p>
-            <a:r>
-              <a:rPr lang="en-US" baseline="0" dirty="0" smtClean="0"/>
-              <a:t>Optimizer: improve on the best app</a:t>
-            </a:r>
-          </a:p>
-          <a:p>
-            <a:r>
-              <a:rPr lang="en-US" baseline="0" dirty="0" smtClean="0"/>
-              <a:t>Copycat: Less creative</a:t>
-            </a:r>
-          </a:p>
-          <a:p>
-            <a:pPr marL="0" marR="0" indent="0" algn="l" defTabSz="914400" rtl="0" eaLnBrk="1" fontAlgn="auto" latinLnBrk="0" hangingPunct="1">
-              <a:lnSpc>
-                <a:spcPct val="100000"/>
-              </a:lnSpc>
-              <a:spcBef>
-                <a:spcPts val="0"/>
-              </a:spcBef>
-              <a:spcAft>
-                <a:spcPts val="0"/>
-              </a:spcAft>
-              <a:buClrTx/>
-              <a:buSzTx/>
+            <a:pPr marL="0" indent="0">
               <a:buFontTx/>
               <a:buNone/>
-              <a:tabLst/>
-              <a:defRPr/>
             </a:pPr>
             <a:r>
               <a:rPr lang="en-US" baseline="0" dirty="0" smtClean="0"/>
-              <a:t>Flexible: </a:t>
-            </a:r>
-            <a:r>
-              <a:rPr lang="en-US" dirty="0" smtClean="0"/>
-              <a:t>Some</a:t>
-            </a:r>
+              <a:t>Developer agents build and upload apps to the app store</a:t>
+            </a:r>
+          </a:p>
+          <a:p>
+            <a:pPr marL="0" indent="0">
+              <a:buFontTx/>
+              <a:buNone/>
+            </a:pPr>
             <a:r>
               <a:rPr lang="en-US" baseline="0" dirty="0" smtClean="0"/>
-              <a:t> are “flexible” meaning there is a 1% chance that after any given app is released, it will change it’s style. Later we will see what happens if everyone is flexible.</a:t>
+              <a:t>User agents browse the store and download the apps</a:t>
             </a:r>
           </a:p>
           <a:p>
@@ -1408,7 +1470,7 @@
     </p:spTree>
     <p:extLst>
       <p:ext uri="{BB962C8B-B14F-4D97-AF65-F5344CB8AC3E}">
-        <p14:creationId xmlns:p14="http://schemas.microsoft.com/office/powerpoint/2010/main" val="704678554"/>
+        <p14:creationId xmlns:p14="http://schemas.microsoft.com/office/powerpoint/2010/main" val="2157627345"/>
       </p:ext>
     </p:extLst>
   </p:cSld>
@@ -1463,12 +1525,37 @@
           <a:lstStyle/>
           <a:p>
             <a:r>
-              <a:rPr lang="en-US" dirty="0" smtClean="0"/>
-              <a:t>Innovator: All cells filled based</a:t>
-            </a:r>
-            <a:r>
               <a:rPr lang="en-US" baseline="0" dirty="0" smtClean="0"/>
-              <a:t> on random probability of being filled</a:t>
+              <a:t>Variables: </a:t>
+            </a:r>
+          </a:p>
+          <a:p>
+            <a:r>
+              <a:rPr lang="en-US" baseline="0" dirty="0" smtClean="0"/>
+              <a:t>Development duration – random value for days to build an app</a:t>
+            </a:r>
+          </a:p>
+          <a:p>
+            <a:r>
+              <a:rPr lang="en-US" baseline="0" dirty="0" smtClean="0"/>
+              <a:t>Probability to become inactive – to model hobbyists and tendency to stop building apps</a:t>
+            </a:r>
+          </a:p>
+          <a:p>
+            <a:endParaRPr lang="en-US" baseline="0" dirty="0" smtClean="0"/>
+          </a:p>
+          <a:p>
+            <a:r>
+              <a:rPr lang="en-US" baseline="0" dirty="0" smtClean="0"/>
+              <a:t>Innovator: Innovative </a:t>
+            </a:r>
+            <a:r>
+              <a:rPr lang="en-US" baseline="0" dirty="0" err="1" smtClean="0"/>
+              <a:t>Devloper</a:t>
+            </a:r>
+            <a:r>
+              <a:rPr lang="en-US" baseline="0" dirty="0" smtClean="0"/>
+              <a:t> to create random features each time</a:t>
             </a:r>
           </a:p>
           <a:p>
@@ -1478,24 +1565,53 @@
             </a:r>
             <a:r>
               <a:rPr lang="en-US" baseline="0" dirty="0" smtClean="0"/>
-              <a:t>: Copies features from previous app with random mutation</a:t>
+              <a:t>: “milk” a single app idea repeatedly</a:t>
             </a:r>
           </a:p>
           <a:p>
             <a:r>
               <a:rPr lang="en-US" baseline="0" dirty="0" smtClean="0"/>
-              <a:t>Optimizer: Copies features from own best app with random mutation</a:t>
-            </a:r>
-          </a:p>
-          <a:p>
-            <a:r>
-              <a:rPr lang="en-US" baseline="0" dirty="0" err="1" smtClean="0"/>
-              <a:t>CopyCat</a:t>
-            </a:r>
+              <a:t>Optimizer: improve on the best app</a:t>
+            </a:r>
+          </a:p>
+          <a:p>
             <a:r>
               <a:rPr lang="en-US" baseline="0" dirty="0" smtClean="0"/>
-              <a:t>: App randomly selected from top charts and copied with random mutation</a:t>
-            </a:r>
+              <a:t>Copycat: Less creative</a:t>
+            </a:r>
+          </a:p>
+          <a:p>
+            <a:pPr marL="0" marR="0" indent="0" algn="l" defTabSz="914400" rtl="0" eaLnBrk="1" fontAlgn="auto" latinLnBrk="0" hangingPunct="1">
+              <a:lnSpc>
+                <a:spcPct val="100000"/>
+              </a:lnSpc>
+              <a:spcBef>
+                <a:spcPts val="0"/>
+              </a:spcBef>
+              <a:spcAft>
+                <a:spcPts val="0"/>
+              </a:spcAft>
+              <a:buClrTx/>
+              <a:buSzTx/>
+              <a:buFontTx/>
+              <a:buNone/>
+              <a:tabLst/>
+              <a:defRPr/>
+            </a:pPr>
+            <a:r>
+              <a:rPr lang="en-US" baseline="0" dirty="0" smtClean="0"/>
+              <a:t>Flexible: </a:t>
+            </a:r>
+            <a:r>
+              <a:rPr lang="en-US" dirty="0" smtClean="0"/>
+              <a:t>Some</a:t>
+            </a:r>
+            <a:r>
+              <a:rPr lang="en-US" baseline="0" dirty="0" smtClean="0"/>
+              <a:t> are “flexible” meaning there is a 1% chance that after any given app is released, it will change it’s style. Later we will see what happens if everyone is flexible.</a:t>
+            </a:r>
+          </a:p>
+          <a:p>
             <a:endParaRPr lang="en-US" dirty="0"/>
           </a:p>
         </p:txBody>
@@ -1526,7 +1642,7 @@
     </p:spTree>
     <p:extLst>
       <p:ext uri="{BB962C8B-B14F-4D97-AF65-F5344CB8AC3E}">
-        <p14:creationId xmlns:p14="http://schemas.microsoft.com/office/powerpoint/2010/main" val="2848245607"/>
+        <p14:creationId xmlns:p14="http://schemas.microsoft.com/office/powerpoint/2010/main" val="704678554"/>
       </p:ext>
     </p:extLst>
   </p:cSld>
@@ -1582,100 +1698,39 @@
           <a:p>
             <a:r>
               <a:rPr lang="en-US" dirty="0" smtClean="0"/>
-              <a:t>Initialize:</a:t>
+              <a:t>Innovator: All cells filled based</a:t>
             </a:r>
             <a:r>
               <a:rPr lang="en-US" baseline="0" dirty="0" smtClean="0"/>
-              <a:t> Creates initial number of apps from random developers</a:t>
-            </a:r>
-          </a:p>
-          <a:p>
+              <a:t> on random probability of being filled</a:t>
+            </a:r>
+          </a:p>
+          <a:p>
+            <a:r>
+              <a:rPr lang="en-US" baseline="0" dirty="0" err="1" smtClean="0"/>
+              <a:t>Milker</a:t>
+            </a:r>
             <a:r>
               <a:rPr lang="en-US" baseline="0" dirty="0" smtClean="0"/>
-              <a:t>Dev Build Apps: For each active </a:t>
-            </a:r>
+              <a:t>: Copies features from previous app with random mutation</a:t>
+            </a:r>
+          </a:p>
+          <a:p>
+            <a:r>
+              <a:rPr lang="en-US" baseline="0" dirty="0" smtClean="0"/>
+              <a:t>Optimizer: Copies features from own best app with random mutation</a:t>
+            </a:r>
+          </a:p>
+          <a:p>
             <a:r>
               <a:rPr lang="en-US" baseline="0" dirty="0" err="1" smtClean="0"/>
-              <a:t>dev</a:t>
+              <a:t>CopyCat</a:t>
             </a:r>
             <a:r>
               <a:rPr lang="en-US" baseline="0" dirty="0" smtClean="0"/>
-              <a:t>, </a:t>
-            </a:r>
-            <a:r>
-              <a:rPr lang="en-US" baseline="0" dirty="0" err="1" smtClean="0"/>
-              <a:t>daysTaken</a:t>
-            </a:r>
-            <a:r>
-              <a:rPr lang="en-US" baseline="0" dirty="0" smtClean="0"/>
-              <a:t>++ if </a:t>
-            </a:r>
-            <a:r>
-              <a:rPr lang="en-US" baseline="0" dirty="0" err="1" smtClean="0"/>
-              <a:t>daysTaken</a:t>
-            </a:r>
-            <a:r>
-              <a:rPr lang="en-US" baseline="0" dirty="0" smtClean="0"/>
-              <a:t> &gt; </a:t>
-            </a:r>
-            <a:r>
-              <a:rPr lang="en-US" baseline="0" dirty="0" err="1" smtClean="0"/>
-              <a:t>devDuration</a:t>
-            </a:r>
-            <a:r>
-              <a:rPr lang="en-US" baseline="0" dirty="0" smtClean="0"/>
-              <a:t> app is uploaded to Store</a:t>
-            </a:r>
-          </a:p>
-          <a:p>
-            <a:r>
-              <a:rPr lang="en-US" baseline="0" dirty="0" smtClean="0"/>
-              <a:t>App Store: New Apps Chart and Top Apps Chart is updated</a:t>
-            </a:r>
-          </a:p>
-          <a:p>
-            <a:r>
-              <a:rPr lang="en-US" baseline="0" dirty="0" smtClean="0"/>
-              <a:t>User Agents: For each user, </a:t>
-            </a:r>
-            <a:r>
-              <a:rPr lang="en-US" baseline="0" dirty="0" err="1" smtClean="0"/>
-              <a:t>daysElapsed</a:t>
-            </a:r>
-            <a:r>
-              <a:rPr lang="en-US" baseline="0" dirty="0" smtClean="0"/>
-              <a:t>++ if </a:t>
-            </a:r>
-            <a:r>
-              <a:rPr lang="en-US" baseline="0" dirty="0" err="1" smtClean="0"/>
-              <a:t>daysElapsed</a:t>
-            </a:r>
-            <a:r>
-              <a:rPr lang="en-US" baseline="0" dirty="0" smtClean="0"/>
-              <a:t> &gt; </a:t>
-            </a:r>
-            <a:r>
-              <a:rPr lang="en-US" baseline="0" dirty="0" err="1" smtClean="0"/>
-              <a:t>daysBtwBrowse</a:t>
-            </a:r>
-            <a:r>
-              <a:rPr lang="en-US" baseline="0" dirty="0" smtClean="0"/>
-              <a:t> user looks at store</a:t>
-            </a:r>
-          </a:p>
-          <a:p>
-            <a:r>
-              <a:rPr lang="en-US" baseline="0" dirty="0" smtClean="0"/>
-              <a:t>Increase Population: Increases </a:t>
-            </a:r>
-            <a:r>
-              <a:rPr lang="en-US" baseline="0" dirty="0" err="1" smtClean="0"/>
-              <a:t>devs</a:t>
-            </a:r>
-            <a:r>
-              <a:rPr lang="en-US" baseline="0" dirty="0" smtClean="0"/>
-              <a:t> and users</a:t>
-            </a:r>
+              <a:t>: App randomly selected from top charts and copied with random mutation</a:t>
+            </a:r>
+            <a:endParaRPr lang="en-US" dirty="0"/>
           </a:p>
         </p:txBody>
       </p:sp>
@@ -1696,7 +1751,7 @@
           <a:p>
             <a:fld id="{B8B3BC3C-0900-4ACD-9030-5BE6C2442A68}" type="slidenum">
               <a:rPr lang="en-US" smtClean="0"/>
-              <a:t>10</a:t>
+              <a:t>7</a:t>
             </a:fld>
             <a:endParaRPr lang="en-US" dirty="0"/>
           </a:p>
@@ -1705,7 +1760,7 @@
     </p:spTree>
     <p:extLst>
       <p:ext uri="{BB962C8B-B14F-4D97-AF65-F5344CB8AC3E}">
-        <p14:creationId xmlns:p14="http://schemas.microsoft.com/office/powerpoint/2010/main" val="2614985751"/>
+        <p14:creationId xmlns:p14="http://schemas.microsoft.com/office/powerpoint/2010/main" val="2848245607"/>
       </p:ext>
     </p:extLst>
   </p:cSld>
@@ -1761,46 +1816,91 @@
           <a:p>
             <a:r>
               <a:rPr lang="en-US" dirty="0" smtClean="0"/>
-              <a:t>Diversity measured</a:t>
+              <a:t>Initialize:</a:t>
             </a:r>
             <a:r>
               <a:rPr lang="en-US" baseline="0" dirty="0" smtClean="0"/>
-              <a:t> by a coefficient of feature variation, based on the mean and standard deviation of values from the feature grid.</a:t>
-            </a:r>
-          </a:p>
-          <a:p>
-            <a:endParaRPr lang="en-US" baseline="0" dirty="0" smtClean="0"/>
-          </a:p>
-          <a:p>
+              <a:t> Creates initial number of apps from random developers</a:t>
+            </a:r>
+          </a:p>
+          <a:p>
+            <a:r>
+              <a:rPr lang="en-US" baseline="0" dirty="0" smtClean="0"/>
+              <a:t>Dev Build Apps: For each active </a:t>
+            </a:r>
             <a:r>
               <a:rPr lang="en-US" baseline="0" dirty="0" err="1" smtClean="0"/>
-              <a:t>AvgDl</a:t>
+              <a:t>dev</a:t>
             </a:r>
             <a:r>
               <a:rPr lang="en-US" baseline="0" dirty="0" smtClean="0"/>
-              <a:t>: total number of downloads / total number of apps</a:t>
-            </a:r>
-          </a:p>
-          <a:p>
+              <a:t>, </a:t>
+            </a:r>
+            <a:r>
+              <a:rPr lang="en-US" baseline="0" dirty="0" err="1" smtClean="0"/>
+              <a:t>daysTaken</a:t>
+            </a:r>
             <a:r>
               <a:rPr lang="en-US" baseline="0" dirty="0" smtClean="0"/>
-              <a:t>Top20TotDl: Rank top 20 based on total number of downloads, % proportion belonging to each strategy</a:t>
-            </a:r>
-          </a:p>
-          <a:p>
+              <a:t>++ if </a:t>
+            </a:r>
+            <a:r>
+              <a:rPr lang="en-US" baseline="0" dirty="0" err="1" smtClean="0"/>
+              <a:t>daysTaken</a:t>
+            </a:r>
             <a:r>
               <a:rPr lang="en-US" baseline="0" dirty="0" smtClean="0"/>
-              <a:t>Top20AvgDl: Rank top 20 based on average number of downloads, % proportion belonging to each strategy</a:t>
-            </a:r>
-          </a:p>
-          <a:p>
+              <a:t> &gt; </a:t>
+            </a:r>
             <a:r>
               <a:rPr lang="en-US" baseline="0" dirty="0" err="1" smtClean="0"/>
-              <a:t>ZeroDl</a:t>
+              <a:t>devDuration</a:t>
             </a:r>
             <a:r>
               <a:rPr lang="en-US" baseline="0" dirty="0" smtClean="0"/>
-              <a:t>: Proportion of </a:t>
+              <a:t> app is uploaded to Store</a:t>
+            </a:r>
+          </a:p>
+          <a:p>
+            <a:r>
+              <a:rPr lang="en-US" baseline="0" dirty="0" smtClean="0"/>
+              <a:t>App Store: New Apps Chart and Top Apps Chart is updated</a:t>
+            </a:r>
+          </a:p>
+          <a:p>
+            <a:r>
+              <a:rPr lang="en-US" baseline="0" dirty="0" smtClean="0"/>
+              <a:t>User Agents: For each user, </a:t>
+            </a:r>
+            <a:r>
+              <a:rPr lang="en-US" baseline="0" dirty="0" err="1" smtClean="0"/>
+              <a:t>daysElapsed</a:t>
+            </a:r>
+            <a:r>
+              <a:rPr lang="en-US" baseline="0" dirty="0" smtClean="0"/>
+              <a:t>++ if </a:t>
+            </a:r>
+            <a:r>
+              <a:rPr lang="en-US" baseline="0" dirty="0" err="1" smtClean="0"/>
+              <a:t>daysElapsed</a:t>
+            </a:r>
+            <a:r>
+              <a:rPr lang="en-US" baseline="0" dirty="0" smtClean="0"/>
+              <a:t> &gt; </a:t>
+            </a:r>
+            <a:r>
+              <a:rPr lang="en-US" baseline="0" dirty="0" err="1" smtClean="0"/>
+              <a:t>daysBtwBrowse</a:t>
+            </a:r>
+            <a:r>
+              <a:rPr lang="en-US" baseline="0" dirty="0" smtClean="0"/>
+              <a:t> user looks at store</a:t>
+            </a:r>
+          </a:p>
+          <a:p>
+            <a:r>
+              <a:rPr lang="en-US" baseline="0" dirty="0" smtClean="0"/>
+              <a:t>Increase Population: Increases </a:t>
             </a:r>
             <a:r>
               <a:rPr lang="en-US" baseline="0" dirty="0" err="1" smtClean="0"/>
@@ -1808,47 +1908,8 @@
             </a:r>
             <a:r>
               <a:rPr lang="en-US" baseline="0" dirty="0" smtClean="0"/>
-              <a:t> who received no downloads for any apps so far.</a:t>
-            </a:r>
-          </a:p>
-          <a:p>
-            <a:endParaRPr lang="en-US" baseline="0" dirty="0" smtClean="0"/>
-          </a:p>
-          <a:p>
-            <a:r>
-              <a:rPr lang="en-US" baseline="0" dirty="0" err="1" smtClean="0"/>
-              <a:t>FeatCV</a:t>
-            </a:r>
-            <a:r>
-              <a:rPr lang="en-US" baseline="0" dirty="0" smtClean="0"/>
-              <a:t>: Measure app coverage of features that are desired by users</a:t>
-            </a:r>
-          </a:p>
-          <a:p>
-            <a:r>
-              <a:rPr lang="en-US" baseline="0" dirty="0" smtClean="0"/>
-              <a:t>	Good strategy has low </a:t>
-            </a:r>
-            <a:r>
-              <a:rPr lang="en-US" baseline="0" dirty="0" err="1" smtClean="0"/>
-              <a:t>FeatCV</a:t>
-            </a:r>
-            <a:endParaRPr lang="en-US" baseline="0" dirty="0" smtClean="0"/>
-          </a:p>
-          <a:p>
-            <a:r>
-              <a:rPr lang="en-US" baseline="0" dirty="0" smtClean="0"/>
-              <a:t>	Mean preference for user population is evenly distributed</a:t>
-            </a:r>
-          </a:p>
-          <a:p>
-            <a:r>
-              <a:rPr lang="en-US" baseline="0" dirty="0" smtClean="0"/>
-              <a:t>	Indicates all the apps have features that cover the desired region in feature matrix</a:t>
-            </a:r>
-          </a:p>
-          <a:p>
-            <a:endParaRPr lang="en-US" dirty="0"/>
+              <a:t> and users</a:t>
+            </a:r>
           </a:p>
         </p:txBody>
       </p:sp>
@@ -1878,7 +1939,7 @@
     </p:spTree>
     <p:extLst>
       <p:ext uri="{BB962C8B-B14F-4D97-AF65-F5344CB8AC3E}">
-        <p14:creationId xmlns:p14="http://schemas.microsoft.com/office/powerpoint/2010/main" val="1971904817"/>
+        <p14:creationId xmlns:p14="http://schemas.microsoft.com/office/powerpoint/2010/main" val="2614985751"/>
       </p:ext>
     </p:extLst>
   </p:cSld>
@@ -1934,73 +1995,93 @@
           <a:p>
             <a:r>
               <a:rPr lang="en-US" dirty="0" smtClean="0"/>
-              <a:t>Measure fitness of each strategy as developers</a:t>
+              <a:t>Diversity measured</a:t>
             </a:r>
             <a:r>
               <a:rPr lang="en-US" baseline="0" dirty="0" smtClean="0"/>
-              <a:t> gain more experience in app development</a:t>
-            </a:r>
-          </a:p>
-          <a:p>
+              <a:t> by a coefficient of feature variation, based on the mean and standard deviation of values from the feature grid.</a:t>
+            </a:r>
+          </a:p>
+          <a:p>
+            <a:endParaRPr lang="en-US" baseline="0" dirty="0" smtClean="0"/>
+          </a:p>
+          <a:p>
+            <a:r>
+              <a:rPr lang="en-US" baseline="0" dirty="0" err="1" smtClean="0"/>
+              <a:t>AvgDl</a:t>
+            </a:r>
             <a:r>
               <a:rPr lang="en-US" baseline="0" dirty="0" smtClean="0"/>
-              <a:t>Survey users if they would download the app</a:t>
+              <a:t>: total number of downloads / total number of apps</a:t>
             </a:r>
           </a:p>
           <a:p>
             <a:r>
               <a:rPr lang="en-US" baseline="0" dirty="0" smtClean="0"/>
-              <a:t>	Fitness = </a:t>
-            </a:r>
+              <a:t>Top20TotDl: Rank top 20 based on total number of downloads, % proportion belonging to each strategy</a:t>
+            </a:r>
+          </a:p>
+          <a:p>
+            <a:r>
+              <a:rPr lang="en-US" baseline="0" dirty="0" smtClean="0"/>
+              <a:t>Top20AvgDl: Rank top 20 based on average number of downloads, % proportion belonging to each strategy</a:t>
+            </a:r>
+          </a:p>
+          <a:p>
             <a:r>
               <a:rPr lang="en-US" baseline="0" dirty="0" err="1" smtClean="0"/>
-              <a:t>avg</a:t>
+              <a:t>ZeroDl</a:t>
             </a:r>
             <a:r>
               <a:rPr lang="en-US" baseline="0" dirty="0" smtClean="0"/>
-              <a:t> download / </a:t>
+              <a:t>: Proportion of </a:t>
             </a:r>
             <a:r>
               <a:rPr lang="en-US" baseline="0" dirty="0" err="1" smtClean="0"/>
-              <a:t>NumUsers</a:t>
-            </a:r>
+              <a:t>devs</a:t>
+            </a:r>
+            <a:r>
+              <a:rPr lang="en-US" baseline="0" dirty="0" smtClean="0"/>
+              <a:t> who received no downloads for any apps so far.</a:t>
+            </a:r>
+          </a:p>
+          <a:p>
             <a:endParaRPr lang="en-US" baseline="0" dirty="0" smtClean="0"/>
           </a:p>
           <a:p>
+            <a:r>
+              <a:rPr lang="en-US" baseline="0" dirty="0" err="1" smtClean="0"/>
+              <a:t>FeatCV</a:t>
+            </a:r>
+            <a:r>
+              <a:rPr lang="en-US" baseline="0" dirty="0" smtClean="0"/>
+              <a:t>: Measure app coverage of features that are desired by users</a:t>
+            </a:r>
+          </a:p>
+          <a:p>
+            <a:r>
+              <a:rPr lang="en-US" baseline="0" dirty="0" smtClean="0"/>
+              <a:t>	Good strategy has low </a:t>
+            </a:r>
+            <a:r>
+              <a:rPr lang="en-US" baseline="0" dirty="0" err="1" smtClean="0"/>
+              <a:t>FeatCV</a:t>
+            </a:r>
             <a:endParaRPr lang="en-US" baseline="0" dirty="0" smtClean="0"/>
           </a:p>
           <a:p>
             <a:r>
               <a:rPr lang="en-US" baseline="0" dirty="0" smtClean="0"/>
-              <a:t>S0: Innovator</a:t>
+              <a:t>	Mean preference for user population is evenly distributed</a:t>
             </a:r>
           </a:p>
           <a:p>
             <a:r>
               <a:rPr lang="en-US" baseline="0" dirty="0" smtClean="0"/>
-              <a:t>S1: </a:t>
-            </a:r>
-            <a:r>
-              <a:rPr lang="en-US" baseline="0" dirty="0" err="1" smtClean="0"/>
-              <a:t>Milker</a:t>
-            </a:r>
-            <a:endParaRPr lang="en-US" baseline="0" dirty="0" smtClean="0"/>
-          </a:p>
-          <a:p>
-            <a:r>
-              <a:rPr lang="en-US" baseline="0" dirty="0" smtClean="0"/>
-              <a:t>S2: Optimizer</a:t>
-            </a:r>
-          </a:p>
-          <a:p>
-            <a:r>
-              <a:rPr lang="en-US" baseline="0" dirty="0" smtClean="0"/>
-              <a:t>S3: </a:t>
-            </a:r>
-            <a:r>
-              <a:rPr lang="en-US" baseline="0" dirty="0" err="1" smtClean="0"/>
-              <a:t>CopyCat</a:t>
-            </a:r>
+              <a:t>	Indicates all the apps have features that cover the desired region in feature matrix</a:t>
+            </a:r>
+          </a:p>
+          <a:p>
             <a:endParaRPr lang="en-US" dirty="0"/>
           </a:p>
         </p:txBody>
@@ -2031,7 +2112,7 @@
     </p:spTree>
     <p:extLst>
       <p:ext uri="{BB962C8B-B14F-4D97-AF65-F5344CB8AC3E}">
-        <p14:creationId xmlns:p14="http://schemas.microsoft.com/office/powerpoint/2010/main" val="4109889531"/>
+        <p14:creationId xmlns:p14="http://schemas.microsoft.com/office/powerpoint/2010/main" val="1971904817"/>
       </p:ext>
     </p:extLst>
   </p:cSld>
@@ -2666,7 +2747,7 @@
           <a:p>
             <a:fld id="{ADE5661A-BDAA-4579-B2F5-AA9011776D83}" type="datetimeFigureOut">
               <a:rPr lang="en-US" smtClean="0"/>
-              <a:t>11/11/2015</a:t>
+              <a:t>11/16/2015</a:t>
             </a:fld>
             <a:endParaRPr lang="en-US" dirty="0"/>
           </a:p>
@@ -2864,7 +2945,7 @@
             <a:fld id="{1D8BD707-D9CF-40AE-B4C6-C98DA3205C09}" type="datetimeFigureOut">
               <a:rPr lang="en-US" smtClean="0"/>
               <a:pPr/>
-              <a:t>11/11/2015</a:t>
+              <a:t>11/16/2015</a:t>
             </a:fld>
             <a:endParaRPr lang="en-US" dirty="0"/>
           </a:p>
@@ -3051,7 +3132,7 @@
             <a:fld id="{1D8BD707-D9CF-40AE-B4C6-C98DA3205C09}" type="datetimeFigureOut">
               <a:rPr lang="en-US" smtClean="0"/>
               <a:pPr/>
-              <a:t>11/11/2015</a:t>
+              <a:t>11/16/2015</a:t>
             </a:fld>
             <a:endParaRPr lang="en-US" dirty="0"/>
           </a:p>
@@ -3203,7 +3284,7 @@
             <a:fld id="{1D8BD707-D9CF-40AE-B4C6-C98DA3205C09}" type="datetimeFigureOut">
               <a:rPr lang="en-US" smtClean="0"/>
               <a:pPr/>
-              <a:t>11/11/2015</a:t>
+              <a:t>11/16/2015</a:t>
             </a:fld>
             <a:endParaRPr lang="en-US" dirty="0"/>
           </a:p>
@@ -3459,7 +3540,7 @@
           <a:p>
             <a:fld id="{7D698992-9F5B-4E9D-871D-4517B2EC8643}" type="datetimeFigureOut">
               <a:rPr lang="en-US" smtClean="0"/>
-              <a:t>11/11/2015</a:t>
+              <a:t>11/16/2015</a:t>
             </a:fld>
             <a:endParaRPr lang="en-US" dirty="0"/>
           </a:p>
@@ -3869,7 +3950,7 @@
             <a:fld id="{1D8BD707-D9CF-40AE-B4C6-C98DA3205C09}" type="datetimeFigureOut">
               <a:rPr lang="en-US" smtClean="0"/>
               <a:pPr/>
-              <a:t>11/11/2015</a:t>
+              <a:t>11/16/2015</a:t>
             </a:fld>
             <a:endParaRPr lang="en-US" dirty="0"/>
           </a:p>
@@ -4317,7 +4398,7 @@
             <a:fld id="{1D8BD707-D9CF-40AE-B4C6-C98DA3205C09}" type="datetimeFigureOut">
               <a:rPr lang="en-US" smtClean="0"/>
               <a:pPr/>
-              <a:t>11/11/2015</a:t>
+              <a:t>11/16/2015</a:t>
             </a:fld>
             <a:endParaRPr lang="en-US" dirty="0"/>
           </a:p>
@@ -4420,7 +4501,7 @@
             <a:fld id="{1D8BD707-D9CF-40AE-B4C6-C98DA3205C09}" type="datetimeFigureOut">
               <a:rPr lang="en-US" smtClean="0"/>
               <a:pPr/>
-              <a:t>11/11/2015</a:t>
+              <a:t>11/16/2015</a:t>
             </a:fld>
             <a:endParaRPr lang="en-US" dirty="0"/>
           </a:p>
@@ -4543,7 +4624,7 @@
             <a:fld id="{1D8BD707-D9CF-40AE-B4C6-C98DA3205C09}" type="datetimeFigureOut">
               <a:rPr lang="en-US" smtClean="0"/>
               <a:pPr/>
-              <a:t>11/11/2015</a:t>
+              <a:t>11/16/2015</a:t>
             </a:fld>
             <a:endParaRPr lang="en-US" dirty="0"/>
           </a:p>
@@ -4819,7 +4900,7 @@
             <a:fld id="{1D8BD707-D9CF-40AE-B4C6-C98DA3205C09}" type="datetimeFigureOut">
               <a:rPr lang="en-US" smtClean="0"/>
               <a:pPr/>
-              <a:t>11/11/2015</a:t>
+              <a:t>11/16/2015</a:t>
             </a:fld>
             <a:endParaRPr lang="en-US" dirty="0"/>
           </a:p>
@@ -5026,7 +5107,7 @@
             <a:fld id="{1D8BD707-D9CF-40AE-B4C6-C98DA3205C09}" type="datetimeFigureOut">
               <a:rPr lang="en-US" smtClean="0"/>
               <a:pPr/>
-              <a:t>11/11/2015</a:t>
+              <a:t>11/16/2015</a:t>
             </a:fld>
             <a:endParaRPr lang="en-US" dirty="0"/>
           </a:p>
@@ -6137,7 +6218,7 @@
             <a:fld id="{1D8BD707-D9CF-40AE-B4C6-C98DA3205C09}" type="datetimeFigureOut">
               <a:rPr lang="en-US" smtClean="0"/>
               <a:pPr/>
-              <a:t>11/11/2015</a:t>
+              <a:t>11/16/2015</a:t>
             </a:fld>
             <a:endParaRPr lang="en-US" dirty="0"/>
           </a:p>
@@ -6817,6 +6898,159 @@
           </a:p>
         </p:txBody>
       </p:sp>
+      <p:sp>
+        <p:nvSpPr>
+          <p:cNvPr id="4" name="Content Placeholder 3"/>
+          <p:cNvSpPr>
+            <a:spLocks noGrp="1"/>
+          </p:cNvSpPr>
+          <p:nvPr>
+            <p:ph idx="1"/>
+          </p:nvPr>
+        </p:nvSpPr>
+        <p:spPr/>
+        <p:txBody>
+          <a:bodyPr/>
+          <a:lstStyle/>
+          <a:p>
+            <a:r>
+              <a:rPr lang="en-US" dirty="0" smtClean="0"/>
+              <a:t>Initial parameters set up to mimic </a:t>
+            </a:r>
+            <a:r>
+              <a:rPr lang="en-US" dirty="0" err="1" smtClean="0"/>
+              <a:t>iOS</a:t>
+            </a:r>
+            <a:r>
+              <a:rPr lang="en-US" dirty="0" smtClean="0"/>
+              <a:t> app store in July 2008, simulated to June 2011</a:t>
+            </a:r>
+          </a:p>
+          <a:p>
+            <a:pPr marL="109728" indent="0">
+              <a:buNone/>
+            </a:pPr>
+            <a:endParaRPr lang="en-US" dirty="0"/>
+          </a:p>
+        </p:txBody>
+      </p:sp>
+      <p:pic>
+        <p:nvPicPr>
+          <p:cNvPr id="2052" name="Picture 4"/>
+          <p:cNvPicPr>
+            <a:picLocks noChangeAspect="1" noChangeArrowheads="1"/>
+          </p:cNvPicPr>
+          <p:nvPr/>
+        </p:nvPicPr>
+        <p:blipFill>
+          <a:blip r:embed="rId2">
+            <a:extLst>
+              <a:ext uri="{28A0092B-C50C-407E-A947-70E740481C1C}">
+                <a14:useLocalDpi xmlns:a14="http://schemas.microsoft.com/office/drawing/2010/main" val="0"/>
+              </a:ext>
+            </a:extLst>
+          </a:blip>
+          <a:srcRect/>
+          <a:stretch>
+            <a:fillRect/>
+          </a:stretch>
+        </p:blipFill>
+        <p:spPr bwMode="auto">
+          <a:xfrm>
+            <a:off x="1348154" y="2500313"/>
+            <a:ext cx="6388587" cy="2147887"/>
+          </a:xfrm>
+          <a:prstGeom prst="rect">
+            <a:avLst/>
+          </a:prstGeom>
+          <a:noFill/>
+          <a:ln>
+            <a:noFill/>
+          </a:ln>
+          <a:effectLst/>
+          <a:extLst>
+            <a:ext uri="{909E8E84-426E-40DD-AFC4-6F175D3DCCD1}">
+              <a14:hiddenFill xmlns:a14="http://schemas.microsoft.com/office/drawing/2010/main">
+                <a:solidFill>
+                  <a:schemeClr val="accent1"/>
+                </a:solidFill>
+              </a14:hiddenFill>
+            </a:ext>
+            <a:ext uri="{91240B29-F687-4F45-9708-019B960494DF}">
+              <a14:hiddenLine xmlns:a14="http://schemas.microsoft.com/office/drawing/2010/main" w="9525">
+                <a:solidFill>
+                  <a:schemeClr val="tx1"/>
+                </a:solidFill>
+                <a:miter lim="800000"/>
+                <a:headEnd/>
+                <a:tailEnd/>
+              </a14:hiddenLine>
+            </a:ext>
+            <a:ext uri="{AF507438-7753-43E0-B8FC-AC1667EBCBE1}">
+              <a14:hiddenEffects xmlns:a14="http://schemas.microsoft.com/office/drawing/2010/main">
+                <a:effectLst>
+                  <a:outerShdw dist="35921" dir="2700000" algn="ctr" rotWithShape="0">
+                    <a:schemeClr val="bg2"/>
+                  </a:outerShdw>
+                </a:effectLst>
+              </a14:hiddenEffects>
+            </a:ext>
+          </a:extLst>
+        </p:spPr>
+      </p:pic>
+    </p:spTree>
+    <p:extLst>
+      <p:ext uri="{BB962C8B-B14F-4D97-AF65-F5344CB8AC3E}">
+        <p14:creationId xmlns:p14="http://schemas.microsoft.com/office/powerpoint/2010/main" val="1154494063"/>
+      </p:ext>
+    </p:extLst>
+  </p:cSld>
+  <p:clrMapOvr>
+    <a:masterClrMapping/>
+  </p:clrMapOvr>
+</p:sld>
+</file>
+
+<file path=ppt/slides/slide11.xml><?xml version="1.0" encoding="utf-8"?>
+<p:sld xmlns:a="http://schemas.openxmlformats.org/drawingml/2006/main" xmlns:r="http://schemas.openxmlformats.org/officeDocument/2006/relationships" xmlns:p="http://schemas.openxmlformats.org/presentationml/2006/main">
+  <p:cSld>
+    <p:spTree>
+      <p:nvGrpSpPr>
+        <p:cNvPr id="1" name=""/>
+        <p:cNvGrpSpPr/>
+        <p:nvPr/>
+      </p:nvGrpSpPr>
+      <p:grpSpPr>
+        <a:xfrm>
+          <a:off x="0" y="0"/>
+          <a:ext cx="0" cy="0"/>
+          <a:chOff x="0" y="0"/>
+          <a:chExt cx="0" cy="0"/>
+        </a:xfrm>
+      </p:grpSpPr>
+      <p:sp>
+        <p:nvSpPr>
+          <p:cNvPr id="3" name="Title 2"/>
+          <p:cNvSpPr>
+            <a:spLocks noGrp="1"/>
+          </p:cNvSpPr>
+          <p:nvPr>
+            <p:ph type="title"/>
+          </p:nvPr>
+        </p:nvSpPr>
+        <p:spPr/>
+        <p:txBody>
+          <a:bodyPr/>
+          <a:lstStyle/>
+          <a:p>
+            <a:r>
+              <a:rPr lang="en-US" dirty="0" smtClean="0"/>
+              <a:t>Algorithm</a:t>
+            </a:r>
+            <a:endParaRPr lang="en-US" dirty="0"/>
+          </a:p>
+        </p:txBody>
+      </p:sp>
       <p:pic>
         <p:nvPicPr>
           <p:cNvPr id="2050" name="Picture 2"/>
@@ -6960,7 +7194,7 @@
 </p:sld>
 </file>
 
-<file path=ppt/slides/slide11.xml><?xml version="1.0" encoding="utf-8"?>
+<file path=ppt/slides/slide12.xml><?xml version="1.0" encoding="utf-8"?>
 <p:sld xmlns:a="http://schemas.openxmlformats.org/drawingml/2006/main" xmlns:r="http://schemas.openxmlformats.org/officeDocument/2006/relationships" xmlns:p="http://schemas.openxmlformats.org/presentationml/2006/main">
   <p:cSld>
     <p:spTree>
@@ -7265,7 +7499,7 @@
 </p:sld>
 </file>
 
-<file path=ppt/slides/slide12.xml><?xml version="1.0" encoding="utf-8"?>
+<file path=ppt/slides/slide13.xml><?xml version="1.0" encoding="utf-8"?>
 <p:sld xmlns:a="http://schemas.openxmlformats.org/drawingml/2006/main" xmlns:r="http://schemas.openxmlformats.org/officeDocument/2006/relationships" xmlns:p="http://schemas.openxmlformats.org/presentationml/2006/main">
   <p:cSld>
     <p:spTree>
@@ -7475,7 +7709,7 @@
 </p:sld>
 </file>
 
-<file path=ppt/slides/slide13.xml><?xml version="1.0" encoding="utf-8"?>
+<file path=ppt/slides/slide14.xml><?xml version="1.0" encoding="utf-8"?>
 <p:sld xmlns:a="http://schemas.openxmlformats.org/drawingml/2006/main" xmlns:r="http://schemas.openxmlformats.org/officeDocument/2006/relationships" xmlns:p="http://schemas.openxmlformats.org/presentationml/2006/main">
   <p:cSld>
     <p:spTree>
@@ -7634,7 +7868,7 @@
 </p:sld>
 </file>
 
-<file path=ppt/slides/slide14.xml><?xml version="1.0" encoding="utf-8"?>
+<file path=ppt/slides/slide15.xml><?xml version="1.0" encoding="utf-8"?>
 <p:sld xmlns:a="http://schemas.openxmlformats.org/drawingml/2006/main" xmlns:r="http://schemas.openxmlformats.org/officeDocument/2006/relationships" xmlns:p="http://schemas.openxmlformats.org/presentationml/2006/main">
   <p:cSld>
     <p:spTree>
@@ -7750,7 +7984,7 @@
 </p:sld>
 </file>
 
-<file path=ppt/slides/slide15.xml><?xml version="1.0" encoding="utf-8"?>
+<file path=ppt/slides/slide16.xml><?xml version="1.0" encoding="utf-8"?>
 <p:sld xmlns:a="http://schemas.openxmlformats.org/drawingml/2006/main" xmlns:r="http://schemas.openxmlformats.org/officeDocument/2006/relationships" xmlns:p="http://schemas.openxmlformats.org/presentationml/2006/main">
   <p:cSld>
     <p:spTree>
@@ -7922,159 +8156,6 @@
 </p:sld>
 </file>
 
-<file path=ppt/slides/slide16.xml><?xml version="1.0" encoding="utf-8"?>
-<p:sld xmlns:a="http://schemas.openxmlformats.org/drawingml/2006/main" xmlns:r="http://schemas.openxmlformats.org/officeDocument/2006/relationships" xmlns:p="http://schemas.openxmlformats.org/presentationml/2006/main">
-  <p:cSld>
-    <p:spTree>
-      <p:nvGrpSpPr>
-        <p:cNvPr id="1" name=""/>
-        <p:cNvGrpSpPr/>
-        <p:nvPr/>
-      </p:nvGrpSpPr>
-      <p:grpSpPr>
-        <a:xfrm>
-          <a:off x="0" y="0"/>
-          <a:ext cx="0" cy="0"/>
-          <a:chOff x="0" y="0"/>
-          <a:chExt cx="0" cy="0"/>
-        </a:xfrm>
-      </p:grpSpPr>
-      <p:sp>
-        <p:nvSpPr>
-          <p:cNvPr id="2" name="Content Placeholder 1"/>
-          <p:cNvSpPr>
-            <a:spLocks noGrp="1"/>
-          </p:cNvSpPr>
-          <p:nvPr>
-            <p:ph idx="1"/>
-          </p:nvPr>
-        </p:nvSpPr>
-        <p:spPr/>
-        <p:txBody>
-          <a:bodyPr>
-            <a:normAutofit/>
-          </a:bodyPr>
-          <a:lstStyle/>
-          <a:p>
-            <a:r>
-              <a:rPr lang="en-US" dirty="0" smtClean="0"/>
-              <a:t>No reasons </a:t>
-            </a:r>
-            <a:r>
-              <a:rPr lang="en-US" dirty="0" smtClean="0"/>
-              <a:t>for </a:t>
-            </a:r>
-            <a:r>
-              <a:rPr lang="en-US" dirty="0" smtClean="0"/>
-              <a:t>choice of developer strategies</a:t>
-            </a:r>
-          </a:p>
-          <a:p>
-            <a:r>
-              <a:rPr lang="en-US" dirty="0" smtClean="0"/>
-              <a:t>Overly simplistic models </a:t>
-            </a:r>
-            <a:r>
-              <a:rPr lang="en-US" dirty="0" smtClean="0"/>
-              <a:t>for user downloads</a:t>
-            </a:r>
-          </a:p>
-          <a:p>
-            <a:pPr lvl="1"/>
-            <a:r>
-              <a:rPr lang="en-US" dirty="0" smtClean="0"/>
-              <a:t>Wanted </a:t>
-            </a:r>
-            <a:r>
-              <a:rPr lang="en-US" dirty="0" err="1" smtClean="0"/>
-              <a:t>vs</a:t>
-            </a:r>
-            <a:r>
-              <a:rPr lang="en-US" dirty="0" smtClean="0"/>
-              <a:t> unwanted features</a:t>
-            </a:r>
-          </a:p>
-          <a:p>
-            <a:pPr lvl="1"/>
-            <a:r>
-              <a:rPr lang="en-US" dirty="0" smtClean="0"/>
-              <a:t>Feature closeness to desired features</a:t>
-            </a:r>
-            <a:endParaRPr lang="en-US" dirty="0" smtClean="0"/>
-          </a:p>
-          <a:p>
-            <a:pPr lvl="1"/>
-            <a:r>
-              <a:rPr lang="en-US" dirty="0" smtClean="0"/>
-              <a:t>App popularity</a:t>
-            </a:r>
-          </a:p>
-          <a:p>
-            <a:pPr lvl="1"/>
-            <a:r>
-              <a:rPr lang="en-US" dirty="0" smtClean="0"/>
-              <a:t>Currently owned apps</a:t>
-            </a:r>
-            <a:endParaRPr lang="en-US" dirty="0" smtClean="0"/>
-          </a:p>
-          <a:p>
-            <a:r>
-              <a:rPr lang="en-US" dirty="0" smtClean="0"/>
-              <a:t>Lack </a:t>
-            </a:r>
-            <a:r>
-              <a:rPr lang="en-US" dirty="0"/>
-              <a:t>of evidence that results predict </a:t>
-            </a:r>
-            <a:r>
-              <a:rPr lang="en-US" dirty="0" smtClean="0"/>
-              <a:t>reality</a:t>
-            </a:r>
-          </a:p>
-          <a:p>
-            <a:r>
-              <a:rPr lang="en-US" dirty="0" smtClean="0"/>
-              <a:t>No mention of how strategies are selected</a:t>
-            </a:r>
-          </a:p>
-        </p:txBody>
-      </p:sp>
-      <p:sp>
-        <p:nvSpPr>
-          <p:cNvPr id="3" name="Title 2"/>
-          <p:cNvSpPr>
-            <a:spLocks noGrp="1"/>
-          </p:cNvSpPr>
-          <p:nvPr>
-            <p:ph type="title"/>
-          </p:nvPr>
-        </p:nvSpPr>
-        <p:spPr/>
-        <p:txBody>
-          <a:bodyPr/>
-          <a:lstStyle/>
-          <a:p>
-            <a:r>
-              <a:rPr lang="en-US" dirty="0" smtClean="0"/>
-              <a:t>Limitations</a:t>
-            </a:r>
-            <a:endParaRPr lang="en-US" dirty="0"/>
-          </a:p>
-        </p:txBody>
-      </p:sp>
-    </p:spTree>
-    <p:extLst>
-      <p:ext uri="{BB962C8B-B14F-4D97-AF65-F5344CB8AC3E}">
-        <p14:creationId xmlns:p14="http://schemas.microsoft.com/office/powerpoint/2010/main" val="1697217071"/>
-      </p:ext>
-    </p:extLst>
-  </p:cSld>
-  <p:clrMapOvr>
-    <a:masterClrMapping/>
-  </p:clrMapOvr>
-</p:sld>
-</file>
-
 <file path=ppt/slides/slide17.xml><?xml version="1.0" encoding="utf-8"?>
 <p:sld xmlns:a="http://schemas.openxmlformats.org/drawingml/2006/main" xmlns:r="http://schemas.openxmlformats.org/officeDocument/2006/relationships" xmlns:p="http://schemas.openxmlformats.org/presentationml/2006/main">
   <p:cSld>
@@ -8104,6 +8185,145 @@
         </p:nvSpPr>
         <p:spPr/>
         <p:txBody>
+          <a:bodyPr>
+            <a:normAutofit/>
+          </a:bodyPr>
+          <a:lstStyle/>
+          <a:p>
+            <a:r>
+              <a:rPr lang="en-US" dirty="0" smtClean="0"/>
+              <a:t>No reasons for choice of developer strategies</a:t>
+            </a:r>
+          </a:p>
+          <a:p>
+            <a:r>
+              <a:rPr lang="en-US" dirty="0" smtClean="0"/>
+              <a:t>Overly simplistic models for user downloads</a:t>
+            </a:r>
+          </a:p>
+          <a:p>
+            <a:pPr lvl="1"/>
+            <a:r>
+              <a:rPr lang="en-US" dirty="0" smtClean="0"/>
+              <a:t>Wanted </a:t>
+            </a:r>
+            <a:r>
+              <a:rPr lang="en-US" dirty="0" err="1" smtClean="0"/>
+              <a:t>vs</a:t>
+            </a:r>
+            <a:r>
+              <a:rPr lang="en-US" dirty="0" smtClean="0"/>
+              <a:t> unwanted features</a:t>
+            </a:r>
+          </a:p>
+          <a:p>
+            <a:pPr lvl="1"/>
+            <a:r>
+              <a:rPr lang="en-US" dirty="0" smtClean="0"/>
+              <a:t>Feature closeness to desired features</a:t>
+            </a:r>
+          </a:p>
+          <a:p>
+            <a:pPr lvl="1"/>
+            <a:r>
+              <a:rPr lang="en-US" dirty="0" smtClean="0"/>
+              <a:t>App popularity</a:t>
+            </a:r>
+          </a:p>
+          <a:p>
+            <a:pPr lvl="1"/>
+            <a:r>
+              <a:rPr lang="en-US" dirty="0" smtClean="0"/>
+              <a:t>Currently owned apps</a:t>
+            </a:r>
+          </a:p>
+          <a:p>
+            <a:r>
+              <a:rPr lang="en-US" dirty="0" smtClean="0"/>
+              <a:t>Lack </a:t>
+            </a:r>
+            <a:r>
+              <a:rPr lang="en-US" dirty="0"/>
+              <a:t>of evidence that results predict </a:t>
+            </a:r>
+            <a:r>
+              <a:rPr lang="en-US" dirty="0" smtClean="0"/>
+              <a:t>reality</a:t>
+            </a:r>
+          </a:p>
+          <a:p>
+            <a:r>
+              <a:rPr lang="en-US" dirty="0" smtClean="0"/>
+              <a:t>No mention of how strategies are selected</a:t>
+            </a:r>
+          </a:p>
+        </p:txBody>
+      </p:sp>
+      <p:sp>
+        <p:nvSpPr>
+          <p:cNvPr id="3" name="Title 2"/>
+          <p:cNvSpPr>
+            <a:spLocks noGrp="1"/>
+          </p:cNvSpPr>
+          <p:nvPr>
+            <p:ph type="title"/>
+          </p:nvPr>
+        </p:nvSpPr>
+        <p:spPr/>
+        <p:txBody>
+          <a:bodyPr/>
+          <a:lstStyle/>
+          <a:p>
+            <a:r>
+              <a:rPr lang="en-US" dirty="0" smtClean="0"/>
+              <a:t>Limitations</a:t>
+            </a:r>
+            <a:endParaRPr lang="en-US" dirty="0"/>
+          </a:p>
+        </p:txBody>
+      </p:sp>
+    </p:spTree>
+    <p:extLst>
+      <p:ext uri="{BB962C8B-B14F-4D97-AF65-F5344CB8AC3E}">
+        <p14:creationId xmlns:p14="http://schemas.microsoft.com/office/powerpoint/2010/main" val="1697217071"/>
+      </p:ext>
+    </p:extLst>
+  </p:cSld>
+  <p:clrMapOvr>
+    <a:masterClrMapping/>
+  </p:clrMapOvr>
+</p:sld>
+</file>
+
+<file path=ppt/slides/slide18.xml><?xml version="1.0" encoding="utf-8"?>
+<p:sld xmlns:a="http://schemas.openxmlformats.org/drawingml/2006/main" xmlns:r="http://schemas.openxmlformats.org/officeDocument/2006/relationships" xmlns:p="http://schemas.openxmlformats.org/presentationml/2006/main">
+  <p:cSld>
+    <p:spTree>
+      <p:nvGrpSpPr>
+        <p:cNvPr id="1" name=""/>
+        <p:cNvGrpSpPr/>
+        <p:nvPr/>
+      </p:nvGrpSpPr>
+      <p:grpSpPr>
+        <a:xfrm>
+          <a:off x="0" y="0"/>
+          <a:ext cx="0" cy="0"/>
+          <a:chOff x="0" y="0"/>
+          <a:chExt cx="0" cy="0"/>
+        </a:xfrm>
+      </p:grpSpPr>
+      <p:sp>
+        <p:nvSpPr>
+          <p:cNvPr id="2" name="Content Placeholder 1"/>
+          <p:cNvSpPr>
+            <a:spLocks noGrp="1"/>
+          </p:cNvSpPr>
+          <p:nvPr>
+            <p:ph idx="1"/>
+          </p:nvPr>
+        </p:nvSpPr>
+        <p:spPr/>
+        <p:txBody>
           <a:bodyPr/>
           <a:lstStyle/>
           <a:p>
@@ -8179,7 +8399,7 @@
 </p:sld>
 </file>
 
-<file path=ppt/slides/slide18.xml><?xml version="1.0" encoding="utf-8"?>
+<file path=ppt/slides/slide19.xml><?xml version="1.0" encoding="utf-8"?>
 <p:sld xmlns:a="http://schemas.openxmlformats.org/drawingml/2006/main" xmlns:r="http://schemas.openxmlformats.org/officeDocument/2006/relationships" xmlns:p="http://schemas.openxmlformats.org/presentationml/2006/main">
   <p:cSld>
     <p:spTree>
@@ -8267,62 +8487,100 @@
         </p:nvSpPr>
         <p:spPr/>
         <p:txBody>
+          <a:bodyPr>
+            <a:normAutofit/>
+          </a:bodyPr>
+          <a:lstStyle/>
+          <a:p>
+            <a:r>
+              <a:rPr lang="en-US" dirty="0" smtClean="0"/>
+              <a:t>Introduction</a:t>
+            </a:r>
+            <a:endParaRPr lang="en-US" dirty="0" smtClean="0"/>
+          </a:p>
+          <a:p>
+            <a:r>
+              <a:rPr lang="en-US" dirty="0" smtClean="0"/>
+              <a:t>Background</a:t>
+            </a:r>
+            <a:endParaRPr lang="en-US" dirty="0" smtClean="0"/>
+          </a:p>
+          <a:p>
+            <a:r>
+              <a:rPr lang="en-US" dirty="0" smtClean="0"/>
+              <a:t>Model</a:t>
+            </a:r>
+          </a:p>
+          <a:p>
+            <a:pPr lvl="1"/>
+            <a:r>
+              <a:rPr lang="en-US" dirty="0" smtClean="0"/>
+              <a:t>Developers</a:t>
+            </a:r>
+          </a:p>
+          <a:p>
+            <a:pPr lvl="1"/>
+            <a:r>
+              <a:rPr lang="en-US" dirty="0" smtClean="0"/>
+              <a:t>Apps</a:t>
+            </a:r>
+          </a:p>
+          <a:p>
+            <a:pPr lvl="1"/>
+            <a:r>
+              <a:rPr lang="en-US" dirty="0" smtClean="0"/>
+              <a:t>Users</a:t>
+            </a:r>
+            <a:endParaRPr lang="en-US" dirty="0" smtClean="0"/>
+          </a:p>
+          <a:p>
+            <a:r>
+              <a:rPr lang="en-US" dirty="0" smtClean="0"/>
+              <a:t>Algorithm</a:t>
+            </a:r>
+          </a:p>
+          <a:p>
+            <a:r>
+              <a:rPr lang="en-US" dirty="0" smtClean="0"/>
+              <a:t>Results</a:t>
+            </a:r>
+          </a:p>
+          <a:p>
+            <a:r>
+              <a:rPr lang="en-US" dirty="0" smtClean="0"/>
+              <a:t>Limitations</a:t>
+            </a:r>
+          </a:p>
+          <a:p>
+            <a:r>
+              <a:rPr lang="en-US" dirty="0" smtClean="0"/>
+              <a:t>Conclusions</a:t>
+            </a:r>
+            <a:endParaRPr lang="en-US" dirty="0" smtClean="0"/>
+          </a:p>
+          <a:p>
+            <a:endParaRPr lang="en-US" dirty="0"/>
+          </a:p>
+        </p:txBody>
+      </p:sp>
+      <p:sp>
+        <p:nvSpPr>
+          <p:cNvPr id="3" name="Title 2"/>
+          <p:cNvSpPr>
+            <a:spLocks noGrp="1"/>
+          </p:cNvSpPr>
+          <p:nvPr>
+            <p:ph type="title"/>
+          </p:nvPr>
+        </p:nvSpPr>
+        <p:spPr/>
+        <p:txBody>
           <a:bodyPr/>
           <a:lstStyle/>
           <a:p>
-            <a:pPr marL="109728" indent="0" algn="ctr">
-              <a:buNone/>
-            </a:pPr>
-            <a:r>
-              <a:rPr lang="en-US" b="1" dirty="0" smtClean="0"/>
-              <a:t>Problem</a:t>
-            </a:r>
-          </a:p>
-          <a:p>
-            <a:pPr marL="109728" indent="0" algn="ctr">
-              <a:buNone/>
-            </a:pPr>
             <a:r>
               <a:rPr lang="en-US" dirty="0" smtClean="0"/>
-              <a:t>App developers are always competing with each other to get more downloads of their apps.</a:t>
-            </a:r>
-          </a:p>
-          <a:p>
-            <a:pPr marL="109728" indent="0" algn="ctr">
-              <a:buNone/>
-            </a:pPr>
-            <a:endParaRPr lang="en-US" dirty="0" smtClean="0"/>
-          </a:p>
-          <a:p>
-            <a:pPr marL="109728" indent="0" algn="ctr">
-              <a:buNone/>
-            </a:pPr>
-            <a:r>
-              <a:rPr lang="en-US" dirty="0" smtClean="0"/>
-              <a:t>What strategy should app developers use to be successful?</a:t>
-            </a:r>
-            <a:endParaRPr lang="en-US" dirty="0"/>
-          </a:p>
-        </p:txBody>
-      </p:sp>
-      <p:sp>
-        <p:nvSpPr>
-          <p:cNvPr id="3" name="Title 2"/>
-          <p:cNvSpPr>
-            <a:spLocks noGrp="1"/>
-          </p:cNvSpPr>
-          <p:nvPr>
-            <p:ph type="title"/>
-          </p:nvPr>
-        </p:nvSpPr>
-        <p:spPr/>
-        <p:txBody>
-          <a:bodyPr/>
-          <a:lstStyle/>
-          <a:p>
-            <a:r>
-              <a:rPr lang="en-US" dirty="0" smtClean="0"/>
-              <a:t>Introduction</a:t>
+              <a:t>Overview</a:t>
             </a:r>
             <a:endParaRPr lang="en-US" dirty="0"/>
           </a:p>
@@ -8331,7 +8589,7 @@
     </p:spTree>
     <p:extLst>
       <p:ext uri="{BB962C8B-B14F-4D97-AF65-F5344CB8AC3E}">
-        <p14:creationId xmlns:p14="http://schemas.microsoft.com/office/powerpoint/2010/main" val="4035027493"/>
+        <p14:creationId xmlns:p14="http://schemas.microsoft.com/office/powerpoint/2010/main" val="3109426433"/>
       </p:ext>
     </p:extLst>
   </p:cSld>
@@ -8370,6 +8628,109 @@
         </p:nvSpPr>
         <p:spPr/>
         <p:txBody>
+          <a:bodyPr/>
+          <a:lstStyle/>
+          <a:p>
+            <a:pPr marL="109728" indent="0" algn="ctr">
+              <a:buNone/>
+            </a:pPr>
+            <a:r>
+              <a:rPr lang="en-US" b="1" dirty="0" smtClean="0"/>
+              <a:t>Problem</a:t>
+            </a:r>
+          </a:p>
+          <a:p>
+            <a:pPr marL="109728" indent="0" algn="ctr">
+              <a:buNone/>
+            </a:pPr>
+            <a:r>
+              <a:rPr lang="en-US" dirty="0" smtClean="0"/>
+              <a:t>App developers are always competing with each other to get more downloads of their apps.</a:t>
+            </a:r>
+          </a:p>
+          <a:p>
+            <a:pPr marL="109728" indent="0" algn="ctr">
+              <a:buNone/>
+            </a:pPr>
+            <a:endParaRPr lang="en-US" dirty="0" smtClean="0"/>
+          </a:p>
+          <a:p>
+            <a:pPr marL="109728" indent="0" algn="ctr">
+              <a:buNone/>
+            </a:pPr>
+            <a:r>
+              <a:rPr lang="en-US" dirty="0" smtClean="0"/>
+              <a:t>What strategy should app developers use to be successful?</a:t>
+            </a:r>
+            <a:endParaRPr lang="en-US" dirty="0"/>
+          </a:p>
+        </p:txBody>
+      </p:sp>
+      <p:sp>
+        <p:nvSpPr>
+          <p:cNvPr id="3" name="Title 2"/>
+          <p:cNvSpPr>
+            <a:spLocks noGrp="1"/>
+          </p:cNvSpPr>
+          <p:nvPr>
+            <p:ph type="title"/>
+          </p:nvPr>
+        </p:nvSpPr>
+        <p:spPr/>
+        <p:txBody>
+          <a:bodyPr/>
+          <a:lstStyle/>
+          <a:p>
+            <a:r>
+              <a:rPr lang="en-US" dirty="0" smtClean="0"/>
+              <a:t>Introduction</a:t>
+            </a:r>
+            <a:endParaRPr lang="en-US" dirty="0"/>
+          </a:p>
+        </p:txBody>
+      </p:sp>
+    </p:spTree>
+    <p:extLst>
+      <p:ext uri="{BB962C8B-B14F-4D97-AF65-F5344CB8AC3E}">
+        <p14:creationId xmlns:p14="http://schemas.microsoft.com/office/powerpoint/2010/main" val="4035027493"/>
+      </p:ext>
+    </p:extLst>
+  </p:cSld>
+  <p:clrMapOvr>
+    <a:masterClrMapping/>
+  </p:clrMapOvr>
+</p:sld>
+</file>
+
+<file path=ppt/slides/slide4.xml><?xml version="1.0" encoding="utf-8"?>
+<p:sld xmlns:a="http://schemas.openxmlformats.org/drawingml/2006/main" xmlns:r="http://schemas.openxmlformats.org/officeDocument/2006/relationships" xmlns:p="http://schemas.openxmlformats.org/presentationml/2006/main">
+  <p:cSld>
+    <p:spTree>
+      <p:nvGrpSpPr>
+        <p:cNvPr id="1" name=""/>
+        <p:cNvGrpSpPr/>
+        <p:nvPr/>
+      </p:nvGrpSpPr>
+      <p:grpSpPr>
+        <a:xfrm>
+          <a:off x="0" y="0"/>
+          <a:ext cx="0" cy="0"/>
+          <a:chOff x="0" y="0"/>
+          <a:chExt cx="0" cy="0"/>
+        </a:xfrm>
+      </p:grpSpPr>
+      <p:sp>
+        <p:nvSpPr>
+          <p:cNvPr id="2" name="Content Placeholder 1"/>
+          <p:cNvSpPr>
+            <a:spLocks noGrp="1"/>
+          </p:cNvSpPr>
+          <p:nvPr>
+            <p:ph idx="1"/>
+          </p:nvPr>
+        </p:nvSpPr>
+        <p:spPr/>
+        <p:txBody>
           <a:bodyPr>
             <a:normAutofit/>
           </a:bodyPr>
@@ -8455,7 +8816,7 @@
 </p:sld>
 </file>
 
-<file path=ppt/slides/slide4.xml><?xml version="1.0" encoding="utf-8"?>
+<file path=ppt/slides/slide5.xml><?xml version="1.0" encoding="utf-8"?>
 <p:sld xmlns:a="http://schemas.openxmlformats.org/drawingml/2006/main" xmlns:r="http://schemas.openxmlformats.org/officeDocument/2006/relationships" xmlns:p="http://schemas.openxmlformats.org/presentationml/2006/main">
   <p:cSld>
     <p:spTree>
@@ -9074,7 +9435,7 @@
 </p:sld>
 </file>
 
-<file path=ppt/slides/slide5.xml><?xml version="1.0" encoding="utf-8"?>
+<file path=ppt/slides/slide6.xml><?xml version="1.0" encoding="utf-8"?>
 <p:sld xmlns:a="http://schemas.openxmlformats.org/drawingml/2006/main" xmlns:r="http://schemas.openxmlformats.org/officeDocument/2006/relationships" xmlns:p="http://schemas.openxmlformats.org/presentationml/2006/main">
   <p:cSld>
     <p:spTree>
@@ -9206,7 +9567,7 @@
 </p:sld>
 </file>
 
-<file path=ppt/slides/slide6.xml><?xml version="1.0" encoding="utf-8"?>
+<file path=ppt/slides/slide7.xml><?xml version="1.0" encoding="utf-8"?>
 <p:sld xmlns:a="http://schemas.openxmlformats.org/drawingml/2006/main" xmlns:r="http://schemas.openxmlformats.org/officeDocument/2006/relationships" xmlns:p="http://schemas.openxmlformats.org/presentationml/2006/main">
   <p:cSld>
     <p:spTree>
@@ -9420,7 +9781,7 @@
 </p:sld>
 </file>
 
-<file path=ppt/slides/slide7.xml><?xml version="1.0" encoding="utf-8"?>
+<file path=ppt/slides/slide8.xml><?xml version="1.0" encoding="utf-8"?>
 <p:sld xmlns:a="http://schemas.openxmlformats.org/drawingml/2006/main" xmlns:r="http://schemas.openxmlformats.org/officeDocument/2006/relationships" xmlns:p="http://schemas.openxmlformats.org/presentationml/2006/main">
   <p:cSld>
     <p:spTree>
@@ -9582,7 +9943,7 @@
 </p:sld>
 </file>
 
-<file path=ppt/slides/slide8.xml><?xml version="1.0" encoding="utf-8"?>
+<file path=ppt/slides/slide9.xml><?xml version="1.0" encoding="utf-8"?>
 <p:sld xmlns:a="http://schemas.openxmlformats.org/drawingml/2006/main" xmlns:r="http://schemas.openxmlformats.org/officeDocument/2006/relationships" xmlns:p="http://schemas.openxmlformats.org/presentationml/2006/main">
   <p:cSld>
     <p:spTree>
@@ -9772,159 +10133,6 @@
     <p:extLst>
       <p:ext uri="{BB962C8B-B14F-4D97-AF65-F5344CB8AC3E}">
         <p14:creationId xmlns:p14="http://schemas.microsoft.com/office/powerpoint/2010/main" val="1183134247"/>
-      </p:ext>
-    </p:extLst>
-  </p:cSld>
-  <p:clrMapOvr>
-    <a:masterClrMapping/>
-  </p:clrMapOvr>
-</p:sld>
-</file>
-
-<file path=ppt/slides/slide9.xml><?xml version="1.0" encoding="utf-8"?>
-<p:sld xmlns:a="http://schemas.openxmlformats.org/drawingml/2006/main" xmlns:r="http://schemas.openxmlformats.org/officeDocument/2006/relationships" xmlns:p="http://schemas.openxmlformats.org/presentationml/2006/main">
-  <p:cSld>
-    <p:spTree>
-      <p:nvGrpSpPr>
-        <p:cNvPr id="1" name=""/>
-        <p:cNvGrpSpPr/>
-        <p:nvPr/>
-      </p:nvGrpSpPr>
-      <p:grpSpPr>
-        <a:xfrm>
-          <a:off x="0" y="0"/>
-          <a:ext cx="0" cy="0"/>
-          <a:chOff x="0" y="0"/>
-          <a:chExt cx="0" cy="0"/>
-        </a:xfrm>
-      </p:grpSpPr>
-      <p:sp>
-        <p:nvSpPr>
-          <p:cNvPr id="3" name="Title 2"/>
-          <p:cNvSpPr>
-            <a:spLocks noGrp="1"/>
-          </p:cNvSpPr>
-          <p:nvPr>
-            <p:ph type="title"/>
-          </p:nvPr>
-        </p:nvSpPr>
-        <p:spPr/>
-        <p:txBody>
-          <a:bodyPr/>
-          <a:lstStyle/>
-          <a:p>
-            <a:r>
-              <a:rPr lang="en-US" dirty="0" smtClean="0"/>
-              <a:t>Algorithm</a:t>
-            </a:r>
-            <a:endParaRPr lang="en-US" dirty="0"/>
-          </a:p>
-        </p:txBody>
-      </p:sp>
-      <p:sp>
-        <p:nvSpPr>
-          <p:cNvPr id="4" name="Content Placeholder 3"/>
-          <p:cNvSpPr>
-            <a:spLocks noGrp="1"/>
-          </p:cNvSpPr>
-          <p:nvPr>
-            <p:ph idx="1"/>
-          </p:nvPr>
-        </p:nvSpPr>
-        <p:spPr/>
-        <p:txBody>
-          <a:bodyPr/>
-          <a:lstStyle/>
-          <a:p>
-            <a:r>
-              <a:rPr lang="en-US" dirty="0" smtClean="0"/>
-              <a:t>Initial parameters set up to mimic </a:t>
-            </a:r>
-            <a:r>
-              <a:rPr lang="en-US" dirty="0" err="1" smtClean="0"/>
-              <a:t>iOS</a:t>
-            </a:r>
-            <a:r>
-              <a:rPr lang="en-US" dirty="0" smtClean="0"/>
-              <a:t> app store in July 2008, simulated to June 2011</a:t>
-            </a:r>
-          </a:p>
-          <a:p>
-            <a:pPr marL="109728" indent="0">
-              <a:buNone/>
-            </a:pPr>
-            <a:endParaRPr lang="en-US" dirty="0"/>
-          </a:p>
-        </p:txBody>
-      </p:sp>
-      <p:pic>
-        <p:nvPicPr>
-          <p:cNvPr id="2052" name="Picture 4"/>
-          <p:cNvPicPr>
-            <a:picLocks noChangeAspect="1" noChangeArrowheads="1"/>
-          </p:cNvPicPr>
-          <p:nvPr/>
-        </p:nvPicPr>
-        <p:blipFill>
-          <a:blip r:embed="rId2">
-            <a:extLst>
-              <a:ext uri="{28A0092B-C50C-407E-A947-70E740481C1C}">
-                <a14:useLocalDpi xmlns:a14="http://schemas.microsoft.com/office/drawing/2010/main" val="0"/>
-              </a:ext>
-            </a:extLst>
-          </a:blip>
-          <a:srcRect/>
-          <a:stretch>
-            <a:fillRect/>
-          </a:stretch>
-        </p:blipFill>
-        <p:spPr bwMode="auto">
-          <a:xfrm>
-            <a:off x="1348154" y="2500313"/>
-            <a:ext cx="6388587" cy="2147887"/>
-          </a:xfrm>
-          <a:prstGeom prst="rect">
-            <a:avLst/>
-          </a:prstGeom>
-          <a:noFill/>
-          <a:ln>
-            <a:noFill/>
-          </a:ln>
-          <a:effectLst/>
-          <a:extLst>
-            <a:ext uri="{909E8E84-426E-40DD-AFC4-6F175D3DCCD1}">
-              <a14:hiddenFill xmlns:a14="http://schemas.microsoft.com/office/drawing/2010/main">
-                <a:solidFill>
-                  <a:schemeClr val="accent1"/>
-                </a:solidFill>
-              </a14:hiddenFill>
-            </a:ext>
-            <a:ext uri="{91240B29-F687-4F45-9708-019B960494DF}">
-              <a14:hiddenLine xmlns:a14="http://schemas.microsoft.com/office/drawing/2010/main" w="9525">
-                <a:solidFill>
-                  <a:schemeClr val="tx1"/>
-                </a:solidFill>
-                <a:miter lim="800000"/>
-                <a:headEnd/>
-                <a:tailEnd/>
-              </a14:hiddenLine>
-            </a:ext>
-            <a:ext uri="{AF507438-7753-43E0-B8FC-AC1667EBCBE1}">
-              <a14:hiddenEffects xmlns:a14="http://schemas.microsoft.com/office/drawing/2010/main">
-                <a:effectLst>
-                  <a:outerShdw dist="35921" dir="2700000" algn="ctr" rotWithShape="0">
-                    <a:schemeClr val="bg2"/>
-                  </a:outerShdw>
-                </a:effectLst>
-              </a14:hiddenEffects>
-            </a:ext>
-          </a:extLst>
-        </p:spPr>
-      </p:pic>
-    </p:spTree>
-    <p:extLst>
-      <p:ext uri="{BB962C8B-B14F-4D97-AF65-F5344CB8AC3E}">
-        <p14:creationId xmlns:p14="http://schemas.microsoft.com/office/powerpoint/2010/main" val="1154494063"/>
       </p:ext>
     </p:extLst>
   </p:cSld>

</xml_diff>

<commit_message>
added GECCO year to PP
</commit_message>
<xml_diff>
--- a/paper/848_Paper_Presentation_Fasburg_Thomas.pptx
+++ b/paper/848_Paper_Presentation_Fasburg_Thomas.pptx
@@ -7,6 +7,9 @@
   <p:notesMasterIdLst>
     <p:notesMasterId r:id="rId23"/>
   </p:notesMasterIdLst>
+  <p:handoutMasterIdLst>
+    <p:handoutMasterId r:id="rId24"/>
+  </p:handoutMasterIdLst>
   <p:sldIdLst>
     <p:sldId id="256" r:id="rId2"/>
     <p:sldId id="291" r:id="rId3"/>
@@ -31,7 +34,7 @@
     <p:sldId id="292" r:id="rId22"/>
   </p:sldIdLst>
   <p:sldSz cx="9144000" cy="6858000" type="screen4x3"/>
-  <p:notesSz cx="6858000" cy="9144000"/>
+  <p:notesSz cx="9144000" cy="6858000"/>
   <p:defaultTextStyle>
     <a:defPPr>
       <a:defRPr lang="en-US"/>
@@ -129,7 +132,7 @@
   </p:defaultTextStyle>
   <p:extLst>
     <p:ext uri="{EFAFB233-063F-42B5-8137-9DF3F51BA10A}">
-      <p15:sldGuideLst xmlns:p15="http://schemas.microsoft.com/office/powerpoint/2012/main" xmlns="">
+      <p15:sldGuideLst xmlns="" xmlns:p15="http://schemas.microsoft.com/office/powerpoint/2012/main">
         <p15:guide id="1" orient="horz" pos="2160">
           <p15:clr>
             <a:srgbClr val="A4A3A4"/>
@@ -144,6 +147,171 @@
     </p:ext>
   </p:extLst>
 </p:presentation>
+</file>
+
+<file path=ppt/handoutMasters/handoutMaster1.xml><?xml version="1.0" encoding="utf-8"?>
+<p:handoutMaster xmlns:a="http://schemas.openxmlformats.org/drawingml/2006/main" xmlns:r="http://schemas.openxmlformats.org/officeDocument/2006/relationships" xmlns:p="http://schemas.openxmlformats.org/presentationml/2006/main">
+  <p:cSld>
+    <p:bg>
+      <p:bgRef idx="1001">
+        <a:schemeClr val="bg1"/>
+      </p:bgRef>
+    </p:bg>
+    <p:spTree>
+      <p:nvGrpSpPr>
+        <p:cNvPr id="1" name=""/>
+        <p:cNvGrpSpPr/>
+        <p:nvPr/>
+      </p:nvGrpSpPr>
+      <p:grpSpPr>
+        <a:xfrm>
+          <a:off x="0" y="0"/>
+          <a:ext cx="0" cy="0"/>
+          <a:chOff x="0" y="0"/>
+          <a:chExt cx="0" cy="0"/>
+        </a:xfrm>
+      </p:grpSpPr>
+      <p:sp>
+        <p:nvSpPr>
+          <p:cNvPr id="2" name="Header Placeholder 1"/>
+          <p:cNvSpPr>
+            <a:spLocks noGrp="1"/>
+          </p:cNvSpPr>
+          <p:nvPr>
+            <p:ph type="hdr" sz="quarter"/>
+          </p:nvPr>
+        </p:nvSpPr>
+        <p:spPr>
+          <a:xfrm>
+            <a:off x="0" y="0"/>
+            <a:ext cx="3962400" cy="342900"/>
+          </a:xfrm>
+          <a:prstGeom prst="rect">
+            <a:avLst/>
+          </a:prstGeom>
+        </p:spPr>
+        <p:txBody>
+          <a:bodyPr vert="horz" lIns="91440" tIns="45720" rIns="91440" bIns="45720" rtlCol="0"/>
+          <a:lstStyle>
+            <a:lvl1pPr algn="l">
+              <a:defRPr sz="1200"/>
+            </a:lvl1pPr>
+          </a:lstStyle>
+          <a:p>
+            <a:endParaRPr lang="en-US"/>
+          </a:p>
+        </p:txBody>
+      </p:sp>
+      <p:sp>
+        <p:nvSpPr>
+          <p:cNvPr id="3" name="Date Placeholder 2"/>
+          <p:cNvSpPr>
+            <a:spLocks noGrp="1"/>
+          </p:cNvSpPr>
+          <p:nvPr>
+            <p:ph type="dt" sz="quarter" idx="1"/>
+          </p:nvPr>
+        </p:nvSpPr>
+        <p:spPr>
+          <a:xfrm>
+            <a:off x="5179484" y="0"/>
+            <a:ext cx="3962400" cy="342900"/>
+          </a:xfrm>
+          <a:prstGeom prst="rect">
+            <a:avLst/>
+          </a:prstGeom>
+        </p:spPr>
+        <p:txBody>
+          <a:bodyPr vert="horz" lIns="91440" tIns="45720" rIns="91440" bIns="45720" rtlCol="0"/>
+          <a:lstStyle>
+            <a:lvl1pPr algn="r">
+              <a:defRPr sz="1200"/>
+            </a:lvl1pPr>
+          </a:lstStyle>
+          <a:p>
+            <a:fld id="{95D363F8-FFE5-4BF3-A041-C591F6C11BBD}" type="datetimeFigureOut">
+              <a:rPr lang="en-US" smtClean="0"/>
+              <a:t>11/23/2015</a:t>
+            </a:fld>
+            <a:endParaRPr lang="en-US"/>
+          </a:p>
+        </p:txBody>
+      </p:sp>
+      <p:sp>
+        <p:nvSpPr>
+          <p:cNvPr id="4" name="Footer Placeholder 3"/>
+          <p:cNvSpPr>
+            <a:spLocks noGrp="1"/>
+          </p:cNvSpPr>
+          <p:nvPr>
+            <p:ph type="ftr" sz="quarter" idx="2"/>
+          </p:nvPr>
+        </p:nvSpPr>
+        <p:spPr>
+          <a:xfrm>
+            <a:off x="0" y="6513910"/>
+            <a:ext cx="3962400" cy="342900"/>
+          </a:xfrm>
+          <a:prstGeom prst="rect">
+            <a:avLst/>
+          </a:prstGeom>
+        </p:spPr>
+        <p:txBody>
+          <a:bodyPr vert="horz" lIns="91440" tIns="45720" rIns="91440" bIns="45720" rtlCol="0" anchor="b"/>
+          <a:lstStyle>
+            <a:lvl1pPr algn="l">
+              <a:defRPr sz="1200"/>
+            </a:lvl1pPr>
+          </a:lstStyle>
+          <a:p>
+            <a:endParaRPr lang="en-US"/>
+          </a:p>
+        </p:txBody>
+      </p:sp>
+      <p:sp>
+        <p:nvSpPr>
+          <p:cNvPr id="5" name="Slide Number Placeholder 4"/>
+          <p:cNvSpPr>
+            <a:spLocks noGrp="1"/>
+          </p:cNvSpPr>
+          <p:nvPr>
+            <p:ph type="sldNum" sz="quarter" idx="3"/>
+          </p:nvPr>
+        </p:nvSpPr>
+        <p:spPr>
+          <a:xfrm>
+            <a:off x="5179484" y="6513910"/>
+            <a:ext cx="3962400" cy="342900"/>
+          </a:xfrm>
+          <a:prstGeom prst="rect">
+            <a:avLst/>
+          </a:prstGeom>
+        </p:spPr>
+        <p:txBody>
+          <a:bodyPr vert="horz" lIns="91440" tIns="45720" rIns="91440" bIns="45720" rtlCol="0" anchor="b"/>
+          <a:lstStyle>
+            <a:lvl1pPr algn="r">
+              <a:defRPr sz="1200"/>
+            </a:lvl1pPr>
+          </a:lstStyle>
+          <a:p>
+            <a:fld id="{152C74A5-2FBC-4B2A-BF83-5BA8E7E77734}" type="slidenum">
+              <a:rPr lang="en-US" smtClean="0"/>
+              <a:t>‹#›</a:t>
+            </a:fld>
+            <a:endParaRPr lang="en-US"/>
+          </a:p>
+        </p:txBody>
+      </p:sp>
+    </p:spTree>
+    <p:extLst>
+      <p:ext uri="{BB962C8B-B14F-4D97-AF65-F5344CB8AC3E}">
+        <p14:creationId xmlns:p14="http://schemas.microsoft.com/office/powerpoint/2010/main" val="930481603"/>
+      </p:ext>
+    </p:extLst>
+  </p:cSld>
+  <p:clrMap bg1="lt1" tx1="dk1" bg2="lt2" tx2="dk2" accent1="accent1" accent2="accent2" accent3="accent3" accent4="accent4" accent5="accent5" accent6="accent6" hlink="hlink" folHlink="folHlink"/>
+</p:handoutMaster>
 </file>
 
 <file path=ppt/notesMasters/notesMaster1.xml><?xml version="1.0" encoding="utf-8"?>
@@ -181,7 +349,7 @@
         <p:spPr>
           <a:xfrm>
             <a:off x="0" y="0"/>
-            <a:ext cx="2971800" cy="457200"/>
+            <a:ext cx="3962400" cy="342900"/>
           </a:xfrm>
           <a:prstGeom prst="rect">
             <a:avLst/>
@@ -211,8 +379,8 @@
         </p:nvSpPr>
         <p:spPr>
           <a:xfrm>
-            <a:off x="3884613" y="0"/>
-            <a:ext cx="2971800" cy="457200"/>
+            <a:off x="5179484" y="0"/>
+            <a:ext cx="3962400" cy="342900"/>
           </a:xfrm>
           <a:prstGeom prst="rect">
             <a:avLst/>
@@ -228,7 +396,7 @@
           <a:p>
             <a:fld id="{A63B8CFC-D614-4432-A7DB-A65856E85B43}" type="datetimeFigureOut">
               <a:rPr lang="en-US" smtClean="0"/>
-              <a:t>11/22/2015</a:t>
+              <a:t>11/23/2015</a:t>
             </a:fld>
             <a:endParaRPr lang="en-US" dirty="0"/>
           </a:p>
@@ -246,8 +414,8 @@
         </p:nvSpPr>
         <p:spPr>
           <a:xfrm>
-            <a:off x="1143000" y="685800"/>
-            <a:ext cx="4572000" cy="3429000"/>
+            <a:off x="2857500" y="514350"/>
+            <a:ext cx="3429000" cy="2571750"/>
           </a:xfrm>
           <a:prstGeom prst="rect">
             <a:avLst/>
@@ -279,8 +447,8 @@
         </p:nvSpPr>
         <p:spPr>
           <a:xfrm>
-            <a:off x="685800" y="4343400"/>
-            <a:ext cx="5486400" cy="4114800"/>
+            <a:off x="914400" y="3257550"/>
+            <a:ext cx="7315200" cy="3086100"/>
           </a:xfrm>
           <a:prstGeom prst="rect">
             <a:avLst/>
@@ -339,8 +507,8 @@
         </p:nvSpPr>
         <p:spPr>
           <a:xfrm>
-            <a:off x="0" y="8685213"/>
-            <a:ext cx="2971800" cy="457200"/>
+            <a:off x="0" y="6513910"/>
+            <a:ext cx="3962400" cy="342900"/>
           </a:xfrm>
           <a:prstGeom prst="rect">
             <a:avLst/>
@@ -370,8 +538,8 @@
         </p:nvSpPr>
         <p:spPr>
           <a:xfrm>
-            <a:off x="3884613" y="8685213"/>
-            <a:ext cx="2971800" cy="457200"/>
+            <a:off x="5179484" y="6513910"/>
+            <a:ext cx="3962400" cy="342900"/>
           </a:xfrm>
           <a:prstGeom prst="rect">
             <a:avLst/>
@@ -3025,7 +3193,7 @@
           <a:p>
             <a:fld id="{ADE5661A-BDAA-4579-B2F5-AA9011776D83}" type="datetimeFigureOut">
               <a:rPr lang="en-US" smtClean="0"/>
-              <a:t>11/22/2015</a:t>
+              <a:t>11/23/2015</a:t>
             </a:fld>
             <a:endParaRPr lang="en-US" dirty="0"/>
           </a:p>
@@ -3223,7 +3391,7 @@
             <a:fld id="{1D8BD707-D9CF-40AE-B4C6-C98DA3205C09}" type="datetimeFigureOut">
               <a:rPr lang="en-US" smtClean="0"/>
               <a:pPr/>
-              <a:t>11/22/2015</a:t>
+              <a:t>11/23/2015</a:t>
             </a:fld>
             <a:endParaRPr lang="en-US" dirty="0"/>
           </a:p>
@@ -3410,7 +3578,7 @@
             <a:fld id="{1D8BD707-D9CF-40AE-B4C6-C98DA3205C09}" type="datetimeFigureOut">
               <a:rPr lang="en-US" smtClean="0"/>
               <a:pPr/>
-              <a:t>11/22/2015</a:t>
+              <a:t>11/23/2015</a:t>
             </a:fld>
             <a:endParaRPr lang="en-US" dirty="0"/>
           </a:p>
@@ -3562,7 +3730,7 @@
             <a:fld id="{1D8BD707-D9CF-40AE-B4C6-C98DA3205C09}" type="datetimeFigureOut">
               <a:rPr lang="en-US" smtClean="0"/>
               <a:pPr/>
-              <a:t>11/22/2015</a:t>
+              <a:t>11/23/2015</a:t>
             </a:fld>
             <a:endParaRPr lang="en-US" dirty="0"/>
           </a:p>
@@ -3818,7 +3986,7 @@
           <a:p>
             <a:fld id="{7D698992-9F5B-4E9D-871D-4517B2EC8643}" type="datetimeFigureOut">
               <a:rPr lang="en-US" smtClean="0"/>
-              <a:t>11/22/2015</a:t>
+              <a:t>11/23/2015</a:t>
             </a:fld>
             <a:endParaRPr lang="en-US" dirty="0"/>
           </a:p>
@@ -4228,7 +4396,7 @@
             <a:fld id="{1D8BD707-D9CF-40AE-B4C6-C98DA3205C09}" type="datetimeFigureOut">
               <a:rPr lang="en-US" smtClean="0"/>
               <a:pPr/>
-              <a:t>11/22/2015</a:t>
+              <a:t>11/23/2015</a:t>
             </a:fld>
             <a:endParaRPr lang="en-US" dirty="0"/>
           </a:p>
@@ -4676,7 +4844,7 @@
             <a:fld id="{1D8BD707-D9CF-40AE-B4C6-C98DA3205C09}" type="datetimeFigureOut">
               <a:rPr lang="en-US" smtClean="0"/>
               <a:pPr/>
-              <a:t>11/22/2015</a:t>
+              <a:t>11/23/2015</a:t>
             </a:fld>
             <a:endParaRPr lang="en-US" dirty="0"/>
           </a:p>
@@ -4779,7 +4947,7 @@
             <a:fld id="{1D8BD707-D9CF-40AE-B4C6-C98DA3205C09}" type="datetimeFigureOut">
               <a:rPr lang="en-US" smtClean="0"/>
               <a:pPr/>
-              <a:t>11/22/2015</a:t>
+              <a:t>11/23/2015</a:t>
             </a:fld>
             <a:endParaRPr lang="en-US" dirty="0"/>
           </a:p>
@@ -4902,7 +5070,7 @@
             <a:fld id="{1D8BD707-D9CF-40AE-B4C6-C98DA3205C09}" type="datetimeFigureOut">
               <a:rPr lang="en-US" smtClean="0"/>
               <a:pPr/>
-              <a:t>11/22/2015</a:t>
+              <a:t>11/23/2015</a:t>
             </a:fld>
             <a:endParaRPr lang="en-US" dirty="0"/>
           </a:p>
@@ -5178,7 +5346,7 @@
             <a:fld id="{1D8BD707-D9CF-40AE-B4C6-C98DA3205C09}" type="datetimeFigureOut">
               <a:rPr lang="en-US" smtClean="0"/>
               <a:pPr/>
-              <a:t>11/22/2015</a:t>
+              <a:t>11/23/2015</a:t>
             </a:fld>
             <a:endParaRPr lang="en-US" dirty="0"/>
           </a:p>
@@ -5385,7 +5553,7 @@
             <a:fld id="{1D8BD707-D9CF-40AE-B4C6-C98DA3205C09}" type="datetimeFigureOut">
               <a:rPr lang="en-US" smtClean="0"/>
               <a:pPr/>
-              <a:t>11/22/2015</a:t>
+              <a:t>11/23/2015</a:t>
             </a:fld>
             <a:endParaRPr lang="en-US" dirty="0"/>
           </a:p>
@@ -6496,7 +6664,7 @@
             <a:fld id="{1D8BD707-D9CF-40AE-B4C6-C98DA3205C09}" type="datetimeFigureOut">
               <a:rPr lang="en-US" smtClean="0"/>
               <a:pPr/>
-              <a:t>11/22/2015</a:t>
+              <a:t>11/23/2015</a:t>
             </a:fld>
             <a:endParaRPr lang="en-US" dirty="0"/>
           </a:p>
@@ -6953,7 +7121,7 @@
         </p:nvSpPr>
         <p:spPr>
           <a:xfrm>
-            <a:off x="685800" y="3203575"/>
+            <a:off x="685800" y="3508374"/>
             <a:ext cx="7772400" cy="1520826"/>
           </a:xfrm>
         </p:spPr>
@@ -7114,6 +7282,207 @@
           </a:extLst>
         </p:spPr>
       </p:pic>
+      <p:sp>
+        <p:nvSpPr>
+          <p:cNvPr id="7" name="Subtitle 2"/>
+          <p:cNvSpPr txBox="1">
+            <a:spLocks/>
+          </p:cNvSpPr>
+          <p:nvPr/>
+        </p:nvSpPr>
+        <p:spPr>
+          <a:xfrm>
+            <a:off x="685800" y="2646114"/>
+            <a:ext cx="1758206" cy="401886"/>
+          </a:xfrm>
+          <a:prstGeom prst="rect">
+            <a:avLst/>
+          </a:prstGeom>
+        </p:spPr>
+        <p:txBody>
+          <a:bodyPr vert="horz" lIns="45720" rIns="45720">
+            <a:normAutofit/>
+          </a:bodyPr>
+          <a:lstStyle>
+            <a:lvl1pPr marL="0" marR="64008" indent="0" algn="r" rtl="0" eaLnBrk="1" latinLnBrk="0" hangingPunct="1">
+              <a:spcBef>
+                <a:spcPts val="400"/>
+              </a:spcBef>
+              <a:spcAft>
+                <a:spcPts val="0"/>
+              </a:spcAft>
+              <a:buClr>
+                <a:schemeClr val="accent1"/>
+              </a:buClr>
+              <a:buSzPct val="68000"/>
+              <a:buFont typeface="Wingdings 3"/>
+              <a:buNone/>
+              <a:defRPr kumimoji="0" sz="2700" kern="1200">
+                <a:solidFill>
+                  <a:schemeClr val="tx2"/>
+                </a:solidFill>
+                <a:latin typeface="+mn-lt"/>
+                <a:ea typeface="+mn-ea"/>
+                <a:cs typeface="+mn-cs"/>
+              </a:defRPr>
+            </a:lvl1pPr>
+            <a:lvl2pPr marL="457200" indent="0" algn="ctr" rtl="0" eaLnBrk="1" latinLnBrk="0" hangingPunct="1">
+              <a:spcBef>
+                <a:spcPts val="324"/>
+              </a:spcBef>
+              <a:buClr>
+                <a:schemeClr val="accent1"/>
+              </a:buClr>
+              <a:buFont typeface="Verdana"/>
+              <a:buNone/>
+              <a:defRPr kumimoji="0" sz="2300" kern="1200">
+                <a:solidFill>
+                  <a:schemeClr val="tx1"/>
+                </a:solidFill>
+                <a:latin typeface="+mn-lt"/>
+                <a:ea typeface="+mn-ea"/>
+                <a:cs typeface="+mn-cs"/>
+              </a:defRPr>
+            </a:lvl2pPr>
+            <a:lvl3pPr marL="914400" indent="0" algn="ctr" rtl="0" eaLnBrk="1" latinLnBrk="0" hangingPunct="1">
+              <a:spcBef>
+                <a:spcPts val="350"/>
+              </a:spcBef>
+              <a:buClr>
+                <a:schemeClr val="accent2"/>
+              </a:buClr>
+              <a:buSzPct val="100000"/>
+              <a:buFont typeface="Wingdings 2"/>
+              <a:buNone/>
+              <a:defRPr kumimoji="0" sz="2100" kern="1200">
+                <a:solidFill>
+                  <a:schemeClr val="tx1"/>
+                </a:solidFill>
+                <a:latin typeface="+mn-lt"/>
+                <a:ea typeface="+mn-ea"/>
+                <a:cs typeface="+mn-cs"/>
+              </a:defRPr>
+            </a:lvl3pPr>
+            <a:lvl4pPr marL="1371600" indent="0" algn="ctr" rtl="0" eaLnBrk="1" latinLnBrk="0" hangingPunct="1">
+              <a:spcBef>
+                <a:spcPts val="350"/>
+              </a:spcBef>
+              <a:buClr>
+                <a:schemeClr val="accent2"/>
+              </a:buClr>
+              <a:buFont typeface="Wingdings 2"/>
+              <a:buNone/>
+              <a:defRPr kumimoji="0" sz="1900" kern="1200">
+                <a:solidFill>
+                  <a:schemeClr val="tx1"/>
+                </a:solidFill>
+                <a:latin typeface="+mn-lt"/>
+                <a:ea typeface="+mn-ea"/>
+                <a:cs typeface="+mn-cs"/>
+              </a:defRPr>
+            </a:lvl4pPr>
+            <a:lvl5pPr marL="1828800" indent="0" algn="ctr" rtl="0" eaLnBrk="1" latinLnBrk="0" hangingPunct="1">
+              <a:spcBef>
+                <a:spcPts val="350"/>
+              </a:spcBef>
+              <a:buClr>
+                <a:schemeClr val="accent2"/>
+              </a:buClr>
+              <a:buFont typeface="Wingdings 2"/>
+              <a:buNone/>
+              <a:defRPr kumimoji="0" sz="1800" kern="1200">
+                <a:solidFill>
+                  <a:schemeClr val="tx1"/>
+                </a:solidFill>
+                <a:latin typeface="+mn-lt"/>
+                <a:ea typeface="+mn-ea"/>
+                <a:cs typeface="+mn-cs"/>
+              </a:defRPr>
+            </a:lvl5pPr>
+            <a:lvl6pPr marL="2286000" indent="0" algn="ctr" rtl="0" eaLnBrk="1" latinLnBrk="0" hangingPunct="1">
+              <a:spcBef>
+                <a:spcPts val="350"/>
+              </a:spcBef>
+              <a:buClr>
+                <a:schemeClr val="accent3"/>
+              </a:buClr>
+              <a:buFont typeface="Wingdings 2"/>
+              <a:buNone/>
+              <a:defRPr kumimoji="0" sz="1800" kern="1200">
+                <a:solidFill>
+                  <a:schemeClr val="tx1"/>
+                </a:solidFill>
+                <a:latin typeface="+mn-lt"/>
+                <a:ea typeface="+mn-ea"/>
+                <a:cs typeface="+mn-cs"/>
+              </a:defRPr>
+            </a:lvl6pPr>
+            <a:lvl7pPr marL="2743200" indent="0" algn="ctr" rtl="0" eaLnBrk="1" latinLnBrk="0" hangingPunct="1">
+              <a:spcBef>
+                <a:spcPts val="350"/>
+              </a:spcBef>
+              <a:buClr>
+                <a:schemeClr val="accent3"/>
+              </a:buClr>
+              <a:buFont typeface="Wingdings 2"/>
+              <a:buNone/>
+              <a:defRPr kumimoji="0" sz="1600" kern="1200">
+                <a:solidFill>
+                  <a:schemeClr val="tx1"/>
+                </a:solidFill>
+                <a:latin typeface="+mn-lt"/>
+                <a:ea typeface="+mn-ea"/>
+                <a:cs typeface="+mn-cs"/>
+              </a:defRPr>
+            </a:lvl7pPr>
+            <a:lvl8pPr marL="3200400" indent="0" algn="ctr" rtl="0" eaLnBrk="1" latinLnBrk="0" hangingPunct="1">
+              <a:spcBef>
+                <a:spcPts val="350"/>
+              </a:spcBef>
+              <a:buClr>
+                <a:schemeClr val="accent3"/>
+              </a:buClr>
+              <a:buFont typeface="Wingdings 2"/>
+              <a:buNone/>
+              <a:defRPr kumimoji="0" sz="1600" kern="1200">
+                <a:solidFill>
+                  <a:schemeClr val="tx1"/>
+                </a:solidFill>
+                <a:latin typeface="+mn-lt"/>
+                <a:ea typeface="+mn-ea"/>
+                <a:cs typeface="+mn-cs"/>
+              </a:defRPr>
+            </a:lvl8pPr>
+            <a:lvl9pPr marL="3657600" indent="0" algn="ctr" rtl="0" eaLnBrk="1" latinLnBrk="0" hangingPunct="1">
+              <a:spcBef>
+                <a:spcPts val="350"/>
+              </a:spcBef>
+              <a:buClr>
+                <a:schemeClr val="accent3"/>
+              </a:buClr>
+              <a:buFont typeface="Wingdings 2"/>
+              <a:buNone/>
+              <a:defRPr kumimoji="0" sz="1600" kern="1200" baseline="0">
+                <a:solidFill>
+                  <a:schemeClr val="tx1"/>
+                </a:solidFill>
+                <a:latin typeface="+mn-lt"/>
+                <a:ea typeface="+mn-ea"/>
+                <a:cs typeface="+mn-cs"/>
+              </a:defRPr>
+            </a:lvl9pPr>
+            <a:extLst/>
+          </a:lstStyle>
+          <a:p>
+            <a:pPr algn="l"/>
+            <a:r>
+              <a:rPr lang="en-US" sz="2000" dirty="0" smtClean="0"/>
+              <a:t>GECCO 2012</a:t>
+            </a:r>
+            <a:endParaRPr lang="en-US" sz="2000" dirty="0"/>
+          </a:p>
+        </p:txBody>
+      </p:sp>
     </p:spTree>
     <p:extLst>
       <p:ext uri="{BB962C8B-B14F-4D97-AF65-F5344CB8AC3E}">
@@ -11983,4 +12352,289 @@
   <a:objectDefaults/>
   <a:extraClrSchemeLst/>
 </a:theme>
+</file>
+
+<file path=ppt/theme/theme3.xml><?xml version="1.0" encoding="utf-8"?>
+<a:theme xmlns:a="http://schemas.openxmlformats.org/drawingml/2006/main" name="Office Theme">
+  <a:themeElements>
+    <a:clrScheme name="Office">
+      <a:dk1>
+        <a:sysClr val="windowText" lastClr="000000"/>
+      </a:dk1>
+      <a:lt1>
+        <a:sysClr val="window" lastClr="FFFFFF"/>
+      </a:lt1>
+      <a:dk2>
+        <a:srgbClr val="1F497D"/>
+      </a:dk2>
+      <a:lt2>
+        <a:srgbClr val="EEECE1"/>
+      </a:lt2>
+      <a:accent1>
+        <a:srgbClr val="4F81BD"/>
+      </a:accent1>
+      <a:accent2>
+        <a:srgbClr val="C0504D"/>
+      </a:accent2>
+      <a:accent3>
+        <a:srgbClr val="9BBB59"/>
+      </a:accent3>
+      <a:accent4>
+        <a:srgbClr val="8064A2"/>
+      </a:accent4>
+      <a:accent5>
+        <a:srgbClr val="4BACC6"/>
+      </a:accent5>
+      <a:accent6>
+        <a:srgbClr val="F79646"/>
+      </a:accent6>
+      <a:hlink>
+        <a:srgbClr val="0000FF"/>
+      </a:hlink>
+      <a:folHlink>
+        <a:srgbClr val="800080"/>
+      </a:folHlink>
+    </a:clrScheme>
+    <a:fontScheme name="Office">
+      <a:majorFont>
+        <a:latin typeface="Calibri"/>
+        <a:ea typeface=""/>
+        <a:cs typeface=""/>
+        <a:font script="Jpan" typeface="ＭＳ Ｐゴシック"/>
+        <a:font script="Hang" typeface="맑은 고딕"/>
+        <a:font script="Hans" typeface="宋体"/>
+        <a:font script="Hant" typeface="新細明體"/>
+        <a:font script="Arab" typeface="Times New Roman"/>
+        <a:font script="Hebr" typeface="Times New Roman"/>
+        <a:font script="Thai" typeface="Angsana New"/>
+        <a:font script="Ethi" typeface="Nyala"/>
+        <a:font script="Beng" typeface="Vrinda"/>
+        <a:font script="Gujr" typeface="Shruti"/>
+        <a:font script="Khmr" typeface="MoolBoran"/>
+        <a:font script="Knda" typeface="Tunga"/>
+        <a:font script="Guru" typeface="Raavi"/>
+        <a:font script="Cans" typeface="Euphemia"/>
+        <a:font script="Cher" typeface="Plantagenet Cherokee"/>
+        <a:font script="Yiii" typeface="Microsoft Yi Baiti"/>
+        <a:font script="Tibt" typeface="Microsoft Himalaya"/>
+        <a:font script="Thaa" typeface="MV Boli"/>
+        <a:font script="Deva" typeface="Mangal"/>
+        <a:font script="Telu" typeface="Gautami"/>
+        <a:font script="Taml" typeface="Latha"/>
+        <a:font script="Syrc" typeface="Estrangelo Edessa"/>
+        <a:font script="Orya" typeface="Kalinga"/>
+        <a:font script="Mlym" typeface="Kartika"/>
+        <a:font script="Laoo" typeface="DokChampa"/>
+        <a:font script="Sinh" typeface="Iskoola Pota"/>
+        <a:font script="Mong" typeface="Mongolian Baiti"/>
+        <a:font script="Viet" typeface="Times New Roman"/>
+        <a:font script="Uigh" typeface="Microsoft Uighur"/>
+        <a:font script="Geor" typeface="Sylfaen"/>
+      </a:majorFont>
+      <a:minorFont>
+        <a:latin typeface="Calibri"/>
+        <a:ea typeface=""/>
+        <a:cs typeface=""/>
+        <a:font script="Jpan" typeface="ＭＳ Ｐゴシック"/>
+        <a:font script="Hang" typeface="맑은 고딕"/>
+        <a:font script="Hans" typeface="宋体"/>
+        <a:font script="Hant" typeface="新細明體"/>
+        <a:font script="Arab" typeface="Arial"/>
+        <a:font script="Hebr" typeface="Arial"/>
+        <a:font script="Thai" typeface="Cordia New"/>
+        <a:font script="Ethi" typeface="Nyala"/>
+        <a:font script="Beng" typeface="Vrinda"/>
+        <a:font script="Gujr" typeface="Shruti"/>
+        <a:font script="Khmr" typeface="DaunPenh"/>
+        <a:font script="Knda" typeface="Tunga"/>
+        <a:font script="Guru" typeface="Raavi"/>
+        <a:font script="Cans" typeface="Euphemia"/>
+        <a:font script="Cher" typeface="Plantagenet Cherokee"/>
+        <a:font script="Yiii" typeface="Microsoft Yi Baiti"/>
+        <a:font script="Tibt" typeface="Microsoft Himalaya"/>
+        <a:font script="Thaa" typeface="MV Boli"/>
+        <a:font script="Deva" typeface="Mangal"/>
+        <a:font script="Telu" typeface="Gautami"/>
+        <a:font script="Taml" typeface="Latha"/>
+        <a:font script="Syrc" typeface="Estrangelo Edessa"/>
+        <a:font script="Orya" typeface="Kalinga"/>
+        <a:font script="Mlym" typeface="Kartika"/>
+        <a:font script="Laoo" typeface="DokChampa"/>
+        <a:font script="Sinh" typeface="Iskoola Pota"/>
+        <a:font script="Mong" typeface="Mongolian Baiti"/>
+        <a:font script="Viet" typeface="Arial"/>
+        <a:font script="Uigh" typeface="Microsoft Uighur"/>
+        <a:font script="Geor" typeface="Sylfaen"/>
+      </a:minorFont>
+    </a:fontScheme>
+    <a:fmtScheme name="Office">
+      <a:fillStyleLst>
+        <a:solidFill>
+          <a:schemeClr val="phClr"/>
+        </a:solidFill>
+        <a:gradFill rotWithShape="1">
+          <a:gsLst>
+            <a:gs pos="0">
+              <a:schemeClr val="phClr">
+                <a:tint val="50000"/>
+                <a:satMod val="300000"/>
+              </a:schemeClr>
+            </a:gs>
+            <a:gs pos="35000">
+              <a:schemeClr val="phClr">
+                <a:tint val="37000"/>
+                <a:satMod val="300000"/>
+              </a:schemeClr>
+            </a:gs>
+            <a:gs pos="100000">
+              <a:schemeClr val="phClr">
+                <a:tint val="15000"/>
+                <a:satMod val="350000"/>
+              </a:schemeClr>
+            </a:gs>
+          </a:gsLst>
+          <a:lin ang="16200000" scaled="1"/>
+        </a:gradFill>
+        <a:gradFill rotWithShape="1">
+          <a:gsLst>
+            <a:gs pos="0">
+              <a:schemeClr val="phClr">
+                <a:shade val="51000"/>
+                <a:satMod val="130000"/>
+              </a:schemeClr>
+            </a:gs>
+            <a:gs pos="80000">
+              <a:schemeClr val="phClr">
+                <a:shade val="93000"/>
+                <a:satMod val="130000"/>
+              </a:schemeClr>
+            </a:gs>
+            <a:gs pos="100000">
+              <a:schemeClr val="phClr">
+                <a:shade val="94000"/>
+                <a:satMod val="135000"/>
+              </a:schemeClr>
+            </a:gs>
+          </a:gsLst>
+          <a:lin ang="16200000" scaled="0"/>
+        </a:gradFill>
+      </a:fillStyleLst>
+      <a:lnStyleLst>
+        <a:ln w="9525" cap="flat" cmpd="sng" algn="ctr">
+          <a:solidFill>
+            <a:schemeClr val="phClr">
+              <a:shade val="95000"/>
+              <a:satMod val="105000"/>
+            </a:schemeClr>
+          </a:solidFill>
+          <a:prstDash val="solid"/>
+        </a:ln>
+        <a:ln w="25400" cap="flat" cmpd="sng" algn="ctr">
+          <a:solidFill>
+            <a:schemeClr val="phClr"/>
+          </a:solidFill>
+          <a:prstDash val="solid"/>
+        </a:ln>
+        <a:ln w="38100" cap="flat" cmpd="sng" algn="ctr">
+          <a:solidFill>
+            <a:schemeClr val="phClr"/>
+          </a:solidFill>
+          <a:prstDash val="solid"/>
+        </a:ln>
+      </a:lnStyleLst>
+      <a:effectStyleLst>
+        <a:effectStyle>
+          <a:effectLst>
+            <a:outerShdw blurRad="40000" dist="20000" dir="5400000" rotWithShape="0">
+              <a:srgbClr val="000000">
+                <a:alpha val="38000"/>
+              </a:srgbClr>
+            </a:outerShdw>
+          </a:effectLst>
+        </a:effectStyle>
+        <a:effectStyle>
+          <a:effectLst>
+            <a:outerShdw blurRad="40000" dist="23000" dir="5400000" rotWithShape="0">
+              <a:srgbClr val="000000">
+                <a:alpha val="35000"/>
+              </a:srgbClr>
+            </a:outerShdw>
+          </a:effectLst>
+        </a:effectStyle>
+        <a:effectStyle>
+          <a:effectLst>
+            <a:outerShdw blurRad="40000" dist="23000" dir="5400000" rotWithShape="0">
+              <a:srgbClr val="000000">
+                <a:alpha val="35000"/>
+              </a:srgbClr>
+            </a:outerShdw>
+          </a:effectLst>
+          <a:scene3d>
+            <a:camera prst="orthographicFront">
+              <a:rot lat="0" lon="0" rev="0"/>
+            </a:camera>
+            <a:lightRig rig="threePt" dir="t">
+              <a:rot lat="0" lon="0" rev="1200000"/>
+            </a:lightRig>
+          </a:scene3d>
+          <a:sp3d>
+            <a:bevelT w="63500" h="25400"/>
+          </a:sp3d>
+        </a:effectStyle>
+      </a:effectStyleLst>
+      <a:bgFillStyleLst>
+        <a:solidFill>
+          <a:schemeClr val="phClr"/>
+        </a:solidFill>
+        <a:gradFill rotWithShape="1">
+          <a:gsLst>
+            <a:gs pos="0">
+              <a:schemeClr val="phClr">
+                <a:tint val="40000"/>
+                <a:satMod val="350000"/>
+              </a:schemeClr>
+            </a:gs>
+            <a:gs pos="40000">
+              <a:schemeClr val="phClr">
+                <a:tint val="45000"/>
+                <a:shade val="99000"/>
+                <a:satMod val="350000"/>
+              </a:schemeClr>
+            </a:gs>
+            <a:gs pos="100000">
+              <a:schemeClr val="phClr">
+                <a:shade val="20000"/>
+                <a:satMod val="255000"/>
+              </a:schemeClr>
+            </a:gs>
+          </a:gsLst>
+          <a:path path="circle">
+            <a:fillToRect l="50000" t="-80000" r="50000" b="180000"/>
+          </a:path>
+        </a:gradFill>
+        <a:gradFill rotWithShape="1">
+          <a:gsLst>
+            <a:gs pos="0">
+              <a:schemeClr val="phClr">
+                <a:tint val="80000"/>
+                <a:satMod val="300000"/>
+              </a:schemeClr>
+            </a:gs>
+            <a:gs pos="100000">
+              <a:schemeClr val="phClr">
+                <a:shade val="30000"/>
+                <a:satMod val="200000"/>
+              </a:schemeClr>
+            </a:gs>
+          </a:gsLst>
+          <a:path path="circle">
+            <a:fillToRect l="50000" t="50000" r="50000" b="50000"/>
+          </a:path>
+        </a:gradFill>
+      </a:bgFillStyleLst>
+    </a:fmtScheme>
+  </a:themeElements>
+  <a:objectDefaults/>
+  <a:extraClrSchemeLst/>
+</a:theme>
 </file>
</xml_diff>